<commit_message>
finshed db and fixed to eduehence
</commit_message>
<xml_diff>
--- a/Bootcamp/DB-uvod/DB-uvod.pptx
+++ b/Bootcamp/DB-uvod/DB-uvod.pptx
@@ -5,7 +5,7 @@
     <p:sldMasterId id="2147483648" r:id="rId4"/>
   </p:sldMasterIdLst>
   <p:notesMasterIdLst>
-    <p:notesMasterId r:id="rId38"/>
+    <p:notesMasterId r:id="rId37"/>
   </p:notesMasterIdLst>
   <p:sldIdLst>
     <p:sldId id="282" r:id="rId5"/>
@@ -17,30 +17,29 @@
     <p:sldId id="383" r:id="rId11"/>
     <p:sldId id="385" r:id="rId12"/>
     <p:sldId id="345" r:id="rId13"/>
-    <p:sldId id="386" r:id="rId14"/>
-    <p:sldId id="387" r:id="rId15"/>
-    <p:sldId id="388" r:id="rId16"/>
-    <p:sldId id="389" r:id="rId17"/>
-    <p:sldId id="378" r:id="rId18"/>
-    <p:sldId id="392" r:id="rId19"/>
-    <p:sldId id="390" r:id="rId20"/>
-    <p:sldId id="393" r:id="rId21"/>
-    <p:sldId id="394" r:id="rId22"/>
-    <p:sldId id="395" r:id="rId23"/>
-    <p:sldId id="398" r:id="rId24"/>
-    <p:sldId id="397" r:id="rId25"/>
-    <p:sldId id="396" r:id="rId26"/>
-    <p:sldId id="399" r:id="rId27"/>
-    <p:sldId id="400" r:id="rId28"/>
-    <p:sldId id="401" r:id="rId29"/>
-    <p:sldId id="402" r:id="rId30"/>
-    <p:sldId id="403" r:id="rId31"/>
-    <p:sldId id="404" r:id="rId32"/>
-    <p:sldId id="405" r:id="rId33"/>
-    <p:sldId id="406" r:id="rId34"/>
-    <p:sldId id="407" r:id="rId35"/>
-    <p:sldId id="408" r:id="rId36"/>
-    <p:sldId id="409" r:id="rId37"/>
+    <p:sldId id="387" r:id="rId14"/>
+    <p:sldId id="388" r:id="rId15"/>
+    <p:sldId id="389" r:id="rId16"/>
+    <p:sldId id="378" r:id="rId17"/>
+    <p:sldId id="392" r:id="rId18"/>
+    <p:sldId id="390" r:id="rId19"/>
+    <p:sldId id="393" r:id="rId20"/>
+    <p:sldId id="394" r:id="rId21"/>
+    <p:sldId id="395" r:id="rId22"/>
+    <p:sldId id="398" r:id="rId23"/>
+    <p:sldId id="397" r:id="rId24"/>
+    <p:sldId id="396" r:id="rId25"/>
+    <p:sldId id="399" r:id="rId26"/>
+    <p:sldId id="400" r:id="rId27"/>
+    <p:sldId id="401" r:id="rId28"/>
+    <p:sldId id="402" r:id="rId29"/>
+    <p:sldId id="403" r:id="rId30"/>
+    <p:sldId id="404" r:id="rId31"/>
+    <p:sldId id="405" r:id="rId32"/>
+    <p:sldId id="406" r:id="rId33"/>
+    <p:sldId id="407" r:id="rId34"/>
+    <p:sldId id="408" r:id="rId35"/>
+    <p:sldId id="409" r:id="rId36"/>
   </p:sldIdLst>
   <p:sldSz cx="12192000" cy="6858000"/>
   <p:notesSz cx="6858000" cy="9144000"/>
@@ -157,7 +156,6 @@
             <p14:sldId id="383"/>
             <p14:sldId id="385"/>
             <p14:sldId id="345"/>
-            <p14:sldId id="386"/>
             <p14:sldId id="387"/>
             <p14:sldId id="388"/>
             <p14:sldId id="389"/>
@@ -285,7 +283,7 @@
           <a:p>
             <a:fld id="{B2A70591-2E3C-5F42-A4E1-C0F5A0F4E5DB}" type="datetimeFigureOut">
               <a:rPr lang="en-US" smtClean="0"/>
-              <a:t>3/3/2025</a:t>
+              <a:t>3/12/2025</a:t>
             </a:fld>
             <a:endParaRPr lang="en-US"/>
           </a:p>
@@ -669,114 +667,6 @@
         <p:cNvPr id="1" name="">
           <a:extLst>
             <a:ext uri="{FF2B5EF4-FFF2-40B4-BE49-F238E27FC236}">
-              <a16:creationId xmlns:a16="http://schemas.microsoft.com/office/drawing/2014/main" id="{6447E1D4-78B8-37FD-1C3A-4164CC43463F}"/>
-            </a:ext>
-          </a:extLst>
-        </p:cNvPr>
-        <p:cNvGrpSpPr/>
-        <p:nvPr/>
-      </p:nvGrpSpPr>
-      <p:grpSpPr>
-        <a:xfrm>
-          <a:off x="0" y="0"/>
-          <a:ext cx="0" cy="0"/>
-          <a:chOff x="0" y="0"/>
-          <a:chExt cx="0" cy="0"/>
-        </a:xfrm>
-      </p:grpSpPr>
-      <p:sp>
-        <p:nvSpPr>
-          <p:cNvPr id="2" name="Slide Image Placeholder 1">
-            <a:extLst>
-              <a:ext uri="{FF2B5EF4-FFF2-40B4-BE49-F238E27FC236}">
-                <a16:creationId xmlns:a16="http://schemas.microsoft.com/office/drawing/2014/main" id="{EB43E683-BEEE-32B6-54F7-E46083B4B4B1}"/>
-              </a:ext>
-            </a:extLst>
-          </p:cNvPr>
-          <p:cNvSpPr>
-            <a:spLocks noGrp="1" noRot="1" noChangeAspect="1"/>
-          </p:cNvSpPr>
-          <p:nvPr>
-            <p:ph type="sldImg"/>
-          </p:nvPr>
-        </p:nvSpPr>
-        <p:spPr/>
-      </p:sp>
-      <p:sp>
-        <p:nvSpPr>
-          <p:cNvPr id="3" name="Notes Placeholder 2">
-            <a:extLst>
-              <a:ext uri="{FF2B5EF4-FFF2-40B4-BE49-F238E27FC236}">
-                <a16:creationId xmlns:a16="http://schemas.microsoft.com/office/drawing/2014/main" id="{643B68D3-49FA-5D89-2863-27A2503AB792}"/>
-              </a:ext>
-            </a:extLst>
-          </p:cNvPr>
-          <p:cNvSpPr>
-            <a:spLocks noGrp="1"/>
-          </p:cNvSpPr>
-          <p:nvPr>
-            <p:ph type="body" idx="1"/>
-          </p:nvPr>
-        </p:nvSpPr>
-        <p:spPr/>
-        <p:txBody>
-          <a:bodyPr/>
-          <a:lstStyle/>
-          <a:p>
-            <a:endParaRPr lang="hr-HR" dirty="0"/>
-          </a:p>
-        </p:txBody>
-      </p:sp>
-      <p:sp>
-        <p:nvSpPr>
-          <p:cNvPr id="4" name="Slide Number Placeholder 3">
-            <a:extLst>
-              <a:ext uri="{FF2B5EF4-FFF2-40B4-BE49-F238E27FC236}">
-                <a16:creationId xmlns:a16="http://schemas.microsoft.com/office/drawing/2014/main" id="{BCF67FF3-B9AF-5DCB-C75B-6018224176B0}"/>
-              </a:ext>
-            </a:extLst>
-          </p:cNvPr>
-          <p:cNvSpPr>
-            <a:spLocks noGrp="1"/>
-          </p:cNvSpPr>
-          <p:nvPr>
-            <p:ph type="sldNum" sz="quarter" idx="5"/>
-          </p:nvPr>
-        </p:nvSpPr>
-        <p:spPr/>
-        <p:txBody>
-          <a:bodyPr/>
-          <a:lstStyle/>
-          <a:p>
-            <a:fld id="{343B951A-A665-1949-AEDB-B62DC9BE7F13}" type="slidenum">
-              <a:rPr lang="en-US" smtClean="0"/>
-              <a:t>11</a:t>
-            </a:fld>
-            <a:endParaRPr lang="en-US"/>
-          </a:p>
-        </p:txBody>
-      </p:sp>
-    </p:spTree>
-    <p:extLst>
-      <p:ext uri="{BB962C8B-B14F-4D97-AF65-F5344CB8AC3E}">
-        <p14:creationId xmlns:p14="http://schemas.microsoft.com/office/powerpoint/2010/main" val="557445626"/>
-      </p:ext>
-    </p:extLst>
-  </p:cSld>
-  <p:clrMapOvr>
-    <a:masterClrMapping/>
-  </p:clrMapOvr>
-</p:notes>
-</file>
-
-<file path=ppt/notesSlides/notesSlide11.xml><?xml version="1.0" encoding="utf-8"?>
-<p:notes xmlns:a="http://schemas.openxmlformats.org/drawingml/2006/main" xmlns:r="http://schemas.openxmlformats.org/officeDocument/2006/relationships" xmlns:p="http://schemas.openxmlformats.org/presentationml/2006/main">
-  <p:cSld>
-    <p:spTree>
-      <p:nvGrpSpPr>
-        <p:cNvPr id="1" name="">
-          <a:extLst>
-            <a:ext uri="{FF2B5EF4-FFF2-40B4-BE49-F238E27FC236}">
               <a16:creationId xmlns:a16="http://schemas.microsoft.com/office/drawing/2014/main" id="{706CFF9B-A097-0D77-DB9C-BBD803D184E5}"/>
             </a:ext>
           </a:extLst>
@@ -858,7 +748,7 @@
           <a:p>
             <a:fld id="{343B951A-A665-1949-AEDB-B62DC9BE7F13}" type="slidenum">
               <a:rPr lang="en-US" smtClean="0"/>
-              <a:t>12</a:t>
+              <a:t>11</a:t>
             </a:fld>
             <a:endParaRPr lang="en-US"/>
           </a:p>
@@ -877,7 +767,7 @@
 </p:notes>
 </file>
 
-<file path=ppt/notesSlides/notesSlide12.xml><?xml version="1.0" encoding="utf-8"?>
+<file path=ppt/notesSlides/notesSlide11.xml><?xml version="1.0" encoding="utf-8"?>
 <p:notes xmlns:a="http://schemas.openxmlformats.org/drawingml/2006/main" xmlns:r="http://schemas.openxmlformats.org/officeDocument/2006/relationships" xmlns:p="http://schemas.openxmlformats.org/presentationml/2006/main">
   <p:cSld>
     <p:spTree>
@@ -966,7 +856,7 @@
           <a:p>
             <a:fld id="{343B951A-A665-1949-AEDB-B62DC9BE7F13}" type="slidenum">
               <a:rPr lang="en-US" smtClean="0"/>
-              <a:t>13</a:t>
+              <a:t>12</a:t>
             </a:fld>
             <a:endParaRPr lang="en-US"/>
           </a:p>
@@ -985,7 +875,7 @@
 </p:notes>
 </file>
 
-<file path=ppt/notesSlides/notesSlide13.xml><?xml version="1.0" encoding="utf-8"?>
+<file path=ppt/notesSlides/notesSlide12.xml><?xml version="1.0" encoding="utf-8"?>
 <p:notes xmlns:a="http://schemas.openxmlformats.org/drawingml/2006/main" xmlns:r="http://schemas.openxmlformats.org/officeDocument/2006/relationships" xmlns:p="http://schemas.openxmlformats.org/presentationml/2006/main">
   <p:cSld>
     <p:spTree>
@@ -1074,7 +964,7 @@
           <a:p>
             <a:fld id="{343B951A-A665-1949-AEDB-B62DC9BE7F13}" type="slidenum">
               <a:rPr lang="en-US" smtClean="0"/>
-              <a:t>14</a:t>
+              <a:t>13</a:t>
             </a:fld>
             <a:endParaRPr lang="en-US"/>
           </a:p>
@@ -1093,7 +983,7 @@
 </p:notes>
 </file>
 
-<file path=ppt/notesSlides/notesSlide14.xml><?xml version="1.0" encoding="utf-8"?>
+<file path=ppt/notesSlides/notesSlide13.xml><?xml version="1.0" encoding="utf-8"?>
 <p:notes xmlns:a="http://schemas.openxmlformats.org/drawingml/2006/main" xmlns:r="http://schemas.openxmlformats.org/officeDocument/2006/relationships" xmlns:p="http://schemas.openxmlformats.org/presentationml/2006/main">
   <p:cSld>
     <p:spTree>
@@ -1182,7 +1072,7 @@
           <a:p>
             <a:fld id="{343B951A-A665-1949-AEDB-B62DC9BE7F13}" type="slidenum">
               <a:rPr lang="en-US" smtClean="0"/>
-              <a:t>15</a:t>
+              <a:t>14</a:t>
             </a:fld>
             <a:endParaRPr lang="en-US"/>
           </a:p>
@@ -1201,7 +1091,7 @@
 </p:notes>
 </file>
 
-<file path=ppt/notesSlides/notesSlide15.xml><?xml version="1.0" encoding="utf-8"?>
+<file path=ppt/notesSlides/notesSlide14.xml><?xml version="1.0" encoding="utf-8"?>
 <p:notes xmlns:a="http://schemas.openxmlformats.org/drawingml/2006/main" xmlns:r="http://schemas.openxmlformats.org/officeDocument/2006/relationships" xmlns:p="http://schemas.openxmlformats.org/presentationml/2006/main">
   <p:cSld>
     <p:spTree>
@@ -1411,7 +1301,7 @@
           <a:p>
             <a:fld id="{343B951A-A665-1949-AEDB-B62DC9BE7F13}" type="slidenum">
               <a:rPr lang="en-US" smtClean="0"/>
-              <a:t>16</a:t>
+              <a:t>15</a:t>
             </a:fld>
             <a:endParaRPr lang="en-US"/>
           </a:p>
@@ -1430,7 +1320,7 @@
 </p:notes>
 </file>
 
-<file path=ppt/notesSlides/notesSlide16.xml><?xml version="1.0" encoding="utf-8"?>
+<file path=ppt/notesSlides/notesSlide15.xml><?xml version="1.0" encoding="utf-8"?>
 <p:notes xmlns:a="http://schemas.openxmlformats.org/drawingml/2006/main" xmlns:r="http://schemas.openxmlformats.org/officeDocument/2006/relationships" xmlns:p="http://schemas.openxmlformats.org/presentationml/2006/main">
   <p:cSld>
     <p:spTree>
@@ -1640,7 +1530,7 @@
           <a:p>
             <a:fld id="{343B951A-A665-1949-AEDB-B62DC9BE7F13}" type="slidenum">
               <a:rPr lang="en-US" smtClean="0"/>
-              <a:t>17</a:t>
+              <a:t>16</a:t>
             </a:fld>
             <a:endParaRPr lang="en-US"/>
           </a:p>
@@ -1659,7 +1549,7 @@
 </p:notes>
 </file>
 
-<file path=ppt/notesSlides/notesSlide17.xml><?xml version="1.0" encoding="utf-8"?>
+<file path=ppt/notesSlides/notesSlide16.xml><?xml version="1.0" encoding="utf-8"?>
 <p:notes xmlns:a="http://schemas.openxmlformats.org/drawingml/2006/main" xmlns:r="http://schemas.openxmlformats.org/officeDocument/2006/relationships" xmlns:p="http://schemas.openxmlformats.org/presentationml/2006/main">
   <p:cSld>
     <p:spTree>
@@ -1748,7 +1638,7 @@
           <a:p>
             <a:fld id="{343B951A-A665-1949-AEDB-B62DC9BE7F13}" type="slidenum">
               <a:rPr lang="en-US" smtClean="0"/>
-              <a:t>18</a:t>
+              <a:t>17</a:t>
             </a:fld>
             <a:endParaRPr lang="en-US"/>
           </a:p>
@@ -1767,7 +1657,7 @@
 </p:notes>
 </file>
 
-<file path=ppt/notesSlides/notesSlide18.xml><?xml version="1.0" encoding="utf-8"?>
+<file path=ppt/notesSlides/notesSlide17.xml><?xml version="1.0" encoding="utf-8"?>
 <p:notes xmlns:a="http://schemas.openxmlformats.org/drawingml/2006/main" xmlns:r="http://schemas.openxmlformats.org/officeDocument/2006/relationships" xmlns:p="http://schemas.openxmlformats.org/presentationml/2006/main">
   <p:cSld>
     <p:spTree>
@@ -1977,7 +1867,7 @@
           <a:p>
             <a:fld id="{343B951A-A665-1949-AEDB-B62DC9BE7F13}" type="slidenum">
               <a:rPr lang="en-US" smtClean="0"/>
-              <a:t>19</a:t>
+              <a:t>18</a:t>
             </a:fld>
             <a:endParaRPr lang="en-US"/>
           </a:p>
@@ -1996,7 +1886,7 @@
 </p:notes>
 </file>
 
-<file path=ppt/notesSlides/notesSlide19.xml><?xml version="1.0" encoding="utf-8"?>
+<file path=ppt/notesSlides/notesSlide18.xml><?xml version="1.0" encoding="utf-8"?>
 <p:notes xmlns:a="http://schemas.openxmlformats.org/drawingml/2006/main" xmlns:r="http://schemas.openxmlformats.org/officeDocument/2006/relationships" xmlns:p="http://schemas.openxmlformats.org/presentationml/2006/main">
   <p:cSld>
     <p:spTree>
@@ -2206,7 +2096,7 @@
           <a:p>
             <a:fld id="{343B951A-A665-1949-AEDB-B62DC9BE7F13}" type="slidenum">
               <a:rPr lang="en-US" smtClean="0"/>
-              <a:t>20</a:t>
+              <a:t>19</a:t>
             </a:fld>
             <a:endParaRPr lang="en-US"/>
           </a:p>
@@ -2216,6 +2106,114 @@
     <p:extLst>
       <p:ext uri="{BB962C8B-B14F-4D97-AF65-F5344CB8AC3E}">
         <p14:creationId xmlns:p14="http://schemas.microsoft.com/office/powerpoint/2010/main" val="3459046579"/>
+      </p:ext>
+    </p:extLst>
+  </p:cSld>
+  <p:clrMapOvr>
+    <a:masterClrMapping/>
+  </p:clrMapOvr>
+</p:notes>
+</file>
+
+<file path=ppt/notesSlides/notesSlide19.xml><?xml version="1.0" encoding="utf-8"?>
+<p:notes xmlns:a="http://schemas.openxmlformats.org/drawingml/2006/main" xmlns:r="http://schemas.openxmlformats.org/officeDocument/2006/relationships" xmlns:p="http://schemas.openxmlformats.org/presentationml/2006/main">
+  <p:cSld>
+    <p:spTree>
+      <p:nvGrpSpPr>
+        <p:cNvPr id="1" name="">
+          <a:extLst>
+            <a:ext uri="{FF2B5EF4-FFF2-40B4-BE49-F238E27FC236}">
+              <a16:creationId xmlns:a16="http://schemas.microsoft.com/office/drawing/2014/main" id="{BAEC98D7-02A1-830F-6BD4-05800C95B62E}"/>
+            </a:ext>
+          </a:extLst>
+        </p:cNvPr>
+        <p:cNvGrpSpPr/>
+        <p:nvPr/>
+      </p:nvGrpSpPr>
+      <p:grpSpPr>
+        <a:xfrm>
+          <a:off x="0" y="0"/>
+          <a:ext cx="0" cy="0"/>
+          <a:chOff x="0" y="0"/>
+          <a:chExt cx="0" cy="0"/>
+        </a:xfrm>
+      </p:grpSpPr>
+      <p:sp>
+        <p:nvSpPr>
+          <p:cNvPr id="2" name="Slide Image Placeholder 1">
+            <a:extLst>
+              <a:ext uri="{FF2B5EF4-FFF2-40B4-BE49-F238E27FC236}">
+                <a16:creationId xmlns:a16="http://schemas.microsoft.com/office/drawing/2014/main" id="{F0B237C2-F2FC-C3C9-8443-101FDE4429BA}"/>
+              </a:ext>
+            </a:extLst>
+          </p:cNvPr>
+          <p:cNvSpPr>
+            <a:spLocks noGrp="1" noRot="1" noChangeAspect="1"/>
+          </p:cNvSpPr>
+          <p:nvPr>
+            <p:ph type="sldImg"/>
+          </p:nvPr>
+        </p:nvSpPr>
+        <p:spPr/>
+      </p:sp>
+      <p:sp>
+        <p:nvSpPr>
+          <p:cNvPr id="3" name="Notes Placeholder 2">
+            <a:extLst>
+              <a:ext uri="{FF2B5EF4-FFF2-40B4-BE49-F238E27FC236}">
+                <a16:creationId xmlns:a16="http://schemas.microsoft.com/office/drawing/2014/main" id="{5DB6DD71-AF3C-4D87-23CF-A7BD930349CD}"/>
+              </a:ext>
+            </a:extLst>
+          </p:cNvPr>
+          <p:cNvSpPr>
+            <a:spLocks noGrp="1"/>
+          </p:cNvSpPr>
+          <p:nvPr>
+            <p:ph type="body" idx="1"/>
+          </p:nvPr>
+        </p:nvSpPr>
+        <p:spPr/>
+        <p:txBody>
+          <a:bodyPr/>
+          <a:lstStyle/>
+          <a:p>
+            <a:endParaRPr lang="hr-HR" dirty="0"/>
+          </a:p>
+        </p:txBody>
+      </p:sp>
+      <p:sp>
+        <p:nvSpPr>
+          <p:cNvPr id="4" name="Slide Number Placeholder 3">
+            <a:extLst>
+              <a:ext uri="{FF2B5EF4-FFF2-40B4-BE49-F238E27FC236}">
+                <a16:creationId xmlns:a16="http://schemas.microsoft.com/office/drawing/2014/main" id="{02D40EF2-09BD-E620-21E9-DD84AB099944}"/>
+              </a:ext>
+            </a:extLst>
+          </p:cNvPr>
+          <p:cNvSpPr>
+            <a:spLocks noGrp="1"/>
+          </p:cNvSpPr>
+          <p:nvPr>
+            <p:ph type="sldNum" sz="quarter" idx="5"/>
+          </p:nvPr>
+        </p:nvSpPr>
+        <p:spPr/>
+        <p:txBody>
+          <a:bodyPr/>
+          <a:lstStyle/>
+          <a:p>
+            <a:fld id="{343B951A-A665-1949-AEDB-B62DC9BE7F13}" type="slidenum">
+              <a:rPr lang="en-US" smtClean="0"/>
+              <a:t>20</a:t>
+            </a:fld>
+            <a:endParaRPr lang="en-US"/>
+          </a:p>
+        </p:txBody>
+      </p:sp>
+    </p:spTree>
+    <p:extLst>
+      <p:ext uri="{BB962C8B-B14F-4D97-AF65-F5344CB8AC3E}">
+        <p14:creationId xmlns:p14="http://schemas.microsoft.com/office/powerpoint/2010/main" val="2378960705"/>
       </p:ext>
     </p:extLst>
   </p:cSld>
@@ -2341,114 +2339,6 @@
         <p:cNvPr id="1" name="">
           <a:extLst>
             <a:ext uri="{FF2B5EF4-FFF2-40B4-BE49-F238E27FC236}">
-              <a16:creationId xmlns:a16="http://schemas.microsoft.com/office/drawing/2014/main" id="{BAEC98D7-02A1-830F-6BD4-05800C95B62E}"/>
-            </a:ext>
-          </a:extLst>
-        </p:cNvPr>
-        <p:cNvGrpSpPr/>
-        <p:nvPr/>
-      </p:nvGrpSpPr>
-      <p:grpSpPr>
-        <a:xfrm>
-          <a:off x="0" y="0"/>
-          <a:ext cx="0" cy="0"/>
-          <a:chOff x="0" y="0"/>
-          <a:chExt cx="0" cy="0"/>
-        </a:xfrm>
-      </p:grpSpPr>
-      <p:sp>
-        <p:nvSpPr>
-          <p:cNvPr id="2" name="Slide Image Placeholder 1">
-            <a:extLst>
-              <a:ext uri="{FF2B5EF4-FFF2-40B4-BE49-F238E27FC236}">
-                <a16:creationId xmlns:a16="http://schemas.microsoft.com/office/drawing/2014/main" id="{F0B237C2-F2FC-C3C9-8443-101FDE4429BA}"/>
-              </a:ext>
-            </a:extLst>
-          </p:cNvPr>
-          <p:cNvSpPr>
-            <a:spLocks noGrp="1" noRot="1" noChangeAspect="1"/>
-          </p:cNvSpPr>
-          <p:nvPr>
-            <p:ph type="sldImg"/>
-          </p:nvPr>
-        </p:nvSpPr>
-        <p:spPr/>
-      </p:sp>
-      <p:sp>
-        <p:nvSpPr>
-          <p:cNvPr id="3" name="Notes Placeholder 2">
-            <a:extLst>
-              <a:ext uri="{FF2B5EF4-FFF2-40B4-BE49-F238E27FC236}">
-                <a16:creationId xmlns:a16="http://schemas.microsoft.com/office/drawing/2014/main" id="{5DB6DD71-AF3C-4D87-23CF-A7BD930349CD}"/>
-              </a:ext>
-            </a:extLst>
-          </p:cNvPr>
-          <p:cNvSpPr>
-            <a:spLocks noGrp="1"/>
-          </p:cNvSpPr>
-          <p:nvPr>
-            <p:ph type="body" idx="1"/>
-          </p:nvPr>
-        </p:nvSpPr>
-        <p:spPr/>
-        <p:txBody>
-          <a:bodyPr/>
-          <a:lstStyle/>
-          <a:p>
-            <a:endParaRPr lang="hr-HR" dirty="0"/>
-          </a:p>
-        </p:txBody>
-      </p:sp>
-      <p:sp>
-        <p:nvSpPr>
-          <p:cNvPr id="4" name="Slide Number Placeholder 3">
-            <a:extLst>
-              <a:ext uri="{FF2B5EF4-FFF2-40B4-BE49-F238E27FC236}">
-                <a16:creationId xmlns:a16="http://schemas.microsoft.com/office/drawing/2014/main" id="{02D40EF2-09BD-E620-21E9-DD84AB099944}"/>
-              </a:ext>
-            </a:extLst>
-          </p:cNvPr>
-          <p:cNvSpPr>
-            <a:spLocks noGrp="1"/>
-          </p:cNvSpPr>
-          <p:nvPr>
-            <p:ph type="sldNum" sz="quarter" idx="5"/>
-          </p:nvPr>
-        </p:nvSpPr>
-        <p:spPr/>
-        <p:txBody>
-          <a:bodyPr/>
-          <a:lstStyle/>
-          <a:p>
-            <a:fld id="{343B951A-A665-1949-AEDB-B62DC9BE7F13}" type="slidenum">
-              <a:rPr lang="en-US" smtClean="0"/>
-              <a:t>21</a:t>
-            </a:fld>
-            <a:endParaRPr lang="en-US"/>
-          </a:p>
-        </p:txBody>
-      </p:sp>
-    </p:spTree>
-    <p:extLst>
-      <p:ext uri="{BB962C8B-B14F-4D97-AF65-F5344CB8AC3E}">
-        <p14:creationId xmlns:p14="http://schemas.microsoft.com/office/powerpoint/2010/main" val="2378960705"/>
-      </p:ext>
-    </p:extLst>
-  </p:cSld>
-  <p:clrMapOvr>
-    <a:masterClrMapping/>
-  </p:clrMapOvr>
-</p:notes>
-</file>
-
-<file path=ppt/notesSlides/notesSlide21.xml><?xml version="1.0" encoding="utf-8"?>
-<p:notes xmlns:a="http://schemas.openxmlformats.org/drawingml/2006/main" xmlns:r="http://schemas.openxmlformats.org/officeDocument/2006/relationships" xmlns:p="http://schemas.openxmlformats.org/presentationml/2006/main">
-  <p:cSld>
-    <p:spTree>
-      <p:nvGrpSpPr>
-        <p:cNvPr id="1" name="">
-          <a:extLst>
-            <a:ext uri="{FF2B5EF4-FFF2-40B4-BE49-F238E27FC236}">
               <a16:creationId xmlns:a16="http://schemas.microsoft.com/office/drawing/2014/main" id="{A9990A41-CE9A-FD5A-F2A8-3AA3EF2EB0AF}"/>
             </a:ext>
           </a:extLst>
@@ -2651,7 +2541,7 @@
           <a:p>
             <a:fld id="{343B951A-A665-1949-AEDB-B62DC9BE7F13}" type="slidenum">
               <a:rPr lang="en-US" smtClean="0"/>
-              <a:t>22</a:t>
+              <a:t>21</a:t>
             </a:fld>
             <a:endParaRPr lang="en-US"/>
           </a:p>
@@ -2670,7 +2560,7 @@
 </p:notes>
 </file>
 
-<file path=ppt/notesSlides/notesSlide22.xml><?xml version="1.0" encoding="utf-8"?>
+<file path=ppt/notesSlides/notesSlide21.xml><?xml version="1.0" encoding="utf-8"?>
 <p:notes xmlns:a="http://schemas.openxmlformats.org/drawingml/2006/main" xmlns:r="http://schemas.openxmlformats.org/officeDocument/2006/relationships" xmlns:p="http://schemas.openxmlformats.org/presentationml/2006/main">
   <p:cSld>
     <p:spTree>
@@ -2880,7 +2770,7 @@
           <a:p>
             <a:fld id="{343B951A-A665-1949-AEDB-B62DC9BE7F13}" type="slidenum">
               <a:rPr lang="en-US" smtClean="0"/>
-              <a:t>23</a:t>
+              <a:t>22</a:t>
             </a:fld>
             <a:endParaRPr lang="en-US"/>
           </a:p>
@@ -2899,7 +2789,7 @@
 </p:notes>
 </file>
 
-<file path=ppt/notesSlides/notesSlide23.xml><?xml version="1.0" encoding="utf-8"?>
+<file path=ppt/notesSlides/notesSlide22.xml><?xml version="1.0" encoding="utf-8"?>
 <p:notes xmlns:a="http://schemas.openxmlformats.org/drawingml/2006/main" xmlns:r="http://schemas.openxmlformats.org/officeDocument/2006/relationships" xmlns:p="http://schemas.openxmlformats.org/presentationml/2006/main">
   <p:cSld>
     <p:spTree>
@@ -3109,7 +2999,7 @@
           <a:p>
             <a:fld id="{343B951A-A665-1949-AEDB-B62DC9BE7F13}" type="slidenum">
               <a:rPr lang="en-US" smtClean="0"/>
-              <a:t>24</a:t>
+              <a:t>23</a:t>
             </a:fld>
             <a:endParaRPr lang="en-US"/>
           </a:p>
@@ -3128,7 +3018,7 @@
 </p:notes>
 </file>
 
-<file path=ppt/notesSlides/notesSlide24.xml><?xml version="1.0" encoding="utf-8"?>
+<file path=ppt/notesSlides/notesSlide23.xml><?xml version="1.0" encoding="utf-8"?>
 <p:notes xmlns:a="http://schemas.openxmlformats.org/drawingml/2006/main" xmlns:r="http://schemas.openxmlformats.org/officeDocument/2006/relationships" xmlns:p="http://schemas.openxmlformats.org/presentationml/2006/main">
   <p:cSld>
     <p:spTree>
@@ -3217,7 +3107,7 @@
           <a:p>
             <a:fld id="{343B951A-A665-1949-AEDB-B62DC9BE7F13}" type="slidenum">
               <a:rPr lang="en-US" smtClean="0"/>
-              <a:t>25</a:t>
+              <a:t>24</a:t>
             </a:fld>
             <a:endParaRPr lang="en-US"/>
           </a:p>
@@ -3236,7 +3126,7 @@
 </p:notes>
 </file>
 
-<file path=ppt/notesSlides/notesSlide25.xml><?xml version="1.0" encoding="utf-8"?>
+<file path=ppt/notesSlides/notesSlide24.xml><?xml version="1.0" encoding="utf-8"?>
 <p:notes xmlns:a="http://schemas.openxmlformats.org/drawingml/2006/main" xmlns:r="http://schemas.openxmlformats.org/officeDocument/2006/relationships" xmlns:p="http://schemas.openxmlformats.org/presentationml/2006/main">
   <p:cSld>
     <p:spTree>
@@ -3446,7 +3336,7 @@
           <a:p>
             <a:fld id="{343B951A-A665-1949-AEDB-B62DC9BE7F13}" type="slidenum">
               <a:rPr lang="en-US" smtClean="0"/>
-              <a:t>26</a:t>
+              <a:t>25</a:t>
             </a:fld>
             <a:endParaRPr lang="en-US"/>
           </a:p>
@@ -3465,7 +3355,7 @@
 </p:notes>
 </file>
 
-<file path=ppt/notesSlides/notesSlide26.xml><?xml version="1.0" encoding="utf-8"?>
+<file path=ppt/notesSlides/notesSlide25.xml><?xml version="1.0" encoding="utf-8"?>
 <p:notes xmlns:a="http://schemas.openxmlformats.org/drawingml/2006/main" xmlns:r="http://schemas.openxmlformats.org/officeDocument/2006/relationships" xmlns:p="http://schemas.openxmlformats.org/presentationml/2006/main">
   <p:cSld>
     <p:spTree>
@@ -3675,7 +3565,7 @@
           <a:p>
             <a:fld id="{343B951A-A665-1949-AEDB-B62DC9BE7F13}" type="slidenum">
               <a:rPr lang="en-US" smtClean="0"/>
-              <a:t>27</a:t>
+              <a:t>26</a:t>
             </a:fld>
             <a:endParaRPr lang="en-US"/>
           </a:p>
@@ -3694,7 +3584,7 @@
 </p:notes>
 </file>
 
-<file path=ppt/notesSlides/notesSlide27.xml><?xml version="1.0" encoding="utf-8"?>
+<file path=ppt/notesSlides/notesSlide26.xml><?xml version="1.0" encoding="utf-8"?>
 <p:notes xmlns:a="http://schemas.openxmlformats.org/drawingml/2006/main" xmlns:r="http://schemas.openxmlformats.org/officeDocument/2006/relationships" xmlns:p="http://schemas.openxmlformats.org/presentationml/2006/main">
   <p:cSld>
     <p:spTree>
@@ -3904,7 +3794,7 @@
           <a:p>
             <a:fld id="{343B951A-A665-1949-AEDB-B62DC9BE7F13}" type="slidenum">
               <a:rPr lang="en-US" smtClean="0"/>
-              <a:t>28</a:t>
+              <a:t>27</a:t>
             </a:fld>
             <a:endParaRPr lang="en-US"/>
           </a:p>
@@ -3923,7 +3813,7 @@
 </p:notes>
 </file>
 
-<file path=ppt/notesSlides/notesSlide28.xml><?xml version="1.0" encoding="utf-8"?>
+<file path=ppt/notesSlides/notesSlide27.xml><?xml version="1.0" encoding="utf-8"?>
 <p:notes xmlns:a="http://schemas.openxmlformats.org/drawingml/2006/main" xmlns:r="http://schemas.openxmlformats.org/officeDocument/2006/relationships" xmlns:p="http://schemas.openxmlformats.org/presentationml/2006/main">
   <p:cSld>
     <p:spTree>
@@ -4012,7 +3902,7 @@
           <a:p>
             <a:fld id="{343B951A-A665-1949-AEDB-B62DC9BE7F13}" type="slidenum">
               <a:rPr lang="en-US" smtClean="0"/>
-              <a:t>29</a:t>
+              <a:t>28</a:t>
             </a:fld>
             <a:endParaRPr lang="en-US"/>
           </a:p>
@@ -4031,7 +3921,7 @@
 </p:notes>
 </file>
 
-<file path=ppt/notesSlides/notesSlide29.xml><?xml version="1.0" encoding="utf-8"?>
+<file path=ppt/notesSlides/notesSlide28.xml><?xml version="1.0" encoding="utf-8"?>
 <p:notes xmlns:a="http://schemas.openxmlformats.org/drawingml/2006/main" xmlns:r="http://schemas.openxmlformats.org/officeDocument/2006/relationships" xmlns:p="http://schemas.openxmlformats.org/presentationml/2006/main">
   <p:cSld>
     <p:spTree>
@@ -4241,7 +4131,7 @@
           <a:p>
             <a:fld id="{343B951A-A665-1949-AEDB-B62DC9BE7F13}" type="slidenum">
               <a:rPr lang="en-US" smtClean="0"/>
-              <a:t>30</a:t>
+              <a:t>29</a:t>
             </a:fld>
             <a:endParaRPr lang="en-US"/>
           </a:p>
@@ -4251,6 +4141,235 @@
     <p:extLst>
       <p:ext uri="{BB962C8B-B14F-4D97-AF65-F5344CB8AC3E}">
         <p14:creationId xmlns:p14="http://schemas.microsoft.com/office/powerpoint/2010/main" val="77197571"/>
+      </p:ext>
+    </p:extLst>
+  </p:cSld>
+  <p:clrMapOvr>
+    <a:masterClrMapping/>
+  </p:clrMapOvr>
+</p:notes>
+</file>
+
+<file path=ppt/notesSlides/notesSlide29.xml><?xml version="1.0" encoding="utf-8"?>
+<p:notes xmlns:a="http://schemas.openxmlformats.org/drawingml/2006/main" xmlns:r="http://schemas.openxmlformats.org/officeDocument/2006/relationships" xmlns:p="http://schemas.openxmlformats.org/presentationml/2006/main">
+  <p:cSld>
+    <p:spTree>
+      <p:nvGrpSpPr>
+        <p:cNvPr id="1" name="">
+          <a:extLst>
+            <a:ext uri="{FF2B5EF4-FFF2-40B4-BE49-F238E27FC236}">
+              <a16:creationId xmlns:a16="http://schemas.microsoft.com/office/drawing/2014/main" id="{123261F1-6BDE-17F1-D3AB-63B36C3813DB}"/>
+            </a:ext>
+          </a:extLst>
+        </p:cNvPr>
+        <p:cNvGrpSpPr/>
+        <p:nvPr/>
+      </p:nvGrpSpPr>
+      <p:grpSpPr>
+        <a:xfrm>
+          <a:off x="0" y="0"/>
+          <a:ext cx="0" cy="0"/>
+          <a:chOff x="0" y="0"/>
+          <a:chExt cx="0" cy="0"/>
+        </a:xfrm>
+      </p:grpSpPr>
+      <p:sp>
+        <p:nvSpPr>
+          <p:cNvPr id="2" name="Slide Image Placeholder 1">
+            <a:extLst>
+              <a:ext uri="{FF2B5EF4-FFF2-40B4-BE49-F238E27FC236}">
+                <a16:creationId xmlns:a16="http://schemas.microsoft.com/office/drawing/2014/main" id="{CFB7C3A0-D999-2048-41AA-1D961676A5E4}"/>
+              </a:ext>
+            </a:extLst>
+          </p:cNvPr>
+          <p:cNvSpPr>
+            <a:spLocks noGrp="1" noRot="1" noChangeAspect="1"/>
+          </p:cNvSpPr>
+          <p:nvPr>
+            <p:ph type="sldImg"/>
+          </p:nvPr>
+        </p:nvSpPr>
+        <p:spPr/>
+      </p:sp>
+      <p:sp>
+        <p:nvSpPr>
+          <p:cNvPr id="3" name="Notes Placeholder 2">
+            <a:extLst>
+              <a:ext uri="{FF2B5EF4-FFF2-40B4-BE49-F238E27FC236}">
+                <a16:creationId xmlns:a16="http://schemas.microsoft.com/office/drawing/2014/main" id="{5B9EE927-122C-01CE-9AAE-EDE39C4660E1}"/>
+              </a:ext>
+            </a:extLst>
+          </p:cNvPr>
+          <p:cNvSpPr>
+            <a:spLocks noGrp="1"/>
+          </p:cNvSpPr>
+          <p:nvPr>
+            <p:ph type="body" idx="1"/>
+          </p:nvPr>
+        </p:nvSpPr>
+        <p:spPr/>
+        <p:txBody>
+          <a:bodyPr/>
+          <a:lstStyle/>
+          <a:p>
+            <a:pPr algn="l"/>
+            <a:r>
+              <a:rPr lang="en-US" dirty="0" err="1"/>
+              <a:t>Instaliranje</a:t>
+            </a:r>
+            <a:r>
+              <a:rPr lang="en-US" dirty="0"/>
+              <a:t> u local</a:t>
+            </a:r>
+            <a:br>
+              <a:rPr lang="en-US" dirty="0"/>
+            </a:br>
+            <a:br>
+              <a:rPr lang="en-US" dirty="0"/>
+            </a:br>
+            <a:r>
+              <a:rPr lang="en-US" b="1" i="0" dirty="0">
+                <a:solidFill>
+                  <a:srgbClr val="303141"/>
+                </a:solidFill>
+                <a:effectLst/>
+                <a:latin typeface="Udemy Sans"/>
+              </a:rPr>
+              <a:t>1. Windows Users:</a:t>
+            </a:r>
+            <a:r>
+              <a:rPr lang="en-US" b="0" i="0" dirty="0">
+                <a:solidFill>
+                  <a:srgbClr val="303141"/>
+                </a:solidFill>
+                <a:effectLst/>
+                <a:latin typeface="Udemy Sans"/>
+              </a:rPr>
+              <a:t> Download the Postgres Installer here:</a:t>
+            </a:r>
+          </a:p>
+          <a:p>
+            <a:pPr algn="l"/>
+            <a:r>
+              <a:rPr lang="en-US" b="0" i="0" dirty="0">
+                <a:solidFill>
+                  <a:srgbClr val="6D28D2"/>
+                </a:solidFill>
+                <a:effectLst/>
+                <a:latin typeface="Udemy Sans"/>
+                <a:hlinkClick r:id="rId3"/>
+              </a:rPr>
+              <a:t>https://sbp.enterprisedb.com/getfile.jsp?fileid=1258649</a:t>
+            </a:r>
+            <a:endParaRPr lang="en-US" b="0" i="0" dirty="0">
+              <a:solidFill>
+                <a:srgbClr val="303141"/>
+              </a:solidFill>
+              <a:effectLst/>
+              <a:latin typeface="Udemy Sans"/>
+            </a:endParaRPr>
+          </a:p>
+          <a:p>
+            <a:pPr algn="l"/>
+            <a:br>
+              <a:rPr lang="en-US" b="0" i="0" dirty="0">
+                <a:solidFill>
+                  <a:srgbClr val="303141"/>
+                </a:solidFill>
+                <a:effectLst/>
+                <a:latin typeface="Udemy Sans"/>
+              </a:rPr>
+            </a:br>
+            <a:endParaRPr lang="en-US" b="0" i="0" dirty="0">
+              <a:solidFill>
+                <a:srgbClr val="303141"/>
+              </a:solidFill>
+              <a:effectLst/>
+              <a:latin typeface="Udemy Sans"/>
+            </a:endParaRPr>
+          </a:p>
+          <a:p>
+            <a:pPr algn="l"/>
+            <a:r>
+              <a:rPr lang="en-US" b="1" i="0" dirty="0">
+                <a:solidFill>
+                  <a:srgbClr val="303141"/>
+                </a:solidFill>
+                <a:effectLst/>
+                <a:latin typeface="Udemy Sans"/>
+              </a:rPr>
+              <a:t>1. Mac Users:</a:t>
+            </a:r>
+            <a:r>
+              <a:rPr lang="en-US" b="0" i="0" dirty="0">
+                <a:solidFill>
+                  <a:srgbClr val="303141"/>
+                </a:solidFill>
+                <a:effectLst/>
+                <a:latin typeface="Udemy Sans"/>
+              </a:rPr>
+              <a:t> Download the Postgres Installer here:</a:t>
+            </a:r>
+          </a:p>
+          <a:p>
+            <a:pPr algn="l"/>
+            <a:r>
+              <a:rPr lang="en-US" b="0" i="0" dirty="0">
+                <a:solidFill>
+                  <a:srgbClr val="6D28D2"/>
+                </a:solidFill>
+                <a:effectLst/>
+                <a:latin typeface="Udemy Sans"/>
+                <a:hlinkClick r:id="rId4"/>
+              </a:rPr>
+              <a:t>https://sbp.enterprisedb.com/getfile.jsp?fileid=1258653</a:t>
+            </a:r>
+            <a:endParaRPr lang="en-US" b="0" i="0" dirty="0">
+              <a:solidFill>
+                <a:srgbClr val="303141"/>
+              </a:solidFill>
+              <a:effectLst/>
+              <a:latin typeface="Udemy Sans"/>
+            </a:endParaRPr>
+          </a:p>
+          <a:p>
+            <a:endParaRPr lang="hr-HR" dirty="0"/>
+          </a:p>
+        </p:txBody>
+      </p:sp>
+      <p:sp>
+        <p:nvSpPr>
+          <p:cNvPr id="4" name="Slide Number Placeholder 3">
+            <a:extLst>
+              <a:ext uri="{FF2B5EF4-FFF2-40B4-BE49-F238E27FC236}">
+                <a16:creationId xmlns:a16="http://schemas.microsoft.com/office/drawing/2014/main" id="{ECA93370-BE7B-BD7B-4983-0177835DC1EC}"/>
+              </a:ext>
+            </a:extLst>
+          </p:cNvPr>
+          <p:cNvSpPr>
+            <a:spLocks noGrp="1"/>
+          </p:cNvSpPr>
+          <p:nvPr>
+            <p:ph type="sldNum" sz="quarter" idx="5"/>
+          </p:nvPr>
+        </p:nvSpPr>
+        <p:spPr/>
+        <p:txBody>
+          <a:bodyPr/>
+          <a:lstStyle/>
+          <a:p>
+            <a:fld id="{343B951A-A665-1949-AEDB-B62DC9BE7F13}" type="slidenum">
+              <a:rPr lang="en-US" smtClean="0"/>
+              <a:t>30</a:t>
+            </a:fld>
+            <a:endParaRPr lang="en-US"/>
+          </a:p>
+        </p:txBody>
+      </p:sp>
+    </p:spTree>
+    <p:extLst>
+      <p:ext uri="{BB962C8B-B14F-4D97-AF65-F5344CB8AC3E}">
+        <p14:creationId xmlns:p14="http://schemas.microsoft.com/office/powerpoint/2010/main" val="3657708147"/>
       </p:ext>
     </p:extLst>
   </p:cSld>
@@ -4376,235 +4495,6 @@
         <p:cNvPr id="1" name="">
           <a:extLst>
             <a:ext uri="{FF2B5EF4-FFF2-40B4-BE49-F238E27FC236}">
-              <a16:creationId xmlns:a16="http://schemas.microsoft.com/office/drawing/2014/main" id="{123261F1-6BDE-17F1-D3AB-63B36C3813DB}"/>
-            </a:ext>
-          </a:extLst>
-        </p:cNvPr>
-        <p:cNvGrpSpPr/>
-        <p:nvPr/>
-      </p:nvGrpSpPr>
-      <p:grpSpPr>
-        <a:xfrm>
-          <a:off x="0" y="0"/>
-          <a:ext cx="0" cy="0"/>
-          <a:chOff x="0" y="0"/>
-          <a:chExt cx="0" cy="0"/>
-        </a:xfrm>
-      </p:grpSpPr>
-      <p:sp>
-        <p:nvSpPr>
-          <p:cNvPr id="2" name="Slide Image Placeholder 1">
-            <a:extLst>
-              <a:ext uri="{FF2B5EF4-FFF2-40B4-BE49-F238E27FC236}">
-                <a16:creationId xmlns:a16="http://schemas.microsoft.com/office/drawing/2014/main" id="{CFB7C3A0-D999-2048-41AA-1D961676A5E4}"/>
-              </a:ext>
-            </a:extLst>
-          </p:cNvPr>
-          <p:cNvSpPr>
-            <a:spLocks noGrp="1" noRot="1" noChangeAspect="1"/>
-          </p:cNvSpPr>
-          <p:nvPr>
-            <p:ph type="sldImg"/>
-          </p:nvPr>
-        </p:nvSpPr>
-        <p:spPr/>
-      </p:sp>
-      <p:sp>
-        <p:nvSpPr>
-          <p:cNvPr id="3" name="Notes Placeholder 2">
-            <a:extLst>
-              <a:ext uri="{FF2B5EF4-FFF2-40B4-BE49-F238E27FC236}">
-                <a16:creationId xmlns:a16="http://schemas.microsoft.com/office/drawing/2014/main" id="{5B9EE927-122C-01CE-9AAE-EDE39C4660E1}"/>
-              </a:ext>
-            </a:extLst>
-          </p:cNvPr>
-          <p:cNvSpPr>
-            <a:spLocks noGrp="1"/>
-          </p:cNvSpPr>
-          <p:nvPr>
-            <p:ph type="body" idx="1"/>
-          </p:nvPr>
-        </p:nvSpPr>
-        <p:spPr/>
-        <p:txBody>
-          <a:bodyPr/>
-          <a:lstStyle/>
-          <a:p>
-            <a:pPr algn="l"/>
-            <a:r>
-              <a:rPr lang="en-US" dirty="0" err="1"/>
-              <a:t>Instaliranje</a:t>
-            </a:r>
-            <a:r>
-              <a:rPr lang="en-US" dirty="0"/>
-              <a:t> u local</a:t>
-            </a:r>
-            <a:br>
-              <a:rPr lang="en-US" dirty="0"/>
-            </a:br>
-            <a:br>
-              <a:rPr lang="en-US" dirty="0"/>
-            </a:br>
-            <a:r>
-              <a:rPr lang="en-US" b="1" i="0" dirty="0">
-                <a:solidFill>
-                  <a:srgbClr val="303141"/>
-                </a:solidFill>
-                <a:effectLst/>
-                <a:latin typeface="Udemy Sans"/>
-              </a:rPr>
-              <a:t>1. Windows Users:</a:t>
-            </a:r>
-            <a:r>
-              <a:rPr lang="en-US" b="0" i="0" dirty="0">
-                <a:solidFill>
-                  <a:srgbClr val="303141"/>
-                </a:solidFill>
-                <a:effectLst/>
-                <a:latin typeface="Udemy Sans"/>
-              </a:rPr>
-              <a:t> Download the Postgres Installer here:</a:t>
-            </a:r>
-          </a:p>
-          <a:p>
-            <a:pPr algn="l"/>
-            <a:r>
-              <a:rPr lang="en-US" b="0" i="0" dirty="0">
-                <a:solidFill>
-                  <a:srgbClr val="6D28D2"/>
-                </a:solidFill>
-                <a:effectLst/>
-                <a:latin typeface="Udemy Sans"/>
-                <a:hlinkClick r:id="rId3"/>
-              </a:rPr>
-              <a:t>https://sbp.enterprisedb.com/getfile.jsp?fileid=1258649</a:t>
-            </a:r>
-            <a:endParaRPr lang="en-US" b="0" i="0" dirty="0">
-              <a:solidFill>
-                <a:srgbClr val="303141"/>
-              </a:solidFill>
-              <a:effectLst/>
-              <a:latin typeface="Udemy Sans"/>
-            </a:endParaRPr>
-          </a:p>
-          <a:p>
-            <a:pPr algn="l"/>
-            <a:br>
-              <a:rPr lang="en-US" b="0" i="0" dirty="0">
-                <a:solidFill>
-                  <a:srgbClr val="303141"/>
-                </a:solidFill>
-                <a:effectLst/>
-                <a:latin typeface="Udemy Sans"/>
-              </a:rPr>
-            </a:br>
-            <a:endParaRPr lang="en-US" b="0" i="0" dirty="0">
-              <a:solidFill>
-                <a:srgbClr val="303141"/>
-              </a:solidFill>
-              <a:effectLst/>
-              <a:latin typeface="Udemy Sans"/>
-            </a:endParaRPr>
-          </a:p>
-          <a:p>
-            <a:pPr algn="l"/>
-            <a:r>
-              <a:rPr lang="en-US" b="1" i="0" dirty="0">
-                <a:solidFill>
-                  <a:srgbClr val="303141"/>
-                </a:solidFill>
-                <a:effectLst/>
-                <a:latin typeface="Udemy Sans"/>
-              </a:rPr>
-              <a:t>1. Mac Users:</a:t>
-            </a:r>
-            <a:r>
-              <a:rPr lang="en-US" b="0" i="0" dirty="0">
-                <a:solidFill>
-                  <a:srgbClr val="303141"/>
-                </a:solidFill>
-                <a:effectLst/>
-                <a:latin typeface="Udemy Sans"/>
-              </a:rPr>
-              <a:t> Download the Postgres Installer here:</a:t>
-            </a:r>
-          </a:p>
-          <a:p>
-            <a:pPr algn="l"/>
-            <a:r>
-              <a:rPr lang="en-US" b="0" i="0" dirty="0">
-                <a:solidFill>
-                  <a:srgbClr val="6D28D2"/>
-                </a:solidFill>
-                <a:effectLst/>
-                <a:latin typeface="Udemy Sans"/>
-                <a:hlinkClick r:id="rId4"/>
-              </a:rPr>
-              <a:t>https://sbp.enterprisedb.com/getfile.jsp?fileid=1258653</a:t>
-            </a:r>
-            <a:endParaRPr lang="en-US" b="0" i="0" dirty="0">
-              <a:solidFill>
-                <a:srgbClr val="303141"/>
-              </a:solidFill>
-              <a:effectLst/>
-              <a:latin typeface="Udemy Sans"/>
-            </a:endParaRPr>
-          </a:p>
-          <a:p>
-            <a:endParaRPr lang="hr-HR" dirty="0"/>
-          </a:p>
-        </p:txBody>
-      </p:sp>
-      <p:sp>
-        <p:nvSpPr>
-          <p:cNvPr id="4" name="Slide Number Placeholder 3">
-            <a:extLst>
-              <a:ext uri="{FF2B5EF4-FFF2-40B4-BE49-F238E27FC236}">
-                <a16:creationId xmlns:a16="http://schemas.microsoft.com/office/drawing/2014/main" id="{ECA93370-BE7B-BD7B-4983-0177835DC1EC}"/>
-              </a:ext>
-            </a:extLst>
-          </p:cNvPr>
-          <p:cNvSpPr>
-            <a:spLocks noGrp="1"/>
-          </p:cNvSpPr>
-          <p:nvPr>
-            <p:ph type="sldNum" sz="quarter" idx="5"/>
-          </p:nvPr>
-        </p:nvSpPr>
-        <p:spPr/>
-        <p:txBody>
-          <a:bodyPr/>
-          <a:lstStyle/>
-          <a:p>
-            <a:fld id="{343B951A-A665-1949-AEDB-B62DC9BE7F13}" type="slidenum">
-              <a:rPr lang="en-US" smtClean="0"/>
-              <a:t>31</a:t>
-            </a:fld>
-            <a:endParaRPr lang="en-US"/>
-          </a:p>
-        </p:txBody>
-      </p:sp>
-    </p:spTree>
-    <p:extLst>
-      <p:ext uri="{BB962C8B-B14F-4D97-AF65-F5344CB8AC3E}">
-        <p14:creationId xmlns:p14="http://schemas.microsoft.com/office/powerpoint/2010/main" val="3657708147"/>
-      </p:ext>
-    </p:extLst>
-  </p:cSld>
-  <p:clrMapOvr>
-    <a:masterClrMapping/>
-  </p:clrMapOvr>
-</p:notes>
-</file>
-
-<file path=ppt/notesSlides/notesSlide31.xml><?xml version="1.0" encoding="utf-8"?>
-<p:notes xmlns:a="http://schemas.openxmlformats.org/drawingml/2006/main" xmlns:r="http://schemas.openxmlformats.org/officeDocument/2006/relationships" xmlns:p="http://schemas.openxmlformats.org/presentationml/2006/main">
-  <p:cSld>
-    <p:spTree>
-      <p:nvGrpSpPr>
-        <p:cNvPr id="1" name="">
-          <a:extLst>
-            <a:ext uri="{FF2B5EF4-FFF2-40B4-BE49-F238E27FC236}">
               <a16:creationId xmlns:a16="http://schemas.microsoft.com/office/drawing/2014/main" id="{E7A7CE55-D789-F97A-C3E5-0C561B703809}"/>
             </a:ext>
           </a:extLst>
@@ -4686,7 +4576,7 @@
           <a:p>
             <a:fld id="{343B951A-A665-1949-AEDB-B62DC9BE7F13}" type="slidenum">
               <a:rPr lang="en-US" smtClean="0"/>
-              <a:t>32</a:t>
+              <a:t>31</a:t>
             </a:fld>
             <a:endParaRPr lang="en-US"/>
           </a:p>
@@ -4705,7 +4595,7 @@
 </p:notes>
 </file>
 
-<file path=ppt/notesSlides/notesSlide32.xml><?xml version="1.0" encoding="utf-8"?>
+<file path=ppt/notesSlides/notesSlide31.xml><?xml version="1.0" encoding="utf-8"?>
 <p:notes xmlns:a="http://schemas.openxmlformats.org/drawingml/2006/main" xmlns:r="http://schemas.openxmlformats.org/officeDocument/2006/relationships" xmlns:p="http://schemas.openxmlformats.org/presentationml/2006/main">
   <p:cSld>
     <p:spTree>
@@ -4794,7 +4684,7 @@
           <a:p>
             <a:fld id="{343B951A-A665-1949-AEDB-B62DC9BE7F13}" type="slidenum">
               <a:rPr lang="en-US" smtClean="0"/>
-              <a:t>33</a:t>
+              <a:t>32</a:t>
             </a:fld>
             <a:endParaRPr lang="en-US"/>
           </a:p>
@@ -5543,7 +5433,7 @@
         <p:cNvPr id="1" name="">
           <a:extLst>
             <a:ext uri="{FF2B5EF4-FFF2-40B4-BE49-F238E27FC236}">
-              <a16:creationId xmlns:a16="http://schemas.microsoft.com/office/drawing/2014/main" id="{C97601FC-9FB3-CB3A-B308-ED59E7282812}"/>
+              <a16:creationId xmlns:a16="http://schemas.microsoft.com/office/drawing/2014/main" id="{6447E1D4-78B8-37FD-1C3A-4164CC43463F}"/>
             </a:ext>
           </a:extLst>
         </p:cNvPr>
@@ -5563,7 +5453,7 @@
           <p:cNvPr id="2" name="Slide Image Placeholder 1">
             <a:extLst>
               <a:ext uri="{FF2B5EF4-FFF2-40B4-BE49-F238E27FC236}">
-                <a16:creationId xmlns:a16="http://schemas.microsoft.com/office/drawing/2014/main" id="{F3192A9D-7C54-1D6A-A155-CD1A3AE50E0C}"/>
+                <a16:creationId xmlns:a16="http://schemas.microsoft.com/office/drawing/2014/main" id="{EB43E683-BEEE-32B6-54F7-E46083B4B4B1}"/>
               </a:ext>
             </a:extLst>
           </p:cNvPr>
@@ -5581,7 +5471,7 @@
           <p:cNvPr id="3" name="Notes Placeholder 2">
             <a:extLst>
               <a:ext uri="{FF2B5EF4-FFF2-40B4-BE49-F238E27FC236}">
-                <a16:creationId xmlns:a16="http://schemas.microsoft.com/office/drawing/2014/main" id="{F9799504-2DFF-9625-3A88-8F0F5E73799B}"/>
+                <a16:creationId xmlns:a16="http://schemas.microsoft.com/office/drawing/2014/main" id="{643B68D3-49FA-5D89-2863-27A2503AB792}"/>
               </a:ext>
             </a:extLst>
           </p:cNvPr>
@@ -5606,7 +5496,7 @@
           <p:cNvPr id="4" name="Slide Number Placeholder 3">
             <a:extLst>
               <a:ext uri="{FF2B5EF4-FFF2-40B4-BE49-F238E27FC236}">
-                <a16:creationId xmlns:a16="http://schemas.microsoft.com/office/drawing/2014/main" id="{3963687A-ADDF-1CF2-6C8B-5302CBF576C3}"/>
+                <a16:creationId xmlns:a16="http://schemas.microsoft.com/office/drawing/2014/main" id="{BCF67FF3-B9AF-5DCB-C75B-6018224176B0}"/>
               </a:ext>
             </a:extLst>
           </p:cNvPr>
@@ -5633,7 +5523,7 @@
     </p:spTree>
     <p:extLst>
       <p:ext uri="{BB962C8B-B14F-4D97-AF65-F5344CB8AC3E}">
-        <p14:creationId xmlns:p14="http://schemas.microsoft.com/office/powerpoint/2010/main" val="1549441741"/>
+        <p14:creationId xmlns:p14="http://schemas.microsoft.com/office/powerpoint/2010/main" val="557445626"/>
       </p:ext>
     </p:extLst>
   </p:cSld>
@@ -6335,7 +6225,7 @@
                 <a:ea typeface="Open Sans" panose="020B0606030504020204" pitchFamily="34" charset="0"/>
                 <a:cs typeface="Open Sans" panose="020B0606030504020204" pitchFamily="34" charset="0"/>
               </a:rPr>
-              <a:t>03/03/2025</a:t>
+              <a:t>12/03/2025</a:t>
             </a:fld>
             <a:endParaRPr lang="en-GB" sz="1800" b="0" i="0" kern="1200" dirty="0">
               <a:solidFill>
@@ -7080,7 +6970,7 @@
                 <a:ea typeface="Open Sans" panose="020B0606030504020204" pitchFamily="34" charset="0"/>
                 <a:cs typeface="Open Sans" panose="020B0606030504020204" pitchFamily="34" charset="0"/>
               </a:rPr>
-              <a:t>03/03/2025</a:t>
+              <a:t>12/03/2025</a:t>
             </a:fld>
             <a:endParaRPr lang="en-GB" sz="1800" b="0" i="0" kern="1200" dirty="0">
               <a:solidFill>
@@ -7603,7 +7493,7 @@
                 <a:ea typeface="Open Sans" panose="020B0606030504020204" pitchFamily="34" charset="0"/>
                 <a:cs typeface="Open Sans" panose="020B0606030504020204" pitchFamily="34" charset="0"/>
               </a:rPr>
-              <a:t>03/03/2025</a:t>
+              <a:t>12/03/2025</a:t>
             </a:fld>
             <a:endParaRPr lang="en-GB" sz="1800" b="0" i="0" kern="1200" dirty="0">
               <a:solidFill>
@@ -8569,7 +8459,7 @@
                 <a:ea typeface="Open Sans" panose="020B0606030504020204" pitchFamily="34" charset="0"/>
                 <a:cs typeface="Open Sans" panose="020B0606030504020204" pitchFamily="34" charset="0"/>
               </a:rPr>
-              <a:t>03/03/2025</a:t>
+              <a:t>12/03/2025</a:t>
             </a:fld>
             <a:endParaRPr lang="en-GB" sz="1800" b="0" i="0" kern="1200" dirty="0">
               <a:solidFill>
@@ -9008,7 +8898,7 @@
                 <a:ea typeface="Open Sans" panose="020B0606030504020204" pitchFamily="34" charset="0"/>
                 <a:cs typeface="Open Sans" panose="020B0606030504020204" pitchFamily="34" charset="0"/>
               </a:rPr>
-              <a:t>03/03/2025</a:t>
+              <a:t>12/03/2025</a:t>
             </a:fld>
             <a:endParaRPr lang="en-GB" sz="1800" b="0" i="0" kern="1200" dirty="0">
               <a:solidFill>
@@ -10778,7 +10668,7 @@
                 <a:ea typeface="Open Sans" pitchFamily="2" charset="0"/>
                 <a:cs typeface="Open Sans" pitchFamily="2" charset="0"/>
               </a:rPr>
-              <a:t>03/03/2025</a:t>
+              <a:t>12/03/2025</a:t>
             </a:fld>
             <a:endParaRPr lang="en-GB" sz="1800" b="0" i="0" kern="1200" dirty="0">
               <a:solidFill>
@@ -12528,7 +12418,7 @@
                 <a:ea typeface="Open Sans" pitchFamily="2" charset="0"/>
                 <a:cs typeface="Open Sans" pitchFamily="2" charset="0"/>
               </a:rPr>
-              <a:t>03/03/2025</a:t>
+              <a:t>12/03/2025</a:t>
             </a:fld>
             <a:endParaRPr lang="en-GB" sz="1800" b="0" i="0" kern="1200" dirty="0">
               <a:solidFill>
@@ -13045,7 +12935,7 @@
                 <a:ea typeface="Open Sans" panose="020B0606030504020204" pitchFamily="34" charset="0"/>
                 <a:cs typeface="Open Sans" panose="020B0606030504020204" pitchFamily="34" charset="0"/>
               </a:rPr>
-              <a:t>03/03/2025</a:t>
+              <a:t>12/03/2025</a:t>
             </a:fld>
             <a:endParaRPr lang="en-GB" sz="1800" b="0" i="0" kern="1200" dirty="0">
               <a:solidFill>
@@ -13642,7 +13532,7 @@
                 <a:ea typeface="Open Sans" pitchFamily="2" charset="0"/>
                 <a:cs typeface="Open Sans" pitchFamily="2" charset="0"/>
               </a:rPr>
-              <a:t>03/03/2025</a:t>
+              <a:t>12/03/2025</a:t>
             </a:fld>
             <a:endParaRPr lang="en-GB" sz="1800" b="0" i="0" kern="1200" dirty="0">
               <a:solidFill>
@@ -14182,7 +14072,7 @@
                 <a:ea typeface="Open Sans" panose="020B0606030504020204" pitchFamily="34" charset="0"/>
                 <a:cs typeface="Open Sans" panose="020B0606030504020204" pitchFamily="34" charset="0"/>
               </a:rPr>
-              <a:t>03/03/2025</a:t>
+              <a:t>12/03/2025</a:t>
             </a:fld>
             <a:endParaRPr lang="en-GB" sz="1800" b="0" i="0" kern="1200" dirty="0">
               <a:solidFill>
@@ -14883,7 +14773,7 @@
                 <a:ea typeface="Open Sans" panose="020B0606030504020204" pitchFamily="34" charset="0"/>
                 <a:cs typeface="Open Sans" panose="020B0606030504020204" pitchFamily="34" charset="0"/>
               </a:rPr>
-              <a:t>03/03/2025</a:t>
+              <a:t>12/03/2025</a:t>
             </a:fld>
             <a:endParaRPr lang="en-GB" sz="1800" b="0" i="0" kern="1200" dirty="0">
               <a:solidFill>
@@ -15246,7 +15136,7 @@
                 <a:ea typeface="Open Sans" pitchFamily="2" charset="0"/>
                 <a:cs typeface="Open Sans" pitchFamily="2" charset="0"/>
               </a:rPr>
-              <a:t>03/03/2025</a:t>
+              <a:t>12/03/2025</a:t>
             </a:fld>
             <a:endParaRPr lang="en-GB" sz="1800" b="0" i="0" kern="1200" dirty="0">
               <a:solidFill>
@@ -15641,7 +15531,7 @@
                 <a:ea typeface="Open Sans" pitchFamily="2" charset="0"/>
                 <a:cs typeface="Open Sans" pitchFamily="2" charset="0"/>
               </a:rPr>
-              <a:t>03/03/2025</a:t>
+              <a:t>12/03/2025</a:t>
             </a:fld>
             <a:endParaRPr lang="en-GB" sz="1800" b="0" i="0" kern="1200" dirty="0">
               <a:solidFill>
@@ -16351,326 +16241,6 @@
         <p:cNvPr id="1" name="">
           <a:extLst>
             <a:ext uri="{FF2B5EF4-FFF2-40B4-BE49-F238E27FC236}">
-              <a16:creationId xmlns:a16="http://schemas.microsoft.com/office/drawing/2014/main" id="{C7150753-4C5F-600E-7657-A99F6527C895}"/>
-            </a:ext>
-          </a:extLst>
-        </p:cNvPr>
-        <p:cNvGrpSpPr/>
-        <p:nvPr/>
-      </p:nvGrpSpPr>
-      <p:grpSpPr>
-        <a:xfrm>
-          <a:off x="0" y="0"/>
-          <a:ext cx="0" cy="0"/>
-          <a:chOff x="0" y="0"/>
-          <a:chExt cx="0" cy="0"/>
-        </a:xfrm>
-      </p:grpSpPr>
-      <p:sp>
-        <p:nvSpPr>
-          <p:cNvPr id="4" name="Title 1">
-            <a:extLst>
-              <a:ext uri="{FF2B5EF4-FFF2-40B4-BE49-F238E27FC236}">
-                <a16:creationId xmlns:a16="http://schemas.microsoft.com/office/drawing/2014/main" id="{5825FADE-B0C9-7DA4-5936-E24071FC00F5}"/>
-              </a:ext>
-            </a:extLst>
-          </p:cNvPr>
-          <p:cNvSpPr txBox="1">
-            <a:spLocks/>
-          </p:cNvSpPr>
-          <p:nvPr/>
-        </p:nvSpPr>
-        <p:spPr>
-          <a:xfrm>
-            <a:off x="990600" y="383056"/>
-            <a:ext cx="10515600" cy="853976"/>
-          </a:xfrm>
-          <a:prstGeom prst="rect">
-            <a:avLst/>
-          </a:prstGeom>
-        </p:spPr>
-        <p:txBody>
-          <a:bodyPr vert="horz" lIns="91440" tIns="45720" rIns="91440" bIns="45720" rtlCol="0" anchor="ctr">
-            <a:normAutofit/>
-          </a:bodyPr>
-          <a:lstStyle>
-            <a:lvl1pPr algn="l" defTabSz="914400" rtl="0" eaLnBrk="1" latinLnBrk="0" hangingPunct="1">
-              <a:lnSpc>
-                <a:spcPct val="90000"/>
-              </a:lnSpc>
-              <a:spcBef>
-                <a:spcPct val="0"/>
-              </a:spcBef>
-              <a:buNone/>
-              <a:defRPr sz="3600" b="1" i="0" kern="1200" cap="all" baseline="0">
-                <a:solidFill>
-                  <a:schemeClr val="tx2"/>
-                </a:solidFill>
-                <a:latin typeface="+mj-lt"/>
-                <a:ea typeface="Open Sans Semibold" panose="020B0606030504020204" pitchFamily="34" charset="0"/>
-                <a:cs typeface="Open Sans Semibold" panose="020B0606030504020204" pitchFamily="34" charset="0"/>
-              </a:defRPr>
-            </a:lvl1pPr>
-          </a:lstStyle>
-          <a:p>
-            <a:r>
-              <a:rPr lang="en-US" dirty="0"/>
-              <a:t>Baze </a:t>
-            </a:r>
-            <a:r>
-              <a:rPr lang="en-US" dirty="0" err="1"/>
-              <a:t>podataka</a:t>
-            </a:r>
-            <a:r>
-              <a:rPr lang="en-US" dirty="0"/>
-              <a:t> – SELECT</a:t>
-            </a:r>
-            <a:endParaRPr lang="hr-HR" dirty="0"/>
-          </a:p>
-        </p:txBody>
-      </p:sp>
-      <p:sp>
-        <p:nvSpPr>
-          <p:cNvPr id="12" name="TextBox 11">
-            <a:extLst>
-              <a:ext uri="{FF2B5EF4-FFF2-40B4-BE49-F238E27FC236}">
-                <a16:creationId xmlns:a16="http://schemas.microsoft.com/office/drawing/2014/main" id="{5DB73454-1E1F-71EF-8999-DC1799A2F510}"/>
-              </a:ext>
-            </a:extLst>
-          </p:cNvPr>
-          <p:cNvSpPr txBox="1"/>
-          <p:nvPr/>
-        </p:nvSpPr>
-        <p:spPr>
-          <a:xfrm>
-            <a:off x="570614" y="1972775"/>
-            <a:ext cx="6145618" cy="1754326"/>
-          </a:xfrm>
-          <a:prstGeom prst="rect">
-            <a:avLst/>
-          </a:prstGeom>
-          <a:noFill/>
-        </p:spPr>
-        <p:txBody>
-          <a:bodyPr wrap="square">
-            <a:spAutoFit/>
-          </a:bodyPr>
-          <a:lstStyle/>
-          <a:p>
-            <a:r>
-              <a:rPr lang="hr-HR" dirty="0"/>
-              <a:t>👉 </a:t>
-            </a:r>
-            <a:r>
-              <a:rPr lang="en-US" dirty="0"/>
-              <a:t>D</a:t>
-            </a:r>
-            <a:r>
-              <a:rPr lang="hr-HR" dirty="0" err="1"/>
-              <a:t>ohvaćanje</a:t>
-            </a:r>
-            <a:r>
-              <a:rPr lang="hr-HR" dirty="0"/>
-              <a:t> svih podataka</a:t>
-            </a:r>
-            <a:endParaRPr lang="en-US" dirty="0"/>
-          </a:p>
-          <a:p>
-            <a:br>
-              <a:rPr lang="hr-HR" dirty="0"/>
-            </a:br>
-            <a:r>
-              <a:rPr lang="hr-HR" dirty="0"/>
-              <a:t>👉 Ako ne želimo sve stupce, možemo navesti </a:t>
-            </a:r>
-            <a:r>
-              <a:rPr lang="hr-HR" b="1" dirty="0"/>
-              <a:t>samo one koji nas zanimaju</a:t>
-            </a:r>
-            <a:endParaRPr lang="en-US" b="1" dirty="0"/>
-          </a:p>
-          <a:p>
-            <a:br>
-              <a:rPr lang="hr-HR" dirty="0"/>
-            </a:br>
-            <a:r>
-              <a:rPr lang="hr-HR" dirty="0"/>
-              <a:t>👉 Kako filtrirati podatke?</a:t>
-            </a:r>
-          </a:p>
-        </p:txBody>
-      </p:sp>
-      <p:pic>
-        <p:nvPicPr>
-          <p:cNvPr id="5" name="Picture 4">
-            <a:extLst>
-              <a:ext uri="{FF2B5EF4-FFF2-40B4-BE49-F238E27FC236}">
-                <a16:creationId xmlns:a16="http://schemas.microsoft.com/office/drawing/2014/main" id="{5C63F665-D86D-498A-0F7C-9F2EB46E51EB}"/>
-              </a:ext>
-            </a:extLst>
-          </p:cNvPr>
-          <p:cNvPicPr>
-            <a:picLocks noChangeAspect="1"/>
-          </p:cNvPicPr>
-          <p:nvPr/>
-        </p:nvPicPr>
-        <p:blipFill>
-          <a:blip r:embed="rId3"/>
-          <a:stretch>
-            <a:fillRect/>
-          </a:stretch>
-        </p:blipFill>
-        <p:spPr>
-          <a:xfrm>
-            <a:off x="4645984" y="1972775"/>
-            <a:ext cx="1943100" cy="352425"/>
-          </a:xfrm>
-          <a:prstGeom prst="rect">
-            <a:avLst/>
-          </a:prstGeom>
-        </p:spPr>
-      </p:pic>
-      <p:pic>
-        <p:nvPicPr>
-          <p:cNvPr id="8" name="Picture 7">
-            <a:extLst>
-              <a:ext uri="{FF2B5EF4-FFF2-40B4-BE49-F238E27FC236}">
-                <a16:creationId xmlns:a16="http://schemas.microsoft.com/office/drawing/2014/main" id="{F4C15E92-8C13-1F1B-7E80-47A8F5DC8155}"/>
-              </a:ext>
-            </a:extLst>
-          </p:cNvPr>
-          <p:cNvPicPr>
-            <a:picLocks noChangeAspect="1"/>
-          </p:cNvPicPr>
-          <p:nvPr/>
-        </p:nvPicPr>
-        <p:blipFill>
-          <a:blip r:embed="rId4"/>
-          <a:stretch>
-            <a:fillRect/>
-          </a:stretch>
-        </p:blipFill>
-        <p:spPr>
-          <a:xfrm>
-            <a:off x="6487964" y="2520248"/>
-            <a:ext cx="2352675" cy="371475"/>
-          </a:xfrm>
-          <a:prstGeom prst="rect">
-            <a:avLst/>
-          </a:prstGeom>
-        </p:spPr>
-      </p:pic>
-      <p:pic>
-        <p:nvPicPr>
-          <p:cNvPr id="11" name="Picture 10">
-            <a:extLst>
-              <a:ext uri="{FF2B5EF4-FFF2-40B4-BE49-F238E27FC236}">
-                <a16:creationId xmlns:a16="http://schemas.microsoft.com/office/drawing/2014/main" id="{74251959-4C13-E914-D6FA-DB554DA98CDC}"/>
-              </a:ext>
-            </a:extLst>
-          </p:cNvPr>
-          <p:cNvPicPr>
-            <a:picLocks noChangeAspect="1"/>
-          </p:cNvPicPr>
-          <p:nvPr/>
-        </p:nvPicPr>
-        <p:blipFill>
-          <a:blip r:embed="rId5"/>
-          <a:stretch>
-            <a:fillRect/>
-          </a:stretch>
-        </p:blipFill>
-        <p:spPr>
-          <a:xfrm>
-            <a:off x="4312609" y="3190875"/>
-            <a:ext cx="2609850" cy="476250"/>
-          </a:xfrm>
-          <a:prstGeom prst="rect">
-            <a:avLst/>
-          </a:prstGeom>
-        </p:spPr>
-      </p:pic>
-      <p:pic>
-        <p:nvPicPr>
-          <p:cNvPr id="14" name="Picture 13">
-            <a:extLst>
-              <a:ext uri="{FF2B5EF4-FFF2-40B4-BE49-F238E27FC236}">
-                <a16:creationId xmlns:a16="http://schemas.microsoft.com/office/drawing/2014/main" id="{DE52CA9E-CA85-A8FB-984E-0A7474A226F2}"/>
-              </a:ext>
-            </a:extLst>
-          </p:cNvPr>
-          <p:cNvPicPr>
-            <a:picLocks noChangeAspect="1"/>
-          </p:cNvPicPr>
-          <p:nvPr/>
-        </p:nvPicPr>
-        <p:blipFill>
-          <a:blip r:embed="rId6"/>
-          <a:stretch>
-            <a:fillRect/>
-          </a:stretch>
-        </p:blipFill>
-        <p:spPr>
-          <a:xfrm>
-            <a:off x="4322689" y="3841517"/>
-            <a:ext cx="4906704" cy="1863958"/>
-          </a:xfrm>
-          <a:prstGeom prst="rect">
-            <a:avLst/>
-          </a:prstGeom>
-        </p:spPr>
-      </p:pic>
-      <p:pic>
-        <p:nvPicPr>
-          <p:cNvPr id="16" name="Picture 15">
-            <a:extLst>
-              <a:ext uri="{FF2B5EF4-FFF2-40B4-BE49-F238E27FC236}">
-                <a16:creationId xmlns:a16="http://schemas.microsoft.com/office/drawing/2014/main" id="{F83E61B4-D920-3F9A-F7DB-1D8AE68E312E}"/>
-              </a:ext>
-            </a:extLst>
-          </p:cNvPr>
-          <p:cNvPicPr>
-            <a:picLocks noChangeAspect="1"/>
-          </p:cNvPicPr>
-          <p:nvPr/>
-        </p:nvPicPr>
-        <p:blipFill>
-          <a:blip r:embed="rId7"/>
-          <a:stretch>
-            <a:fillRect/>
-          </a:stretch>
-        </p:blipFill>
-        <p:spPr>
-          <a:xfrm>
-            <a:off x="7092803" y="3190875"/>
-            <a:ext cx="3475960" cy="476250"/>
-          </a:xfrm>
-          <a:prstGeom prst="rect">
-            <a:avLst/>
-          </a:prstGeom>
-        </p:spPr>
-      </p:pic>
-    </p:spTree>
-    <p:extLst>
-      <p:ext uri="{BB962C8B-B14F-4D97-AF65-F5344CB8AC3E}">
-        <p14:creationId xmlns:p14="http://schemas.microsoft.com/office/powerpoint/2010/main" val="2365574182"/>
-      </p:ext>
-    </p:extLst>
-  </p:cSld>
-  <p:clrMapOvr>
-    <a:masterClrMapping/>
-  </p:clrMapOvr>
-</p:sld>
-</file>
-
-<file path=ppt/slides/slide11.xml><?xml version="1.0" encoding="utf-8"?>
-<p:sld xmlns:a="http://schemas.openxmlformats.org/drawingml/2006/main" xmlns:r="http://schemas.openxmlformats.org/officeDocument/2006/relationships" xmlns:p="http://schemas.openxmlformats.org/presentationml/2006/main">
-  <p:cSld>
-    <p:spTree>
-      <p:nvGrpSpPr>
-        <p:cNvPr id="1" name="">
-          <a:extLst>
-            <a:ext uri="{FF2B5EF4-FFF2-40B4-BE49-F238E27FC236}">
               <a16:creationId xmlns:a16="http://schemas.microsoft.com/office/drawing/2014/main" id="{F6F0719F-6F27-363C-1646-69F1B8C03311}"/>
             </a:ext>
           </a:extLst>
@@ -17160,7 +16730,7 @@
 </p:sld>
 </file>
 
-<file path=ppt/slides/slide12.xml><?xml version="1.0" encoding="utf-8"?>
+<file path=ppt/slides/slide11.xml><?xml version="1.0" encoding="utf-8"?>
 <p:sld xmlns:a="http://schemas.openxmlformats.org/drawingml/2006/main" xmlns:r="http://schemas.openxmlformats.org/officeDocument/2006/relationships" xmlns:p="http://schemas.openxmlformats.org/presentationml/2006/main">
   <p:cSld>
     <p:spTree>
@@ -17251,10 +16821,10 @@
       </p:sp>
       <p:sp>
         <p:nvSpPr>
-          <p:cNvPr id="12" name="TextBox 11">
-            <a:extLst>
-              <a:ext uri="{FF2B5EF4-FFF2-40B4-BE49-F238E27FC236}">
-                <a16:creationId xmlns:a16="http://schemas.microsoft.com/office/drawing/2014/main" id="{5B4455D5-F71B-D2C1-0675-9CB2717B0D52}"/>
+          <p:cNvPr id="15" name="TextBox 14">
+            <a:extLst>
+              <a:ext uri="{FF2B5EF4-FFF2-40B4-BE49-F238E27FC236}">
+                <a16:creationId xmlns:a16="http://schemas.microsoft.com/office/drawing/2014/main" id="{1626659B-BA3E-5966-66EE-A6D9F82792FD}"/>
               </a:ext>
             </a:extLst>
           </p:cNvPr>
@@ -17263,63 +16833,7 @@
         </p:nvSpPr>
         <p:spPr>
           <a:xfrm>
-            <a:off x="675002" y="2803770"/>
-            <a:ext cx="6145618" cy="646331"/>
-          </a:xfrm>
-          <a:prstGeom prst="rect">
-            <a:avLst/>
-          </a:prstGeom>
-          <a:noFill/>
-        </p:spPr>
-        <p:txBody>
-          <a:bodyPr wrap="square">
-            <a:spAutoFit/>
-          </a:bodyPr>
-          <a:lstStyle/>
-          <a:p>
-            <a:r>
-              <a:rPr lang="hr-HR" dirty="0"/>
-              <a:t>👉 </a:t>
-            </a:r>
-            <a:r>
-              <a:rPr lang="hr-HR" b="1" dirty="0" err="1"/>
-              <a:t>Primary</a:t>
-            </a:r>
-            <a:r>
-              <a:rPr lang="hr-HR" b="1" dirty="0"/>
-              <a:t> </a:t>
-            </a:r>
-            <a:r>
-              <a:rPr lang="hr-HR" b="1" dirty="0" err="1"/>
-              <a:t>Key</a:t>
-            </a:r>
-            <a:r>
-              <a:rPr lang="hr-HR" b="1" dirty="0"/>
-              <a:t> (PK)</a:t>
-            </a:r>
-            <a:r>
-              <a:rPr lang="hr-HR" dirty="0"/>
-              <a:t> – Identificira svaki zapis unutar tablice (jedinstven ID).</a:t>
-            </a:r>
-            <a:endParaRPr lang="en-US" dirty="0"/>
-          </a:p>
-        </p:txBody>
-      </p:sp>
-      <p:sp>
-        <p:nvSpPr>
-          <p:cNvPr id="15" name="TextBox 14">
-            <a:extLst>
-              <a:ext uri="{FF2B5EF4-FFF2-40B4-BE49-F238E27FC236}">
-                <a16:creationId xmlns:a16="http://schemas.microsoft.com/office/drawing/2014/main" id="{1626659B-BA3E-5966-66EE-A6D9F82792FD}"/>
-              </a:ext>
-            </a:extLst>
-          </p:cNvPr>
-          <p:cNvSpPr txBox="1"/>
-          <p:nvPr/>
-        </p:nvSpPr>
-        <p:spPr>
-          <a:xfrm>
-            <a:off x="675002" y="1675821"/>
+            <a:off x="618484" y="1870134"/>
             <a:ext cx="6145618" cy="646331"/>
           </a:xfrm>
           <a:prstGeom prst="rect">
@@ -17405,7 +16919,7 @@
         </p:nvSpPr>
         <p:spPr>
           <a:xfrm>
-            <a:off x="675002" y="4258658"/>
+            <a:off x="697840" y="4281685"/>
             <a:ext cx="6145618" cy="369332"/>
           </a:xfrm>
           <a:prstGeom prst="rect">
@@ -17470,7 +16984,7 @@
 </p:sld>
 </file>
 
-<file path=ppt/slides/slide13.xml><?xml version="1.0" encoding="utf-8"?>
+<file path=ppt/slides/slide12.xml><?xml version="1.0" encoding="utf-8"?>
 <p:sld xmlns:a="http://schemas.openxmlformats.org/drawingml/2006/main" xmlns:r="http://schemas.openxmlformats.org/officeDocument/2006/relationships" xmlns:p="http://schemas.openxmlformats.org/presentationml/2006/main">
   <p:cSld>
     <p:spTree>
@@ -17927,7 +17441,7 @@
 </p:sld>
 </file>
 
-<file path=ppt/slides/slide14.xml><?xml version="1.0" encoding="utf-8"?>
+<file path=ppt/slides/slide13.xml><?xml version="1.0" encoding="utf-8"?>
 <p:sld xmlns:a="http://schemas.openxmlformats.org/drawingml/2006/main" xmlns:r="http://schemas.openxmlformats.org/officeDocument/2006/relationships" xmlns:p="http://schemas.openxmlformats.org/presentationml/2006/main">
   <p:cSld>
     <p:spTree>
@@ -18150,7 +17664,7 @@
 </p:sld>
 </file>
 
-<file path=ppt/slides/slide15.xml><?xml version="1.0" encoding="utf-8"?>
+<file path=ppt/slides/slide14.xml><?xml version="1.0" encoding="utf-8"?>
 <p:sld xmlns:a="http://schemas.openxmlformats.org/drawingml/2006/main" xmlns:r="http://schemas.openxmlformats.org/officeDocument/2006/relationships" xmlns:p="http://schemas.openxmlformats.org/presentationml/2006/main">
   <p:cSld>
     <p:spTree>
@@ -18335,7 +17849,7 @@
 </p:sld>
 </file>
 
-<file path=ppt/slides/slide16.xml><?xml version="1.0" encoding="utf-8"?>
+<file path=ppt/slides/slide15.xml><?xml version="1.0" encoding="utf-8"?>
 <p:sld xmlns:a="http://schemas.openxmlformats.org/drawingml/2006/main" xmlns:r="http://schemas.openxmlformats.org/officeDocument/2006/relationships" xmlns:p="http://schemas.openxmlformats.org/presentationml/2006/main">
   <p:cSld>
     <p:spTree>
@@ -18664,7 +18178,7 @@
 </p:sld>
 </file>
 
-<file path=ppt/slides/slide17.xml><?xml version="1.0" encoding="utf-8"?>
+<file path=ppt/slides/slide16.xml><?xml version="1.0" encoding="utf-8"?>
 <p:sld xmlns:a="http://schemas.openxmlformats.org/drawingml/2006/main" xmlns:r="http://schemas.openxmlformats.org/officeDocument/2006/relationships" xmlns:p="http://schemas.openxmlformats.org/presentationml/2006/main">
   <p:cSld>
     <p:spTree>
@@ -18985,7 +18499,7 @@
 </p:sld>
 </file>
 
-<file path=ppt/slides/slide18.xml><?xml version="1.0" encoding="utf-8"?>
+<file path=ppt/slides/slide17.xml><?xml version="1.0" encoding="utf-8"?>
 <p:sld xmlns:a="http://schemas.openxmlformats.org/drawingml/2006/main" xmlns:r="http://schemas.openxmlformats.org/officeDocument/2006/relationships" xmlns:p="http://schemas.openxmlformats.org/presentationml/2006/main">
   <p:cSld>
     <p:spTree>
@@ -19126,7 +18640,7 @@
 </p:sld>
 </file>
 
-<file path=ppt/slides/slide19.xml><?xml version="1.0" encoding="utf-8"?>
+<file path=ppt/slides/slide18.xml><?xml version="1.0" encoding="utf-8"?>
 <p:sld xmlns:a="http://schemas.openxmlformats.org/drawingml/2006/main" xmlns:r="http://schemas.openxmlformats.org/officeDocument/2006/relationships" xmlns:p="http://schemas.openxmlformats.org/presentationml/2006/main">
   <p:cSld>
     <p:spTree>
@@ -19469,6 +18983,330 @@
     <p:extLst>
       <p:ext uri="{BB962C8B-B14F-4D97-AF65-F5344CB8AC3E}">
         <p14:creationId xmlns:p14="http://schemas.microsoft.com/office/powerpoint/2010/main" val="2230213429"/>
+      </p:ext>
+    </p:extLst>
+  </p:cSld>
+  <p:clrMapOvr>
+    <a:masterClrMapping/>
+  </p:clrMapOvr>
+</p:sld>
+</file>
+
+<file path=ppt/slides/slide19.xml><?xml version="1.0" encoding="utf-8"?>
+<p:sld xmlns:a="http://schemas.openxmlformats.org/drawingml/2006/main" xmlns:r="http://schemas.openxmlformats.org/officeDocument/2006/relationships" xmlns:p="http://schemas.openxmlformats.org/presentationml/2006/main">
+  <p:cSld>
+    <p:spTree>
+      <p:nvGrpSpPr>
+        <p:cNvPr id="1" name="">
+          <a:extLst>
+            <a:ext uri="{FF2B5EF4-FFF2-40B4-BE49-F238E27FC236}">
+              <a16:creationId xmlns:a16="http://schemas.microsoft.com/office/drawing/2014/main" id="{61800159-5D3C-EF0F-DB56-34B1FFD0BA89}"/>
+            </a:ext>
+          </a:extLst>
+        </p:cNvPr>
+        <p:cNvGrpSpPr/>
+        <p:nvPr/>
+      </p:nvGrpSpPr>
+      <p:grpSpPr>
+        <a:xfrm>
+          <a:off x="0" y="0"/>
+          <a:ext cx="0" cy="0"/>
+          <a:chOff x="0" y="0"/>
+          <a:chExt cx="0" cy="0"/>
+        </a:xfrm>
+      </p:grpSpPr>
+      <p:sp>
+        <p:nvSpPr>
+          <p:cNvPr id="4" name="Title 1">
+            <a:extLst>
+              <a:ext uri="{FF2B5EF4-FFF2-40B4-BE49-F238E27FC236}">
+                <a16:creationId xmlns:a16="http://schemas.microsoft.com/office/drawing/2014/main" id="{D9C47BAA-7344-AED4-AAAF-4AB02047E2D1}"/>
+              </a:ext>
+            </a:extLst>
+          </p:cNvPr>
+          <p:cNvSpPr txBox="1">
+            <a:spLocks/>
+          </p:cNvSpPr>
+          <p:nvPr/>
+        </p:nvSpPr>
+        <p:spPr>
+          <a:xfrm>
+            <a:off x="990600" y="383056"/>
+            <a:ext cx="10515600" cy="853976"/>
+          </a:xfrm>
+          <a:prstGeom prst="rect">
+            <a:avLst/>
+          </a:prstGeom>
+        </p:spPr>
+        <p:txBody>
+          <a:bodyPr vert="horz" lIns="91440" tIns="45720" rIns="91440" bIns="45720" rtlCol="0" anchor="ctr">
+            <a:normAutofit/>
+          </a:bodyPr>
+          <a:lstStyle>
+            <a:lvl1pPr algn="l" defTabSz="914400" rtl="0" eaLnBrk="1" latinLnBrk="0" hangingPunct="1">
+              <a:lnSpc>
+                <a:spcPct val="90000"/>
+              </a:lnSpc>
+              <a:spcBef>
+                <a:spcPct val="0"/>
+              </a:spcBef>
+              <a:buNone/>
+              <a:defRPr sz="3600" b="1" i="0" kern="1200" cap="all" baseline="0">
+                <a:solidFill>
+                  <a:schemeClr val="tx2"/>
+                </a:solidFill>
+                <a:latin typeface="+mj-lt"/>
+                <a:ea typeface="Open Sans Semibold" panose="020B0606030504020204" pitchFamily="34" charset="0"/>
+                <a:cs typeface="Open Sans Semibold" panose="020B0606030504020204" pitchFamily="34" charset="0"/>
+              </a:defRPr>
+            </a:lvl1pPr>
+          </a:lstStyle>
+          <a:p>
+            <a:r>
+              <a:rPr lang="en-US" dirty="0"/>
+              <a:t>Baze </a:t>
+            </a:r>
+            <a:r>
+              <a:rPr lang="en-US" dirty="0" err="1"/>
+              <a:t>podataka</a:t>
+            </a:r>
+            <a:r>
+              <a:rPr lang="en-US" dirty="0"/>
+              <a:t> – JEDAN NA JEDAN (1:1)</a:t>
+            </a:r>
+            <a:endParaRPr lang="hr-HR" dirty="0"/>
+          </a:p>
+        </p:txBody>
+      </p:sp>
+      <p:sp>
+        <p:nvSpPr>
+          <p:cNvPr id="7" name="TextBox 6">
+            <a:extLst>
+              <a:ext uri="{FF2B5EF4-FFF2-40B4-BE49-F238E27FC236}">
+                <a16:creationId xmlns:a16="http://schemas.microsoft.com/office/drawing/2014/main" id="{8BD984AA-B614-D702-A1D1-0F0E6A82BFEA}"/>
+              </a:ext>
+            </a:extLst>
+          </p:cNvPr>
+          <p:cNvSpPr txBox="1"/>
+          <p:nvPr/>
+        </p:nvSpPr>
+        <p:spPr>
+          <a:xfrm>
+            <a:off x="990600" y="1295097"/>
+            <a:ext cx="10008781" cy="923330"/>
+          </a:xfrm>
+          <a:prstGeom prst="rect">
+            <a:avLst/>
+          </a:prstGeom>
+          <a:noFill/>
+        </p:spPr>
+        <p:txBody>
+          <a:bodyPr wrap="square">
+            <a:spAutoFit/>
+          </a:bodyPr>
+          <a:lstStyle/>
+          <a:p>
+            <a:r>
+              <a:rPr lang="hr-HR" dirty="0"/>
+              <a:t>👉</a:t>
+            </a:r>
+            <a:r>
+              <a:rPr lang="en-US" dirty="0"/>
+              <a:t> </a:t>
+            </a:r>
+            <a:r>
+              <a:rPr lang="hr-HR" dirty="0"/>
+              <a:t>Ovaj odnos znači da </a:t>
+            </a:r>
+            <a:r>
+              <a:rPr lang="hr-HR" b="1" dirty="0"/>
+              <a:t>jedan redak u jednoj tablici odgovara točno jednom retku u drugoj tablici</a:t>
+            </a:r>
+            <a:r>
+              <a:rPr lang="hr-HR" dirty="0"/>
+              <a:t>.</a:t>
+            </a:r>
+            <a:br>
+              <a:rPr lang="hr-HR" dirty="0"/>
+            </a:br>
+            <a:r>
+              <a:rPr lang="hr-HR" dirty="0"/>
+              <a:t>Koristi se </a:t>
+            </a:r>
+            <a:r>
+              <a:rPr lang="hr-HR" b="1" dirty="0"/>
+              <a:t>za </a:t>
+            </a:r>
+            <a:r>
+              <a:rPr lang="hr-HR" b="1" dirty="0" err="1"/>
+              <a:t>modularizaciju</a:t>
+            </a:r>
+            <a:r>
+              <a:rPr lang="hr-HR" b="1" dirty="0"/>
+              <a:t> baze</a:t>
+            </a:r>
+            <a:r>
+              <a:rPr lang="hr-HR" dirty="0"/>
+              <a:t> i izbjegavanje prevelikih tablica s previše stupaca.</a:t>
+            </a:r>
+            <a:endParaRPr lang="en-US" dirty="0"/>
+          </a:p>
+        </p:txBody>
+      </p:sp>
+      <p:pic>
+        <p:nvPicPr>
+          <p:cNvPr id="10" name="Picture 9">
+            <a:extLst>
+              <a:ext uri="{FF2B5EF4-FFF2-40B4-BE49-F238E27FC236}">
+                <a16:creationId xmlns:a16="http://schemas.microsoft.com/office/drawing/2014/main" id="{3977CD9B-1362-A952-6D41-F78E2E33B59E}"/>
+              </a:ext>
+            </a:extLst>
+          </p:cNvPr>
+          <p:cNvPicPr>
+            <a:picLocks noChangeAspect="1"/>
+          </p:cNvPicPr>
+          <p:nvPr/>
+        </p:nvPicPr>
+        <p:blipFill>
+          <a:blip r:embed="rId3"/>
+          <a:stretch>
+            <a:fillRect/>
+          </a:stretch>
+        </p:blipFill>
+        <p:spPr>
+          <a:xfrm>
+            <a:off x="1199707" y="3836304"/>
+            <a:ext cx="2903576" cy="1786454"/>
+          </a:xfrm>
+          <a:prstGeom prst="rect">
+            <a:avLst/>
+          </a:prstGeom>
+        </p:spPr>
+      </p:pic>
+      <p:pic>
+        <p:nvPicPr>
+          <p:cNvPr id="13" name="Picture 12">
+            <a:extLst>
+              <a:ext uri="{FF2B5EF4-FFF2-40B4-BE49-F238E27FC236}">
+                <a16:creationId xmlns:a16="http://schemas.microsoft.com/office/drawing/2014/main" id="{68DD9227-49F4-6356-C796-359932E10E15}"/>
+              </a:ext>
+            </a:extLst>
+          </p:cNvPr>
+          <p:cNvPicPr>
+            <a:picLocks noChangeAspect="1"/>
+          </p:cNvPicPr>
+          <p:nvPr/>
+        </p:nvPicPr>
+        <p:blipFill>
+          <a:blip r:embed="rId4"/>
+          <a:stretch>
+            <a:fillRect/>
+          </a:stretch>
+        </p:blipFill>
+        <p:spPr>
+          <a:xfrm>
+            <a:off x="1104013" y="2335103"/>
+            <a:ext cx="3212805" cy="1331361"/>
+          </a:xfrm>
+          <a:prstGeom prst="rect">
+            <a:avLst/>
+          </a:prstGeom>
+        </p:spPr>
+      </p:pic>
+      <p:pic>
+        <p:nvPicPr>
+          <p:cNvPr id="6" name="Picture 5">
+            <a:extLst>
+              <a:ext uri="{FF2B5EF4-FFF2-40B4-BE49-F238E27FC236}">
+                <a16:creationId xmlns:a16="http://schemas.microsoft.com/office/drawing/2014/main" id="{F99818A8-1C0B-9788-CC0E-0B91F4EBA44C}"/>
+              </a:ext>
+            </a:extLst>
+          </p:cNvPr>
+          <p:cNvPicPr>
+            <a:picLocks noChangeAspect="1"/>
+          </p:cNvPicPr>
+          <p:nvPr/>
+        </p:nvPicPr>
+        <p:blipFill>
+          <a:blip r:embed="rId5"/>
+          <a:stretch>
+            <a:fillRect/>
+          </a:stretch>
+        </p:blipFill>
+        <p:spPr>
+          <a:xfrm>
+            <a:off x="5298779" y="2406225"/>
+            <a:ext cx="3755525" cy="523070"/>
+          </a:xfrm>
+          <a:prstGeom prst="rect">
+            <a:avLst/>
+          </a:prstGeom>
+        </p:spPr>
+      </p:pic>
+      <p:pic>
+        <p:nvPicPr>
+          <p:cNvPr id="9" name="Picture 8">
+            <a:extLst>
+              <a:ext uri="{FF2B5EF4-FFF2-40B4-BE49-F238E27FC236}">
+                <a16:creationId xmlns:a16="http://schemas.microsoft.com/office/drawing/2014/main" id="{90A03C66-131C-9E44-1550-CF02244EB088}"/>
+              </a:ext>
+            </a:extLst>
+          </p:cNvPr>
+          <p:cNvPicPr>
+            <a:picLocks noChangeAspect="1"/>
+          </p:cNvPicPr>
+          <p:nvPr/>
+        </p:nvPicPr>
+        <p:blipFill>
+          <a:blip r:embed="rId6"/>
+          <a:stretch>
+            <a:fillRect/>
+          </a:stretch>
+        </p:blipFill>
+        <p:spPr>
+          <a:xfrm>
+            <a:off x="5298779" y="3128962"/>
+            <a:ext cx="3829050" cy="600075"/>
+          </a:xfrm>
+          <a:prstGeom prst="rect">
+            <a:avLst/>
+          </a:prstGeom>
+        </p:spPr>
+      </p:pic>
+      <p:pic>
+        <p:nvPicPr>
+          <p:cNvPr id="12" name="Picture 11">
+            <a:extLst>
+              <a:ext uri="{FF2B5EF4-FFF2-40B4-BE49-F238E27FC236}">
+                <a16:creationId xmlns:a16="http://schemas.microsoft.com/office/drawing/2014/main" id="{B7895BFF-248C-8FD0-0738-12503309C712}"/>
+              </a:ext>
+            </a:extLst>
+          </p:cNvPr>
+          <p:cNvPicPr>
+            <a:picLocks noChangeAspect="1"/>
+          </p:cNvPicPr>
+          <p:nvPr/>
+        </p:nvPicPr>
+        <p:blipFill>
+          <a:blip r:embed="rId7"/>
+          <a:stretch>
+            <a:fillRect/>
+          </a:stretch>
+        </p:blipFill>
+        <p:spPr>
+          <a:xfrm>
+            <a:off x="5298779" y="3977056"/>
+            <a:ext cx="3733800" cy="752475"/>
+          </a:xfrm>
+          <a:prstGeom prst="rect">
+            <a:avLst/>
+          </a:prstGeom>
+        </p:spPr>
+      </p:pic>
+    </p:spTree>
+    <p:extLst>
+      <p:ext uri="{BB962C8B-B14F-4D97-AF65-F5344CB8AC3E}">
+        <p14:creationId xmlns:p14="http://schemas.microsoft.com/office/powerpoint/2010/main" val="4274671457"/>
       </p:ext>
     </p:extLst>
   </p:cSld>
@@ -20276,330 +20114,6 @@
         <p:cNvPr id="1" name="">
           <a:extLst>
             <a:ext uri="{FF2B5EF4-FFF2-40B4-BE49-F238E27FC236}">
-              <a16:creationId xmlns:a16="http://schemas.microsoft.com/office/drawing/2014/main" id="{61800159-5D3C-EF0F-DB56-34B1FFD0BA89}"/>
-            </a:ext>
-          </a:extLst>
-        </p:cNvPr>
-        <p:cNvGrpSpPr/>
-        <p:nvPr/>
-      </p:nvGrpSpPr>
-      <p:grpSpPr>
-        <a:xfrm>
-          <a:off x="0" y="0"/>
-          <a:ext cx="0" cy="0"/>
-          <a:chOff x="0" y="0"/>
-          <a:chExt cx="0" cy="0"/>
-        </a:xfrm>
-      </p:grpSpPr>
-      <p:sp>
-        <p:nvSpPr>
-          <p:cNvPr id="4" name="Title 1">
-            <a:extLst>
-              <a:ext uri="{FF2B5EF4-FFF2-40B4-BE49-F238E27FC236}">
-                <a16:creationId xmlns:a16="http://schemas.microsoft.com/office/drawing/2014/main" id="{D9C47BAA-7344-AED4-AAAF-4AB02047E2D1}"/>
-              </a:ext>
-            </a:extLst>
-          </p:cNvPr>
-          <p:cNvSpPr txBox="1">
-            <a:spLocks/>
-          </p:cNvSpPr>
-          <p:nvPr/>
-        </p:nvSpPr>
-        <p:spPr>
-          <a:xfrm>
-            <a:off x="990600" y="383056"/>
-            <a:ext cx="10515600" cy="853976"/>
-          </a:xfrm>
-          <a:prstGeom prst="rect">
-            <a:avLst/>
-          </a:prstGeom>
-        </p:spPr>
-        <p:txBody>
-          <a:bodyPr vert="horz" lIns="91440" tIns="45720" rIns="91440" bIns="45720" rtlCol="0" anchor="ctr">
-            <a:normAutofit/>
-          </a:bodyPr>
-          <a:lstStyle>
-            <a:lvl1pPr algn="l" defTabSz="914400" rtl="0" eaLnBrk="1" latinLnBrk="0" hangingPunct="1">
-              <a:lnSpc>
-                <a:spcPct val="90000"/>
-              </a:lnSpc>
-              <a:spcBef>
-                <a:spcPct val="0"/>
-              </a:spcBef>
-              <a:buNone/>
-              <a:defRPr sz="3600" b="1" i="0" kern="1200" cap="all" baseline="0">
-                <a:solidFill>
-                  <a:schemeClr val="tx2"/>
-                </a:solidFill>
-                <a:latin typeface="+mj-lt"/>
-                <a:ea typeface="Open Sans Semibold" panose="020B0606030504020204" pitchFamily="34" charset="0"/>
-                <a:cs typeface="Open Sans Semibold" panose="020B0606030504020204" pitchFamily="34" charset="0"/>
-              </a:defRPr>
-            </a:lvl1pPr>
-          </a:lstStyle>
-          <a:p>
-            <a:r>
-              <a:rPr lang="en-US" dirty="0"/>
-              <a:t>Baze </a:t>
-            </a:r>
-            <a:r>
-              <a:rPr lang="en-US" dirty="0" err="1"/>
-              <a:t>podataka</a:t>
-            </a:r>
-            <a:r>
-              <a:rPr lang="en-US" dirty="0"/>
-              <a:t> – JEDAN NA JEDAN (1:1)</a:t>
-            </a:r>
-            <a:endParaRPr lang="hr-HR" dirty="0"/>
-          </a:p>
-        </p:txBody>
-      </p:sp>
-      <p:sp>
-        <p:nvSpPr>
-          <p:cNvPr id="7" name="TextBox 6">
-            <a:extLst>
-              <a:ext uri="{FF2B5EF4-FFF2-40B4-BE49-F238E27FC236}">
-                <a16:creationId xmlns:a16="http://schemas.microsoft.com/office/drawing/2014/main" id="{8BD984AA-B614-D702-A1D1-0F0E6A82BFEA}"/>
-              </a:ext>
-            </a:extLst>
-          </p:cNvPr>
-          <p:cNvSpPr txBox="1"/>
-          <p:nvPr/>
-        </p:nvSpPr>
-        <p:spPr>
-          <a:xfrm>
-            <a:off x="990600" y="1295097"/>
-            <a:ext cx="10008781" cy="923330"/>
-          </a:xfrm>
-          <a:prstGeom prst="rect">
-            <a:avLst/>
-          </a:prstGeom>
-          <a:noFill/>
-        </p:spPr>
-        <p:txBody>
-          <a:bodyPr wrap="square">
-            <a:spAutoFit/>
-          </a:bodyPr>
-          <a:lstStyle/>
-          <a:p>
-            <a:r>
-              <a:rPr lang="hr-HR" dirty="0"/>
-              <a:t>👉</a:t>
-            </a:r>
-            <a:r>
-              <a:rPr lang="en-US" dirty="0"/>
-              <a:t> </a:t>
-            </a:r>
-            <a:r>
-              <a:rPr lang="hr-HR" dirty="0"/>
-              <a:t>Ovaj odnos znači da </a:t>
-            </a:r>
-            <a:r>
-              <a:rPr lang="hr-HR" b="1" dirty="0"/>
-              <a:t>jedan redak u jednoj tablici odgovara točno jednom retku u drugoj tablici</a:t>
-            </a:r>
-            <a:r>
-              <a:rPr lang="hr-HR" dirty="0"/>
-              <a:t>.</a:t>
-            </a:r>
-            <a:br>
-              <a:rPr lang="hr-HR" dirty="0"/>
-            </a:br>
-            <a:r>
-              <a:rPr lang="hr-HR" dirty="0"/>
-              <a:t>Koristi se </a:t>
-            </a:r>
-            <a:r>
-              <a:rPr lang="hr-HR" b="1" dirty="0"/>
-              <a:t>za </a:t>
-            </a:r>
-            <a:r>
-              <a:rPr lang="hr-HR" b="1" dirty="0" err="1"/>
-              <a:t>modularizaciju</a:t>
-            </a:r>
-            <a:r>
-              <a:rPr lang="hr-HR" b="1" dirty="0"/>
-              <a:t> baze</a:t>
-            </a:r>
-            <a:r>
-              <a:rPr lang="hr-HR" dirty="0"/>
-              <a:t> i izbjegavanje prevelikih tablica s previše stupaca.</a:t>
-            </a:r>
-            <a:endParaRPr lang="en-US" dirty="0"/>
-          </a:p>
-        </p:txBody>
-      </p:sp>
-      <p:pic>
-        <p:nvPicPr>
-          <p:cNvPr id="10" name="Picture 9">
-            <a:extLst>
-              <a:ext uri="{FF2B5EF4-FFF2-40B4-BE49-F238E27FC236}">
-                <a16:creationId xmlns:a16="http://schemas.microsoft.com/office/drawing/2014/main" id="{3977CD9B-1362-A952-6D41-F78E2E33B59E}"/>
-              </a:ext>
-            </a:extLst>
-          </p:cNvPr>
-          <p:cNvPicPr>
-            <a:picLocks noChangeAspect="1"/>
-          </p:cNvPicPr>
-          <p:nvPr/>
-        </p:nvPicPr>
-        <p:blipFill>
-          <a:blip r:embed="rId3"/>
-          <a:stretch>
-            <a:fillRect/>
-          </a:stretch>
-        </p:blipFill>
-        <p:spPr>
-          <a:xfrm>
-            <a:off x="1199707" y="3836304"/>
-            <a:ext cx="2903576" cy="1786454"/>
-          </a:xfrm>
-          <a:prstGeom prst="rect">
-            <a:avLst/>
-          </a:prstGeom>
-        </p:spPr>
-      </p:pic>
-      <p:pic>
-        <p:nvPicPr>
-          <p:cNvPr id="13" name="Picture 12">
-            <a:extLst>
-              <a:ext uri="{FF2B5EF4-FFF2-40B4-BE49-F238E27FC236}">
-                <a16:creationId xmlns:a16="http://schemas.microsoft.com/office/drawing/2014/main" id="{68DD9227-49F4-6356-C796-359932E10E15}"/>
-              </a:ext>
-            </a:extLst>
-          </p:cNvPr>
-          <p:cNvPicPr>
-            <a:picLocks noChangeAspect="1"/>
-          </p:cNvPicPr>
-          <p:nvPr/>
-        </p:nvPicPr>
-        <p:blipFill>
-          <a:blip r:embed="rId4"/>
-          <a:stretch>
-            <a:fillRect/>
-          </a:stretch>
-        </p:blipFill>
-        <p:spPr>
-          <a:xfrm>
-            <a:off x="1104013" y="2335103"/>
-            <a:ext cx="3212805" cy="1331361"/>
-          </a:xfrm>
-          <a:prstGeom prst="rect">
-            <a:avLst/>
-          </a:prstGeom>
-        </p:spPr>
-      </p:pic>
-      <p:pic>
-        <p:nvPicPr>
-          <p:cNvPr id="6" name="Picture 5">
-            <a:extLst>
-              <a:ext uri="{FF2B5EF4-FFF2-40B4-BE49-F238E27FC236}">
-                <a16:creationId xmlns:a16="http://schemas.microsoft.com/office/drawing/2014/main" id="{F99818A8-1C0B-9788-CC0E-0B91F4EBA44C}"/>
-              </a:ext>
-            </a:extLst>
-          </p:cNvPr>
-          <p:cNvPicPr>
-            <a:picLocks noChangeAspect="1"/>
-          </p:cNvPicPr>
-          <p:nvPr/>
-        </p:nvPicPr>
-        <p:blipFill>
-          <a:blip r:embed="rId5"/>
-          <a:stretch>
-            <a:fillRect/>
-          </a:stretch>
-        </p:blipFill>
-        <p:spPr>
-          <a:xfrm>
-            <a:off x="5298779" y="2406225"/>
-            <a:ext cx="3755525" cy="523070"/>
-          </a:xfrm>
-          <a:prstGeom prst="rect">
-            <a:avLst/>
-          </a:prstGeom>
-        </p:spPr>
-      </p:pic>
-      <p:pic>
-        <p:nvPicPr>
-          <p:cNvPr id="9" name="Picture 8">
-            <a:extLst>
-              <a:ext uri="{FF2B5EF4-FFF2-40B4-BE49-F238E27FC236}">
-                <a16:creationId xmlns:a16="http://schemas.microsoft.com/office/drawing/2014/main" id="{90A03C66-131C-9E44-1550-CF02244EB088}"/>
-              </a:ext>
-            </a:extLst>
-          </p:cNvPr>
-          <p:cNvPicPr>
-            <a:picLocks noChangeAspect="1"/>
-          </p:cNvPicPr>
-          <p:nvPr/>
-        </p:nvPicPr>
-        <p:blipFill>
-          <a:blip r:embed="rId6"/>
-          <a:stretch>
-            <a:fillRect/>
-          </a:stretch>
-        </p:blipFill>
-        <p:spPr>
-          <a:xfrm>
-            <a:off x="5298779" y="3128962"/>
-            <a:ext cx="3829050" cy="600075"/>
-          </a:xfrm>
-          <a:prstGeom prst="rect">
-            <a:avLst/>
-          </a:prstGeom>
-        </p:spPr>
-      </p:pic>
-      <p:pic>
-        <p:nvPicPr>
-          <p:cNvPr id="12" name="Picture 11">
-            <a:extLst>
-              <a:ext uri="{FF2B5EF4-FFF2-40B4-BE49-F238E27FC236}">
-                <a16:creationId xmlns:a16="http://schemas.microsoft.com/office/drawing/2014/main" id="{B7895BFF-248C-8FD0-0738-12503309C712}"/>
-              </a:ext>
-            </a:extLst>
-          </p:cNvPr>
-          <p:cNvPicPr>
-            <a:picLocks noChangeAspect="1"/>
-          </p:cNvPicPr>
-          <p:nvPr/>
-        </p:nvPicPr>
-        <p:blipFill>
-          <a:blip r:embed="rId7"/>
-          <a:stretch>
-            <a:fillRect/>
-          </a:stretch>
-        </p:blipFill>
-        <p:spPr>
-          <a:xfrm>
-            <a:off x="5298779" y="3977056"/>
-            <a:ext cx="3733800" cy="752475"/>
-          </a:xfrm>
-          <a:prstGeom prst="rect">
-            <a:avLst/>
-          </a:prstGeom>
-        </p:spPr>
-      </p:pic>
-    </p:spTree>
-    <p:extLst>
-      <p:ext uri="{BB962C8B-B14F-4D97-AF65-F5344CB8AC3E}">
-        <p14:creationId xmlns:p14="http://schemas.microsoft.com/office/powerpoint/2010/main" val="4274671457"/>
-      </p:ext>
-    </p:extLst>
-  </p:cSld>
-  <p:clrMapOvr>
-    <a:masterClrMapping/>
-  </p:clrMapOvr>
-</p:sld>
-</file>
-
-<file path=ppt/slides/slide21.xml><?xml version="1.0" encoding="utf-8"?>
-<p:sld xmlns:a="http://schemas.openxmlformats.org/drawingml/2006/main" xmlns:r="http://schemas.openxmlformats.org/officeDocument/2006/relationships" xmlns:p="http://schemas.openxmlformats.org/presentationml/2006/main">
-  <p:cSld>
-    <p:spTree>
-      <p:nvGrpSpPr>
-        <p:cNvPr id="1" name="">
-          <a:extLst>
-            <a:ext uri="{FF2B5EF4-FFF2-40B4-BE49-F238E27FC236}">
               <a16:creationId xmlns:a16="http://schemas.microsoft.com/office/drawing/2014/main" id="{601E071A-2CC6-EC9E-3AA2-353C6D0539C8}"/>
             </a:ext>
           </a:extLst>
@@ -20806,7 +20320,7 @@
 </p:sld>
 </file>
 
-<file path=ppt/slides/slide22.xml><?xml version="1.0" encoding="utf-8"?>
+<file path=ppt/slides/slide21.xml><?xml version="1.0" encoding="utf-8"?>
 <p:sld xmlns:a="http://schemas.openxmlformats.org/drawingml/2006/main" xmlns:r="http://schemas.openxmlformats.org/officeDocument/2006/relationships" xmlns:p="http://schemas.openxmlformats.org/presentationml/2006/main">
   <p:cSld>
     <p:spTree>
@@ -21063,7 +20577,7 @@
 </p:sld>
 </file>
 
-<file path=ppt/slides/slide23.xml><?xml version="1.0" encoding="utf-8"?>
+<file path=ppt/slides/slide22.xml><?xml version="1.0" encoding="utf-8"?>
 <p:sld xmlns:a="http://schemas.openxmlformats.org/drawingml/2006/main" xmlns:r="http://schemas.openxmlformats.org/officeDocument/2006/relationships" xmlns:p="http://schemas.openxmlformats.org/presentationml/2006/main">
   <p:cSld>
     <p:spTree>
@@ -21149,58 +20663,6 @@
               <a:rPr lang="hr-HR" dirty="0"/>
               <a:t>Jedan-na-Više (1:M) </a:t>
             </a:r>
-          </a:p>
-        </p:txBody>
-      </p:sp>
-      <p:sp>
-        <p:nvSpPr>
-          <p:cNvPr id="7" name="TextBox 6">
-            <a:extLst>
-              <a:ext uri="{FF2B5EF4-FFF2-40B4-BE49-F238E27FC236}">
-                <a16:creationId xmlns:a16="http://schemas.microsoft.com/office/drawing/2014/main" id="{FAA71C2D-FC80-4D3A-AB02-E1F22685509E}"/>
-              </a:ext>
-            </a:extLst>
-          </p:cNvPr>
-          <p:cNvSpPr txBox="1"/>
-          <p:nvPr/>
-        </p:nvSpPr>
-        <p:spPr>
-          <a:xfrm>
-            <a:off x="990600" y="1295097"/>
-            <a:ext cx="10008781" cy="646331"/>
-          </a:xfrm>
-          <a:prstGeom prst="rect">
-            <a:avLst/>
-          </a:prstGeom>
-          <a:noFill/>
-        </p:spPr>
-        <p:txBody>
-          <a:bodyPr wrap="square">
-            <a:spAutoFit/>
-          </a:bodyPr>
-          <a:lstStyle/>
-          <a:p>
-            <a:r>
-              <a:rPr lang="hr-HR" dirty="0"/>
-              <a:t>👉</a:t>
-            </a:r>
-            <a:r>
-              <a:rPr lang="en-US" dirty="0"/>
-              <a:t> </a:t>
-            </a:r>
-            <a:r>
-              <a:rPr lang="hr-HR" dirty="0"/>
-              <a:t>Jedan-na-Više (1:M) odnos se javlja kada </a:t>
-            </a:r>
-            <a:r>
-              <a:rPr lang="hr-HR" b="1" dirty="0"/>
-              <a:t>jedan zapis u jednoj tablici može biti povezan s više zapisa u drugoj tablici</a:t>
-            </a:r>
-            <a:r>
-              <a:rPr lang="hr-HR" dirty="0"/>
-              <a:t>.</a:t>
-            </a:r>
-            <a:endParaRPr lang="en-US" dirty="0"/>
           </a:p>
         </p:txBody>
       </p:sp>
@@ -21494,7 +20956,7 @@
 </p:sld>
 </file>
 
-<file path=ppt/slides/slide24.xml><?xml version="1.0" encoding="utf-8"?>
+<file path=ppt/slides/slide23.xml><?xml version="1.0" encoding="utf-8"?>
 <p:sld xmlns:a="http://schemas.openxmlformats.org/drawingml/2006/main" xmlns:r="http://schemas.openxmlformats.org/officeDocument/2006/relationships" xmlns:p="http://schemas.openxmlformats.org/presentationml/2006/main">
   <p:cSld>
     <p:spTree>
@@ -21691,7 +21153,7 @@
 </p:sld>
 </file>
 
-<file path=ppt/slides/slide25.xml><?xml version="1.0" encoding="utf-8"?>
+<file path=ppt/slides/slide24.xml><?xml version="1.0" encoding="utf-8"?>
 <p:sld xmlns:a="http://schemas.openxmlformats.org/drawingml/2006/main" xmlns:r="http://schemas.openxmlformats.org/officeDocument/2006/relationships" xmlns:p="http://schemas.openxmlformats.org/presentationml/2006/main">
   <p:cSld>
     <p:spTree>
@@ -21875,7 +21337,7 @@
 </p:sld>
 </file>
 
-<file path=ppt/slides/slide26.xml><?xml version="1.0" encoding="utf-8"?>
+<file path=ppt/slides/slide25.xml><?xml version="1.0" encoding="utf-8"?>
 <p:sld xmlns:a="http://schemas.openxmlformats.org/drawingml/2006/main" xmlns:r="http://schemas.openxmlformats.org/officeDocument/2006/relationships" xmlns:p="http://schemas.openxmlformats.org/presentationml/2006/main">
   <p:cSld>
     <p:spTree>
@@ -22140,7 +21602,7 @@
 </p:sld>
 </file>
 
-<file path=ppt/slides/slide27.xml><?xml version="1.0" encoding="utf-8"?>
+<file path=ppt/slides/slide26.xml><?xml version="1.0" encoding="utf-8"?>
 <p:sld xmlns:a="http://schemas.openxmlformats.org/drawingml/2006/main" xmlns:r="http://schemas.openxmlformats.org/officeDocument/2006/relationships" xmlns:p="http://schemas.openxmlformats.org/presentationml/2006/main">
   <p:cSld>
     <p:spTree>
@@ -22610,7 +22072,7 @@
 </p:sld>
 </file>
 
-<file path=ppt/slides/slide28.xml><?xml version="1.0" encoding="utf-8"?>
+<file path=ppt/slides/slide27.xml><?xml version="1.0" encoding="utf-8"?>
 <p:sld xmlns:a="http://schemas.openxmlformats.org/drawingml/2006/main" xmlns:r="http://schemas.openxmlformats.org/officeDocument/2006/relationships" xmlns:p="http://schemas.openxmlformats.org/presentationml/2006/main">
   <p:cSld>
     <p:spTree>
@@ -22879,7 +22341,7 @@
 </p:sld>
 </file>
 
-<file path=ppt/slides/slide29.xml><?xml version="1.0" encoding="utf-8"?>
+<file path=ppt/slides/slide28.xml><?xml version="1.0" encoding="utf-8"?>
 <p:sld xmlns:a="http://schemas.openxmlformats.org/drawingml/2006/main" xmlns:r="http://schemas.openxmlformats.org/officeDocument/2006/relationships" xmlns:p="http://schemas.openxmlformats.org/presentationml/2006/main">
   <p:cSld>
     <p:spTree>
@@ -23068,915 +22530,7 @@
 </p:sld>
 </file>
 
-<file path=ppt/slides/slide3.xml><?xml version="1.0" encoding="utf-8"?>
-<p:sld xmlns:a="http://schemas.openxmlformats.org/drawingml/2006/main" xmlns:r="http://schemas.openxmlformats.org/officeDocument/2006/relationships" xmlns:p="http://schemas.openxmlformats.org/presentationml/2006/main">
-  <p:cSld>
-    <p:spTree>
-      <p:nvGrpSpPr>
-        <p:cNvPr id="1" name="">
-          <a:extLst>
-            <a:ext uri="{FF2B5EF4-FFF2-40B4-BE49-F238E27FC236}">
-              <a16:creationId xmlns:a16="http://schemas.microsoft.com/office/drawing/2014/main" id="{8A3BB671-DE0C-69DA-7D50-7B520318E890}"/>
-            </a:ext>
-          </a:extLst>
-        </p:cNvPr>
-        <p:cNvGrpSpPr/>
-        <p:nvPr/>
-      </p:nvGrpSpPr>
-      <p:grpSpPr>
-        <a:xfrm>
-          <a:off x="0" y="0"/>
-          <a:ext cx="0" cy="0"/>
-          <a:chOff x="0" y="0"/>
-          <a:chExt cx="0" cy="0"/>
-        </a:xfrm>
-      </p:grpSpPr>
-      <p:sp>
-        <p:nvSpPr>
-          <p:cNvPr id="4" name="Title 1">
-            <a:extLst>
-              <a:ext uri="{FF2B5EF4-FFF2-40B4-BE49-F238E27FC236}">
-                <a16:creationId xmlns:a16="http://schemas.microsoft.com/office/drawing/2014/main" id="{46514EAA-86A0-ABD2-5692-FA150F3943FE}"/>
-              </a:ext>
-            </a:extLst>
-          </p:cNvPr>
-          <p:cNvSpPr txBox="1">
-            <a:spLocks/>
-          </p:cNvSpPr>
-          <p:nvPr/>
-        </p:nvSpPr>
-        <p:spPr>
-          <a:xfrm>
-            <a:off x="990600" y="383056"/>
-            <a:ext cx="10515600" cy="853976"/>
-          </a:xfrm>
-          <a:prstGeom prst="rect">
-            <a:avLst/>
-          </a:prstGeom>
-        </p:spPr>
-        <p:txBody>
-          <a:bodyPr vert="horz" lIns="91440" tIns="45720" rIns="91440" bIns="45720" rtlCol="0" anchor="ctr">
-            <a:normAutofit/>
-          </a:bodyPr>
-          <a:lstStyle>
-            <a:lvl1pPr algn="l" defTabSz="914400" rtl="0" eaLnBrk="1" latinLnBrk="0" hangingPunct="1">
-              <a:lnSpc>
-                <a:spcPct val="90000"/>
-              </a:lnSpc>
-              <a:spcBef>
-                <a:spcPct val="0"/>
-              </a:spcBef>
-              <a:buNone/>
-              <a:defRPr sz="3600" b="1" i="0" kern="1200" cap="all" baseline="0">
-                <a:solidFill>
-                  <a:schemeClr val="tx2"/>
-                </a:solidFill>
-                <a:latin typeface="+mj-lt"/>
-                <a:ea typeface="Open Sans Semibold" panose="020B0606030504020204" pitchFamily="34" charset="0"/>
-                <a:cs typeface="Open Sans Semibold" panose="020B0606030504020204" pitchFamily="34" charset="0"/>
-              </a:defRPr>
-            </a:lvl1pPr>
-          </a:lstStyle>
-          <a:p>
-            <a:r>
-              <a:rPr lang="en-US" dirty="0" err="1"/>
-              <a:t>baze</a:t>
-            </a:r>
-            <a:r>
-              <a:rPr lang="en-US" dirty="0"/>
-              <a:t> </a:t>
-            </a:r>
-            <a:r>
-              <a:rPr lang="en-US" dirty="0" err="1"/>
-              <a:t>podataka</a:t>
-            </a:r>
-            <a:r>
-              <a:rPr lang="en-US" dirty="0"/>
-              <a:t> - SQL</a:t>
-            </a:r>
-            <a:endParaRPr lang="hr-HR" dirty="0"/>
-          </a:p>
-        </p:txBody>
-      </p:sp>
-      <p:pic>
-        <p:nvPicPr>
-          <p:cNvPr id="3" name="Picture 2">
-            <a:extLst>
-              <a:ext uri="{FF2B5EF4-FFF2-40B4-BE49-F238E27FC236}">
-                <a16:creationId xmlns:a16="http://schemas.microsoft.com/office/drawing/2014/main" id="{95640238-01BC-E770-D831-E152577D15FB}"/>
-              </a:ext>
-            </a:extLst>
-          </p:cNvPr>
-          <p:cNvPicPr>
-            <a:picLocks noChangeAspect="1"/>
-          </p:cNvPicPr>
-          <p:nvPr/>
-        </p:nvPicPr>
-        <p:blipFill>
-          <a:blip r:embed="rId3"/>
-          <a:stretch>
-            <a:fillRect/>
-          </a:stretch>
-        </p:blipFill>
-        <p:spPr>
-          <a:xfrm>
-            <a:off x="5365122" y="1344243"/>
-            <a:ext cx="6448425" cy="1266825"/>
-          </a:xfrm>
-          <a:prstGeom prst="rect">
-            <a:avLst/>
-          </a:prstGeom>
-        </p:spPr>
-      </p:pic>
-      <p:pic>
-        <p:nvPicPr>
-          <p:cNvPr id="7" name="Picture 6">
-            <a:extLst>
-              <a:ext uri="{FF2B5EF4-FFF2-40B4-BE49-F238E27FC236}">
-                <a16:creationId xmlns:a16="http://schemas.microsoft.com/office/drawing/2014/main" id="{4E239D55-EDDE-C6BE-D549-0151E3F5D71B}"/>
-              </a:ext>
-            </a:extLst>
-          </p:cNvPr>
-          <p:cNvPicPr>
-            <a:picLocks noChangeAspect="1"/>
-          </p:cNvPicPr>
-          <p:nvPr/>
-        </p:nvPicPr>
-        <p:blipFill>
-          <a:blip r:embed="rId4"/>
-          <a:stretch>
-            <a:fillRect/>
-          </a:stretch>
-        </p:blipFill>
-        <p:spPr>
-          <a:xfrm>
-            <a:off x="5365122" y="2771775"/>
-            <a:ext cx="6448425" cy="1314450"/>
-          </a:xfrm>
-          <a:prstGeom prst="rect">
-            <a:avLst/>
-          </a:prstGeom>
-        </p:spPr>
-      </p:pic>
-      <p:sp>
-        <p:nvSpPr>
-          <p:cNvPr id="9" name="Content Placeholder 2">
-            <a:extLst>
-              <a:ext uri="{FF2B5EF4-FFF2-40B4-BE49-F238E27FC236}">
-                <a16:creationId xmlns:a16="http://schemas.microsoft.com/office/drawing/2014/main" id="{29325DB5-C4FA-1201-F20B-8A44F160DF8A}"/>
-              </a:ext>
-            </a:extLst>
-          </p:cNvPr>
-          <p:cNvSpPr txBox="1">
-            <a:spLocks/>
-          </p:cNvSpPr>
-          <p:nvPr/>
-        </p:nvSpPr>
-        <p:spPr>
-          <a:xfrm>
-            <a:off x="1077248" y="1904392"/>
-            <a:ext cx="3932237" cy="3805292"/>
-          </a:xfrm>
-          <a:prstGeom prst="rect">
-            <a:avLst/>
-          </a:prstGeom>
-        </p:spPr>
-        <p:txBody>
-          <a:bodyPr vert="horz" lIns="91440" tIns="45720" rIns="91440" bIns="45720" rtlCol="0">
-            <a:normAutofit fontScale="55000" lnSpcReduction="20000"/>
-          </a:bodyPr>
-          <a:lstStyle>
-            <a:lvl1pPr marL="368300" indent="-352425" algn="l" defTabSz="914400" rtl="0" eaLnBrk="1" latinLnBrk="0" hangingPunct="1">
-              <a:lnSpc>
-                <a:spcPct val="90000"/>
-              </a:lnSpc>
-              <a:spcBef>
-                <a:spcPts val="600"/>
-              </a:spcBef>
-              <a:spcAft>
-                <a:spcPts val="600"/>
-              </a:spcAft>
-              <a:buClr>
-                <a:schemeClr val="accent2"/>
-              </a:buClr>
-              <a:buFont typeface="Wingdings" pitchFamily="2" charset="2"/>
-              <a:buChar char="§"/>
-              <a:tabLst/>
-              <a:defRPr sz="2400" kern="1200">
-                <a:solidFill>
-                  <a:schemeClr val="tx1"/>
-                </a:solidFill>
-                <a:latin typeface="+mn-lt"/>
-                <a:ea typeface="Open Sans" panose="020B0606030504020204" pitchFamily="34" charset="0"/>
-                <a:cs typeface="Open Sans" panose="020B0606030504020204" pitchFamily="34" charset="0"/>
-              </a:defRPr>
-            </a:lvl1pPr>
-            <a:lvl2pPr marL="771525" indent="-274638" algn="l" defTabSz="914400" rtl="0" eaLnBrk="1" latinLnBrk="0" hangingPunct="1">
-              <a:lnSpc>
-                <a:spcPct val="90000"/>
-              </a:lnSpc>
-              <a:spcBef>
-                <a:spcPts val="600"/>
-              </a:spcBef>
-              <a:spcAft>
-                <a:spcPts val="600"/>
-              </a:spcAft>
-              <a:buClr>
-                <a:schemeClr val="accent2"/>
-              </a:buClr>
-              <a:buFont typeface="Wingdings" pitchFamily="2" charset="2"/>
-              <a:buChar char="§"/>
-              <a:tabLst/>
-              <a:defRPr sz="2200" kern="1200">
-                <a:solidFill>
-                  <a:schemeClr val="tx1"/>
-                </a:solidFill>
-                <a:latin typeface="+mn-lt"/>
-                <a:ea typeface="Open Sans" panose="020B0606030504020204" pitchFamily="34" charset="0"/>
-                <a:cs typeface="Open Sans" panose="020B0606030504020204" pitchFamily="34" charset="0"/>
-              </a:defRPr>
-            </a:lvl2pPr>
-            <a:lvl3pPr marL="1143000" indent="-228600" algn="l" defTabSz="914400" rtl="0" eaLnBrk="1" latinLnBrk="0" hangingPunct="1">
-              <a:lnSpc>
-                <a:spcPct val="90000"/>
-              </a:lnSpc>
-              <a:spcBef>
-                <a:spcPts val="600"/>
-              </a:spcBef>
-              <a:spcAft>
-                <a:spcPts val="600"/>
-              </a:spcAft>
-              <a:buClr>
-                <a:schemeClr val="accent2"/>
-              </a:buClr>
-              <a:buFont typeface="Wingdings" pitchFamily="2" charset="2"/>
-              <a:buChar char="§"/>
-              <a:defRPr sz="2000" kern="1200">
-                <a:solidFill>
-                  <a:schemeClr val="tx1"/>
-                </a:solidFill>
-                <a:latin typeface="+mn-lt"/>
-                <a:ea typeface="Open Sans" panose="020B0606030504020204" pitchFamily="34" charset="0"/>
-                <a:cs typeface="Open Sans" panose="020B0606030504020204" pitchFamily="34" charset="0"/>
-              </a:defRPr>
-            </a:lvl3pPr>
-            <a:lvl4pPr marL="1600200" indent="-228600" algn="l" defTabSz="914400" rtl="0" eaLnBrk="1" latinLnBrk="0" hangingPunct="1">
-              <a:lnSpc>
-                <a:spcPct val="90000"/>
-              </a:lnSpc>
-              <a:spcBef>
-                <a:spcPts val="600"/>
-              </a:spcBef>
-              <a:spcAft>
-                <a:spcPts val="600"/>
-              </a:spcAft>
-              <a:buClr>
-                <a:schemeClr val="accent2"/>
-              </a:buClr>
-              <a:buFont typeface="Wingdings" pitchFamily="2" charset="2"/>
-              <a:buChar char="§"/>
-              <a:defRPr sz="1800" kern="1200">
-                <a:solidFill>
-                  <a:schemeClr val="tx1"/>
-                </a:solidFill>
-                <a:latin typeface="+mn-lt"/>
-                <a:ea typeface="Open Sans" panose="020B0606030504020204" pitchFamily="34" charset="0"/>
-                <a:cs typeface="Open Sans" panose="020B0606030504020204" pitchFamily="34" charset="0"/>
-              </a:defRPr>
-            </a:lvl4pPr>
-            <a:lvl5pPr marL="1960563" indent="-225425" algn="l" defTabSz="914400" rtl="0" eaLnBrk="1" latinLnBrk="0" hangingPunct="1">
-              <a:lnSpc>
-                <a:spcPct val="90000"/>
-              </a:lnSpc>
-              <a:spcBef>
-                <a:spcPts val="600"/>
-              </a:spcBef>
-              <a:spcAft>
-                <a:spcPts val="600"/>
-              </a:spcAft>
-              <a:buClr>
-                <a:schemeClr val="accent2"/>
-              </a:buClr>
-              <a:buFont typeface="Wingdings" pitchFamily="2" charset="2"/>
-              <a:buChar char="§"/>
-              <a:tabLst/>
-              <a:defRPr sz="1600" kern="1200">
-                <a:solidFill>
-                  <a:schemeClr val="tx1"/>
-                </a:solidFill>
-                <a:latin typeface="+mn-lt"/>
-                <a:ea typeface="Open Sans" panose="020B0606030504020204" pitchFamily="34" charset="0"/>
-                <a:cs typeface="Open Sans" panose="020B0606030504020204" pitchFamily="34" charset="0"/>
-              </a:defRPr>
-            </a:lvl5pPr>
-            <a:lvl6pPr marL="2514600" indent="-228600" algn="l" defTabSz="914400" rtl="0" eaLnBrk="1" latinLnBrk="0" hangingPunct="1">
-              <a:lnSpc>
-                <a:spcPct val="90000"/>
-              </a:lnSpc>
-              <a:spcBef>
-                <a:spcPts val="500"/>
-              </a:spcBef>
-              <a:buFont typeface="Arial" panose="020B0604020202020204" pitchFamily="34" charset="0"/>
-              <a:buChar char="•"/>
-              <a:defRPr sz="1800" kern="1200">
-                <a:solidFill>
-                  <a:schemeClr val="tx1"/>
-                </a:solidFill>
-                <a:latin typeface="+mn-lt"/>
-                <a:ea typeface="+mn-ea"/>
-                <a:cs typeface="+mn-cs"/>
-              </a:defRPr>
-            </a:lvl6pPr>
-            <a:lvl7pPr marL="2971800" indent="-228600" algn="l" defTabSz="914400" rtl="0" eaLnBrk="1" latinLnBrk="0" hangingPunct="1">
-              <a:lnSpc>
-                <a:spcPct val="90000"/>
-              </a:lnSpc>
-              <a:spcBef>
-                <a:spcPts val="500"/>
-              </a:spcBef>
-              <a:buFont typeface="Arial" panose="020B0604020202020204" pitchFamily="34" charset="0"/>
-              <a:buChar char="•"/>
-              <a:defRPr sz="1800" kern="1200">
-                <a:solidFill>
-                  <a:schemeClr val="tx1"/>
-                </a:solidFill>
-                <a:latin typeface="+mn-lt"/>
-                <a:ea typeface="+mn-ea"/>
-                <a:cs typeface="+mn-cs"/>
-              </a:defRPr>
-            </a:lvl7pPr>
-            <a:lvl8pPr marL="3429000" indent="-228600" algn="l" defTabSz="914400" rtl="0" eaLnBrk="1" latinLnBrk="0" hangingPunct="1">
-              <a:lnSpc>
-                <a:spcPct val="90000"/>
-              </a:lnSpc>
-              <a:spcBef>
-                <a:spcPts val="500"/>
-              </a:spcBef>
-              <a:buFont typeface="Arial" panose="020B0604020202020204" pitchFamily="34" charset="0"/>
-              <a:buChar char="•"/>
-              <a:defRPr sz="1800" kern="1200">
-                <a:solidFill>
-                  <a:schemeClr val="tx1"/>
-                </a:solidFill>
-                <a:latin typeface="+mn-lt"/>
-                <a:ea typeface="+mn-ea"/>
-                <a:cs typeface="+mn-cs"/>
-              </a:defRPr>
-            </a:lvl8pPr>
-            <a:lvl9pPr marL="3886200" indent="-228600" algn="l" defTabSz="914400" rtl="0" eaLnBrk="1" latinLnBrk="0" hangingPunct="1">
-              <a:lnSpc>
-                <a:spcPct val="90000"/>
-              </a:lnSpc>
-              <a:spcBef>
-                <a:spcPts val="500"/>
-              </a:spcBef>
-              <a:buFont typeface="Arial" panose="020B0604020202020204" pitchFamily="34" charset="0"/>
-              <a:buChar char="•"/>
-              <a:defRPr sz="1800" kern="1200">
-                <a:solidFill>
-                  <a:schemeClr val="tx1"/>
-                </a:solidFill>
-                <a:latin typeface="+mn-lt"/>
-                <a:ea typeface="+mn-ea"/>
-                <a:cs typeface="+mn-cs"/>
-              </a:defRPr>
-            </a:lvl9pPr>
-          </a:lstStyle>
-          <a:p>
-            <a:pPr marL="15875" indent="0">
-              <a:buNone/>
-            </a:pPr>
-            <a:r>
-              <a:rPr lang="hr-HR" dirty="0"/>
-              <a:t>👉 </a:t>
-            </a:r>
-            <a:r>
-              <a:rPr lang="hr-HR" b="1" dirty="0"/>
-              <a:t>SQL (</a:t>
-            </a:r>
-            <a:r>
-              <a:rPr lang="hr-HR" b="1" dirty="0" err="1"/>
-              <a:t>Structured</a:t>
-            </a:r>
-            <a:r>
-              <a:rPr lang="hr-HR" b="1" dirty="0"/>
-              <a:t> </a:t>
-            </a:r>
-            <a:r>
-              <a:rPr lang="hr-HR" b="1" dirty="0" err="1"/>
-              <a:t>Query</a:t>
-            </a:r>
-            <a:r>
-              <a:rPr lang="hr-HR" b="1" dirty="0"/>
-              <a:t> </a:t>
-            </a:r>
-            <a:r>
-              <a:rPr lang="hr-HR" b="1" dirty="0" err="1"/>
-              <a:t>Language</a:t>
-            </a:r>
-            <a:r>
-              <a:rPr lang="hr-HR" b="1" dirty="0"/>
-              <a:t>)</a:t>
-            </a:r>
-            <a:r>
-              <a:rPr lang="hr-HR" dirty="0"/>
-              <a:t> je jezik koji omogućuje </a:t>
-            </a:r>
-            <a:r>
-              <a:rPr lang="hr-HR" b="1" dirty="0"/>
-              <a:t>upite nad strukturiranom bazom podataka</a:t>
-            </a:r>
-            <a:r>
-              <a:rPr lang="hr-HR" dirty="0"/>
-              <a:t>.</a:t>
-            </a:r>
-            <a:endParaRPr lang="en-US" dirty="0"/>
-          </a:p>
-          <a:p>
-            <a:pPr marL="15875" indent="0">
-              <a:buNone/>
-            </a:pPr>
-            <a:r>
-              <a:rPr lang="hr-HR" dirty="0"/>
-              <a:t>👉Ove baze podataka postoje </a:t>
-            </a:r>
-            <a:r>
-              <a:rPr lang="hr-HR" b="1" dirty="0"/>
-              <a:t>desetljećima</a:t>
-            </a:r>
-            <a:r>
-              <a:rPr lang="hr-HR" dirty="0"/>
-              <a:t> i nazivaju se još i </a:t>
-            </a:r>
-            <a:r>
-              <a:rPr lang="hr-HR" b="1" dirty="0"/>
-              <a:t>relacijske baze podataka</a:t>
-            </a:r>
-            <a:r>
-              <a:rPr lang="hr-HR" dirty="0"/>
-              <a:t>.</a:t>
-            </a:r>
-            <a:endParaRPr lang="en-US" dirty="0"/>
-          </a:p>
-          <a:p>
-            <a:pPr marL="15875" indent="0">
-              <a:buNone/>
-            </a:pPr>
-            <a:r>
-              <a:rPr lang="hr-HR" dirty="0"/>
-              <a:t>👉</a:t>
-            </a:r>
-            <a:r>
-              <a:rPr lang="es-ES" dirty="0" err="1"/>
-              <a:t>Podaci</a:t>
-            </a:r>
-            <a:r>
-              <a:rPr lang="es-ES" dirty="0"/>
-              <a:t> su </a:t>
-            </a:r>
-            <a:r>
-              <a:rPr lang="es-ES" b="1" dirty="0" err="1"/>
-              <a:t>organizirani</a:t>
-            </a:r>
-            <a:r>
-              <a:rPr lang="es-ES" b="1" dirty="0"/>
-              <a:t> u </a:t>
-            </a:r>
-            <a:r>
-              <a:rPr lang="es-ES" b="1" dirty="0" err="1"/>
-              <a:t>tablice</a:t>
-            </a:r>
-            <a:r>
-              <a:rPr lang="es-ES" dirty="0"/>
-              <a:t> (</a:t>
-            </a:r>
-            <a:r>
-              <a:rPr lang="es-ES" dirty="0" err="1"/>
-              <a:t>slično</a:t>
-            </a:r>
-            <a:r>
-              <a:rPr lang="es-ES" dirty="0"/>
-              <a:t> Excel </a:t>
-            </a:r>
-            <a:r>
-              <a:rPr lang="es-ES" dirty="0" err="1"/>
-              <a:t>tablicama</a:t>
-            </a:r>
-            <a:r>
-              <a:rPr lang="es-ES" dirty="0"/>
-              <a:t>).</a:t>
-            </a:r>
-          </a:p>
-          <a:p>
-            <a:pPr marL="15875" indent="0">
-              <a:buNone/>
-            </a:pPr>
-            <a:r>
-              <a:rPr lang="hr-HR" dirty="0"/>
-              <a:t>👉Svaka tablica sadrži </a:t>
-            </a:r>
-            <a:r>
-              <a:rPr lang="hr-HR" b="1" dirty="0"/>
-              <a:t>stupce (kolone)</a:t>
-            </a:r>
-            <a:r>
-              <a:rPr lang="hr-HR" dirty="0"/>
-              <a:t> koji definiraju </a:t>
-            </a:r>
-            <a:r>
-              <a:rPr lang="hr-HR" b="1" dirty="0"/>
-              <a:t>tipove podataka</a:t>
-            </a:r>
-            <a:r>
-              <a:rPr lang="hr-HR" dirty="0"/>
-              <a:t>.</a:t>
-            </a:r>
-            <a:endParaRPr lang="en-US" dirty="0"/>
-          </a:p>
-          <a:p>
-            <a:pPr marL="15875" indent="0">
-              <a:buNone/>
-            </a:pPr>
-            <a:r>
-              <a:rPr lang="hr-HR" dirty="0"/>
-              <a:t>👉 </a:t>
-            </a:r>
-            <a:r>
-              <a:rPr lang="pl-PL" dirty="0"/>
-              <a:t>Svaki redak tablice je </a:t>
-            </a:r>
-            <a:r>
-              <a:rPr lang="pl-PL" b="1" dirty="0"/>
-              <a:t>novi zapis (record)</a:t>
-            </a:r>
-            <a:r>
-              <a:rPr lang="pl-PL" dirty="0"/>
-              <a:t>.</a:t>
-            </a:r>
-            <a:endParaRPr lang="en-US" dirty="0"/>
-          </a:p>
-          <a:p>
-            <a:pPr marL="15875" indent="0">
-              <a:buNone/>
-            </a:pPr>
-            <a:r>
-              <a:rPr lang="hr-HR" dirty="0"/>
-              <a:t>👉 Relacije između podataka omogućuju povezivanje tablica.</a:t>
-            </a:r>
-            <a:endParaRPr lang="en-US" dirty="0"/>
-          </a:p>
-          <a:p>
-            <a:pPr marL="15875" indent="0">
-              <a:buNone/>
-            </a:pPr>
-            <a:r>
-              <a:rPr lang="hr-HR" dirty="0"/>
-              <a:t>👉 Svaki blog post ima ID korisnika koji ga je napisao (</a:t>
-            </a:r>
-            <a:r>
-              <a:rPr lang="hr-HR" dirty="0" err="1"/>
-              <a:t>foreign</a:t>
-            </a:r>
-            <a:r>
-              <a:rPr lang="hr-HR" dirty="0"/>
-              <a:t> </a:t>
-            </a:r>
-            <a:r>
-              <a:rPr lang="hr-HR" dirty="0" err="1"/>
-              <a:t>key</a:t>
-            </a:r>
-            <a:r>
-              <a:rPr lang="hr-HR" dirty="0"/>
-              <a:t>). </a:t>
-            </a:r>
-            <a:endParaRPr lang="en-US" dirty="0"/>
-          </a:p>
-          <a:p>
-            <a:pPr marL="15875" indent="0">
-              <a:buNone/>
-            </a:pPr>
-            <a:r>
-              <a:rPr lang="hr-HR" dirty="0"/>
-              <a:t>👉 Možemo jednostavno dohvatiti sve postove određenog korisnika koristeći SQL upite.</a:t>
-            </a:r>
-          </a:p>
-          <a:p>
-            <a:pPr marL="15875" indent="0">
-              <a:buNone/>
-            </a:pPr>
-            <a:endParaRPr lang="hr-HR" dirty="0"/>
-          </a:p>
-        </p:txBody>
-      </p:sp>
-      <p:sp>
-        <p:nvSpPr>
-          <p:cNvPr id="10" name="Content Placeholder 2">
-            <a:extLst>
-              <a:ext uri="{FF2B5EF4-FFF2-40B4-BE49-F238E27FC236}">
-                <a16:creationId xmlns:a16="http://schemas.microsoft.com/office/drawing/2014/main" id="{5B8ADE76-19A5-448C-ECC4-1DBF33F4E196}"/>
-              </a:ext>
-            </a:extLst>
-          </p:cNvPr>
-          <p:cNvSpPr txBox="1">
-            <a:spLocks/>
-          </p:cNvSpPr>
-          <p:nvPr/>
-        </p:nvSpPr>
-        <p:spPr>
-          <a:xfrm>
-            <a:off x="6716232" y="4351350"/>
-            <a:ext cx="3703675" cy="1255552"/>
-          </a:xfrm>
-          <a:prstGeom prst="rect">
-            <a:avLst/>
-          </a:prstGeom>
-        </p:spPr>
-        <p:txBody>
-          <a:bodyPr vert="horz" lIns="91440" tIns="45720" rIns="91440" bIns="45720" rtlCol="0">
-            <a:normAutofit fontScale="70000" lnSpcReduction="20000"/>
-          </a:bodyPr>
-          <a:lstStyle>
-            <a:lvl1pPr marL="368300" indent="-352425" algn="l" defTabSz="914400" rtl="0" eaLnBrk="1" latinLnBrk="0" hangingPunct="1">
-              <a:lnSpc>
-                <a:spcPct val="90000"/>
-              </a:lnSpc>
-              <a:spcBef>
-                <a:spcPts val="600"/>
-              </a:spcBef>
-              <a:spcAft>
-                <a:spcPts val="600"/>
-              </a:spcAft>
-              <a:buClr>
-                <a:schemeClr val="accent2"/>
-              </a:buClr>
-              <a:buFont typeface="Wingdings" pitchFamily="2" charset="2"/>
-              <a:buChar char="§"/>
-              <a:tabLst/>
-              <a:defRPr sz="2400" kern="1200">
-                <a:solidFill>
-                  <a:schemeClr val="tx1"/>
-                </a:solidFill>
-                <a:latin typeface="+mn-lt"/>
-                <a:ea typeface="Open Sans" panose="020B0606030504020204" pitchFamily="34" charset="0"/>
-                <a:cs typeface="Open Sans" panose="020B0606030504020204" pitchFamily="34" charset="0"/>
-              </a:defRPr>
-            </a:lvl1pPr>
-            <a:lvl2pPr marL="771525" indent="-274638" algn="l" defTabSz="914400" rtl="0" eaLnBrk="1" latinLnBrk="0" hangingPunct="1">
-              <a:lnSpc>
-                <a:spcPct val="90000"/>
-              </a:lnSpc>
-              <a:spcBef>
-                <a:spcPts val="600"/>
-              </a:spcBef>
-              <a:spcAft>
-                <a:spcPts val="600"/>
-              </a:spcAft>
-              <a:buClr>
-                <a:schemeClr val="accent2"/>
-              </a:buClr>
-              <a:buFont typeface="Wingdings" pitchFamily="2" charset="2"/>
-              <a:buChar char="§"/>
-              <a:tabLst/>
-              <a:defRPr sz="2200" kern="1200">
-                <a:solidFill>
-                  <a:schemeClr val="tx1"/>
-                </a:solidFill>
-                <a:latin typeface="+mn-lt"/>
-                <a:ea typeface="Open Sans" panose="020B0606030504020204" pitchFamily="34" charset="0"/>
-                <a:cs typeface="Open Sans" panose="020B0606030504020204" pitchFamily="34" charset="0"/>
-              </a:defRPr>
-            </a:lvl2pPr>
-            <a:lvl3pPr marL="1143000" indent="-228600" algn="l" defTabSz="914400" rtl="0" eaLnBrk="1" latinLnBrk="0" hangingPunct="1">
-              <a:lnSpc>
-                <a:spcPct val="90000"/>
-              </a:lnSpc>
-              <a:spcBef>
-                <a:spcPts val="600"/>
-              </a:spcBef>
-              <a:spcAft>
-                <a:spcPts val="600"/>
-              </a:spcAft>
-              <a:buClr>
-                <a:schemeClr val="accent2"/>
-              </a:buClr>
-              <a:buFont typeface="Wingdings" pitchFamily="2" charset="2"/>
-              <a:buChar char="§"/>
-              <a:defRPr sz="2000" kern="1200">
-                <a:solidFill>
-                  <a:schemeClr val="tx1"/>
-                </a:solidFill>
-                <a:latin typeface="+mn-lt"/>
-                <a:ea typeface="Open Sans" panose="020B0606030504020204" pitchFamily="34" charset="0"/>
-                <a:cs typeface="Open Sans" panose="020B0606030504020204" pitchFamily="34" charset="0"/>
-              </a:defRPr>
-            </a:lvl3pPr>
-            <a:lvl4pPr marL="1600200" indent="-228600" algn="l" defTabSz="914400" rtl="0" eaLnBrk="1" latinLnBrk="0" hangingPunct="1">
-              <a:lnSpc>
-                <a:spcPct val="90000"/>
-              </a:lnSpc>
-              <a:spcBef>
-                <a:spcPts val="600"/>
-              </a:spcBef>
-              <a:spcAft>
-                <a:spcPts val="600"/>
-              </a:spcAft>
-              <a:buClr>
-                <a:schemeClr val="accent2"/>
-              </a:buClr>
-              <a:buFont typeface="Wingdings" pitchFamily="2" charset="2"/>
-              <a:buChar char="§"/>
-              <a:defRPr sz="1800" kern="1200">
-                <a:solidFill>
-                  <a:schemeClr val="tx1"/>
-                </a:solidFill>
-                <a:latin typeface="+mn-lt"/>
-                <a:ea typeface="Open Sans" panose="020B0606030504020204" pitchFamily="34" charset="0"/>
-                <a:cs typeface="Open Sans" panose="020B0606030504020204" pitchFamily="34" charset="0"/>
-              </a:defRPr>
-            </a:lvl4pPr>
-            <a:lvl5pPr marL="1960563" indent="-225425" algn="l" defTabSz="914400" rtl="0" eaLnBrk="1" latinLnBrk="0" hangingPunct="1">
-              <a:lnSpc>
-                <a:spcPct val="90000"/>
-              </a:lnSpc>
-              <a:spcBef>
-                <a:spcPts val="600"/>
-              </a:spcBef>
-              <a:spcAft>
-                <a:spcPts val="600"/>
-              </a:spcAft>
-              <a:buClr>
-                <a:schemeClr val="accent2"/>
-              </a:buClr>
-              <a:buFont typeface="Wingdings" pitchFamily="2" charset="2"/>
-              <a:buChar char="§"/>
-              <a:tabLst/>
-              <a:defRPr sz="1600" kern="1200">
-                <a:solidFill>
-                  <a:schemeClr val="tx1"/>
-                </a:solidFill>
-                <a:latin typeface="+mn-lt"/>
-                <a:ea typeface="Open Sans" panose="020B0606030504020204" pitchFamily="34" charset="0"/>
-                <a:cs typeface="Open Sans" panose="020B0606030504020204" pitchFamily="34" charset="0"/>
-              </a:defRPr>
-            </a:lvl5pPr>
-            <a:lvl6pPr marL="2514600" indent="-228600" algn="l" defTabSz="914400" rtl="0" eaLnBrk="1" latinLnBrk="0" hangingPunct="1">
-              <a:lnSpc>
-                <a:spcPct val="90000"/>
-              </a:lnSpc>
-              <a:spcBef>
-                <a:spcPts val="500"/>
-              </a:spcBef>
-              <a:buFont typeface="Arial" panose="020B0604020202020204" pitchFamily="34" charset="0"/>
-              <a:buChar char="•"/>
-              <a:defRPr sz="1800" kern="1200">
-                <a:solidFill>
-                  <a:schemeClr val="tx1"/>
-                </a:solidFill>
-                <a:latin typeface="+mn-lt"/>
-                <a:ea typeface="+mn-ea"/>
-                <a:cs typeface="+mn-cs"/>
-              </a:defRPr>
-            </a:lvl6pPr>
-            <a:lvl7pPr marL="2971800" indent="-228600" algn="l" defTabSz="914400" rtl="0" eaLnBrk="1" latinLnBrk="0" hangingPunct="1">
-              <a:lnSpc>
-                <a:spcPct val="90000"/>
-              </a:lnSpc>
-              <a:spcBef>
-                <a:spcPts val="500"/>
-              </a:spcBef>
-              <a:buFont typeface="Arial" panose="020B0604020202020204" pitchFamily="34" charset="0"/>
-              <a:buChar char="•"/>
-              <a:defRPr sz="1800" kern="1200">
-                <a:solidFill>
-                  <a:schemeClr val="tx1"/>
-                </a:solidFill>
-                <a:latin typeface="+mn-lt"/>
-                <a:ea typeface="+mn-ea"/>
-                <a:cs typeface="+mn-cs"/>
-              </a:defRPr>
-            </a:lvl7pPr>
-            <a:lvl8pPr marL="3429000" indent="-228600" algn="l" defTabSz="914400" rtl="0" eaLnBrk="1" latinLnBrk="0" hangingPunct="1">
-              <a:lnSpc>
-                <a:spcPct val="90000"/>
-              </a:lnSpc>
-              <a:spcBef>
-                <a:spcPts val="500"/>
-              </a:spcBef>
-              <a:buFont typeface="Arial" panose="020B0604020202020204" pitchFamily="34" charset="0"/>
-              <a:buChar char="•"/>
-              <a:defRPr sz="1800" kern="1200">
-                <a:solidFill>
-                  <a:schemeClr val="tx1"/>
-                </a:solidFill>
-                <a:latin typeface="+mn-lt"/>
-                <a:ea typeface="+mn-ea"/>
-                <a:cs typeface="+mn-cs"/>
-              </a:defRPr>
-            </a:lvl8pPr>
-            <a:lvl9pPr marL="3886200" indent="-228600" algn="l" defTabSz="914400" rtl="0" eaLnBrk="1" latinLnBrk="0" hangingPunct="1">
-              <a:lnSpc>
-                <a:spcPct val="90000"/>
-              </a:lnSpc>
-              <a:spcBef>
-                <a:spcPts val="500"/>
-              </a:spcBef>
-              <a:buFont typeface="Arial" panose="020B0604020202020204" pitchFamily="34" charset="0"/>
-              <a:buChar char="•"/>
-              <a:defRPr sz="1800" kern="1200">
-                <a:solidFill>
-                  <a:schemeClr val="tx1"/>
-                </a:solidFill>
-                <a:latin typeface="+mn-lt"/>
-                <a:ea typeface="+mn-ea"/>
-                <a:cs typeface="+mn-cs"/>
-              </a:defRPr>
-            </a:lvl9pPr>
-          </a:lstStyle>
-          <a:p>
-            <a:pPr marL="15875" indent="0">
-              <a:buNone/>
-            </a:pPr>
-            <a:r>
-              <a:rPr lang="hr-HR" dirty="0"/>
-              <a:t>✔ </a:t>
-            </a:r>
-            <a:r>
-              <a:rPr lang="hr-HR" b="1" dirty="0" err="1"/>
-              <a:t>PostgreSQL</a:t>
-            </a:r>
-            <a:r>
-              <a:rPr lang="hr-HR" dirty="0"/>
-              <a:t> 🏆 (najpopularnija među developerima!)</a:t>
-            </a:r>
-            <a:br>
-              <a:rPr lang="hr-HR" dirty="0"/>
-            </a:br>
-            <a:r>
-              <a:rPr lang="hr-HR" dirty="0"/>
-              <a:t>✔ </a:t>
-            </a:r>
-            <a:r>
-              <a:rPr lang="hr-HR" b="1" dirty="0" err="1"/>
-              <a:t>MySQL</a:t>
-            </a:r>
-            <a:br>
-              <a:rPr lang="hr-HR" dirty="0"/>
-            </a:br>
-            <a:r>
-              <a:rPr lang="hr-HR" dirty="0"/>
-              <a:t>✔ </a:t>
-            </a:r>
-            <a:r>
-              <a:rPr lang="hr-HR" b="1" dirty="0" err="1"/>
-              <a:t>SQLite</a:t>
-            </a:r>
-            <a:br>
-              <a:rPr lang="hr-HR" dirty="0"/>
-            </a:br>
-            <a:r>
-              <a:rPr lang="hr-HR" dirty="0"/>
-              <a:t>✔ </a:t>
-            </a:r>
-            <a:r>
-              <a:rPr lang="hr-HR" b="1" dirty="0"/>
-              <a:t>Microsoft SQL Server</a:t>
-            </a:r>
-            <a:br>
-              <a:rPr lang="hr-HR" dirty="0"/>
-            </a:br>
-            <a:r>
-              <a:rPr lang="hr-HR" dirty="0"/>
-              <a:t>✔ </a:t>
-            </a:r>
-            <a:r>
-              <a:rPr lang="hr-HR" b="1" dirty="0"/>
-              <a:t>Oracle </a:t>
-            </a:r>
-            <a:r>
-              <a:rPr lang="hr-HR" b="1" dirty="0" err="1"/>
-              <a:t>Database</a:t>
-            </a:r>
-            <a:r>
-              <a:rPr lang="hr-HR" dirty="0"/>
-              <a:t> (ali košta $$$)</a:t>
-            </a:r>
-          </a:p>
-        </p:txBody>
-      </p:sp>
-    </p:spTree>
-    <p:extLst>
-      <p:ext uri="{BB962C8B-B14F-4D97-AF65-F5344CB8AC3E}">
-        <p14:creationId xmlns:p14="http://schemas.microsoft.com/office/powerpoint/2010/main" val="452716800"/>
-      </p:ext>
-    </p:extLst>
-  </p:cSld>
-  <p:clrMapOvr>
-    <a:masterClrMapping/>
-  </p:clrMapOvr>
-</p:sld>
-</file>
-
-<file path=ppt/slides/slide30.xml><?xml version="1.0" encoding="utf-8"?>
+<file path=ppt/slides/slide29.xml><?xml version="1.0" encoding="utf-8"?>
 <p:sld xmlns:a="http://schemas.openxmlformats.org/drawingml/2006/main" xmlns:r="http://schemas.openxmlformats.org/officeDocument/2006/relationships" xmlns:p="http://schemas.openxmlformats.org/presentationml/2006/main">
   <p:cSld>
     <p:spTree>
@@ -24244,7 +22798,915 @@
 </p:sld>
 </file>
 
-<file path=ppt/slides/slide31.xml><?xml version="1.0" encoding="utf-8"?>
+<file path=ppt/slides/slide3.xml><?xml version="1.0" encoding="utf-8"?>
+<p:sld xmlns:a="http://schemas.openxmlformats.org/drawingml/2006/main" xmlns:r="http://schemas.openxmlformats.org/officeDocument/2006/relationships" xmlns:p="http://schemas.openxmlformats.org/presentationml/2006/main">
+  <p:cSld>
+    <p:spTree>
+      <p:nvGrpSpPr>
+        <p:cNvPr id="1" name="">
+          <a:extLst>
+            <a:ext uri="{FF2B5EF4-FFF2-40B4-BE49-F238E27FC236}">
+              <a16:creationId xmlns:a16="http://schemas.microsoft.com/office/drawing/2014/main" id="{8A3BB671-DE0C-69DA-7D50-7B520318E890}"/>
+            </a:ext>
+          </a:extLst>
+        </p:cNvPr>
+        <p:cNvGrpSpPr/>
+        <p:nvPr/>
+      </p:nvGrpSpPr>
+      <p:grpSpPr>
+        <a:xfrm>
+          <a:off x="0" y="0"/>
+          <a:ext cx="0" cy="0"/>
+          <a:chOff x="0" y="0"/>
+          <a:chExt cx="0" cy="0"/>
+        </a:xfrm>
+      </p:grpSpPr>
+      <p:sp>
+        <p:nvSpPr>
+          <p:cNvPr id="4" name="Title 1">
+            <a:extLst>
+              <a:ext uri="{FF2B5EF4-FFF2-40B4-BE49-F238E27FC236}">
+                <a16:creationId xmlns:a16="http://schemas.microsoft.com/office/drawing/2014/main" id="{46514EAA-86A0-ABD2-5692-FA150F3943FE}"/>
+              </a:ext>
+            </a:extLst>
+          </p:cNvPr>
+          <p:cNvSpPr txBox="1">
+            <a:spLocks/>
+          </p:cNvSpPr>
+          <p:nvPr/>
+        </p:nvSpPr>
+        <p:spPr>
+          <a:xfrm>
+            <a:off x="990600" y="383056"/>
+            <a:ext cx="10515600" cy="853976"/>
+          </a:xfrm>
+          <a:prstGeom prst="rect">
+            <a:avLst/>
+          </a:prstGeom>
+        </p:spPr>
+        <p:txBody>
+          <a:bodyPr vert="horz" lIns="91440" tIns="45720" rIns="91440" bIns="45720" rtlCol="0" anchor="ctr">
+            <a:normAutofit/>
+          </a:bodyPr>
+          <a:lstStyle>
+            <a:lvl1pPr algn="l" defTabSz="914400" rtl="0" eaLnBrk="1" latinLnBrk="0" hangingPunct="1">
+              <a:lnSpc>
+                <a:spcPct val="90000"/>
+              </a:lnSpc>
+              <a:spcBef>
+                <a:spcPct val="0"/>
+              </a:spcBef>
+              <a:buNone/>
+              <a:defRPr sz="3600" b="1" i="0" kern="1200" cap="all" baseline="0">
+                <a:solidFill>
+                  <a:schemeClr val="tx2"/>
+                </a:solidFill>
+                <a:latin typeface="+mj-lt"/>
+                <a:ea typeface="Open Sans Semibold" panose="020B0606030504020204" pitchFamily="34" charset="0"/>
+                <a:cs typeface="Open Sans Semibold" panose="020B0606030504020204" pitchFamily="34" charset="0"/>
+              </a:defRPr>
+            </a:lvl1pPr>
+          </a:lstStyle>
+          <a:p>
+            <a:r>
+              <a:rPr lang="en-US" dirty="0" err="1"/>
+              <a:t>baze</a:t>
+            </a:r>
+            <a:r>
+              <a:rPr lang="en-US" dirty="0"/>
+              <a:t> </a:t>
+            </a:r>
+            <a:r>
+              <a:rPr lang="en-US" dirty="0" err="1"/>
+              <a:t>podataka</a:t>
+            </a:r>
+            <a:r>
+              <a:rPr lang="en-US" dirty="0"/>
+              <a:t> - SQL</a:t>
+            </a:r>
+            <a:endParaRPr lang="hr-HR" dirty="0"/>
+          </a:p>
+        </p:txBody>
+      </p:sp>
+      <p:pic>
+        <p:nvPicPr>
+          <p:cNvPr id="3" name="Picture 2">
+            <a:extLst>
+              <a:ext uri="{FF2B5EF4-FFF2-40B4-BE49-F238E27FC236}">
+                <a16:creationId xmlns:a16="http://schemas.microsoft.com/office/drawing/2014/main" id="{95640238-01BC-E770-D831-E152577D15FB}"/>
+              </a:ext>
+            </a:extLst>
+          </p:cNvPr>
+          <p:cNvPicPr>
+            <a:picLocks noChangeAspect="1"/>
+          </p:cNvPicPr>
+          <p:nvPr/>
+        </p:nvPicPr>
+        <p:blipFill>
+          <a:blip r:embed="rId3"/>
+          <a:stretch>
+            <a:fillRect/>
+          </a:stretch>
+        </p:blipFill>
+        <p:spPr>
+          <a:xfrm>
+            <a:off x="5365122" y="1344243"/>
+            <a:ext cx="6448425" cy="1266825"/>
+          </a:xfrm>
+          <a:prstGeom prst="rect">
+            <a:avLst/>
+          </a:prstGeom>
+        </p:spPr>
+      </p:pic>
+      <p:pic>
+        <p:nvPicPr>
+          <p:cNvPr id="7" name="Picture 6">
+            <a:extLst>
+              <a:ext uri="{FF2B5EF4-FFF2-40B4-BE49-F238E27FC236}">
+                <a16:creationId xmlns:a16="http://schemas.microsoft.com/office/drawing/2014/main" id="{4E239D55-EDDE-C6BE-D549-0151E3F5D71B}"/>
+              </a:ext>
+            </a:extLst>
+          </p:cNvPr>
+          <p:cNvPicPr>
+            <a:picLocks noChangeAspect="1"/>
+          </p:cNvPicPr>
+          <p:nvPr/>
+        </p:nvPicPr>
+        <p:blipFill>
+          <a:blip r:embed="rId4"/>
+          <a:stretch>
+            <a:fillRect/>
+          </a:stretch>
+        </p:blipFill>
+        <p:spPr>
+          <a:xfrm>
+            <a:off x="5365122" y="2771775"/>
+            <a:ext cx="6448425" cy="1314450"/>
+          </a:xfrm>
+          <a:prstGeom prst="rect">
+            <a:avLst/>
+          </a:prstGeom>
+        </p:spPr>
+      </p:pic>
+      <p:sp>
+        <p:nvSpPr>
+          <p:cNvPr id="9" name="Content Placeholder 2">
+            <a:extLst>
+              <a:ext uri="{FF2B5EF4-FFF2-40B4-BE49-F238E27FC236}">
+                <a16:creationId xmlns:a16="http://schemas.microsoft.com/office/drawing/2014/main" id="{29325DB5-C4FA-1201-F20B-8A44F160DF8A}"/>
+              </a:ext>
+            </a:extLst>
+          </p:cNvPr>
+          <p:cNvSpPr txBox="1">
+            <a:spLocks/>
+          </p:cNvSpPr>
+          <p:nvPr/>
+        </p:nvSpPr>
+        <p:spPr>
+          <a:xfrm>
+            <a:off x="1077248" y="1904392"/>
+            <a:ext cx="3932237" cy="3805292"/>
+          </a:xfrm>
+          <a:prstGeom prst="rect">
+            <a:avLst/>
+          </a:prstGeom>
+        </p:spPr>
+        <p:txBody>
+          <a:bodyPr vert="horz" lIns="91440" tIns="45720" rIns="91440" bIns="45720" rtlCol="0">
+            <a:normAutofit fontScale="55000" lnSpcReduction="20000"/>
+          </a:bodyPr>
+          <a:lstStyle>
+            <a:lvl1pPr marL="368300" indent="-352425" algn="l" defTabSz="914400" rtl="0" eaLnBrk="1" latinLnBrk="0" hangingPunct="1">
+              <a:lnSpc>
+                <a:spcPct val="90000"/>
+              </a:lnSpc>
+              <a:spcBef>
+                <a:spcPts val="600"/>
+              </a:spcBef>
+              <a:spcAft>
+                <a:spcPts val="600"/>
+              </a:spcAft>
+              <a:buClr>
+                <a:schemeClr val="accent2"/>
+              </a:buClr>
+              <a:buFont typeface="Wingdings" pitchFamily="2" charset="2"/>
+              <a:buChar char="§"/>
+              <a:tabLst/>
+              <a:defRPr sz="2400" kern="1200">
+                <a:solidFill>
+                  <a:schemeClr val="tx1"/>
+                </a:solidFill>
+                <a:latin typeface="+mn-lt"/>
+                <a:ea typeface="Open Sans" panose="020B0606030504020204" pitchFamily="34" charset="0"/>
+                <a:cs typeface="Open Sans" panose="020B0606030504020204" pitchFamily="34" charset="0"/>
+              </a:defRPr>
+            </a:lvl1pPr>
+            <a:lvl2pPr marL="771525" indent="-274638" algn="l" defTabSz="914400" rtl="0" eaLnBrk="1" latinLnBrk="0" hangingPunct="1">
+              <a:lnSpc>
+                <a:spcPct val="90000"/>
+              </a:lnSpc>
+              <a:spcBef>
+                <a:spcPts val="600"/>
+              </a:spcBef>
+              <a:spcAft>
+                <a:spcPts val="600"/>
+              </a:spcAft>
+              <a:buClr>
+                <a:schemeClr val="accent2"/>
+              </a:buClr>
+              <a:buFont typeface="Wingdings" pitchFamily="2" charset="2"/>
+              <a:buChar char="§"/>
+              <a:tabLst/>
+              <a:defRPr sz="2200" kern="1200">
+                <a:solidFill>
+                  <a:schemeClr val="tx1"/>
+                </a:solidFill>
+                <a:latin typeface="+mn-lt"/>
+                <a:ea typeface="Open Sans" panose="020B0606030504020204" pitchFamily="34" charset="0"/>
+                <a:cs typeface="Open Sans" panose="020B0606030504020204" pitchFamily="34" charset="0"/>
+              </a:defRPr>
+            </a:lvl2pPr>
+            <a:lvl3pPr marL="1143000" indent="-228600" algn="l" defTabSz="914400" rtl="0" eaLnBrk="1" latinLnBrk="0" hangingPunct="1">
+              <a:lnSpc>
+                <a:spcPct val="90000"/>
+              </a:lnSpc>
+              <a:spcBef>
+                <a:spcPts val="600"/>
+              </a:spcBef>
+              <a:spcAft>
+                <a:spcPts val="600"/>
+              </a:spcAft>
+              <a:buClr>
+                <a:schemeClr val="accent2"/>
+              </a:buClr>
+              <a:buFont typeface="Wingdings" pitchFamily="2" charset="2"/>
+              <a:buChar char="§"/>
+              <a:defRPr sz="2000" kern="1200">
+                <a:solidFill>
+                  <a:schemeClr val="tx1"/>
+                </a:solidFill>
+                <a:latin typeface="+mn-lt"/>
+                <a:ea typeface="Open Sans" panose="020B0606030504020204" pitchFamily="34" charset="0"/>
+                <a:cs typeface="Open Sans" panose="020B0606030504020204" pitchFamily="34" charset="0"/>
+              </a:defRPr>
+            </a:lvl3pPr>
+            <a:lvl4pPr marL="1600200" indent="-228600" algn="l" defTabSz="914400" rtl="0" eaLnBrk="1" latinLnBrk="0" hangingPunct="1">
+              <a:lnSpc>
+                <a:spcPct val="90000"/>
+              </a:lnSpc>
+              <a:spcBef>
+                <a:spcPts val="600"/>
+              </a:spcBef>
+              <a:spcAft>
+                <a:spcPts val="600"/>
+              </a:spcAft>
+              <a:buClr>
+                <a:schemeClr val="accent2"/>
+              </a:buClr>
+              <a:buFont typeface="Wingdings" pitchFamily="2" charset="2"/>
+              <a:buChar char="§"/>
+              <a:defRPr sz="1800" kern="1200">
+                <a:solidFill>
+                  <a:schemeClr val="tx1"/>
+                </a:solidFill>
+                <a:latin typeface="+mn-lt"/>
+                <a:ea typeface="Open Sans" panose="020B0606030504020204" pitchFamily="34" charset="0"/>
+                <a:cs typeface="Open Sans" panose="020B0606030504020204" pitchFamily="34" charset="0"/>
+              </a:defRPr>
+            </a:lvl4pPr>
+            <a:lvl5pPr marL="1960563" indent="-225425" algn="l" defTabSz="914400" rtl="0" eaLnBrk="1" latinLnBrk="0" hangingPunct="1">
+              <a:lnSpc>
+                <a:spcPct val="90000"/>
+              </a:lnSpc>
+              <a:spcBef>
+                <a:spcPts val="600"/>
+              </a:spcBef>
+              <a:spcAft>
+                <a:spcPts val="600"/>
+              </a:spcAft>
+              <a:buClr>
+                <a:schemeClr val="accent2"/>
+              </a:buClr>
+              <a:buFont typeface="Wingdings" pitchFamily="2" charset="2"/>
+              <a:buChar char="§"/>
+              <a:tabLst/>
+              <a:defRPr sz="1600" kern="1200">
+                <a:solidFill>
+                  <a:schemeClr val="tx1"/>
+                </a:solidFill>
+                <a:latin typeface="+mn-lt"/>
+                <a:ea typeface="Open Sans" panose="020B0606030504020204" pitchFamily="34" charset="0"/>
+                <a:cs typeface="Open Sans" panose="020B0606030504020204" pitchFamily="34" charset="0"/>
+              </a:defRPr>
+            </a:lvl5pPr>
+            <a:lvl6pPr marL="2514600" indent="-228600" algn="l" defTabSz="914400" rtl="0" eaLnBrk="1" latinLnBrk="0" hangingPunct="1">
+              <a:lnSpc>
+                <a:spcPct val="90000"/>
+              </a:lnSpc>
+              <a:spcBef>
+                <a:spcPts val="500"/>
+              </a:spcBef>
+              <a:buFont typeface="Arial" panose="020B0604020202020204" pitchFamily="34" charset="0"/>
+              <a:buChar char="•"/>
+              <a:defRPr sz="1800" kern="1200">
+                <a:solidFill>
+                  <a:schemeClr val="tx1"/>
+                </a:solidFill>
+                <a:latin typeface="+mn-lt"/>
+                <a:ea typeface="+mn-ea"/>
+                <a:cs typeface="+mn-cs"/>
+              </a:defRPr>
+            </a:lvl6pPr>
+            <a:lvl7pPr marL="2971800" indent="-228600" algn="l" defTabSz="914400" rtl="0" eaLnBrk="1" latinLnBrk="0" hangingPunct="1">
+              <a:lnSpc>
+                <a:spcPct val="90000"/>
+              </a:lnSpc>
+              <a:spcBef>
+                <a:spcPts val="500"/>
+              </a:spcBef>
+              <a:buFont typeface="Arial" panose="020B0604020202020204" pitchFamily="34" charset="0"/>
+              <a:buChar char="•"/>
+              <a:defRPr sz="1800" kern="1200">
+                <a:solidFill>
+                  <a:schemeClr val="tx1"/>
+                </a:solidFill>
+                <a:latin typeface="+mn-lt"/>
+                <a:ea typeface="+mn-ea"/>
+                <a:cs typeface="+mn-cs"/>
+              </a:defRPr>
+            </a:lvl7pPr>
+            <a:lvl8pPr marL="3429000" indent="-228600" algn="l" defTabSz="914400" rtl="0" eaLnBrk="1" latinLnBrk="0" hangingPunct="1">
+              <a:lnSpc>
+                <a:spcPct val="90000"/>
+              </a:lnSpc>
+              <a:spcBef>
+                <a:spcPts val="500"/>
+              </a:spcBef>
+              <a:buFont typeface="Arial" panose="020B0604020202020204" pitchFamily="34" charset="0"/>
+              <a:buChar char="•"/>
+              <a:defRPr sz="1800" kern="1200">
+                <a:solidFill>
+                  <a:schemeClr val="tx1"/>
+                </a:solidFill>
+                <a:latin typeface="+mn-lt"/>
+                <a:ea typeface="+mn-ea"/>
+                <a:cs typeface="+mn-cs"/>
+              </a:defRPr>
+            </a:lvl8pPr>
+            <a:lvl9pPr marL="3886200" indent="-228600" algn="l" defTabSz="914400" rtl="0" eaLnBrk="1" latinLnBrk="0" hangingPunct="1">
+              <a:lnSpc>
+                <a:spcPct val="90000"/>
+              </a:lnSpc>
+              <a:spcBef>
+                <a:spcPts val="500"/>
+              </a:spcBef>
+              <a:buFont typeface="Arial" panose="020B0604020202020204" pitchFamily="34" charset="0"/>
+              <a:buChar char="•"/>
+              <a:defRPr sz="1800" kern="1200">
+                <a:solidFill>
+                  <a:schemeClr val="tx1"/>
+                </a:solidFill>
+                <a:latin typeface="+mn-lt"/>
+                <a:ea typeface="+mn-ea"/>
+                <a:cs typeface="+mn-cs"/>
+              </a:defRPr>
+            </a:lvl9pPr>
+          </a:lstStyle>
+          <a:p>
+            <a:pPr marL="15875" indent="0">
+              <a:buNone/>
+            </a:pPr>
+            <a:r>
+              <a:rPr lang="hr-HR" dirty="0"/>
+              <a:t>👉 </a:t>
+            </a:r>
+            <a:r>
+              <a:rPr lang="hr-HR" b="1" dirty="0"/>
+              <a:t>SQL (</a:t>
+            </a:r>
+            <a:r>
+              <a:rPr lang="hr-HR" b="1" dirty="0" err="1"/>
+              <a:t>Structured</a:t>
+            </a:r>
+            <a:r>
+              <a:rPr lang="hr-HR" b="1" dirty="0"/>
+              <a:t> </a:t>
+            </a:r>
+            <a:r>
+              <a:rPr lang="hr-HR" b="1" dirty="0" err="1"/>
+              <a:t>Query</a:t>
+            </a:r>
+            <a:r>
+              <a:rPr lang="hr-HR" b="1" dirty="0"/>
+              <a:t> </a:t>
+            </a:r>
+            <a:r>
+              <a:rPr lang="hr-HR" b="1" dirty="0" err="1"/>
+              <a:t>Language</a:t>
+            </a:r>
+            <a:r>
+              <a:rPr lang="hr-HR" b="1" dirty="0"/>
+              <a:t>)</a:t>
+            </a:r>
+            <a:r>
+              <a:rPr lang="hr-HR" dirty="0"/>
+              <a:t> je jezik koji omogućuje </a:t>
+            </a:r>
+            <a:r>
+              <a:rPr lang="hr-HR" b="1" dirty="0"/>
+              <a:t>upite nad strukturiranom bazom podataka</a:t>
+            </a:r>
+            <a:r>
+              <a:rPr lang="hr-HR" dirty="0"/>
+              <a:t>.</a:t>
+            </a:r>
+            <a:endParaRPr lang="en-US" dirty="0"/>
+          </a:p>
+          <a:p>
+            <a:pPr marL="15875" indent="0">
+              <a:buNone/>
+            </a:pPr>
+            <a:r>
+              <a:rPr lang="hr-HR" dirty="0"/>
+              <a:t>👉Ove baze podataka postoje </a:t>
+            </a:r>
+            <a:r>
+              <a:rPr lang="hr-HR" b="1" dirty="0"/>
+              <a:t>desetljećima</a:t>
+            </a:r>
+            <a:r>
+              <a:rPr lang="hr-HR" dirty="0"/>
+              <a:t> i nazivaju se još i </a:t>
+            </a:r>
+            <a:r>
+              <a:rPr lang="hr-HR" b="1" dirty="0"/>
+              <a:t>relacijske baze podataka</a:t>
+            </a:r>
+            <a:r>
+              <a:rPr lang="hr-HR" dirty="0"/>
+              <a:t>.</a:t>
+            </a:r>
+            <a:endParaRPr lang="en-US" dirty="0"/>
+          </a:p>
+          <a:p>
+            <a:pPr marL="15875" indent="0">
+              <a:buNone/>
+            </a:pPr>
+            <a:r>
+              <a:rPr lang="hr-HR" dirty="0"/>
+              <a:t>👉</a:t>
+            </a:r>
+            <a:r>
+              <a:rPr lang="es-ES" dirty="0" err="1"/>
+              <a:t>Podaci</a:t>
+            </a:r>
+            <a:r>
+              <a:rPr lang="es-ES" dirty="0"/>
+              <a:t> su </a:t>
+            </a:r>
+            <a:r>
+              <a:rPr lang="es-ES" b="1" dirty="0" err="1"/>
+              <a:t>organizirani</a:t>
+            </a:r>
+            <a:r>
+              <a:rPr lang="es-ES" b="1" dirty="0"/>
+              <a:t> u </a:t>
+            </a:r>
+            <a:r>
+              <a:rPr lang="es-ES" b="1" dirty="0" err="1"/>
+              <a:t>tablice</a:t>
+            </a:r>
+            <a:r>
+              <a:rPr lang="es-ES" dirty="0"/>
+              <a:t> (</a:t>
+            </a:r>
+            <a:r>
+              <a:rPr lang="es-ES" dirty="0" err="1"/>
+              <a:t>slično</a:t>
+            </a:r>
+            <a:r>
+              <a:rPr lang="es-ES" dirty="0"/>
+              <a:t> Excel </a:t>
+            </a:r>
+            <a:r>
+              <a:rPr lang="es-ES" dirty="0" err="1"/>
+              <a:t>tablicama</a:t>
+            </a:r>
+            <a:r>
+              <a:rPr lang="es-ES" dirty="0"/>
+              <a:t>).</a:t>
+            </a:r>
+          </a:p>
+          <a:p>
+            <a:pPr marL="15875" indent="0">
+              <a:buNone/>
+            </a:pPr>
+            <a:r>
+              <a:rPr lang="hr-HR" dirty="0"/>
+              <a:t>👉Svaka tablica sadrži </a:t>
+            </a:r>
+            <a:r>
+              <a:rPr lang="hr-HR" b="1" dirty="0"/>
+              <a:t>stupce (kolone)</a:t>
+            </a:r>
+            <a:r>
+              <a:rPr lang="hr-HR" dirty="0"/>
+              <a:t> koji definiraju </a:t>
+            </a:r>
+            <a:r>
+              <a:rPr lang="hr-HR" b="1" dirty="0"/>
+              <a:t>tipove podataka</a:t>
+            </a:r>
+            <a:r>
+              <a:rPr lang="hr-HR" dirty="0"/>
+              <a:t>.</a:t>
+            </a:r>
+            <a:endParaRPr lang="en-US" dirty="0"/>
+          </a:p>
+          <a:p>
+            <a:pPr marL="15875" indent="0">
+              <a:buNone/>
+            </a:pPr>
+            <a:r>
+              <a:rPr lang="hr-HR" dirty="0"/>
+              <a:t>👉 </a:t>
+            </a:r>
+            <a:r>
+              <a:rPr lang="pl-PL" dirty="0"/>
+              <a:t>Svaki redak tablice je </a:t>
+            </a:r>
+            <a:r>
+              <a:rPr lang="pl-PL" b="1" dirty="0"/>
+              <a:t>novi zapis (record)</a:t>
+            </a:r>
+            <a:r>
+              <a:rPr lang="pl-PL" dirty="0"/>
+              <a:t>.</a:t>
+            </a:r>
+            <a:endParaRPr lang="en-US" dirty="0"/>
+          </a:p>
+          <a:p>
+            <a:pPr marL="15875" indent="0">
+              <a:buNone/>
+            </a:pPr>
+            <a:r>
+              <a:rPr lang="hr-HR" dirty="0"/>
+              <a:t>👉 Relacije između podataka omogućuju povezivanje tablica.</a:t>
+            </a:r>
+            <a:endParaRPr lang="en-US" dirty="0"/>
+          </a:p>
+          <a:p>
+            <a:pPr marL="15875" indent="0">
+              <a:buNone/>
+            </a:pPr>
+            <a:r>
+              <a:rPr lang="hr-HR" dirty="0"/>
+              <a:t>👉 Svaki blog post ima ID korisnika koji ga je napisao (</a:t>
+            </a:r>
+            <a:r>
+              <a:rPr lang="hr-HR" dirty="0" err="1"/>
+              <a:t>foreign</a:t>
+            </a:r>
+            <a:r>
+              <a:rPr lang="hr-HR" dirty="0"/>
+              <a:t> </a:t>
+            </a:r>
+            <a:r>
+              <a:rPr lang="hr-HR" dirty="0" err="1"/>
+              <a:t>key</a:t>
+            </a:r>
+            <a:r>
+              <a:rPr lang="hr-HR" dirty="0"/>
+              <a:t>). </a:t>
+            </a:r>
+            <a:endParaRPr lang="en-US" dirty="0"/>
+          </a:p>
+          <a:p>
+            <a:pPr marL="15875" indent="0">
+              <a:buNone/>
+            </a:pPr>
+            <a:r>
+              <a:rPr lang="hr-HR" dirty="0"/>
+              <a:t>👉 Možemo jednostavno dohvatiti sve postove određenog korisnika koristeći SQL upite.</a:t>
+            </a:r>
+          </a:p>
+          <a:p>
+            <a:pPr marL="15875" indent="0">
+              <a:buNone/>
+            </a:pPr>
+            <a:endParaRPr lang="hr-HR" dirty="0"/>
+          </a:p>
+        </p:txBody>
+      </p:sp>
+      <p:sp>
+        <p:nvSpPr>
+          <p:cNvPr id="10" name="Content Placeholder 2">
+            <a:extLst>
+              <a:ext uri="{FF2B5EF4-FFF2-40B4-BE49-F238E27FC236}">
+                <a16:creationId xmlns:a16="http://schemas.microsoft.com/office/drawing/2014/main" id="{5B8ADE76-19A5-448C-ECC4-1DBF33F4E196}"/>
+              </a:ext>
+            </a:extLst>
+          </p:cNvPr>
+          <p:cNvSpPr txBox="1">
+            <a:spLocks/>
+          </p:cNvSpPr>
+          <p:nvPr/>
+        </p:nvSpPr>
+        <p:spPr>
+          <a:xfrm>
+            <a:off x="6716232" y="4351350"/>
+            <a:ext cx="3703675" cy="1255552"/>
+          </a:xfrm>
+          <a:prstGeom prst="rect">
+            <a:avLst/>
+          </a:prstGeom>
+        </p:spPr>
+        <p:txBody>
+          <a:bodyPr vert="horz" lIns="91440" tIns="45720" rIns="91440" bIns="45720" rtlCol="0">
+            <a:normAutofit fontScale="70000" lnSpcReduction="20000"/>
+          </a:bodyPr>
+          <a:lstStyle>
+            <a:lvl1pPr marL="368300" indent="-352425" algn="l" defTabSz="914400" rtl="0" eaLnBrk="1" latinLnBrk="0" hangingPunct="1">
+              <a:lnSpc>
+                <a:spcPct val="90000"/>
+              </a:lnSpc>
+              <a:spcBef>
+                <a:spcPts val="600"/>
+              </a:spcBef>
+              <a:spcAft>
+                <a:spcPts val="600"/>
+              </a:spcAft>
+              <a:buClr>
+                <a:schemeClr val="accent2"/>
+              </a:buClr>
+              <a:buFont typeface="Wingdings" pitchFamily="2" charset="2"/>
+              <a:buChar char="§"/>
+              <a:tabLst/>
+              <a:defRPr sz="2400" kern="1200">
+                <a:solidFill>
+                  <a:schemeClr val="tx1"/>
+                </a:solidFill>
+                <a:latin typeface="+mn-lt"/>
+                <a:ea typeface="Open Sans" panose="020B0606030504020204" pitchFamily="34" charset="0"/>
+                <a:cs typeface="Open Sans" panose="020B0606030504020204" pitchFamily="34" charset="0"/>
+              </a:defRPr>
+            </a:lvl1pPr>
+            <a:lvl2pPr marL="771525" indent="-274638" algn="l" defTabSz="914400" rtl="0" eaLnBrk="1" latinLnBrk="0" hangingPunct="1">
+              <a:lnSpc>
+                <a:spcPct val="90000"/>
+              </a:lnSpc>
+              <a:spcBef>
+                <a:spcPts val="600"/>
+              </a:spcBef>
+              <a:spcAft>
+                <a:spcPts val="600"/>
+              </a:spcAft>
+              <a:buClr>
+                <a:schemeClr val="accent2"/>
+              </a:buClr>
+              <a:buFont typeface="Wingdings" pitchFamily="2" charset="2"/>
+              <a:buChar char="§"/>
+              <a:tabLst/>
+              <a:defRPr sz="2200" kern="1200">
+                <a:solidFill>
+                  <a:schemeClr val="tx1"/>
+                </a:solidFill>
+                <a:latin typeface="+mn-lt"/>
+                <a:ea typeface="Open Sans" panose="020B0606030504020204" pitchFamily="34" charset="0"/>
+                <a:cs typeface="Open Sans" panose="020B0606030504020204" pitchFamily="34" charset="0"/>
+              </a:defRPr>
+            </a:lvl2pPr>
+            <a:lvl3pPr marL="1143000" indent="-228600" algn="l" defTabSz="914400" rtl="0" eaLnBrk="1" latinLnBrk="0" hangingPunct="1">
+              <a:lnSpc>
+                <a:spcPct val="90000"/>
+              </a:lnSpc>
+              <a:spcBef>
+                <a:spcPts val="600"/>
+              </a:spcBef>
+              <a:spcAft>
+                <a:spcPts val="600"/>
+              </a:spcAft>
+              <a:buClr>
+                <a:schemeClr val="accent2"/>
+              </a:buClr>
+              <a:buFont typeface="Wingdings" pitchFamily="2" charset="2"/>
+              <a:buChar char="§"/>
+              <a:defRPr sz="2000" kern="1200">
+                <a:solidFill>
+                  <a:schemeClr val="tx1"/>
+                </a:solidFill>
+                <a:latin typeface="+mn-lt"/>
+                <a:ea typeface="Open Sans" panose="020B0606030504020204" pitchFamily="34" charset="0"/>
+                <a:cs typeface="Open Sans" panose="020B0606030504020204" pitchFamily="34" charset="0"/>
+              </a:defRPr>
+            </a:lvl3pPr>
+            <a:lvl4pPr marL="1600200" indent="-228600" algn="l" defTabSz="914400" rtl="0" eaLnBrk="1" latinLnBrk="0" hangingPunct="1">
+              <a:lnSpc>
+                <a:spcPct val="90000"/>
+              </a:lnSpc>
+              <a:spcBef>
+                <a:spcPts val="600"/>
+              </a:spcBef>
+              <a:spcAft>
+                <a:spcPts val="600"/>
+              </a:spcAft>
+              <a:buClr>
+                <a:schemeClr val="accent2"/>
+              </a:buClr>
+              <a:buFont typeface="Wingdings" pitchFamily="2" charset="2"/>
+              <a:buChar char="§"/>
+              <a:defRPr sz="1800" kern="1200">
+                <a:solidFill>
+                  <a:schemeClr val="tx1"/>
+                </a:solidFill>
+                <a:latin typeface="+mn-lt"/>
+                <a:ea typeface="Open Sans" panose="020B0606030504020204" pitchFamily="34" charset="0"/>
+                <a:cs typeface="Open Sans" panose="020B0606030504020204" pitchFamily="34" charset="0"/>
+              </a:defRPr>
+            </a:lvl4pPr>
+            <a:lvl5pPr marL="1960563" indent="-225425" algn="l" defTabSz="914400" rtl="0" eaLnBrk="1" latinLnBrk="0" hangingPunct="1">
+              <a:lnSpc>
+                <a:spcPct val="90000"/>
+              </a:lnSpc>
+              <a:spcBef>
+                <a:spcPts val="600"/>
+              </a:spcBef>
+              <a:spcAft>
+                <a:spcPts val="600"/>
+              </a:spcAft>
+              <a:buClr>
+                <a:schemeClr val="accent2"/>
+              </a:buClr>
+              <a:buFont typeface="Wingdings" pitchFamily="2" charset="2"/>
+              <a:buChar char="§"/>
+              <a:tabLst/>
+              <a:defRPr sz="1600" kern="1200">
+                <a:solidFill>
+                  <a:schemeClr val="tx1"/>
+                </a:solidFill>
+                <a:latin typeface="+mn-lt"/>
+                <a:ea typeface="Open Sans" panose="020B0606030504020204" pitchFamily="34" charset="0"/>
+                <a:cs typeface="Open Sans" panose="020B0606030504020204" pitchFamily="34" charset="0"/>
+              </a:defRPr>
+            </a:lvl5pPr>
+            <a:lvl6pPr marL="2514600" indent="-228600" algn="l" defTabSz="914400" rtl="0" eaLnBrk="1" latinLnBrk="0" hangingPunct="1">
+              <a:lnSpc>
+                <a:spcPct val="90000"/>
+              </a:lnSpc>
+              <a:spcBef>
+                <a:spcPts val="500"/>
+              </a:spcBef>
+              <a:buFont typeface="Arial" panose="020B0604020202020204" pitchFamily="34" charset="0"/>
+              <a:buChar char="•"/>
+              <a:defRPr sz="1800" kern="1200">
+                <a:solidFill>
+                  <a:schemeClr val="tx1"/>
+                </a:solidFill>
+                <a:latin typeface="+mn-lt"/>
+                <a:ea typeface="+mn-ea"/>
+                <a:cs typeface="+mn-cs"/>
+              </a:defRPr>
+            </a:lvl6pPr>
+            <a:lvl7pPr marL="2971800" indent="-228600" algn="l" defTabSz="914400" rtl="0" eaLnBrk="1" latinLnBrk="0" hangingPunct="1">
+              <a:lnSpc>
+                <a:spcPct val="90000"/>
+              </a:lnSpc>
+              <a:spcBef>
+                <a:spcPts val="500"/>
+              </a:spcBef>
+              <a:buFont typeface="Arial" panose="020B0604020202020204" pitchFamily="34" charset="0"/>
+              <a:buChar char="•"/>
+              <a:defRPr sz="1800" kern="1200">
+                <a:solidFill>
+                  <a:schemeClr val="tx1"/>
+                </a:solidFill>
+                <a:latin typeface="+mn-lt"/>
+                <a:ea typeface="+mn-ea"/>
+                <a:cs typeface="+mn-cs"/>
+              </a:defRPr>
+            </a:lvl7pPr>
+            <a:lvl8pPr marL="3429000" indent="-228600" algn="l" defTabSz="914400" rtl="0" eaLnBrk="1" latinLnBrk="0" hangingPunct="1">
+              <a:lnSpc>
+                <a:spcPct val="90000"/>
+              </a:lnSpc>
+              <a:spcBef>
+                <a:spcPts val="500"/>
+              </a:spcBef>
+              <a:buFont typeface="Arial" panose="020B0604020202020204" pitchFamily="34" charset="0"/>
+              <a:buChar char="•"/>
+              <a:defRPr sz="1800" kern="1200">
+                <a:solidFill>
+                  <a:schemeClr val="tx1"/>
+                </a:solidFill>
+                <a:latin typeface="+mn-lt"/>
+                <a:ea typeface="+mn-ea"/>
+                <a:cs typeface="+mn-cs"/>
+              </a:defRPr>
+            </a:lvl8pPr>
+            <a:lvl9pPr marL="3886200" indent="-228600" algn="l" defTabSz="914400" rtl="0" eaLnBrk="1" latinLnBrk="0" hangingPunct="1">
+              <a:lnSpc>
+                <a:spcPct val="90000"/>
+              </a:lnSpc>
+              <a:spcBef>
+                <a:spcPts val="500"/>
+              </a:spcBef>
+              <a:buFont typeface="Arial" panose="020B0604020202020204" pitchFamily="34" charset="0"/>
+              <a:buChar char="•"/>
+              <a:defRPr sz="1800" kern="1200">
+                <a:solidFill>
+                  <a:schemeClr val="tx1"/>
+                </a:solidFill>
+                <a:latin typeface="+mn-lt"/>
+                <a:ea typeface="+mn-ea"/>
+                <a:cs typeface="+mn-cs"/>
+              </a:defRPr>
+            </a:lvl9pPr>
+          </a:lstStyle>
+          <a:p>
+            <a:pPr marL="15875" indent="0">
+              <a:buNone/>
+            </a:pPr>
+            <a:r>
+              <a:rPr lang="hr-HR" dirty="0"/>
+              <a:t>✔ </a:t>
+            </a:r>
+            <a:r>
+              <a:rPr lang="hr-HR" b="1" dirty="0" err="1"/>
+              <a:t>PostgreSQL</a:t>
+            </a:r>
+            <a:r>
+              <a:rPr lang="hr-HR" dirty="0"/>
+              <a:t> 🏆 (najpopularnija među developerima!)</a:t>
+            </a:r>
+            <a:br>
+              <a:rPr lang="hr-HR" dirty="0"/>
+            </a:br>
+            <a:r>
+              <a:rPr lang="hr-HR" dirty="0"/>
+              <a:t>✔ </a:t>
+            </a:r>
+            <a:r>
+              <a:rPr lang="hr-HR" b="1" dirty="0" err="1"/>
+              <a:t>MySQL</a:t>
+            </a:r>
+            <a:br>
+              <a:rPr lang="hr-HR" dirty="0"/>
+            </a:br>
+            <a:r>
+              <a:rPr lang="hr-HR" dirty="0"/>
+              <a:t>✔ </a:t>
+            </a:r>
+            <a:r>
+              <a:rPr lang="hr-HR" b="1" dirty="0" err="1"/>
+              <a:t>SQLite</a:t>
+            </a:r>
+            <a:br>
+              <a:rPr lang="hr-HR" dirty="0"/>
+            </a:br>
+            <a:r>
+              <a:rPr lang="hr-HR" dirty="0"/>
+              <a:t>✔ </a:t>
+            </a:r>
+            <a:r>
+              <a:rPr lang="hr-HR" b="1" dirty="0"/>
+              <a:t>Microsoft SQL Server</a:t>
+            </a:r>
+            <a:br>
+              <a:rPr lang="hr-HR" dirty="0"/>
+            </a:br>
+            <a:r>
+              <a:rPr lang="hr-HR" dirty="0"/>
+              <a:t>✔ </a:t>
+            </a:r>
+            <a:r>
+              <a:rPr lang="hr-HR" b="1" dirty="0"/>
+              <a:t>Oracle </a:t>
+            </a:r>
+            <a:r>
+              <a:rPr lang="hr-HR" b="1" dirty="0" err="1"/>
+              <a:t>Database</a:t>
+            </a:r>
+            <a:r>
+              <a:rPr lang="hr-HR" dirty="0"/>
+              <a:t> (ali košta $$$)</a:t>
+            </a:r>
+          </a:p>
+        </p:txBody>
+      </p:sp>
+    </p:spTree>
+    <p:extLst>
+      <p:ext uri="{BB962C8B-B14F-4D97-AF65-F5344CB8AC3E}">
+        <p14:creationId xmlns:p14="http://schemas.microsoft.com/office/powerpoint/2010/main" val="452716800"/>
+      </p:ext>
+    </p:extLst>
+  </p:cSld>
+  <p:clrMapOvr>
+    <a:masterClrMapping/>
+  </p:clrMapOvr>
+</p:sld>
+</file>
+
+<file path=ppt/slides/slide30.xml><?xml version="1.0" encoding="utf-8"?>
 <p:sld xmlns:a="http://schemas.openxmlformats.org/drawingml/2006/main" xmlns:r="http://schemas.openxmlformats.org/officeDocument/2006/relationships" xmlns:p="http://schemas.openxmlformats.org/presentationml/2006/main">
   <p:cSld>
     <p:spTree>
@@ -24632,7 +24094,7 @@
 </p:sld>
 </file>
 
-<file path=ppt/slides/slide32.xml><?xml version="1.0" encoding="utf-8"?>
+<file path=ppt/slides/slide31.xml><?xml version="1.0" encoding="utf-8"?>
 <p:sld xmlns:a="http://schemas.openxmlformats.org/drawingml/2006/main" xmlns:r="http://schemas.openxmlformats.org/officeDocument/2006/relationships" xmlns:p="http://schemas.openxmlformats.org/presentationml/2006/main">
   <p:cSld>
     <p:spTree>
@@ -24790,7 +24252,7 @@
 </p:sld>
 </file>
 
-<file path=ppt/slides/slide33.xml><?xml version="1.0" encoding="utf-8"?>
+<file path=ppt/slides/slide32.xml><?xml version="1.0" encoding="utf-8"?>
 <p:sld xmlns:a="http://schemas.openxmlformats.org/drawingml/2006/main" xmlns:r="http://schemas.openxmlformats.org/officeDocument/2006/relationships" xmlns:p="http://schemas.openxmlformats.org/presentationml/2006/main">
   <p:cSld>
     <p:spTree>
@@ -29115,6 +28577,26 @@
 </file>
 
 <file path=customXml/item1.xml><?xml version="1.0" encoding="utf-8"?>
+<p:properties xmlns:p="http://schemas.microsoft.com/office/2006/metadata/properties" xmlns:xsi="http://www.w3.org/2001/XMLSchema-instance" xmlns:pc="http://schemas.microsoft.com/office/infopath/2007/PartnerControls">
+  <documentManagement>
+    <lcf76f155ced4ddcb4097134ff3c332f xmlns="40806f44-bc4a-4ea4-b660-c6da93f8f179">
+      <Terms xmlns="http://schemas.microsoft.com/office/infopath/2007/PartnerControls"/>
+    </lcf76f155ced4ddcb4097134ff3c332f>
+    <TaxCatchAll xmlns="758d0d8f-b783-4c78-ab73-9740c97b97cf" xsi:nil="true"/>
+  </documentManagement>
+</p:properties>
+</file>
+
+<file path=customXml/item2.xml><?xml version="1.0" encoding="utf-8"?>
+<?mso-contentType ?>
+<FormTemplates xmlns="http://schemas.microsoft.com/sharepoint/v3/contenttype/forms">
+  <Display>DocumentLibraryForm</Display>
+  <Edit>DocumentLibraryForm</Edit>
+  <New>DocumentLibraryForm</New>
+</FormTemplates>
+</file>
+
+<file path=customXml/item3.xml><?xml version="1.0" encoding="utf-8"?>
 <ct:contentTypeSchema xmlns:ct="http://schemas.microsoft.com/office/2006/metadata/contentType" xmlns:ma="http://schemas.microsoft.com/office/2006/metadata/properties/metaAttributes" ct:_="" ma:_="" ma:contentTypeName="Document" ma:contentTypeID="0x010100E4F55D9EF0BF0A44B819E681FCAC00B7" ma:contentTypeVersion="12" ma:contentTypeDescription="Create a new document." ma:contentTypeScope="" ma:versionID="068ce121a7a7a0aebcb89dd601c4f0a2">
   <xsd:schema xmlns:xsd="http://www.w3.org/2001/XMLSchema" xmlns:xs="http://www.w3.org/2001/XMLSchema" xmlns:p="http://schemas.microsoft.com/office/2006/metadata/properties" xmlns:ns2="40806f44-bc4a-4ea4-b660-c6da93f8f179" xmlns:ns3="758d0d8f-b783-4c78-ab73-9740c97b97cf" targetNamespace="http://schemas.microsoft.com/office/2006/metadata/properties" ma:root="true" ma:fieldsID="67c58e6c5c8ea9af0822acd84d25e1a2" ns2:_="" ns3:_="">
     <xsd:import namespace="40806f44-bc4a-4ea4-b660-c6da93f8f179"/>
@@ -29331,27 +28813,32 @@
 </ct:contentTypeSchema>
 </file>
 
-<file path=customXml/item2.xml><?xml version="1.0" encoding="utf-8"?>
-<?mso-contentType ?>
-<FormTemplates xmlns="http://schemas.microsoft.com/sharepoint/v3/contenttype/forms">
-  <Display>DocumentLibraryForm</Display>
-  <Edit>DocumentLibraryForm</Edit>
-  <New>DocumentLibraryForm</New>
-</FormTemplates>
+<file path=customXml/itemProps1.xml><?xml version="1.0" encoding="utf-8"?>
+<ds:datastoreItem xmlns:ds="http://schemas.openxmlformats.org/officeDocument/2006/customXml" ds:itemID="{61E72F81-8533-461E-8E71-A6D77294CFEF}">
+  <ds:schemaRefs>
+    <ds:schemaRef ds:uri="http://purl.org/dc/elements/1.1/"/>
+    <ds:schemaRef ds:uri="http://www.w3.org/XML/1998/namespace"/>
+    <ds:schemaRef ds:uri="http://purl.org/dc/terms/"/>
+    <ds:schemaRef ds:uri="http://schemas.microsoft.com/office/2006/documentManagement/types"/>
+    <ds:schemaRef ds:uri="40806f44-bc4a-4ea4-b660-c6da93f8f179"/>
+    <ds:schemaRef ds:uri="http://schemas.openxmlformats.org/package/2006/metadata/core-properties"/>
+    <ds:schemaRef ds:uri="http://purl.org/dc/dcmitype/"/>
+    <ds:schemaRef ds:uri="http://schemas.microsoft.com/office/infopath/2007/PartnerControls"/>
+    <ds:schemaRef ds:uri="758d0d8f-b783-4c78-ab73-9740c97b97cf"/>
+    <ds:schemaRef ds:uri="http://schemas.microsoft.com/office/2006/metadata/properties"/>
+  </ds:schemaRefs>
+</ds:datastoreItem>
 </file>
 
-<file path=customXml/item3.xml><?xml version="1.0" encoding="utf-8"?>
-<p:properties xmlns:p="http://schemas.microsoft.com/office/2006/metadata/properties" xmlns:xsi="http://www.w3.org/2001/XMLSchema-instance" xmlns:pc="http://schemas.microsoft.com/office/infopath/2007/PartnerControls">
-  <documentManagement>
-    <lcf76f155ced4ddcb4097134ff3c332f xmlns="40806f44-bc4a-4ea4-b660-c6da93f8f179">
-      <Terms xmlns="http://schemas.microsoft.com/office/infopath/2007/PartnerControls"/>
-    </lcf76f155ced4ddcb4097134ff3c332f>
-    <TaxCatchAll xmlns="758d0d8f-b783-4c78-ab73-9740c97b97cf" xsi:nil="true"/>
-  </documentManagement>
-</p:properties>
+<file path=customXml/itemProps2.xml><?xml version="1.0" encoding="utf-8"?>
+<ds:datastoreItem xmlns:ds="http://schemas.openxmlformats.org/officeDocument/2006/customXml" ds:itemID="{46915D30-CAA6-465E-907F-1770D4E3B01D}">
+  <ds:schemaRefs>
+    <ds:schemaRef ds:uri="http://schemas.microsoft.com/sharepoint/v3/contenttype/forms"/>
+  </ds:schemaRefs>
+</ds:datastoreItem>
 </file>
 
-<file path=customXml/itemProps1.xml><?xml version="1.0" encoding="utf-8"?>
+<file path=customXml/itemProps3.xml><?xml version="1.0" encoding="utf-8"?>
 <ds:datastoreItem xmlns:ds="http://schemas.openxmlformats.org/officeDocument/2006/customXml" ds:itemID="{4E6AED0F-96FF-4C7F-8AC9-672C91BFCDFE}">
   <ds:schemaRefs>
     <ds:schemaRef ds:uri="http://schemas.microsoft.com/office/2006/metadata/contentType"/>
@@ -29368,29 +28855,4 @@
     <ds:schemaRef ds:uri="http://schemas.microsoft.com/internal/obd"/>
   </ds:schemaRefs>
 </ds:datastoreItem>
-</file>
-
-<file path=customXml/itemProps2.xml><?xml version="1.0" encoding="utf-8"?>
-<ds:datastoreItem xmlns:ds="http://schemas.openxmlformats.org/officeDocument/2006/customXml" ds:itemID="{46915D30-CAA6-465E-907F-1770D4E3B01D}">
-  <ds:schemaRefs>
-    <ds:schemaRef ds:uri="http://schemas.microsoft.com/sharepoint/v3/contenttype/forms"/>
-  </ds:schemaRefs>
-</ds:datastoreItem>
-</file>
-
-<file path=customXml/itemProps3.xml><?xml version="1.0" encoding="utf-8"?>
-<ds:datastoreItem xmlns:ds="http://schemas.openxmlformats.org/officeDocument/2006/customXml" ds:itemID="{61E72F81-8533-461E-8E71-A6D77294CFEF}">
-  <ds:schemaRefs>
-    <ds:schemaRef ds:uri="http://purl.org/dc/elements/1.1/"/>
-    <ds:schemaRef ds:uri="http://www.w3.org/XML/1998/namespace"/>
-    <ds:schemaRef ds:uri="http://purl.org/dc/terms/"/>
-    <ds:schemaRef ds:uri="http://schemas.microsoft.com/office/2006/documentManagement/types"/>
-    <ds:schemaRef ds:uri="40806f44-bc4a-4ea4-b660-c6da93f8f179"/>
-    <ds:schemaRef ds:uri="http://schemas.openxmlformats.org/package/2006/metadata/core-properties"/>
-    <ds:schemaRef ds:uri="http://purl.org/dc/dcmitype/"/>
-    <ds:schemaRef ds:uri="http://schemas.microsoft.com/office/infopath/2007/PartnerControls"/>
-    <ds:schemaRef ds:uri="758d0d8f-b783-4c78-ab73-9740c97b97cf"/>
-    <ds:schemaRef ds:uri="http://schemas.microsoft.com/office/2006/metadata/properties"/>
-  </ds:schemaRefs>
-</ds:datastoreItem>
 </file>
</xml_diff>

<commit_message>
Added db final exercise
</commit_message>
<xml_diff>
--- a/Bootcamp/DB-uvod/DB-uvod.pptx
+++ b/Bootcamp/DB-uvod/DB-uvod.pptx
@@ -283,7 +283,7 @@
           <a:p>
             <a:fld id="{B2A70591-2E3C-5F42-A4E1-C0F5A0F4E5DB}" type="datetimeFigureOut">
               <a:rPr lang="en-US" smtClean="0"/>
-              <a:t>4/1/2025</a:t>
+              <a:t>4/8/2025</a:t>
             </a:fld>
             <a:endParaRPr lang="en-US"/>
           </a:p>
@@ -4657,6 +4657,10 @@
           <a:bodyPr/>
           <a:lstStyle/>
           <a:p>
+            <a:r>
+              <a:rPr lang="hr-HR"/>
+              <a:t>https://docs.google.com/document/d/1DFs5Y93wuRjF9xnY9SWvMOreWY7Lro_Yj7_f7Ix16VY/edit?usp=sharing</a:t>
+            </a:r>
             <a:endParaRPr lang="hr-HR" dirty="0"/>
           </a:p>
         </p:txBody>
@@ -6225,7 +6229,7 @@
                 <a:ea typeface="Open Sans" panose="020B0606030504020204" pitchFamily="34" charset="0"/>
                 <a:cs typeface="Open Sans" panose="020B0606030504020204" pitchFamily="34" charset="0"/>
               </a:rPr>
-              <a:t>01/04/2025</a:t>
+              <a:t>08/04/2025</a:t>
             </a:fld>
             <a:endParaRPr lang="en-GB" sz="1800" b="0" i="0" kern="1200" dirty="0">
               <a:solidFill>
@@ -6970,7 +6974,7 @@
                 <a:ea typeface="Open Sans" panose="020B0606030504020204" pitchFamily="34" charset="0"/>
                 <a:cs typeface="Open Sans" panose="020B0606030504020204" pitchFamily="34" charset="0"/>
               </a:rPr>
-              <a:t>01/04/2025</a:t>
+              <a:t>08/04/2025</a:t>
             </a:fld>
             <a:endParaRPr lang="en-GB" sz="1800" b="0" i="0" kern="1200" dirty="0">
               <a:solidFill>
@@ -7493,7 +7497,7 @@
                 <a:ea typeface="Open Sans" panose="020B0606030504020204" pitchFamily="34" charset="0"/>
                 <a:cs typeface="Open Sans" panose="020B0606030504020204" pitchFamily="34" charset="0"/>
               </a:rPr>
-              <a:t>01/04/2025</a:t>
+              <a:t>08/04/2025</a:t>
             </a:fld>
             <a:endParaRPr lang="en-GB" sz="1800" b="0" i="0" kern="1200" dirty="0">
               <a:solidFill>
@@ -8459,7 +8463,7 @@
                 <a:ea typeface="Open Sans" panose="020B0606030504020204" pitchFamily="34" charset="0"/>
                 <a:cs typeface="Open Sans" panose="020B0606030504020204" pitchFamily="34" charset="0"/>
               </a:rPr>
-              <a:t>01/04/2025</a:t>
+              <a:t>08/04/2025</a:t>
             </a:fld>
             <a:endParaRPr lang="en-GB" sz="1800" b="0" i="0" kern="1200" dirty="0">
               <a:solidFill>
@@ -8898,7 +8902,7 @@
                 <a:ea typeface="Open Sans" panose="020B0606030504020204" pitchFamily="34" charset="0"/>
                 <a:cs typeface="Open Sans" panose="020B0606030504020204" pitchFamily="34" charset="0"/>
               </a:rPr>
-              <a:t>01/04/2025</a:t>
+              <a:t>08/04/2025</a:t>
             </a:fld>
             <a:endParaRPr lang="en-GB" sz="1800" b="0" i="0" kern="1200" dirty="0">
               <a:solidFill>
@@ -10668,7 +10672,7 @@
                 <a:ea typeface="Open Sans" pitchFamily="2" charset="0"/>
                 <a:cs typeface="Open Sans" pitchFamily="2" charset="0"/>
               </a:rPr>
-              <a:t>01/04/2025</a:t>
+              <a:t>08/04/2025</a:t>
             </a:fld>
             <a:endParaRPr lang="en-GB" sz="1800" b="0" i="0" kern="1200" dirty="0">
               <a:solidFill>
@@ -12418,7 +12422,7 @@
                 <a:ea typeface="Open Sans" pitchFamily="2" charset="0"/>
                 <a:cs typeface="Open Sans" pitchFamily="2" charset="0"/>
               </a:rPr>
-              <a:t>01/04/2025</a:t>
+              <a:t>08/04/2025</a:t>
             </a:fld>
             <a:endParaRPr lang="en-GB" sz="1800" b="0" i="0" kern="1200" dirty="0">
               <a:solidFill>
@@ -12935,7 +12939,7 @@
                 <a:ea typeface="Open Sans" panose="020B0606030504020204" pitchFamily="34" charset="0"/>
                 <a:cs typeface="Open Sans" panose="020B0606030504020204" pitchFamily="34" charset="0"/>
               </a:rPr>
-              <a:t>01/04/2025</a:t>
+              <a:t>08/04/2025</a:t>
             </a:fld>
             <a:endParaRPr lang="en-GB" sz="1800" b="0" i="0" kern="1200" dirty="0">
               <a:solidFill>
@@ -13532,7 +13536,7 @@
                 <a:ea typeface="Open Sans" pitchFamily="2" charset="0"/>
                 <a:cs typeface="Open Sans" pitchFamily="2" charset="0"/>
               </a:rPr>
-              <a:t>01/04/2025</a:t>
+              <a:t>08/04/2025</a:t>
             </a:fld>
             <a:endParaRPr lang="en-GB" sz="1800" b="0" i="0" kern="1200" dirty="0">
               <a:solidFill>
@@ -14072,7 +14076,7 @@
                 <a:ea typeface="Open Sans" panose="020B0606030504020204" pitchFamily="34" charset="0"/>
                 <a:cs typeface="Open Sans" panose="020B0606030504020204" pitchFamily="34" charset="0"/>
               </a:rPr>
-              <a:t>01/04/2025</a:t>
+              <a:t>08/04/2025</a:t>
             </a:fld>
             <a:endParaRPr lang="en-GB" sz="1800" b="0" i="0" kern="1200" dirty="0">
               <a:solidFill>
@@ -14773,7 +14777,7 @@
                 <a:ea typeface="Open Sans" panose="020B0606030504020204" pitchFamily="34" charset="0"/>
                 <a:cs typeface="Open Sans" panose="020B0606030504020204" pitchFamily="34" charset="0"/>
               </a:rPr>
-              <a:t>01/04/2025</a:t>
+              <a:t>08/04/2025</a:t>
             </a:fld>
             <a:endParaRPr lang="en-GB" sz="1800" b="0" i="0" kern="1200" dirty="0">
               <a:solidFill>
@@ -15136,7 +15140,7 @@
                 <a:ea typeface="Open Sans" pitchFamily="2" charset="0"/>
                 <a:cs typeface="Open Sans" pitchFamily="2" charset="0"/>
               </a:rPr>
-              <a:t>01/04/2025</a:t>
+              <a:t>08/04/2025</a:t>
             </a:fld>
             <a:endParaRPr lang="en-GB" sz="1800" b="0" i="0" kern="1200" dirty="0">
               <a:solidFill>
@@ -15531,7 +15535,7 @@
                 <a:ea typeface="Open Sans" pitchFamily="2" charset="0"/>
                 <a:cs typeface="Open Sans" pitchFamily="2" charset="0"/>
               </a:rPr>
-              <a:t>01/04/2025</a:t>
+              <a:t>08/04/2025</a:t>
             </a:fld>
             <a:endParaRPr lang="en-GB" sz="1800" b="0" i="0" kern="1200" dirty="0">
               <a:solidFill>
@@ -24355,76 +24359,10 @@
           <a:lstStyle/>
           <a:p>
             <a:r>
-              <a:rPr lang="hr-HR" sz="1200" b="1" dirty="0"/>
-              <a:t>Zadatak: Napravite bazu podataka za videoklub</a:t>
-            </a:r>
-          </a:p>
-          <a:p>
-            <a:r>
-              <a:rPr lang="hr-HR" sz="1200" b="1" dirty="0"/>
-              <a:t>Cilj:</a:t>
+              <a:rPr lang="en-US" sz="1200" dirty="0"/>
+              <a:t>ZADATAK - https://docs.google.com/document/d/1DFs5Y93wuRjF9xnY9SWvMOreWY7Lro_Yj7_f7Ix16VY/edit?usp=sharing</a:t>
             </a:r>
             <a:endParaRPr lang="hr-HR" sz="1200" dirty="0"/>
-          </a:p>
-          <a:p>
-            <a:pPr>
-              <a:buFont typeface="Arial" panose="020B0604020202020204" pitchFamily="34" charset="0"/>
-              <a:buChar char="•"/>
-            </a:pPr>
-            <a:r>
-              <a:rPr lang="hr-HR" sz="1200" dirty="0"/>
-              <a:t>Osmisliti i izraditi bazu podataka (database</a:t>
-            </a:r>
-            <a:r>
-              <a:rPr lang="en-US" sz="1200" dirty="0"/>
-              <a:t> </a:t>
-            </a:r>
-            <a:r>
-              <a:rPr lang="en-US" sz="1200" dirty="0" err="1"/>
-              <a:t>shemu</a:t>
-            </a:r>
-            <a:r>
-              <a:rPr lang="hr-HR" sz="1200" dirty="0"/>
-              <a:t>) za videoklub.</a:t>
-            </a:r>
-          </a:p>
-          <a:p>
-            <a:pPr>
-              <a:buFont typeface="Arial" panose="020B0604020202020204" pitchFamily="34" charset="0"/>
-              <a:buChar char="•"/>
-            </a:pPr>
-            <a:r>
-              <a:rPr lang="hr-HR" sz="1200" dirty="0"/>
-              <a:t>Spojiti tu bazu s vlastitim frontendom (</a:t>
-            </a:r>
-            <a:r>
-              <a:rPr lang="en-US" sz="1200" dirty="0"/>
-              <a:t>koji </a:t>
-            </a:r>
-            <a:r>
-              <a:rPr lang="en-US" sz="1200" dirty="0" err="1"/>
-              <a:t>smo</a:t>
-            </a:r>
-            <a:r>
-              <a:rPr lang="en-US" sz="1200" dirty="0"/>
-              <a:t> </a:t>
-            </a:r>
-            <a:r>
-              <a:rPr lang="en-US" sz="1200" dirty="0" err="1"/>
-              <a:t>izradili</a:t>
-            </a:r>
-            <a:r>
-              <a:rPr lang="en-US" sz="1200" dirty="0"/>
-              <a:t> u HTML, CSS I JAVASCRIPT </a:t>
-            </a:r>
-            <a:r>
-              <a:rPr lang="en-US" sz="1200" dirty="0" err="1"/>
-              <a:t>Sekcijama</a:t>
-            </a:r>
-            <a:r>
-              <a:rPr lang="hr-HR" sz="1200" dirty="0"/>
-              <a:t>)</a:t>
-            </a:r>
           </a:p>
         </p:txBody>
       </p:sp>
@@ -28565,6 +28503,15 @@
 </file>
 
 <file path=customXml/item1.xml><?xml version="1.0" encoding="utf-8"?>
+<?mso-contentType ?>
+<FormTemplates xmlns="http://schemas.microsoft.com/sharepoint/v3/contenttype/forms">
+  <Display>DocumentLibraryForm</Display>
+  <Edit>DocumentLibraryForm</Edit>
+  <New>DocumentLibraryForm</New>
+</FormTemplates>
+</file>
+
+<file path=customXml/item2.xml><?xml version="1.0" encoding="utf-8"?>
 <ct:contentTypeSchema xmlns:ct="http://schemas.microsoft.com/office/2006/metadata/contentType" xmlns:ma="http://schemas.microsoft.com/office/2006/metadata/properties/metaAttributes" ct:_="" ma:_="" ma:contentTypeName="Document" ma:contentTypeID="0x010100E4F55D9EF0BF0A44B819E681FCAC00B7" ma:contentTypeVersion="12" ma:contentTypeDescription="Create a new document." ma:contentTypeScope="" ma:versionID="068ce121a7a7a0aebcb89dd601c4f0a2">
   <xsd:schema xmlns:xsd="http://www.w3.org/2001/XMLSchema" xmlns:xs="http://www.w3.org/2001/XMLSchema" xmlns:p="http://schemas.microsoft.com/office/2006/metadata/properties" xmlns:ns2="40806f44-bc4a-4ea4-b660-c6da93f8f179" xmlns:ns3="758d0d8f-b783-4c78-ab73-9740c97b97cf" targetNamespace="http://schemas.microsoft.com/office/2006/metadata/properties" ma:root="true" ma:fieldsID="67c58e6c5c8ea9af0822acd84d25e1a2" ns2:_="" ns3:_="">
     <xsd:import namespace="40806f44-bc4a-4ea4-b660-c6da93f8f179"/>
@@ -28781,15 +28728,6 @@
 </ct:contentTypeSchema>
 </file>
 
-<file path=customXml/item2.xml><?xml version="1.0" encoding="utf-8"?>
-<?mso-contentType ?>
-<FormTemplates xmlns="http://schemas.microsoft.com/sharepoint/v3/contenttype/forms">
-  <Display>DocumentLibraryForm</Display>
-  <Edit>DocumentLibraryForm</Edit>
-  <New>DocumentLibraryForm</New>
-</FormTemplates>
-</file>
-
 <file path=customXml/item3.xml><?xml version="1.0" encoding="utf-8"?>
 <p:properties xmlns:p="http://schemas.microsoft.com/office/2006/metadata/properties" xmlns:xsi="http://www.w3.org/2001/XMLSchema-instance" xmlns:pc="http://schemas.microsoft.com/office/infopath/2007/PartnerControls">
   <documentManagement>
@@ -28802,6 +28740,14 @@
 </file>
 
 <file path=customXml/itemProps1.xml><?xml version="1.0" encoding="utf-8"?>
+<ds:datastoreItem xmlns:ds="http://schemas.openxmlformats.org/officeDocument/2006/customXml" ds:itemID="{46915D30-CAA6-465E-907F-1770D4E3B01D}">
+  <ds:schemaRefs>
+    <ds:schemaRef ds:uri="http://schemas.microsoft.com/sharepoint/v3/contenttype/forms"/>
+  </ds:schemaRefs>
+</ds:datastoreItem>
+</file>
+
+<file path=customXml/itemProps2.xml><?xml version="1.0" encoding="utf-8"?>
 <ds:datastoreItem xmlns:ds="http://schemas.openxmlformats.org/officeDocument/2006/customXml" ds:itemID="{4E6AED0F-96FF-4C7F-8AC9-672C91BFCDFE}">
   <ds:schemaRefs>
     <ds:schemaRef ds:uri="http://schemas.microsoft.com/office/2006/metadata/contentType"/>
@@ -28816,14 +28762,6 @@
     <ds:schemaRef ds:uri="http://purl.org/dc/elements/1.1/"/>
     <ds:schemaRef ds:uri="http://purl.org/dc/terms/"/>
     <ds:schemaRef ds:uri="http://schemas.microsoft.com/internal/obd"/>
-  </ds:schemaRefs>
-</ds:datastoreItem>
-</file>
-
-<file path=customXml/itemProps2.xml><?xml version="1.0" encoding="utf-8"?>
-<ds:datastoreItem xmlns:ds="http://schemas.openxmlformats.org/officeDocument/2006/customXml" ds:itemID="{46915D30-CAA6-465E-907F-1770D4E3B01D}">
-  <ds:schemaRefs>
-    <ds:schemaRef ds:uri="http://schemas.microsoft.com/sharepoint/v3/contenttype/forms"/>
   </ds:schemaRefs>
 </ds:datastoreItem>
 </file>

</xml_diff>

<commit_message>
added base exercisses for the sql
</commit_message>
<xml_diff>
--- a/Bootcamp/DB-uvod/DB-uvod.pptx
+++ b/Bootcamp/DB-uvod/DB-uvod.pptx
@@ -18,9 +18,9 @@
     <p:sldId id="385" r:id="rId12"/>
     <p:sldId id="345" r:id="rId13"/>
     <p:sldId id="387" r:id="rId14"/>
-    <p:sldId id="388" r:id="rId15"/>
-    <p:sldId id="389" r:id="rId16"/>
-    <p:sldId id="378" r:id="rId17"/>
+    <p:sldId id="410" r:id="rId15"/>
+    <p:sldId id="388" r:id="rId16"/>
+    <p:sldId id="389" r:id="rId17"/>
     <p:sldId id="392" r:id="rId18"/>
     <p:sldId id="390" r:id="rId19"/>
     <p:sldId id="393" r:id="rId20"/>
@@ -157,9 +157,9 @@
             <p14:sldId id="385"/>
             <p14:sldId id="345"/>
             <p14:sldId id="387"/>
+            <p14:sldId id="410"/>
             <p14:sldId id="388"/>
             <p14:sldId id="389"/>
-            <p14:sldId id="378"/>
             <p14:sldId id="392"/>
             <p14:sldId id="390"/>
             <p14:sldId id="393"/>
@@ -283,7 +283,7 @@
           <a:p>
             <a:fld id="{B2A70591-2E3C-5F42-A4E1-C0F5A0F4E5DB}" type="datetimeFigureOut">
               <a:rPr lang="en-US" smtClean="0"/>
-              <a:t>5/19/2025</a:t>
+              <a:t>6/2/2025</a:t>
             </a:fld>
             <a:endParaRPr lang="en-US"/>
           </a:p>
@@ -667,6 +667,117 @@
         <p:cNvPr id="1" name="">
           <a:extLst>
             <a:ext uri="{FF2B5EF4-FFF2-40B4-BE49-F238E27FC236}">
+              <a16:creationId xmlns:a16="http://schemas.microsoft.com/office/drawing/2014/main" id="{16F1F2D7-3D49-043D-86E0-F790EA68701C}"/>
+            </a:ext>
+          </a:extLst>
+        </p:cNvPr>
+        <p:cNvGrpSpPr/>
+        <p:nvPr/>
+      </p:nvGrpSpPr>
+      <p:grpSpPr>
+        <a:xfrm>
+          <a:off x="0" y="0"/>
+          <a:ext cx="0" cy="0"/>
+          <a:chOff x="0" y="0"/>
+          <a:chExt cx="0" cy="0"/>
+        </a:xfrm>
+      </p:grpSpPr>
+      <p:sp>
+        <p:nvSpPr>
+          <p:cNvPr id="2" name="Slide Image Placeholder 1">
+            <a:extLst>
+              <a:ext uri="{FF2B5EF4-FFF2-40B4-BE49-F238E27FC236}">
+                <a16:creationId xmlns:a16="http://schemas.microsoft.com/office/drawing/2014/main" id="{099A1907-06F8-D8D8-D271-C83A748AD789}"/>
+              </a:ext>
+            </a:extLst>
+          </p:cNvPr>
+          <p:cNvSpPr>
+            <a:spLocks noGrp="1" noRot="1" noChangeAspect="1"/>
+          </p:cNvSpPr>
+          <p:nvPr>
+            <p:ph type="sldImg"/>
+          </p:nvPr>
+        </p:nvSpPr>
+        <p:spPr/>
+      </p:sp>
+      <p:sp>
+        <p:nvSpPr>
+          <p:cNvPr id="3" name="Notes Placeholder 2">
+            <a:extLst>
+              <a:ext uri="{FF2B5EF4-FFF2-40B4-BE49-F238E27FC236}">
+                <a16:creationId xmlns:a16="http://schemas.microsoft.com/office/drawing/2014/main" id="{B1033E94-2072-19F3-62D9-EFD40D07CF2E}"/>
+              </a:ext>
+            </a:extLst>
+          </p:cNvPr>
+          <p:cNvSpPr>
+            <a:spLocks noGrp="1"/>
+          </p:cNvSpPr>
+          <p:nvPr>
+            <p:ph type="body" idx="1"/>
+          </p:nvPr>
+        </p:nvSpPr>
+        <p:spPr/>
+        <p:txBody>
+          <a:bodyPr/>
+          <a:lstStyle/>
+          <a:p>
+            <a:r>
+              <a:rPr lang="hr-HR" dirty="0"/>
+              <a:t>https://docs.google.com/document/d/1iOxlBd63WG4rDuyEodS3I69lpM60IxLilB6mgGbCUgU/edit?usp=sharing</a:t>
+            </a:r>
+          </a:p>
+        </p:txBody>
+      </p:sp>
+      <p:sp>
+        <p:nvSpPr>
+          <p:cNvPr id="4" name="Slide Number Placeholder 3">
+            <a:extLst>
+              <a:ext uri="{FF2B5EF4-FFF2-40B4-BE49-F238E27FC236}">
+                <a16:creationId xmlns:a16="http://schemas.microsoft.com/office/drawing/2014/main" id="{2B0B7AA3-47B4-DEB7-E810-69CCEF8FD8B8}"/>
+              </a:ext>
+            </a:extLst>
+          </p:cNvPr>
+          <p:cNvSpPr>
+            <a:spLocks noGrp="1"/>
+          </p:cNvSpPr>
+          <p:nvPr>
+            <p:ph type="sldNum" sz="quarter" idx="5"/>
+          </p:nvPr>
+        </p:nvSpPr>
+        <p:spPr/>
+        <p:txBody>
+          <a:bodyPr/>
+          <a:lstStyle/>
+          <a:p>
+            <a:fld id="{343B951A-A665-1949-AEDB-B62DC9BE7F13}" type="slidenum">
+              <a:rPr lang="en-US" smtClean="0"/>
+              <a:t>11</a:t>
+            </a:fld>
+            <a:endParaRPr lang="en-US"/>
+          </a:p>
+        </p:txBody>
+      </p:sp>
+    </p:spTree>
+    <p:extLst>
+      <p:ext uri="{BB962C8B-B14F-4D97-AF65-F5344CB8AC3E}">
+        <p14:creationId xmlns:p14="http://schemas.microsoft.com/office/powerpoint/2010/main" val="2407518995"/>
+      </p:ext>
+    </p:extLst>
+  </p:cSld>
+  <p:clrMapOvr>
+    <a:masterClrMapping/>
+  </p:clrMapOvr>
+</p:notes>
+</file>
+
+<file path=ppt/notesSlides/notesSlide11.xml><?xml version="1.0" encoding="utf-8"?>
+<p:notes xmlns:a="http://schemas.openxmlformats.org/drawingml/2006/main" xmlns:r="http://schemas.openxmlformats.org/officeDocument/2006/relationships" xmlns:p="http://schemas.openxmlformats.org/presentationml/2006/main">
+  <p:cSld>
+    <p:spTree>
+      <p:nvGrpSpPr>
+        <p:cNvPr id="1" name="">
+          <a:extLst>
+            <a:ext uri="{FF2B5EF4-FFF2-40B4-BE49-F238E27FC236}">
               <a16:creationId xmlns:a16="http://schemas.microsoft.com/office/drawing/2014/main" id="{706CFF9B-A097-0D77-DB9C-BBD803D184E5}"/>
             </a:ext>
           </a:extLst>
@@ -748,7 +859,7 @@
           <a:p>
             <a:fld id="{343B951A-A665-1949-AEDB-B62DC9BE7F13}" type="slidenum">
               <a:rPr lang="en-US" smtClean="0"/>
-              <a:t>11</a:t>
+              <a:t>12</a:t>
             </a:fld>
             <a:endParaRPr lang="en-US"/>
           </a:p>
@@ -767,7 +878,7 @@
 </p:notes>
 </file>
 
-<file path=ppt/notesSlides/notesSlide11.xml><?xml version="1.0" encoding="utf-8"?>
+<file path=ppt/notesSlides/notesSlide12.xml><?xml version="1.0" encoding="utf-8"?>
 <p:notes xmlns:a="http://schemas.openxmlformats.org/drawingml/2006/main" xmlns:r="http://schemas.openxmlformats.org/officeDocument/2006/relationships" xmlns:p="http://schemas.openxmlformats.org/presentationml/2006/main">
   <p:cSld>
     <p:spTree>
@@ -856,7 +967,7 @@
           <a:p>
             <a:fld id="{343B951A-A665-1949-AEDB-B62DC9BE7F13}" type="slidenum">
               <a:rPr lang="en-US" smtClean="0"/>
-              <a:t>12</a:t>
+              <a:t>13</a:t>
             </a:fld>
             <a:endParaRPr lang="en-US"/>
           </a:p>
@@ -866,114 +977,6 @@
     <p:extLst>
       <p:ext uri="{BB962C8B-B14F-4D97-AF65-F5344CB8AC3E}">
         <p14:creationId xmlns:p14="http://schemas.microsoft.com/office/powerpoint/2010/main" val="1887011085"/>
-      </p:ext>
-    </p:extLst>
-  </p:cSld>
-  <p:clrMapOvr>
-    <a:masterClrMapping/>
-  </p:clrMapOvr>
-</p:notes>
-</file>
-
-<file path=ppt/notesSlides/notesSlide12.xml><?xml version="1.0" encoding="utf-8"?>
-<p:notes xmlns:a="http://schemas.openxmlformats.org/drawingml/2006/main" xmlns:r="http://schemas.openxmlformats.org/officeDocument/2006/relationships" xmlns:p="http://schemas.openxmlformats.org/presentationml/2006/main">
-  <p:cSld>
-    <p:spTree>
-      <p:nvGrpSpPr>
-        <p:cNvPr id="1" name="">
-          <a:extLst>
-            <a:ext uri="{FF2B5EF4-FFF2-40B4-BE49-F238E27FC236}">
-              <a16:creationId xmlns:a16="http://schemas.microsoft.com/office/drawing/2014/main" id="{4F32F5CD-A2DA-DD60-9A45-CC97E0363F9A}"/>
-            </a:ext>
-          </a:extLst>
-        </p:cNvPr>
-        <p:cNvGrpSpPr/>
-        <p:nvPr/>
-      </p:nvGrpSpPr>
-      <p:grpSpPr>
-        <a:xfrm>
-          <a:off x="0" y="0"/>
-          <a:ext cx="0" cy="0"/>
-          <a:chOff x="0" y="0"/>
-          <a:chExt cx="0" cy="0"/>
-        </a:xfrm>
-      </p:grpSpPr>
-      <p:sp>
-        <p:nvSpPr>
-          <p:cNvPr id="2" name="Slide Image Placeholder 1">
-            <a:extLst>
-              <a:ext uri="{FF2B5EF4-FFF2-40B4-BE49-F238E27FC236}">
-                <a16:creationId xmlns:a16="http://schemas.microsoft.com/office/drawing/2014/main" id="{F74C1F54-F75E-E6EF-02BB-6B7640CF52AF}"/>
-              </a:ext>
-            </a:extLst>
-          </p:cNvPr>
-          <p:cNvSpPr>
-            <a:spLocks noGrp="1" noRot="1" noChangeAspect="1"/>
-          </p:cNvSpPr>
-          <p:nvPr>
-            <p:ph type="sldImg"/>
-          </p:nvPr>
-        </p:nvSpPr>
-        <p:spPr/>
-      </p:sp>
-      <p:sp>
-        <p:nvSpPr>
-          <p:cNvPr id="3" name="Notes Placeholder 2">
-            <a:extLst>
-              <a:ext uri="{FF2B5EF4-FFF2-40B4-BE49-F238E27FC236}">
-                <a16:creationId xmlns:a16="http://schemas.microsoft.com/office/drawing/2014/main" id="{74EDBDA2-31AB-B8AC-5E4B-BFEBC5570DD6}"/>
-              </a:ext>
-            </a:extLst>
-          </p:cNvPr>
-          <p:cNvSpPr>
-            <a:spLocks noGrp="1"/>
-          </p:cNvSpPr>
-          <p:nvPr>
-            <p:ph type="body" idx="1"/>
-          </p:nvPr>
-        </p:nvSpPr>
-        <p:spPr/>
-        <p:txBody>
-          <a:bodyPr/>
-          <a:lstStyle/>
-          <a:p>
-            <a:endParaRPr lang="hr-HR" dirty="0"/>
-          </a:p>
-        </p:txBody>
-      </p:sp>
-      <p:sp>
-        <p:nvSpPr>
-          <p:cNvPr id="4" name="Slide Number Placeholder 3">
-            <a:extLst>
-              <a:ext uri="{FF2B5EF4-FFF2-40B4-BE49-F238E27FC236}">
-                <a16:creationId xmlns:a16="http://schemas.microsoft.com/office/drawing/2014/main" id="{122A1C05-6BC9-2947-A3F1-2736F5A627D8}"/>
-              </a:ext>
-            </a:extLst>
-          </p:cNvPr>
-          <p:cNvSpPr>
-            <a:spLocks noGrp="1"/>
-          </p:cNvSpPr>
-          <p:nvPr>
-            <p:ph type="sldNum" sz="quarter" idx="5"/>
-          </p:nvPr>
-        </p:nvSpPr>
-        <p:spPr/>
-        <p:txBody>
-          <a:bodyPr/>
-          <a:lstStyle/>
-          <a:p>
-            <a:fld id="{343B951A-A665-1949-AEDB-B62DC9BE7F13}" type="slidenum">
-              <a:rPr lang="en-US" smtClean="0"/>
-              <a:t>13</a:t>
-            </a:fld>
-            <a:endParaRPr lang="en-US"/>
-          </a:p>
-        </p:txBody>
-      </p:sp>
-    </p:spTree>
-    <p:extLst>
-      <p:ext uri="{BB962C8B-B14F-4D97-AF65-F5344CB8AC3E}">
-        <p14:creationId xmlns:p14="http://schemas.microsoft.com/office/powerpoint/2010/main" val="978507786"/>
       </p:ext>
     </p:extLst>
   </p:cSld>
@@ -6229,7 +6232,7 @@
                 <a:ea typeface="Open Sans" panose="020B0606030504020204" pitchFamily="34" charset="0"/>
                 <a:cs typeface="Open Sans" panose="020B0606030504020204" pitchFamily="34" charset="0"/>
               </a:rPr>
-              <a:t>19/05/2025</a:t>
+              <a:t>02/06/2025</a:t>
             </a:fld>
             <a:endParaRPr lang="en-GB" sz="1800" b="0" i="0" kern="1200" dirty="0">
               <a:solidFill>
@@ -6974,7 +6977,7 @@
                 <a:ea typeface="Open Sans" panose="020B0606030504020204" pitchFamily="34" charset="0"/>
                 <a:cs typeface="Open Sans" panose="020B0606030504020204" pitchFamily="34" charset="0"/>
               </a:rPr>
-              <a:t>19/05/2025</a:t>
+              <a:t>02/06/2025</a:t>
             </a:fld>
             <a:endParaRPr lang="en-GB" sz="1800" b="0" i="0" kern="1200" dirty="0">
               <a:solidFill>
@@ -7497,7 +7500,7 @@
                 <a:ea typeface="Open Sans" panose="020B0606030504020204" pitchFamily="34" charset="0"/>
                 <a:cs typeface="Open Sans" panose="020B0606030504020204" pitchFamily="34" charset="0"/>
               </a:rPr>
-              <a:t>19/05/2025</a:t>
+              <a:t>02/06/2025</a:t>
             </a:fld>
             <a:endParaRPr lang="en-GB" sz="1800" b="0" i="0" kern="1200" dirty="0">
               <a:solidFill>
@@ -8463,7 +8466,7 @@
                 <a:ea typeface="Open Sans" panose="020B0606030504020204" pitchFamily="34" charset="0"/>
                 <a:cs typeface="Open Sans" panose="020B0606030504020204" pitchFamily="34" charset="0"/>
               </a:rPr>
-              <a:t>19/05/2025</a:t>
+              <a:t>02/06/2025</a:t>
             </a:fld>
             <a:endParaRPr lang="en-GB" sz="1800" b="0" i="0" kern="1200" dirty="0">
               <a:solidFill>
@@ -8902,7 +8905,7 @@
                 <a:ea typeface="Open Sans" panose="020B0606030504020204" pitchFamily="34" charset="0"/>
                 <a:cs typeface="Open Sans" panose="020B0606030504020204" pitchFamily="34" charset="0"/>
               </a:rPr>
-              <a:t>19/05/2025</a:t>
+              <a:t>02/06/2025</a:t>
             </a:fld>
             <a:endParaRPr lang="en-GB" sz="1800" b="0" i="0" kern="1200" dirty="0">
               <a:solidFill>
@@ -10672,7 +10675,7 @@
                 <a:ea typeface="Open Sans" pitchFamily="2" charset="0"/>
                 <a:cs typeface="Open Sans" pitchFamily="2" charset="0"/>
               </a:rPr>
-              <a:t>19/05/2025</a:t>
+              <a:t>02/06/2025</a:t>
             </a:fld>
             <a:endParaRPr lang="en-GB" sz="1800" b="0" i="0" kern="1200" dirty="0">
               <a:solidFill>
@@ -12422,7 +12425,7 @@
                 <a:ea typeface="Open Sans" pitchFamily="2" charset="0"/>
                 <a:cs typeface="Open Sans" pitchFamily="2" charset="0"/>
               </a:rPr>
-              <a:t>19/05/2025</a:t>
+              <a:t>02/06/2025</a:t>
             </a:fld>
             <a:endParaRPr lang="en-GB" sz="1800" b="0" i="0" kern="1200" dirty="0">
               <a:solidFill>
@@ -12939,7 +12942,7 @@
                 <a:ea typeface="Open Sans" panose="020B0606030504020204" pitchFamily="34" charset="0"/>
                 <a:cs typeface="Open Sans" panose="020B0606030504020204" pitchFamily="34" charset="0"/>
               </a:rPr>
-              <a:t>19/05/2025</a:t>
+              <a:t>02/06/2025</a:t>
             </a:fld>
             <a:endParaRPr lang="en-GB" sz="1800" b="0" i="0" kern="1200" dirty="0">
               <a:solidFill>
@@ -13536,7 +13539,7 @@
                 <a:ea typeface="Open Sans" pitchFamily="2" charset="0"/>
                 <a:cs typeface="Open Sans" pitchFamily="2" charset="0"/>
               </a:rPr>
-              <a:t>19/05/2025</a:t>
+              <a:t>02/06/2025</a:t>
             </a:fld>
             <a:endParaRPr lang="en-GB" sz="1800" b="0" i="0" kern="1200" dirty="0">
               <a:solidFill>
@@ -14076,7 +14079,7 @@
                 <a:ea typeface="Open Sans" panose="020B0606030504020204" pitchFamily="34" charset="0"/>
                 <a:cs typeface="Open Sans" panose="020B0606030504020204" pitchFamily="34" charset="0"/>
               </a:rPr>
-              <a:t>19/05/2025</a:t>
+              <a:t>02/06/2025</a:t>
             </a:fld>
             <a:endParaRPr lang="en-GB" sz="1800" b="0" i="0" kern="1200" dirty="0">
               <a:solidFill>
@@ -14777,7 +14780,7 @@
                 <a:ea typeface="Open Sans" panose="020B0606030504020204" pitchFamily="34" charset="0"/>
                 <a:cs typeface="Open Sans" panose="020B0606030504020204" pitchFamily="34" charset="0"/>
               </a:rPr>
-              <a:t>19/05/2025</a:t>
+              <a:t>02/06/2025</a:t>
             </a:fld>
             <a:endParaRPr lang="en-GB" sz="1800" b="0" i="0" kern="1200" dirty="0">
               <a:solidFill>
@@ -15140,7 +15143,7 @@
                 <a:ea typeface="Open Sans" pitchFamily="2" charset="0"/>
                 <a:cs typeface="Open Sans" pitchFamily="2" charset="0"/>
               </a:rPr>
-              <a:t>19/05/2025</a:t>
+              <a:t>02/06/2025</a:t>
             </a:fld>
             <a:endParaRPr lang="en-GB" sz="1800" b="0" i="0" kern="1200" dirty="0">
               <a:solidFill>
@@ -15535,7 +15538,7 @@
                 <a:ea typeface="Open Sans" pitchFamily="2" charset="0"/>
                 <a:cs typeface="Open Sans" pitchFamily="2" charset="0"/>
               </a:rPr>
-              <a:t>19/05/2025</a:t>
+              <a:t>02/06/2025</a:t>
             </a:fld>
             <a:endParaRPr lang="en-GB" sz="1800" b="0" i="0" kern="1200" dirty="0">
               <a:solidFill>
@@ -16742,6 +16745,107 @@
         <p:cNvPr id="1" name="">
           <a:extLst>
             <a:ext uri="{FF2B5EF4-FFF2-40B4-BE49-F238E27FC236}">
+              <a16:creationId xmlns:a16="http://schemas.microsoft.com/office/drawing/2014/main" id="{54A8B7F2-967C-1634-8524-15E0B536B696}"/>
+            </a:ext>
+          </a:extLst>
+        </p:cNvPr>
+        <p:cNvGrpSpPr/>
+        <p:nvPr/>
+      </p:nvGrpSpPr>
+      <p:grpSpPr>
+        <a:xfrm>
+          <a:off x="0" y="0"/>
+          <a:ext cx="0" cy="0"/>
+          <a:chOff x="0" y="0"/>
+          <a:chExt cx="0" cy="0"/>
+        </a:xfrm>
+      </p:grpSpPr>
+      <p:sp>
+        <p:nvSpPr>
+          <p:cNvPr id="2" name="Title 1">
+            <a:extLst>
+              <a:ext uri="{FF2B5EF4-FFF2-40B4-BE49-F238E27FC236}">
+                <a16:creationId xmlns:a16="http://schemas.microsoft.com/office/drawing/2014/main" id="{CEEBB774-607E-E1B6-80C0-C820348197B8}"/>
+              </a:ext>
+            </a:extLst>
+          </p:cNvPr>
+          <p:cNvSpPr>
+            <a:spLocks noGrp="1"/>
+          </p:cNvSpPr>
+          <p:nvPr>
+            <p:ph type="title"/>
+          </p:nvPr>
+        </p:nvSpPr>
+        <p:spPr/>
+        <p:txBody>
+          <a:bodyPr/>
+          <a:lstStyle/>
+          <a:p>
+            <a:r>
+              <a:rPr lang="en-US" dirty="0"/>
+              <a:t>VJE</a:t>
+            </a:r>
+            <a:r>
+              <a:rPr lang="hr-HR" dirty="0"/>
+              <a:t>ž</a:t>
+            </a:r>
+            <a:r>
+              <a:rPr lang="en-US" dirty="0" err="1"/>
+              <a:t>ba</a:t>
+            </a:r>
+            <a:endParaRPr lang="hr-HR" dirty="0"/>
+          </a:p>
+        </p:txBody>
+      </p:sp>
+      <p:sp>
+        <p:nvSpPr>
+          <p:cNvPr id="5" name="Text Placeholder 4">
+            <a:extLst>
+              <a:ext uri="{FF2B5EF4-FFF2-40B4-BE49-F238E27FC236}">
+                <a16:creationId xmlns:a16="http://schemas.microsoft.com/office/drawing/2014/main" id="{98FEB784-377E-FEC1-FDE6-77919365066C}"/>
+              </a:ext>
+            </a:extLst>
+          </p:cNvPr>
+          <p:cNvSpPr>
+            <a:spLocks noGrp="1"/>
+          </p:cNvSpPr>
+          <p:nvPr>
+            <p:ph type="body" sz="half" idx="2"/>
+          </p:nvPr>
+        </p:nvSpPr>
+        <p:spPr/>
+        <p:txBody>
+          <a:bodyPr/>
+          <a:lstStyle/>
+          <a:p>
+            <a:r>
+              <a:rPr lang="hr-HR" dirty="0"/>
+              <a:t>https://docs.google.com/document/d/1iOxlBd63WG4rDuyEodS3I69lpM60IxLilB6mgGbCUgU/edit?usp=sharing</a:t>
+            </a:r>
+          </a:p>
+        </p:txBody>
+      </p:sp>
+    </p:spTree>
+    <p:extLst>
+      <p:ext uri="{BB962C8B-B14F-4D97-AF65-F5344CB8AC3E}">
+        <p14:creationId xmlns:p14="http://schemas.microsoft.com/office/powerpoint/2010/main" val="3450919414"/>
+      </p:ext>
+    </p:extLst>
+  </p:cSld>
+  <p:clrMapOvr>
+    <a:masterClrMapping/>
+  </p:clrMapOvr>
+</p:sld>
+</file>
+
+<file path=ppt/slides/slide12.xml><?xml version="1.0" encoding="utf-8"?>
+<p:sld xmlns:a="http://schemas.openxmlformats.org/drawingml/2006/main" xmlns:r="http://schemas.openxmlformats.org/officeDocument/2006/relationships" xmlns:p="http://schemas.openxmlformats.org/presentationml/2006/main">
+  <p:cSld>
+    <p:spTree>
+      <p:nvGrpSpPr>
+        <p:cNvPr id="1" name="">
+          <a:extLst>
+            <a:ext uri="{FF2B5EF4-FFF2-40B4-BE49-F238E27FC236}">
               <a16:creationId xmlns:a16="http://schemas.microsoft.com/office/drawing/2014/main" id="{3DFF1A05-B2F4-F7DF-DF98-3618C14DB00C}"/>
             </a:ext>
           </a:extLst>
@@ -16988,7 +17092,7 @@
 </p:sld>
 </file>
 
-<file path=ppt/slides/slide12.xml><?xml version="1.0" encoding="utf-8"?>
+<file path=ppt/slides/slide13.xml><?xml version="1.0" encoding="utf-8"?>
 <p:sld xmlns:a="http://schemas.openxmlformats.org/drawingml/2006/main" xmlns:r="http://schemas.openxmlformats.org/officeDocument/2006/relationships" xmlns:p="http://schemas.openxmlformats.org/presentationml/2006/main">
   <p:cSld>
     <p:spTree>
@@ -17445,229 +17549,6 @@
 </p:sld>
 </file>
 
-<file path=ppt/slides/slide13.xml><?xml version="1.0" encoding="utf-8"?>
-<p:sld xmlns:a="http://schemas.openxmlformats.org/drawingml/2006/main" xmlns:r="http://schemas.openxmlformats.org/officeDocument/2006/relationships" xmlns:p="http://schemas.openxmlformats.org/presentationml/2006/main">
-  <p:cSld>
-    <p:spTree>
-      <p:nvGrpSpPr>
-        <p:cNvPr id="1" name="">
-          <a:extLst>
-            <a:ext uri="{FF2B5EF4-FFF2-40B4-BE49-F238E27FC236}">
-              <a16:creationId xmlns:a16="http://schemas.microsoft.com/office/drawing/2014/main" id="{41D8D391-E500-51BA-E7FD-06C8D5BADE27}"/>
-            </a:ext>
-          </a:extLst>
-        </p:cNvPr>
-        <p:cNvGrpSpPr/>
-        <p:nvPr/>
-      </p:nvGrpSpPr>
-      <p:grpSpPr>
-        <a:xfrm>
-          <a:off x="0" y="0"/>
-          <a:ext cx="0" cy="0"/>
-          <a:chOff x="0" y="0"/>
-          <a:chExt cx="0" cy="0"/>
-        </a:xfrm>
-      </p:grpSpPr>
-      <p:sp>
-        <p:nvSpPr>
-          <p:cNvPr id="2" name="Title 1">
-            <a:extLst>
-              <a:ext uri="{FF2B5EF4-FFF2-40B4-BE49-F238E27FC236}">
-                <a16:creationId xmlns:a16="http://schemas.microsoft.com/office/drawing/2014/main" id="{7A95F4FD-1537-5299-B877-F1D1B4403E64}"/>
-              </a:ext>
-            </a:extLst>
-          </p:cNvPr>
-          <p:cNvSpPr>
-            <a:spLocks noGrp="1"/>
-          </p:cNvSpPr>
-          <p:nvPr>
-            <p:ph type="title"/>
-          </p:nvPr>
-        </p:nvSpPr>
-        <p:spPr/>
-        <p:txBody>
-          <a:bodyPr/>
-          <a:lstStyle/>
-          <a:p>
-            <a:r>
-              <a:rPr lang="en-US" dirty="0"/>
-              <a:t>VJE</a:t>
-            </a:r>
-            <a:r>
-              <a:rPr lang="hr-HR" dirty="0"/>
-              <a:t>ž</a:t>
-            </a:r>
-            <a:r>
-              <a:rPr lang="en-US" dirty="0" err="1"/>
-              <a:t>ba</a:t>
-            </a:r>
-            <a:endParaRPr lang="hr-HR" dirty="0"/>
-          </a:p>
-        </p:txBody>
-      </p:sp>
-      <p:sp>
-        <p:nvSpPr>
-          <p:cNvPr id="6" name="Text Placeholder 5">
-            <a:extLst>
-              <a:ext uri="{FF2B5EF4-FFF2-40B4-BE49-F238E27FC236}">
-                <a16:creationId xmlns:a16="http://schemas.microsoft.com/office/drawing/2014/main" id="{833981EC-5E89-16A5-C438-450D17DC012D}"/>
-              </a:ext>
-            </a:extLst>
-          </p:cNvPr>
-          <p:cNvSpPr>
-            <a:spLocks noGrp="1"/>
-          </p:cNvSpPr>
-          <p:nvPr>
-            <p:ph type="body" sz="half" idx="2"/>
-          </p:nvPr>
-        </p:nvSpPr>
-        <p:spPr/>
-        <p:txBody>
-          <a:bodyPr/>
-          <a:lstStyle/>
-          <a:p>
-            <a:pPr marL="285750" indent="-285750">
-              <a:buFontTx/>
-              <a:buChar char="-"/>
-            </a:pPr>
-            <a:r>
-              <a:rPr lang="hr-HR" dirty="0"/>
-              <a:t>Dohvatiti </a:t>
-            </a:r>
-            <a:r>
-              <a:rPr lang="hr-HR" b="1" dirty="0"/>
-              <a:t>broj narudžbe</a:t>
-            </a:r>
-            <a:r>
-              <a:rPr lang="hr-HR" dirty="0"/>
-              <a:t>, </a:t>
-            </a:r>
-            <a:r>
-              <a:rPr lang="hr-HR" b="1" dirty="0"/>
-              <a:t>naziv proizvoda</a:t>
-            </a:r>
-            <a:r>
-              <a:rPr lang="hr-HR" dirty="0"/>
-              <a:t>, </a:t>
-            </a:r>
-            <a:r>
-              <a:rPr lang="hr-HR" b="1" dirty="0"/>
-              <a:t>cijenu</a:t>
-            </a:r>
-            <a:r>
-              <a:rPr lang="hr-HR" dirty="0"/>
-              <a:t> i </a:t>
-            </a:r>
-            <a:r>
-              <a:rPr lang="hr-HR" b="1" dirty="0"/>
-              <a:t>stanje na skladištu</a:t>
-            </a:r>
-            <a:r>
-              <a:rPr lang="hr-HR" dirty="0"/>
-              <a:t>.</a:t>
-            </a:r>
-            <a:endParaRPr lang="en-US" dirty="0"/>
-          </a:p>
-          <a:p>
-            <a:pPr marL="285750" indent="-285750">
-              <a:buFontTx/>
-              <a:buChar char="-"/>
-            </a:pPr>
-            <a:endParaRPr lang="en-US" dirty="0"/>
-          </a:p>
-          <a:p>
-            <a:pPr marL="285750" indent="-285750">
-              <a:buFontTx/>
-              <a:buChar char="-"/>
-            </a:pPr>
-            <a:r>
-              <a:rPr lang="hr-HR" dirty="0"/>
-              <a:t>Dohvatiti </a:t>
-            </a:r>
-            <a:r>
-              <a:rPr lang="hr-HR" b="1" dirty="0"/>
-              <a:t>ime kupca, proizvod koji je kupio, cijenu i broj narudžbe</a:t>
-            </a:r>
-            <a:r>
-              <a:rPr lang="hr-HR" dirty="0"/>
-              <a:t> iz više tablica istovremeno.</a:t>
-            </a:r>
-          </a:p>
-        </p:txBody>
-      </p:sp>
-      <p:pic>
-        <p:nvPicPr>
-          <p:cNvPr id="4" name="Picture 3">
-            <a:extLst>
-              <a:ext uri="{FF2B5EF4-FFF2-40B4-BE49-F238E27FC236}">
-                <a16:creationId xmlns:a16="http://schemas.microsoft.com/office/drawing/2014/main" id="{F88980A7-6A1F-37BE-BA42-2F1B1E95CB35}"/>
-              </a:ext>
-            </a:extLst>
-          </p:cNvPr>
-          <p:cNvPicPr>
-            <a:picLocks noChangeAspect="1"/>
-          </p:cNvPicPr>
-          <p:nvPr/>
-        </p:nvPicPr>
-        <p:blipFill>
-          <a:blip r:embed="rId3"/>
-          <a:stretch>
-            <a:fillRect/>
-          </a:stretch>
-        </p:blipFill>
-        <p:spPr>
-          <a:xfrm>
-            <a:off x="5697057" y="2500312"/>
-            <a:ext cx="6305550" cy="619125"/>
-          </a:xfrm>
-          <a:prstGeom prst="rect">
-            <a:avLst/>
-          </a:prstGeom>
-        </p:spPr>
-      </p:pic>
-      <p:pic>
-        <p:nvPicPr>
-          <p:cNvPr id="7" name="Picture 6">
-            <a:extLst>
-              <a:ext uri="{FF2B5EF4-FFF2-40B4-BE49-F238E27FC236}">
-                <a16:creationId xmlns:a16="http://schemas.microsoft.com/office/drawing/2014/main" id="{5F1716DD-6DE7-ACE3-D299-9DFA98C23587}"/>
-              </a:ext>
-            </a:extLst>
-          </p:cNvPr>
-          <p:cNvPicPr>
-            <a:picLocks noChangeAspect="1"/>
-          </p:cNvPicPr>
-          <p:nvPr/>
-        </p:nvPicPr>
-        <p:blipFill>
-          <a:blip r:embed="rId4"/>
-          <a:stretch>
-            <a:fillRect/>
-          </a:stretch>
-        </p:blipFill>
-        <p:spPr>
-          <a:xfrm>
-            <a:off x="5697057" y="3931167"/>
-            <a:ext cx="6286500" cy="590550"/>
-          </a:xfrm>
-          <a:prstGeom prst="rect">
-            <a:avLst/>
-          </a:prstGeom>
-        </p:spPr>
-      </p:pic>
-    </p:spTree>
-    <p:extLst>
-      <p:ext uri="{BB962C8B-B14F-4D97-AF65-F5344CB8AC3E}">
-        <p14:creationId xmlns:p14="http://schemas.microsoft.com/office/powerpoint/2010/main" val="4076044860"/>
-      </p:ext>
-    </p:extLst>
-  </p:cSld>
-  <p:clrMapOvr>
-    <a:masterClrMapping/>
-  </p:clrMapOvr>
-</p:sld>
-</file>
-
 <file path=ppt/slides/slide14.xml><?xml version="1.0" encoding="utf-8"?>
 <p:sld xmlns:a="http://schemas.openxmlformats.org/drawingml/2006/main" xmlns:r="http://schemas.openxmlformats.org/officeDocument/2006/relationships" xmlns:p="http://schemas.openxmlformats.org/presentationml/2006/main">
   <p:cSld>
@@ -18021,8 +17902,8 @@
         </p:blipFill>
         <p:spPr>
           <a:xfrm>
-            <a:off x="1326413" y="2193109"/>
-            <a:ext cx="1884620" cy="1922616"/>
+            <a:off x="871134" y="2340343"/>
+            <a:ext cx="2734466" cy="2789596"/>
           </a:xfrm>
           <a:prstGeom prst="rect">
             <a:avLst/>
@@ -18051,8 +17932,8 @@
         </p:blipFill>
         <p:spPr>
           <a:xfrm>
-            <a:off x="4180921" y="2190362"/>
-            <a:ext cx="3176809" cy="1266478"/>
+            <a:off x="4020713" y="2340343"/>
+            <a:ext cx="3913646" cy="1560228"/>
           </a:xfrm>
           <a:prstGeom prst="rect">
             <a:avLst/>
@@ -18161,8 +18042,8 @@
         </p:blipFill>
         <p:spPr>
           <a:xfrm>
-            <a:off x="8508372" y="2190362"/>
-            <a:ext cx="2836568" cy="1209029"/>
+            <a:off x="8349472" y="2340343"/>
+            <a:ext cx="3660535" cy="1560228"/>
           </a:xfrm>
           <a:prstGeom prst="rect">
             <a:avLst/>
@@ -20684,8 +20565,8 @@
         </p:nvGrpSpPr>
         <p:grpSpPr>
           <a:xfrm>
-            <a:off x="1084299" y="2859356"/>
-            <a:ext cx="2249008" cy="1755839"/>
+            <a:off x="875071" y="2848583"/>
+            <a:ext cx="2883267" cy="2251016"/>
             <a:chOff x="1084299" y="2205824"/>
             <a:chExt cx="3086100" cy="2409371"/>
           </a:xfrm>
@@ -20773,8 +20654,8 @@
         </p:blipFill>
         <p:spPr>
           <a:xfrm>
-            <a:off x="4276282" y="2914011"/>
-            <a:ext cx="3448050" cy="1695450"/>
+            <a:off x="4007197" y="3068504"/>
+            <a:ext cx="3858469" cy="1897258"/>
           </a:xfrm>
           <a:prstGeom prst="rect">
             <a:avLst/>
@@ -20803,8 +20684,8 @@
         </p:blipFill>
         <p:spPr>
           <a:xfrm>
-            <a:off x="8114525" y="2910496"/>
-            <a:ext cx="3629025" cy="800100"/>
+            <a:off x="8114525" y="2848583"/>
+            <a:ext cx="3909845" cy="862013"/>
           </a:xfrm>
           <a:prstGeom prst="rect">
             <a:avLst/>
@@ -20833,8 +20714,8 @@
         </p:blipFill>
         <p:spPr>
           <a:xfrm>
-            <a:off x="8114525" y="3870387"/>
-            <a:ext cx="1981200" cy="1095375"/>
+            <a:off x="8114525" y="3911461"/>
+            <a:ext cx="2463068" cy="1361792"/>
           </a:xfrm>
           <a:prstGeom prst="rect">
             <a:avLst/>
@@ -28756,15 +28637,6 @@
 </file>
 
 <file path=customXml/item2.xml><?xml version="1.0" encoding="utf-8"?>
-<?mso-contentType ?>
-<FormTemplates xmlns="http://schemas.microsoft.com/sharepoint/v3/contenttype/forms">
-  <Display>DocumentLibraryForm</Display>
-  <Edit>DocumentLibraryForm</Edit>
-  <New>DocumentLibraryForm</New>
-</FormTemplates>
-</file>
-
-<file path=customXml/item3.xml><?xml version="1.0" encoding="utf-8"?>
 <p:properties xmlns:p="http://schemas.microsoft.com/office/2006/metadata/properties" xmlns:xsi="http://www.w3.org/2001/XMLSchema-instance" xmlns:pc="http://schemas.microsoft.com/office/infopath/2007/PartnerControls">
   <documentManagement>
     <lcf76f155ced4ddcb4097134ff3c332f xmlns="40806f44-bc4a-4ea4-b660-c6da93f8f179">
@@ -28773,6 +28645,15 @@
     <TaxCatchAll xmlns="758d0d8f-b783-4c78-ab73-9740c97b97cf" xsi:nil="true"/>
   </documentManagement>
 </p:properties>
+</file>
+
+<file path=customXml/item3.xml><?xml version="1.0" encoding="utf-8"?>
+<?mso-contentType ?>
+<FormTemplates xmlns="http://schemas.microsoft.com/sharepoint/v3/contenttype/forms">
+  <Display>DocumentLibraryForm</Display>
+  <Edit>DocumentLibraryForm</Edit>
+  <New>DocumentLibraryForm</New>
+</FormTemplates>
 </file>
 
 <file path=customXml/itemProps1.xml><?xml version="1.0" encoding="utf-8"?>
@@ -28795,14 +28676,6 @@
 </file>
 
 <file path=customXml/itemProps2.xml><?xml version="1.0" encoding="utf-8"?>
-<ds:datastoreItem xmlns:ds="http://schemas.openxmlformats.org/officeDocument/2006/customXml" ds:itemID="{46915D30-CAA6-465E-907F-1770D4E3B01D}">
-  <ds:schemaRefs>
-    <ds:schemaRef ds:uri="http://schemas.microsoft.com/sharepoint/v3/contenttype/forms"/>
-  </ds:schemaRefs>
-</ds:datastoreItem>
-</file>
-
-<file path=customXml/itemProps3.xml><?xml version="1.0" encoding="utf-8"?>
 <ds:datastoreItem xmlns:ds="http://schemas.openxmlformats.org/officeDocument/2006/customXml" ds:itemID="{61E72F81-8533-461E-8E71-A6D77294CFEF}">
   <ds:schemaRefs>
     <ds:schemaRef ds:uri="http://purl.org/dc/elements/1.1/"/>
@@ -28817,4 +28690,12 @@
     <ds:schemaRef ds:uri="http://schemas.microsoft.com/office/2006/metadata/properties"/>
   </ds:schemaRefs>
 </ds:datastoreItem>
+</file>
+
+<file path=customXml/itemProps3.xml><?xml version="1.0" encoding="utf-8"?>
+<ds:datastoreItem xmlns:ds="http://schemas.openxmlformats.org/officeDocument/2006/customXml" ds:itemID="{46915D30-CAA6-465E-907F-1770D4E3B01D}">
+  <ds:schemaRefs>
+    <ds:schemaRef ds:uri="http://schemas.microsoft.com/sharepoint/v3/contenttype/forms"/>
+  </ds:schemaRefs>
+</ds:datastoreItem>
 </file>
</xml_diff>

<commit_message>
added code for final project
</commit_message>
<xml_diff>
--- a/Bootcamp/DB-uvod/DB-uvod.pptx
+++ b/Bootcamp/DB-uvod/DB-uvod.pptx
@@ -3086,6 +3086,29 @@
         <p:txBody>
           <a:bodyPr/>
           <a:lstStyle/>
+          <a:p>
+            <a:pPr marL="0" marR="0" lvl="0" indent="0" algn="l" defTabSz="914400" rtl="0" eaLnBrk="1" fontAlgn="auto" latinLnBrk="0" hangingPunct="1">
+              <a:lnSpc>
+                <a:spcPct val="100000"/>
+              </a:lnSpc>
+              <a:spcBef>
+                <a:spcPts val="0"/>
+              </a:spcBef>
+              <a:spcAft>
+                <a:spcPts val="0"/>
+              </a:spcAft>
+              <a:buClrTx/>
+              <a:buSzTx/>
+              <a:buFontTx/>
+              <a:buNone/>
+              <a:tabLst/>
+              <a:defRPr/>
+            </a:pPr>
+            <a:r>
+              <a:rPr lang="hr-HR" dirty="0"/>
+              <a:t>https://docs.google.com/document/d/1zKC2AqkcjIkm3VYRt_GC1lc5C3WkbGBK1z_kbT26Ses/edit?usp=sharing</a:t>
+            </a:r>
+          </a:p>
           <a:p>
             <a:endParaRPr lang="hr-HR" dirty="0"/>
           </a:p>
@@ -18096,12 +18119,52 @@
           <a:lstStyle/>
           <a:p>
             <a:r>
+              <a:rPr lang="en-US" dirty="0"/>
+              <a:t>1:1</a:t>
+            </a:r>
+            <a:br>
+              <a:rPr lang="en-US" dirty="0"/>
+            </a:br>
+            <a:br>
+              <a:rPr lang="en-US" dirty="0"/>
+            </a:br>
+            <a:r>
               <a:rPr lang="hr-HR" dirty="0"/>
               <a:t>https://docs.google.com/document/d/1i--zRsM3qWEkR8TV0YO4KKkDKm3CCpY5TM1wmCBNG5M/edit?usp=sharing</a:t>
             </a:r>
           </a:p>
         </p:txBody>
       </p:sp>
+      <p:pic>
+        <p:nvPicPr>
+          <p:cNvPr id="7" name="Picture 6">
+            <a:extLst>
+              <a:ext uri="{FF2B5EF4-FFF2-40B4-BE49-F238E27FC236}">
+                <a16:creationId xmlns:a16="http://schemas.microsoft.com/office/drawing/2014/main" id="{63380B9A-ACE7-4410-18CF-3FF064861F17}"/>
+              </a:ext>
+            </a:extLst>
+          </p:cNvPr>
+          <p:cNvPicPr>
+            <a:picLocks noChangeAspect="1"/>
+          </p:cNvPicPr>
+          <p:nvPr/>
+        </p:nvPicPr>
+        <p:blipFill>
+          <a:blip r:embed="rId3"/>
+          <a:stretch>
+            <a:fillRect/>
+          </a:stretch>
+        </p:blipFill>
+        <p:spPr>
+          <a:xfrm>
+            <a:off x="5593839" y="2107769"/>
+            <a:ext cx="6076048" cy="2303435"/>
+          </a:xfrm>
+          <a:prstGeom prst="rect">
+            <a:avLst/>
+          </a:prstGeom>
+        </p:spPr>
+      </p:pic>
     </p:spTree>
     <p:extLst>
       <p:ext uri="{BB962C8B-B14F-4D97-AF65-F5344CB8AC3E}">
@@ -20046,6 +20109,36 @@
           </a:p>
         </p:txBody>
       </p:sp>
+      <p:pic>
+        <p:nvPicPr>
+          <p:cNvPr id="4" name="Picture 3">
+            <a:extLst>
+              <a:ext uri="{FF2B5EF4-FFF2-40B4-BE49-F238E27FC236}">
+                <a16:creationId xmlns:a16="http://schemas.microsoft.com/office/drawing/2014/main" id="{A33EC362-D94F-15D6-3317-7F8303B4498D}"/>
+              </a:ext>
+            </a:extLst>
+          </p:cNvPr>
+          <p:cNvPicPr>
+            <a:picLocks noChangeAspect="1"/>
+          </p:cNvPicPr>
+          <p:nvPr/>
+        </p:nvPicPr>
+        <p:blipFill>
+          <a:blip r:embed="rId3"/>
+          <a:stretch>
+            <a:fillRect/>
+          </a:stretch>
+        </p:blipFill>
+        <p:spPr>
+          <a:xfrm>
+            <a:off x="5536285" y="2271712"/>
+            <a:ext cx="6419850" cy="2314575"/>
+          </a:xfrm>
+          <a:prstGeom prst="rect">
+            <a:avLst/>
+          </a:prstGeom>
+        </p:spPr>
+      </p:pic>
     </p:spTree>
     <p:extLst>
       <p:ext uri="{BB962C8B-B14F-4D97-AF65-F5344CB8AC3E}">
@@ -20698,6 +20791,36 @@
           </a:p>
         </p:txBody>
       </p:sp>
+      <p:pic>
+        <p:nvPicPr>
+          <p:cNvPr id="4" name="Picture 3">
+            <a:extLst>
+              <a:ext uri="{FF2B5EF4-FFF2-40B4-BE49-F238E27FC236}">
+                <a16:creationId xmlns:a16="http://schemas.microsoft.com/office/drawing/2014/main" id="{885345EB-1DF1-8F7F-6FC1-5FB525BEBEC0}"/>
+              </a:ext>
+            </a:extLst>
+          </p:cNvPr>
+          <p:cNvPicPr>
+            <a:picLocks noChangeAspect="1"/>
+          </p:cNvPicPr>
+          <p:nvPr/>
+        </p:nvPicPr>
+        <p:blipFill>
+          <a:blip r:embed="rId3"/>
+          <a:stretch>
+            <a:fillRect/>
+          </a:stretch>
+        </p:blipFill>
+        <p:spPr>
+          <a:xfrm>
+            <a:off x="5831317" y="2175368"/>
+            <a:ext cx="6086583" cy="1881906"/>
+          </a:xfrm>
+          <a:prstGeom prst="rect">
+            <a:avLst/>
+          </a:prstGeom>
+        </p:spPr>
+      </p:pic>
     </p:spTree>
     <p:extLst>
       <p:ext uri="{BB962C8B-B14F-4D97-AF65-F5344CB8AC3E}">
@@ -23146,6 +23269,36 @@
           </a:p>
         </p:txBody>
       </p:sp>
+      <p:pic>
+        <p:nvPicPr>
+          <p:cNvPr id="4" name="Picture 3">
+            <a:extLst>
+              <a:ext uri="{FF2B5EF4-FFF2-40B4-BE49-F238E27FC236}">
+                <a16:creationId xmlns:a16="http://schemas.microsoft.com/office/drawing/2014/main" id="{85E01D83-1D2E-F9DA-E067-074FD5C32A16}"/>
+              </a:ext>
+            </a:extLst>
+          </p:cNvPr>
+          <p:cNvPicPr>
+            <a:picLocks noChangeAspect="1"/>
+          </p:cNvPicPr>
+          <p:nvPr/>
+        </p:nvPicPr>
+        <p:blipFill>
+          <a:blip r:embed="rId3"/>
+          <a:stretch>
+            <a:fillRect/>
+          </a:stretch>
+        </p:blipFill>
+        <p:spPr>
+          <a:xfrm>
+            <a:off x="5401159" y="1743559"/>
+            <a:ext cx="6356681" cy="2470925"/>
+          </a:xfrm>
+          <a:prstGeom prst="rect">
+            <a:avLst/>
+          </a:prstGeom>
+        </p:spPr>
+      </p:pic>
     </p:spTree>
     <p:extLst>
       <p:ext uri="{BB962C8B-B14F-4D97-AF65-F5344CB8AC3E}">
@@ -27451,6 +27604,17 @@
 </file>
 
 <file path=customXml/item2.xml><?xml version="1.0" encoding="utf-8"?>
+<p:properties xmlns:p="http://schemas.microsoft.com/office/2006/metadata/properties" xmlns:xsi="http://www.w3.org/2001/XMLSchema-instance" xmlns:pc="http://schemas.microsoft.com/office/infopath/2007/PartnerControls">
+  <documentManagement>
+    <lcf76f155ced4ddcb4097134ff3c332f xmlns="40806f44-bc4a-4ea4-b660-c6da93f8f179">
+      <Terms xmlns="http://schemas.microsoft.com/office/infopath/2007/PartnerControls"/>
+    </lcf76f155ced4ddcb4097134ff3c332f>
+    <TaxCatchAll xmlns="758d0d8f-b783-4c78-ab73-9740c97b97cf" xsi:nil="true"/>
+  </documentManagement>
+</p:properties>
+</file>
+
+<file path=customXml/item3.xml><?xml version="1.0" encoding="utf-8"?>
 <ct:contentTypeSchema xmlns:ct="http://schemas.microsoft.com/office/2006/metadata/contentType" xmlns:ma="http://schemas.microsoft.com/office/2006/metadata/properties/metaAttributes" ct:_="" ma:_="" ma:contentTypeName="Document" ma:contentTypeID="0x010100E4F55D9EF0BF0A44B819E681FCAC00B7" ma:contentTypeVersion="12" ma:contentTypeDescription="Create a new document." ma:contentTypeScope="" ma:versionID="068ce121a7a7a0aebcb89dd601c4f0a2">
   <xsd:schema xmlns:xsd="http://www.w3.org/2001/XMLSchema" xmlns:xs="http://www.w3.org/2001/XMLSchema" xmlns:p="http://schemas.microsoft.com/office/2006/metadata/properties" xmlns:ns2="40806f44-bc4a-4ea4-b660-c6da93f8f179" xmlns:ns3="758d0d8f-b783-4c78-ab73-9740c97b97cf" targetNamespace="http://schemas.microsoft.com/office/2006/metadata/properties" ma:root="true" ma:fieldsID="67c58e6c5c8ea9af0822acd84d25e1a2" ns2:_="" ns3:_="">
     <xsd:import namespace="40806f44-bc4a-4ea4-b660-c6da93f8f179"/>
@@ -27667,17 +27831,6 @@
 </ct:contentTypeSchema>
 </file>
 
-<file path=customXml/item3.xml><?xml version="1.0" encoding="utf-8"?>
-<p:properties xmlns:p="http://schemas.microsoft.com/office/2006/metadata/properties" xmlns:xsi="http://www.w3.org/2001/XMLSchema-instance" xmlns:pc="http://schemas.microsoft.com/office/infopath/2007/PartnerControls">
-  <documentManagement>
-    <lcf76f155ced4ddcb4097134ff3c332f xmlns="40806f44-bc4a-4ea4-b660-c6da93f8f179">
-      <Terms xmlns="http://schemas.microsoft.com/office/infopath/2007/PartnerControls"/>
-    </lcf76f155ced4ddcb4097134ff3c332f>
-    <TaxCatchAll xmlns="758d0d8f-b783-4c78-ab73-9740c97b97cf" xsi:nil="true"/>
-  </documentManagement>
-</p:properties>
-</file>
-
 <file path=customXml/itemProps1.xml><?xml version="1.0" encoding="utf-8"?>
 <ds:datastoreItem xmlns:ds="http://schemas.openxmlformats.org/officeDocument/2006/customXml" ds:itemID="{46915D30-CAA6-465E-907F-1770D4E3B01D}">
   <ds:schemaRefs>
@@ -27687,6 +27840,23 @@
 </file>
 
 <file path=customXml/itemProps2.xml><?xml version="1.0" encoding="utf-8"?>
+<ds:datastoreItem xmlns:ds="http://schemas.openxmlformats.org/officeDocument/2006/customXml" ds:itemID="{61E72F81-8533-461E-8E71-A6D77294CFEF}">
+  <ds:schemaRefs>
+    <ds:schemaRef ds:uri="http://purl.org/dc/elements/1.1/"/>
+    <ds:schemaRef ds:uri="http://www.w3.org/XML/1998/namespace"/>
+    <ds:schemaRef ds:uri="http://purl.org/dc/terms/"/>
+    <ds:schemaRef ds:uri="http://schemas.microsoft.com/office/2006/documentManagement/types"/>
+    <ds:schemaRef ds:uri="40806f44-bc4a-4ea4-b660-c6da93f8f179"/>
+    <ds:schemaRef ds:uri="http://schemas.openxmlformats.org/package/2006/metadata/core-properties"/>
+    <ds:schemaRef ds:uri="http://purl.org/dc/dcmitype/"/>
+    <ds:schemaRef ds:uri="http://schemas.microsoft.com/office/infopath/2007/PartnerControls"/>
+    <ds:schemaRef ds:uri="758d0d8f-b783-4c78-ab73-9740c97b97cf"/>
+    <ds:schemaRef ds:uri="http://schemas.microsoft.com/office/2006/metadata/properties"/>
+  </ds:schemaRefs>
+</ds:datastoreItem>
+</file>
+
+<file path=customXml/itemProps3.xml><?xml version="1.0" encoding="utf-8"?>
 <ds:datastoreItem xmlns:ds="http://schemas.openxmlformats.org/officeDocument/2006/customXml" ds:itemID="{4E6AED0F-96FF-4C7F-8AC9-672C91BFCDFE}">
   <ds:schemaRefs>
     <ds:schemaRef ds:uri="http://schemas.microsoft.com/office/2006/metadata/contentType"/>
@@ -27703,21 +27873,4 @@
     <ds:schemaRef ds:uri="http://schemas.microsoft.com/internal/obd"/>
   </ds:schemaRefs>
 </ds:datastoreItem>
-</file>
-
-<file path=customXml/itemProps3.xml><?xml version="1.0" encoding="utf-8"?>
-<ds:datastoreItem xmlns:ds="http://schemas.openxmlformats.org/officeDocument/2006/customXml" ds:itemID="{61E72F81-8533-461E-8E71-A6D77294CFEF}">
-  <ds:schemaRefs>
-    <ds:schemaRef ds:uri="http://purl.org/dc/elements/1.1/"/>
-    <ds:schemaRef ds:uri="http://www.w3.org/XML/1998/namespace"/>
-    <ds:schemaRef ds:uri="http://purl.org/dc/terms/"/>
-    <ds:schemaRef ds:uri="http://schemas.microsoft.com/office/2006/documentManagement/types"/>
-    <ds:schemaRef ds:uri="40806f44-bc4a-4ea4-b660-c6da93f8f179"/>
-    <ds:schemaRef ds:uri="http://schemas.openxmlformats.org/package/2006/metadata/core-properties"/>
-    <ds:schemaRef ds:uri="http://purl.org/dc/dcmitype/"/>
-    <ds:schemaRef ds:uri="http://schemas.microsoft.com/office/infopath/2007/PartnerControls"/>
-    <ds:schemaRef ds:uri="758d0d8f-b783-4c78-ab73-9740c97b97cf"/>
-    <ds:schemaRef ds:uri="http://schemas.microsoft.com/office/2006/metadata/properties"/>
-  </ds:schemaRefs>
-</ds:datastoreItem>
 </file>
</xml_diff>

<commit_message>
finished the DB predavanje
</commit_message>
<xml_diff>
--- a/Bootcamp/DB-uvod/DB-uvod.pptx
+++ b/Bootcamp/DB-uvod/DB-uvod.pptx
@@ -5,7 +5,7 @@
     <p:sldMasterId id="2147483648" r:id="rId4"/>
   </p:sldMasterIdLst>
   <p:notesMasterIdLst>
-    <p:notesMasterId r:id="rId36"/>
+    <p:notesMasterId r:id="rId37"/>
   </p:notesMasterIdLst>
   <p:sldIdLst>
     <p:sldId id="282" r:id="rId5"/>
@@ -21,24 +21,25 @@
     <p:sldId id="410" r:id="rId15"/>
     <p:sldId id="388" r:id="rId16"/>
     <p:sldId id="389" r:id="rId17"/>
-    <p:sldId id="395" r:id="rId18"/>
-    <p:sldId id="398" r:id="rId19"/>
-    <p:sldId id="397" r:id="rId20"/>
-    <p:sldId id="411" r:id="rId21"/>
-    <p:sldId id="396" r:id="rId22"/>
-    <p:sldId id="399" r:id="rId23"/>
-    <p:sldId id="400" r:id="rId24"/>
-    <p:sldId id="401" r:id="rId25"/>
-    <p:sldId id="402" r:id="rId26"/>
-    <p:sldId id="404" r:id="rId27"/>
-    <p:sldId id="405" r:id="rId28"/>
-    <p:sldId id="406" r:id="rId29"/>
-    <p:sldId id="407" r:id="rId30"/>
-    <p:sldId id="390" r:id="rId31"/>
-    <p:sldId id="393" r:id="rId32"/>
-    <p:sldId id="408" r:id="rId33"/>
-    <p:sldId id="412" r:id="rId34"/>
-    <p:sldId id="409" r:id="rId35"/>
+    <p:sldId id="414" r:id="rId18"/>
+    <p:sldId id="395" r:id="rId19"/>
+    <p:sldId id="398" r:id="rId20"/>
+    <p:sldId id="397" r:id="rId21"/>
+    <p:sldId id="411" r:id="rId22"/>
+    <p:sldId id="396" r:id="rId23"/>
+    <p:sldId id="399" r:id="rId24"/>
+    <p:sldId id="400" r:id="rId25"/>
+    <p:sldId id="401" r:id="rId26"/>
+    <p:sldId id="402" r:id="rId27"/>
+    <p:sldId id="404" r:id="rId28"/>
+    <p:sldId id="405" r:id="rId29"/>
+    <p:sldId id="406" r:id="rId30"/>
+    <p:sldId id="407" r:id="rId31"/>
+    <p:sldId id="390" r:id="rId32"/>
+    <p:sldId id="413" r:id="rId33"/>
+    <p:sldId id="408" r:id="rId34"/>
+    <p:sldId id="412" r:id="rId35"/>
+    <p:sldId id="409" r:id="rId36"/>
   </p:sldIdLst>
   <p:sldSz cx="12192000" cy="6858000"/>
   <p:notesSz cx="6858000" cy="9144000"/>
@@ -159,6 +160,7 @@
             <p14:sldId id="410"/>
             <p14:sldId id="388"/>
             <p14:sldId id="389"/>
+            <p14:sldId id="414"/>
             <p14:sldId id="395"/>
             <p14:sldId id="398"/>
             <p14:sldId id="397"/>
@@ -173,7 +175,7 @@
             <p14:sldId id="406"/>
             <p14:sldId id="407"/>
             <p14:sldId id="390"/>
-            <p14:sldId id="393"/>
+            <p14:sldId id="413"/>
             <p14:sldId id="408"/>
             <p14:sldId id="412"/>
             <p14:sldId id="409"/>
@@ -281,7 +283,7 @@
           <a:p>
             <a:fld id="{B2A70591-2E3C-5F42-A4E1-C0F5A0F4E5DB}" type="datetimeFigureOut">
               <a:rPr lang="en-US" smtClean="0"/>
-              <a:t>6/3/2025</a:t>
+              <a:t>6/4/2025</a:t>
             </a:fld>
             <a:endParaRPr lang="en-US"/>
           </a:p>
@@ -992,6 +994,114 @@
         <p:cNvPr id="1" name="">
           <a:extLst>
             <a:ext uri="{FF2B5EF4-FFF2-40B4-BE49-F238E27FC236}">
+              <a16:creationId xmlns:a16="http://schemas.microsoft.com/office/drawing/2014/main" id="{6558A340-08EC-EE96-65AD-AA19B7E32E13}"/>
+            </a:ext>
+          </a:extLst>
+        </p:cNvPr>
+        <p:cNvGrpSpPr/>
+        <p:nvPr/>
+      </p:nvGrpSpPr>
+      <p:grpSpPr>
+        <a:xfrm>
+          <a:off x="0" y="0"/>
+          <a:ext cx="0" cy="0"/>
+          <a:chOff x="0" y="0"/>
+          <a:chExt cx="0" cy="0"/>
+        </a:xfrm>
+      </p:grpSpPr>
+      <p:sp>
+        <p:nvSpPr>
+          <p:cNvPr id="2" name="Slide Image Placeholder 1">
+            <a:extLst>
+              <a:ext uri="{FF2B5EF4-FFF2-40B4-BE49-F238E27FC236}">
+                <a16:creationId xmlns:a16="http://schemas.microsoft.com/office/drawing/2014/main" id="{223286F1-D15F-F39F-A228-F20DEBF3031A}"/>
+              </a:ext>
+            </a:extLst>
+          </p:cNvPr>
+          <p:cNvSpPr>
+            <a:spLocks noGrp="1" noRot="1" noChangeAspect="1"/>
+          </p:cNvSpPr>
+          <p:nvPr>
+            <p:ph type="sldImg"/>
+          </p:nvPr>
+        </p:nvSpPr>
+        <p:spPr/>
+      </p:sp>
+      <p:sp>
+        <p:nvSpPr>
+          <p:cNvPr id="3" name="Notes Placeholder 2">
+            <a:extLst>
+              <a:ext uri="{FF2B5EF4-FFF2-40B4-BE49-F238E27FC236}">
+                <a16:creationId xmlns:a16="http://schemas.microsoft.com/office/drawing/2014/main" id="{F3550643-B7CA-6DD8-554C-1CFF311CDC2F}"/>
+              </a:ext>
+            </a:extLst>
+          </p:cNvPr>
+          <p:cNvSpPr>
+            <a:spLocks noGrp="1"/>
+          </p:cNvSpPr>
+          <p:nvPr>
+            <p:ph type="body" idx="1"/>
+          </p:nvPr>
+        </p:nvSpPr>
+        <p:spPr/>
+        <p:txBody>
+          <a:bodyPr/>
+          <a:lstStyle/>
+          <a:p>
+            <a:endParaRPr lang="hr-HR" dirty="0"/>
+          </a:p>
+        </p:txBody>
+      </p:sp>
+      <p:sp>
+        <p:nvSpPr>
+          <p:cNvPr id="4" name="Slide Number Placeholder 3">
+            <a:extLst>
+              <a:ext uri="{FF2B5EF4-FFF2-40B4-BE49-F238E27FC236}">
+                <a16:creationId xmlns:a16="http://schemas.microsoft.com/office/drawing/2014/main" id="{2AEA0671-D8E9-0C76-8173-A06CC5B9AF71}"/>
+              </a:ext>
+            </a:extLst>
+          </p:cNvPr>
+          <p:cNvSpPr>
+            <a:spLocks noGrp="1"/>
+          </p:cNvSpPr>
+          <p:nvPr>
+            <p:ph type="sldNum" sz="quarter" idx="5"/>
+          </p:nvPr>
+        </p:nvSpPr>
+        <p:spPr/>
+        <p:txBody>
+          <a:bodyPr/>
+          <a:lstStyle/>
+          <a:p>
+            <a:fld id="{343B951A-A665-1949-AEDB-B62DC9BE7F13}" type="slidenum">
+              <a:rPr lang="en-US" smtClean="0"/>
+              <a:t>14</a:t>
+            </a:fld>
+            <a:endParaRPr lang="en-US"/>
+          </a:p>
+        </p:txBody>
+      </p:sp>
+    </p:spTree>
+    <p:extLst>
+      <p:ext uri="{BB962C8B-B14F-4D97-AF65-F5344CB8AC3E}">
+        <p14:creationId xmlns:p14="http://schemas.microsoft.com/office/powerpoint/2010/main" val="1266057687"/>
+      </p:ext>
+    </p:extLst>
+  </p:cSld>
+  <p:clrMapOvr>
+    <a:masterClrMapping/>
+  </p:clrMapOvr>
+</p:notes>
+</file>
+
+<file path=ppt/notesSlides/notesSlide14.xml><?xml version="1.0" encoding="utf-8"?>
+<p:notes xmlns:a="http://schemas.openxmlformats.org/drawingml/2006/main" xmlns:r="http://schemas.openxmlformats.org/officeDocument/2006/relationships" xmlns:p="http://schemas.openxmlformats.org/presentationml/2006/main">
+  <p:cSld>
+    <p:spTree>
+      <p:nvGrpSpPr>
+        <p:cNvPr id="1" name="">
+          <a:extLst>
+            <a:ext uri="{FF2B5EF4-FFF2-40B4-BE49-F238E27FC236}">
               <a16:creationId xmlns:a16="http://schemas.microsoft.com/office/drawing/2014/main" id="{0EB53CF8-06C2-2540-2942-956F005FEEFC}"/>
             </a:ext>
           </a:extLst>
@@ -1194,7 +1304,7 @@
           <a:p>
             <a:fld id="{343B951A-A665-1949-AEDB-B62DC9BE7F13}" type="slidenum">
               <a:rPr lang="en-US" smtClean="0"/>
-              <a:t>14</a:t>
+              <a:t>15</a:t>
             </a:fld>
             <a:endParaRPr lang="en-US"/>
           </a:p>
@@ -1213,7 +1323,7 @@
 </p:notes>
 </file>
 
-<file path=ppt/notesSlides/notesSlide14.xml><?xml version="1.0" encoding="utf-8"?>
+<file path=ppt/notesSlides/notesSlide15.xml><?xml version="1.0" encoding="utf-8"?>
 <p:notes xmlns:a="http://schemas.openxmlformats.org/drawingml/2006/main" xmlns:r="http://schemas.openxmlformats.org/officeDocument/2006/relationships" xmlns:p="http://schemas.openxmlformats.org/presentationml/2006/main">
   <p:cSld>
     <p:spTree>
@@ -1423,7 +1533,7 @@
           <a:p>
             <a:fld id="{343B951A-A665-1949-AEDB-B62DC9BE7F13}" type="slidenum">
               <a:rPr lang="en-US" smtClean="0"/>
-              <a:t>15</a:t>
+              <a:t>16</a:t>
             </a:fld>
             <a:endParaRPr lang="en-US"/>
           </a:p>
@@ -1442,7 +1552,7 @@
 </p:notes>
 </file>
 
-<file path=ppt/notesSlides/notesSlide15.xml><?xml version="1.0" encoding="utf-8"?>
+<file path=ppt/notesSlides/notesSlide16.xml><?xml version="1.0" encoding="utf-8"?>
 <p:notes xmlns:a="http://schemas.openxmlformats.org/drawingml/2006/main" xmlns:r="http://schemas.openxmlformats.org/officeDocument/2006/relationships" xmlns:p="http://schemas.openxmlformats.org/presentationml/2006/main">
   <p:cSld>
     <p:spTree>
@@ -1534,7 +1644,7 @@
           <a:p>
             <a:fld id="{343B951A-A665-1949-AEDB-B62DC9BE7F13}" type="slidenum">
               <a:rPr lang="en-US" smtClean="0"/>
-              <a:t>16</a:t>
+              <a:t>17</a:t>
             </a:fld>
             <a:endParaRPr lang="en-US"/>
           </a:p>
@@ -1553,7 +1663,7 @@
 </p:notes>
 </file>
 
-<file path=ppt/notesSlides/notesSlide16.xml><?xml version="1.0" encoding="utf-8"?>
+<file path=ppt/notesSlides/notesSlide17.xml><?xml version="1.0" encoding="utf-8"?>
 <p:notes xmlns:a="http://schemas.openxmlformats.org/drawingml/2006/main" xmlns:r="http://schemas.openxmlformats.org/officeDocument/2006/relationships" xmlns:p="http://schemas.openxmlformats.org/presentationml/2006/main">
   <p:cSld>
     <p:spTree>
@@ -1642,7 +1752,7 @@
           <a:p>
             <a:fld id="{343B951A-A665-1949-AEDB-B62DC9BE7F13}" type="slidenum">
               <a:rPr lang="en-US" smtClean="0"/>
-              <a:t>17</a:t>
+              <a:t>18</a:t>
             </a:fld>
             <a:endParaRPr lang="en-US"/>
           </a:p>
@@ -1661,7 +1771,7 @@
 </p:notes>
 </file>
 
-<file path=ppt/notesSlides/notesSlide17.xml><?xml version="1.0" encoding="utf-8"?>
+<file path=ppt/notesSlides/notesSlide18.xml><?xml version="1.0" encoding="utf-8"?>
 <p:notes xmlns:a="http://schemas.openxmlformats.org/drawingml/2006/main" xmlns:r="http://schemas.openxmlformats.org/officeDocument/2006/relationships" xmlns:p="http://schemas.openxmlformats.org/presentationml/2006/main">
   <p:cSld>
     <p:spTree>
@@ -1871,7 +1981,7 @@
           <a:p>
             <a:fld id="{343B951A-A665-1949-AEDB-B62DC9BE7F13}" type="slidenum">
               <a:rPr lang="en-US" smtClean="0"/>
-              <a:t>18</a:t>
+              <a:t>19</a:t>
             </a:fld>
             <a:endParaRPr lang="en-US"/>
           </a:p>
@@ -1890,7 +2000,7 @@
 </p:notes>
 </file>
 
-<file path=ppt/notesSlides/notesSlide18.xml><?xml version="1.0" encoding="utf-8"?>
+<file path=ppt/notesSlides/notesSlide19.xml><?xml version="1.0" encoding="utf-8"?>
 <p:notes xmlns:a="http://schemas.openxmlformats.org/drawingml/2006/main" xmlns:r="http://schemas.openxmlformats.org/officeDocument/2006/relationships" xmlns:p="http://schemas.openxmlformats.org/presentationml/2006/main">
   <p:cSld>
     <p:spTree>
@@ -2100,7 +2210,7 @@
           <a:p>
             <a:fld id="{343B951A-A665-1949-AEDB-B62DC9BE7F13}" type="slidenum">
               <a:rPr lang="en-US" smtClean="0"/>
-              <a:t>19</a:t>
+              <a:t>20</a:t>
             </a:fld>
             <a:endParaRPr lang="en-US"/>
           </a:p>
@@ -2110,235 +2220,6 @@
     <p:extLst>
       <p:ext uri="{BB962C8B-B14F-4D97-AF65-F5344CB8AC3E}">
         <p14:creationId xmlns:p14="http://schemas.microsoft.com/office/powerpoint/2010/main" val="4064672705"/>
-      </p:ext>
-    </p:extLst>
-  </p:cSld>
-  <p:clrMapOvr>
-    <a:masterClrMapping/>
-  </p:clrMapOvr>
-</p:notes>
-</file>
-
-<file path=ppt/notesSlides/notesSlide19.xml><?xml version="1.0" encoding="utf-8"?>
-<p:notes xmlns:a="http://schemas.openxmlformats.org/drawingml/2006/main" xmlns:r="http://schemas.openxmlformats.org/officeDocument/2006/relationships" xmlns:p="http://schemas.openxmlformats.org/presentationml/2006/main">
-  <p:cSld>
-    <p:spTree>
-      <p:nvGrpSpPr>
-        <p:cNvPr id="1" name="">
-          <a:extLst>
-            <a:ext uri="{FF2B5EF4-FFF2-40B4-BE49-F238E27FC236}">
-              <a16:creationId xmlns:a16="http://schemas.microsoft.com/office/drawing/2014/main" id="{800314F9-687A-26E3-46FB-0F6A9C8209F5}"/>
-            </a:ext>
-          </a:extLst>
-        </p:cNvPr>
-        <p:cNvGrpSpPr/>
-        <p:nvPr/>
-      </p:nvGrpSpPr>
-      <p:grpSpPr>
-        <a:xfrm>
-          <a:off x="0" y="0"/>
-          <a:ext cx="0" cy="0"/>
-          <a:chOff x="0" y="0"/>
-          <a:chExt cx="0" cy="0"/>
-        </a:xfrm>
-      </p:grpSpPr>
-      <p:sp>
-        <p:nvSpPr>
-          <p:cNvPr id="2" name="Slide Image Placeholder 1">
-            <a:extLst>
-              <a:ext uri="{FF2B5EF4-FFF2-40B4-BE49-F238E27FC236}">
-                <a16:creationId xmlns:a16="http://schemas.microsoft.com/office/drawing/2014/main" id="{D0B7694F-315A-AA87-E03F-7F8A887DB4FA}"/>
-              </a:ext>
-            </a:extLst>
-          </p:cNvPr>
-          <p:cNvSpPr>
-            <a:spLocks noGrp="1" noRot="1" noChangeAspect="1"/>
-          </p:cNvSpPr>
-          <p:nvPr>
-            <p:ph type="sldImg"/>
-          </p:nvPr>
-        </p:nvSpPr>
-        <p:spPr/>
-      </p:sp>
-      <p:sp>
-        <p:nvSpPr>
-          <p:cNvPr id="3" name="Notes Placeholder 2">
-            <a:extLst>
-              <a:ext uri="{FF2B5EF4-FFF2-40B4-BE49-F238E27FC236}">
-                <a16:creationId xmlns:a16="http://schemas.microsoft.com/office/drawing/2014/main" id="{A08D9040-B72E-3E51-7C90-30138103B945}"/>
-              </a:ext>
-            </a:extLst>
-          </p:cNvPr>
-          <p:cNvSpPr>
-            <a:spLocks noGrp="1"/>
-          </p:cNvSpPr>
-          <p:nvPr>
-            <p:ph type="body" idx="1"/>
-          </p:nvPr>
-        </p:nvSpPr>
-        <p:spPr/>
-        <p:txBody>
-          <a:bodyPr/>
-          <a:lstStyle/>
-          <a:p>
-            <a:pPr algn="l"/>
-            <a:r>
-              <a:rPr lang="en-US" dirty="0" err="1"/>
-              <a:t>Instaliranje</a:t>
-            </a:r>
-            <a:r>
-              <a:rPr lang="en-US" dirty="0"/>
-              <a:t> u local</a:t>
-            </a:r>
-            <a:br>
-              <a:rPr lang="en-US" dirty="0"/>
-            </a:br>
-            <a:br>
-              <a:rPr lang="en-US" dirty="0"/>
-            </a:br>
-            <a:r>
-              <a:rPr lang="en-US" b="1" i="0" dirty="0">
-                <a:solidFill>
-                  <a:srgbClr val="303141"/>
-                </a:solidFill>
-                <a:effectLst/>
-                <a:latin typeface="Udemy Sans"/>
-              </a:rPr>
-              <a:t>1. Windows Users:</a:t>
-            </a:r>
-            <a:r>
-              <a:rPr lang="en-US" b="0" i="0" dirty="0">
-                <a:solidFill>
-                  <a:srgbClr val="303141"/>
-                </a:solidFill>
-                <a:effectLst/>
-                <a:latin typeface="Udemy Sans"/>
-              </a:rPr>
-              <a:t> Download the Postgres Installer here:</a:t>
-            </a:r>
-          </a:p>
-          <a:p>
-            <a:pPr algn="l"/>
-            <a:r>
-              <a:rPr lang="en-US" b="0" i="0" dirty="0">
-                <a:solidFill>
-                  <a:srgbClr val="6D28D2"/>
-                </a:solidFill>
-                <a:effectLst/>
-                <a:latin typeface="Udemy Sans"/>
-                <a:hlinkClick r:id="rId3"/>
-              </a:rPr>
-              <a:t>https://sbp.enterprisedb.com/getfile.jsp?fileid=1258649</a:t>
-            </a:r>
-            <a:endParaRPr lang="en-US" b="0" i="0" dirty="0">
-              <a:solidFill>
-                <a:srgbClr val="303141"/>
-              </a:solidFill>
-              <a:effectLst/>
-              <a:latin typeface="Udemy Sans"/>
-            </a:endParaRPr>
-          </a:p>
-          <a:p>
-            <a:pPr algn="l"/>
-            <a:br>
-              <a:rPr lang="en-US" b="0" i="0" dirty="0">
-                <a:solidFill>
-                  <a:srgbClr val="303141"/>
-                </a:solidFill>
-                <a:effectLst/>
-                <a:latin typeface="Udemy Sans"/>
-              </a:rPr>
-            </a:br>
-            <a:endParaRPr lang="en-US" b="0" i="0" dirty="0">
-              <a:solidFill>
-                <a:srgbClr val="303141"/>
-              </a:solidFill>
-              <a:effectLst/>
-              <a:latin typeface="Udemy Sans"/>
-            </a:endParaRPr>
-          </a:p>
-          <a:p>
-            <a:pPr algn="l"/>
-            <a:r>
-              <a:rPr lang="en-US" b="1" i="0" dirty="0">
-                <a:solidFill>
-                  <a:srgbClr val="303141"/>
-                </a:solidFill>
-                <a:effectLst/>
-                <a:latin typeface="Udemy Sans"/>
-              </a:rPr>
-              <a:t>1. Mac Users:</a:t>
-            </a:r>
-            <a:r>
-              <a:rPr lang="en-US" b="0" i="0" dirty="0">
-                <a:solidFill>
-                  <a:srgbClr val="303141"/>
-                </a:solidFill>
-                <a:effectLst/>
-                <a:latin typeface="Udemy Sans"/>
-              </a:rPr>
-              <a:t> Download the Postgres Installer here:</a:t>
-            </a:r>
-          </a:p>
-          <a:p>
-            <a:pPr algn="l"/>
-            <a:r>
-              <a:rPr lang="en-US" b="0" i="0" dirty="0">
-                <a:solidFill>
-                  <a:srgbClr val="6D28D2"/>
-                </a:solidFill>
-                <a:effectLst/>
-                <a:latin typeface="Udemy Sans"/>
-                <a:hlinkClick r:id="rId4"/>
-              </a:rPr>
-              <a:t>https://sbp.enterprisedb.com/getfile.jsp?fileid=1258653</a:t>
-            </a:r>
-            <a:endParaRPr lang="en-US" b="0" i="0" dirty="0">
-              <a:solidFill>
-                <a:srgbClr val="303141"/>
-              </a:solidFill>
-              <a:effectLst/>
-              <a:latin typeface="Udemy Sans"/>
-            </a:endParaRPr>
-          </a:p>
-          <a:p>
-            <a:endParaRPr lang="hr-HR" dirty="0"/>
-          </a:p>
-        </p:txBody>
-      </p:sp>
-      <p:sp>
-        <p:nvSpPr>
-          <p:cNvPr id="4" name="Slide Number Placeholder 3">
-            <a:extLst>
-              <a:ext uri="{FF2B5EF4-FFF2-40B4-BE49-F238E27FC236}">
-                <a16:creationId xmlns:a16="http://schemas.microsoft.com/office/drawing/2014/main" id="{FD3F1963-731E-E215-23A3-7D9756D6C7B2}"/>
-              </a:ext>
-            </a:extLst>
-          </p:cNvPr>
-          <p:cNvSpPr>
-            <a:spLocks noGrp="1"/>
-          </p:cNvSpPr>
-          <p:nvPr>
-            <p:ph type="sldNum" sz="quarter" idx="5"/>
-          </p:nvPr>
-        </p:nvSpPr>
-        <p:spPr/>
-        <p:txBody>
-          <a:bodyPr/>
-          <a:lstStyle/>
-          <a:p>
-            <a:fld id="{343B951A-A665-1949-AEDB-B62DC9BE7F13}" type="slidenum">
-              <a:rPr lang="en-US" smtClean="0"/>
-              <a:t>20</a:t>
-            </a:fld>
-            <a:endParaRPr lang="en-US"/>
-          </a:p>
-        </p:txBody>
-      </p:sp>
-    </p:spTree>
-    <p:extLst>
-      <p:ext uri="{BB962C8B-B14F-4D97-AF65-F5344CB8AC3E}">
-        <p14:creationId xmlns:p14="http://schemas.microsoft.com/office/powerpoint/2010/main" val="146644264"/>
       </p:ext>
     </p:extLst>
   </p:cSld>
@@ -2464,6 +2345,235 @@
         <p:cNvPr id="1" name="">
           <a:extLst>
             <a:ext uri="{FF2B5EF4-FFF2-40B4-BE49-F238E27FC236}">
+              <a16:creationId xmlns:a16="http://schemas.microsoft.com/office/drawing/2014/main" id="{800314F9-687A-26E3-46FB-0F6A9C8209F5}"/>
+            </a:ext>
+          </a:extLst>
+        </p:cNvPr>
+        <p:cNvGrpSpPr/>
+        <p:nvPr/>
+      </p:nvGrpSpPr>
+      <p:grpSpPr>
+        <a:xfrm>
+          <a:off x="0" y="0"/>
+          <a:ext cx="0" cy="0"/>
+          <a:chOff x="0" y="0"/>
+          <a:chExt cx="0" cy="0"/>
+        </a:xfrm>
+      </p:grpSpPr>
+      <p:sp>
+        <p:nvSpPr>
+          <p:cNvPr id="2" name="Slide Image Placeholder 1">
+            <a:extLst>
+              <a:ext uri="{FF2B5EF4-FFF2-40B4-BE49-F238E27FC236}">
+                <a16:creationId xmlns:a16="http://schemas.microsoft.com/office/drawing/2014/main" id="{D0B7694F-315A-AA87-E03F-7F8A887DB4FA}"/>
+              </a:ext>
+            </a:extLst>
+          </p:cNvPr>
+          <p:cNvSpPr>
+            <a:spLocks noGrp="1" noRot="1" noChangeAspect="1"/>
+          </p:cNvSpPr>
+          <p:nvPr>
+            <p:ph type="sldImg"/>
+          </p:nvPr>
+        </p:nvSpPr>
+        <p:spPr/>
+      </p:sp>
+      <p:sp>
+        <p:nvSpPr>
+          <p:cNvPr id="3" name="Notes Placeholder 2">
+            <a:extLst>
+              <a:ext uri="{FF2B5EF4-FFF2-40B4-BE49-F238E27FC236}">
+                <a16:creationId xmlns:a16="http://schemas.microsoft.com/office/drawing/2014/main" id="{A08D9040-B72E-3E51-7C90-30138103B945}"/>
+              </a:ext>
+            </a:extLst>
+          </p:cNvPr>
+          <p:cNvSpPr>
+            <a:spLocks noGrp="1"/>
+          </p:cNvSpPr>
+          <p:nvPr>
+            <p:ph type="body" idx="1"/>
+          </p:nvPr>
+        </p:nvSpPr>
+        <p:spPr/>
+        <p:txBody>
+          <a:bodyPr/>
+          <a:lstStyle/>
+          <a:p>
+            <a:pPr algn="l"/>
+            <a:r>
+              <a:rPr lang="en-US" dirty="0" err="1"/>
+              <a:t>Instaliranje</a:t>
+            </a:r>
+            <a:r>
+              <a:rPr lang="en-US" dirty="0"/>
+              <a:t> u local</a:t>
+            </a:r>
+            <a:br>
+              <a:rPr lang="en-US" dirty="0"/>
+            </a:br>
+            <a:br>
+              <a:rPr lang="en-US" dirty="0"/>
+            </a:br>
+            <a:r>
+              <a:rPr lang="en-US" b="1" i="0" dirty="0">
+                <a:solidFill>
+                  <a:srgbClr val="303141"/>
+                </a:solidFill>
+                <a:effectLst/>
+                <a:latin typeface="Udemy Sans"/>
+              </a:rPr>
+              <a:t>1. Windows Users:</a:t>
+            </a:r>
+            <a:r>
+              <a:rPr lang="en-US" b="0" i="0" dirty="0">
+                <a:solidFill>
+                  <a:srgbClr val="303141"/>
+                </a:solidFill>
+                <a:effectLst/>
+                <a:latin typeface="Udemy Sans"/>
+              </a:rPr>
+              <a:t> Download the Postgres Installer here:</a:t>
+            </a:r>
+          </a:p>
+          <a:p>
+            <a:pPr algn="l"/>
+            <a:r>
+              <a:rPr lang="en-US" b="0" i="0" dirty="0">
+                <a:solidFill>
+                  <a:srgbClr val="6D28D2"/>
+                </a:solidFill>
+                <a:effectLst/>
+                <a:latin typeface="Udemy Sans"/>
+                <a:hlinkClick r:id="rId3"/>
+              </a:rPr>
+              <a:t>https://sbp.enterprisedb.com/getfile.jsp?fileid=1258649</a:t>
+            </a:r>
+            <a:endParaRPr lang="en-US" b="0" i="0" dirty="0">
+              <a:solidFill>
+                <a:srgbClr val="303141"/>
+              </a:solidFill>
+              <a:effectLst/>
+              <a:latin typeface="Udemy Sans"/>
+            </a:endParaRPr>
+          </a:p>
+          <a:p>
+            <a:pPr algn="l"/>
+            <a:br>
+              <a:rPr lang="en-US" b="0" i="0" dirty="0">
+                <a:solidFill>
+                  <a:srgbClr val="303141"/>
+                </a:solidFill>
+                <a:effectLst/>
+                <a:latin typeface="Udemy Sans"/>
+              </a:rPr>
+            </a:br>
+            <a:endParaRPr lang="en-US" b="0" i="0" dirty="0">
+              <a:solidFill>
+                <a:srgbClr val="303141"/>
+              </a:solidFill>
+              <a:effectLst/>
+              <a:latin typeface="Udemy Sans"/>
+            </a:endParaRPr>
+          </a:p>
+          <a:p>
+            <a:pPr algn="l"/>
+            <a:r>
+              <a:rPr lang="en-US" b="1" i="0" dirty="0">
+                <a:solidFill>
+                  <a:srgbClr val="303141"/>
+                </a:solidFill>
+                <a:effectLst/>
+                <a:latin typeface="Udemy Sans"/>
+              </a:rPr>
+              <a:t>1. Mac Users:</a:t>
+            </a:r>
+            <a:r>
+              <a:rPr lang="en-US" b="0" i="0" dirty="0">
+                <a:solidFill>
+                  <a:srgbClr val="303141"/>
+                </a:solidFill>
+                <a:effectLst/>
+                <a:latin typeface="Udemy Sans"/>
+              </a:rPr>
+              <a:t> Download the Postgres Installer here:</a:t>
+            </a:r>
+          </a:p>
+          <a:p>
+            <a:pPr algn="l"/>
+            <a:r>
+              <a:rPr lang="en-US" b="0" i="0" dirty="0">
+                <a:solidFill>
+                  <a:srgbClr val="6D28D2"/>
+                </a:solidFill>
+                <a:effectLst/>
+                <a:latin typeface="Udemy Sans"/>
+                <a:hlinkClick r:id="rId4"/>
+              </a:rPr>
+              <a:t>https://sbp.enterprisedb.com/getfile.jsp?fileid=1258653</a:t>
+            </a:r>
+            <a:endParaRPr lang="en-US" b="0" i="0" dirty="0">
+              <a:solidFill>
+                <a:srgbClr val="303141"/>
+              </a:solidFill>
+              <a:effectLst/>
+              <a:latin typeface="Udemy Sans"/>
+            </a:endParaRPr>
+          </a:p>
+          <a:p>
+            <a:endParaRPr lang="hr-HR" dirty="0"/>
+          </a:p>
+        </p:txBody>
+      </p:sp>
+      <p:sp>
+        <p:nvSpPr>
+          <p:cNvPr id="4" name="Slide Number Placeholder 3">
+            <a:extLst>
+              <a:ext uri="{FF2B5EF4-FFF2-40B4-BE49-F238E27FC236}">
+                <a16:creationId xmlns:a16="http://schemas.microsoft.com/office/drawing/2014/main" id="{FD3F1963-731E-E215-23A3-7D9756D6C7B2}"/>
+              </a:ext>
+            </a:extLst>
+          </p:cNvPr>
+          <p:cNvSpPr>
+            <a:spLocks noGrp="1"/>
+          </p:cNvSpPr>
+          <p:nvPr>
+            <p:ph type="sldNum" sz="quarter" idx="5"/>
+          </p:nvPr>
+        </p:nvSpPr>
+        <p:spPr/>
+        <p:txBody>
+          <a:bodyPr/>
+          <a:lstStyle/>
+          <a:p>
+            <a:fld id="{343B951A-A665-1949-AEDB-B62DC9BE7F13}" type="slidenum">
+              <a:rPr lang="en-US" smtClean="0"/>
+              <a:t>21</a:t>
+            </a:fld>
+            <a:endParaRPr lang="en-US"/>
+          </a:p>
+        </p:txBody>
+      </p:sp>
+    </p:spTree>
+    <p:extLst>
+      <p:ext uri="{BB962C8B-B14F-4D97-AF65-F5344CB8AC3E}">
+        <p14:creationId xmlns:p14="http://schemas.microsoft.com/office/powerpoint/2010/main" val="146644264"/>
+      </p:ext>
+    </p:extLst>
+  </p:cSld>
+  <p:clrMapOvr>
+    <a:masterClrMapping/>
+  </p:clrMapOvr>
+</p:notes>
+</file>
+
+<file path=ppt/notesSlides/notesSlide21.xml><?xml version="1.0" encoding="utf-8"?>
+<p:notes xmlns:a="http://schemas.openxmlformats.org/drawingml/2006/main" xmlns:r="http://schemas.openxmlformats.org/officeDocument/2006/relationships" xmlns:p="http://schemas.openxmlformats.org/presentationml/2006/main">
+  <p:cSld>
+    <p:spTree>
+      <p:nvGrpSpPr>
+        <p:cNvPr id="1" name="">
+          <a:extLst>
+            <a:ext uri="{FF2B5EF4-FFF2-40B4-BE49-F238E27FC236}">
               <a16:creationId xmlns:a16="http://schemas.microsoft.com/office/drawing/2014/main" id="{4BF708B8-4F09-6A2B-ECAD-BB98F316CF2D}"/>
             </a:ext>
           </a:extLst>
@@ -2548,7 +2658,7 @@
           <a:p>
             <a:fld id="{343B951A-A665-1949-AEDB-B62DC9BE7F13}" type="slidenum">
               <a:rPr lang="en-US" smtClean="0"/>
-              <a:t>21</a:t>
+              <a:t>22</a:t>
             </a:fld>
             <a:endParaRPr lang="en-US"/>
           </a:p>
@@ -2567,7 +2677,7 @@
 </p:notes>
 </file>
 
-<file path=ppt/notesSlides/notesSlide21.xml><?xml version="1.0" encoding="utf-8"?>
+<file path=ppt/notesSlides/notesSlide22.xml><?xml version="1.0" encoding="utf-8"?>
 <p:notes xmlns:a="http://schemas.openxmlformats.org/drawingml/2006/main" xmlns:r="http://schemas.openxmlformats.org/officeDocument/2006/relationships" xmlns:p="http://schemas.openxmlformats.org/presentationml/2006/main">
   <p:cSld>
     <p:spTree>
@@ -2777,7 +2887,7 @@
           <a:p>
             <a:fld id="{343B951A-A665-1949-AEDB-B62DC9BE7F13}" type="slidenum">
               <a:rPr lang="en-US" smtClean="0"/>
-              <a:t>22</a:t>
+              <a:t>23</a:t>
             </a:fld>
             <a:endParaRPr lang="en-US"/>
           </a:p>
@@ -2796,7 +2906,7 @@
 </p:notes>
 </file>
 
-<file path=ppt/notesSlides/notesSlide22.xml><?xml version="1.0" encoding="utf-8"?>
+<file path=ppt/notesSlides/notesSlide23.xml><?xml version="1.0" encoding="utf-8"?>
 <p:notes xmlns:a="http://schemas.openxmlformats.org/drawingml/2006/main" xmlns:r="http://schemas.openxmlformats.org/officeDocument/2006/relationships" xmlns:p="http://schemas.openxmlformats.org/presentationml/2006/main">
   <p:cSld>
     <p:spTree>
@@ -3006,7 +3116,7 @@
           <a:p>
             <a:fld id="{343B951A-A665-1949-AEDB-B62DC9BE7F13}" type="slidenum">
               <a:rPr lang="en-US" smtClean="0"/>
-              <a:t>23</a:t>
+              <a:t>24</a:t>
             </a:fld>
             <a:endParaRPr lang="en-US"/>
           </a:p>
@@ -3025,7 +3135,7 @@
 </p:notes>
 </file>
 
-<file path=ppt/notesSlides/notesSlide23.xml><?xml version="1.0" encoding="utf-8"?>
+<file path=ppt/notesSlides/notesSlide24.xml><?xml version="1.0" encoding="utf-8"?>
 <p:notes xmlns:a="http://schemas.openxmlformats.org/drawingml/2006/main" xmlns:r="http://schemas.openxmlformats.org/officeDocument/2006/relationships" xmlns:p="http://schemas.openxmlformats.org/presentationml/2006/main">
   <p:cSld>
     <p:spTree>
@@ -3137,7 +3247,7 @@
           <a:p>
             <a:fld id="{343B951A-A665-1949-AEDB-B62DC9BE7F13}" type="slidenum">
               <a:rPr lang="en-US" smtClean="0"/>
-              <a:t>24</a:t>
+              <a:t>25</a:t>
             </a:fld>
             <a:endParaRPr lang="en-US"/>
           </a:p>
@@ -3156,7 +3266,7 @@
 </p:notes>
 </file>
 
-<file path=ppt/notesSlides/notesSlide24.xml><?xml version="1.0" encoding="utf-8"?>
+<file path=ppt/notesSlides/notesSlide25.xml><?xml version="1.0" encoding="utf-8"?>
 <p:notes xmlns:a="http://schemas.openxmlformats.org/drawingml/2006/main" xmlns:r="http://schemas.openxmlformats.org/officeDocument/2006/relationships" xmlns:p="http://schemas.openxmlformats.org/presentationml/2006/main">
   <p:cSld>
     <p:spTree>
@@ -3366,7 +3476,7 @@
           <a:p>
             <a:fld id="{343B951A-A665-1949-AEDB-B62DC9BE7F13}" type="slidenum">
               <a:rPr lang="en-US" smtClean="0"/>
-              <a:t>25</a:t>
+              <a:t>26</a:t>
             </a:fld>
             <a:endParaRPr lang="en-US"/>
           </a:p>
@@ -3385,7 +3495,7 @@
 </p:notes>
 </file>
 
-<file path=ppt/notesSlides/notesSlide25.xml><?xml version="1.0" encoding="utf-8"?>
+<file path=ppt/notesSlides/notesSlide26.xml><?xml version="1.0" encoding="utf-8"?>
 <p:notes xmlns:a="http://schemas.openxmlformats.org/drawingml/2006/main" xmlns:r="http://schemas.openxmlformats.org/officeDocument/2006/relationships" xmlns:p="http://schemas.openxmlformats.org/presentationml/2006/main">
   <p:cSld>
     <p:spTree>
@@ -3595,7 +3705,7 @@
           <a:p>
             <a:fld id="{343B951A-A665-1949-AEDB-B62DC9BE7F13}" type="slidenum">
               <a:rPr lang="en-US" smtClean="0"/>
-              <a:t>26</a:t>
+              <a:t>27</a:t>
             </a:fld>
             <a:endParaRPr lang="en-US"/>
           </a:p>
@@ -3614,7 +3724,7 @@
 </p:notes>
 </file>
 
-<file path=ppt/notesSlides/notesSlide26.xml><?xml version="1.0" encoding="utf-8"?>
+<file path=ppt/notesSlides/notesSlide27.xml><?xml version="1.0" encoding="utf-8"?>
 <p:notes xmlns:a="http://schemas.openxmlformats.org/drawingml/2006/main" xmlns:r="http://schemas.openxmlformats.org/officeDocument/2006/relationships" xmlns:p="http://schemas.openxmlformats.org/presentationml/2006/main">
   <p:cSld>
     <p:spTree>
@@ -3824,7 +3934,7 @@
           <a:p>
             <a:fld id="{343B951A-A665-1949-AEDB-B62DC9BE7F13}" type="slidenum">
               <a:rPr lang="en-US" smtClean="0"/>
-              <a:t>27</a:t>
+              <a:t>28</a:t>
             </a:fld>
             <a:endParaRPr lang="en-US"/>
           </a:p>
@@ -3843,7 +3953,7 @@
 </p:notes>
 </file>
 
-<file path=ppt/notesSlides/notesSlide27.xml><?xml version="1.0" encoding="utf-8"?>
+<file path=ppt/notesSlides/notesSlide28.xml><?xml version="1.0" encoding="utf-8"?>
 <p:notes xmlns:a="http://schemas.openxmlformats.org/drawingml/2006/main" xmlns:r="http://schemas.openxmlformats.org/officeDocument/2006/relationships" xmlns:p="http://schemas.openxmlformats.org/presentationml/2006/main">
   <p:cSld>
     <p:spTree>
@@ -3851,7 +3961,7 @@
         <p:cNvPr id="1" name="">
           <a:extLst>
             <a:ext uri="{FF2B5EF4-FFF2-40B4-BE49-F238E27FC236}">
-              <a16:creationId xmlns:a16="http://schemas.microsoft.com/office/drawing/2014/main" id="{720A8F65-A6BD-2CF2-9740-9100D5D8CDA5}"/>
+              <a16:creationId xmlns:a16="http://schemas.microsoft.com/office/drawing/2014/main" id="{83FF7113-FCCB-F4E6-4BF7-A7289124EFD9}"/>
             </a:ext>
           </a:extLst>
         </p:cNvPr>
@@ -3871,7 +3981,7 @@
           <p:cNvPr id="2" name="Slide Image Placeholder 1">
             <a:extLst>
               <a:ext uri="{FF2B5EF4-FFF2-40B4-BE49-F238E27FC236}">
-                <a16:creationId xmlns:a16="http://schemas.microsoft.com/office/drawing/2014/main" id="{4A32F345-C10E-3F25-FCB8-8FF90CCAFE14}"/>
+                <a16:creationId xmlns:a16="http://schemas.microsoft.com/office/drawing/2014/main" id="{C58F8676-C1F1-C48B-B38D-C208BA63B5D9}"/>
               </a:ext>
             </a:extLst>
           </p:cNvPr>
@@ -3889,7 +3999,7 @@
           <p:cNvPr id="3" name="Notes Placeholder 2">
             <a:extLst>
               <a:ext uri="{FF2B5EF4-FFF2-40B4-BE49-F238E27FC236}">
-                <a16:creationId xmlns:a16="http://schemas.microsoft.com/office/drawing/2014/main" id="{71024809-572B-B34B-18B8-9FDE1A6CD579}"/>
+                <a16:creationId xmlns:a16="http://schemas.microsoft.com/office/drawing/2014/main" id="{23F5B8E5-1735-0C02-9064-C25B5E34E2CB}"/>
               </a:ext>
             </a:extLst>
           </p:cNvPr>
@@ -4035,7 +4145,7 @@
           <p:cNvPr id="4" name="Slide Number Placeholder 3">
             <a:extLst>
               <a:ext uri="{FF2B5EF4-FFF2-40B4-BE49-F238E27FC236}">
-                <a16:creationId xmlns:a16="http://schemas.microsoft.com/office/drawing/2014/main" id="{77350998-62B7-77DB-9780-3E3DE72EA528}"/>
+                <a16:creationId xmlns:a16="http://schemas.microsoft.com/office/drawing/2014/main" id="{B9FDEC84-BD65-376C-F99B-3E6E68EE843E}"/>
               </a:ext>
             </a:extLst>
           </p:cNvPr>
@@ -4053,7 +4163,7 @@
           <a:p>
             <a:fld id="{343B951A-A665-1949-AEDB-B62DC9BE7F13}" type="slidenum">
               <a:rPr lang="en-US" smtClean="0"/>
-              <a:t>28</a:t>
+              <a:t>29</a:t>
             </a:fld>
             <a:endParaRPr lang="en-US"/>
           </a:p>
@@ -4062,7 +4172,7 @@
     </p:spTree>
     <p:extLst>
       <p:ext uri="{BB962C8B-B14F-4D97-AF65-F5344CB8AC3E}">
-        <p14:creationId xmlns:p14="http://schemas.microsoft.com/office/powerpoint/2010/main" val="1346560804"/>
+        <p14:creationId xmlns:p14="http://schemas.microsoft.com/office/powerpoint/2010/main" val="1176537158"/>
       </p:ext>
     </p:extLst>
   </p:cSld>
@@ -4072,7 +4182,7 @@
 </p:notes>
 </file>
 
-<file path=ppt/notesSlides/notesSlide28.xml><?xml version="1.0" encoding="utf-8"?>
+<file path=ppt/notesSlides/notesSlide29.xml><?xml version="1.0" encoding="utf-8"?>
 <p:notes xmlns:a="http://schemas.openxmlformats.org/drawingml/2006/main" xmlns:r="http://schemas.openxmlformats.org/officeDocument/2006/relationships" xmlns:p="http://schemas.openxmlformats.org/presentationml/2006/main">
   <p:cSld>
     <p:spTree>
@@ -4164,7 +4274,7 @@
           <a:p>
             <a:fld id="{343B951A-A665-1949-AEDB-B62DC9BE7F13}" type="slidenum">
               <a:rPr lang="en-US" smtClean="0"/>
-              <a:t>29</a:t>
+              <a:t>30</a:t>
             </a:fld>
             <a:endParaRPr lang="en-US"/>
           </a:p>
@@ -4174,117 +4284,6 @@
     <p:extLst>
       <p:ext uri="{BB962C8B-B14F-4D97-AF65-F5344CB8AC3E}">
         <p14:creationId xmlns:p14="http://schemas.microsoft.com/office/powerpoint/2010/main" val="306905185"/>
-      </p:ext>
-    </p:extLst>
-  </p:cSld>
-  <p:clrMapOvr>
-    <a:masterClrMapping/>
-  </p:clrMapOvr>
-</p:notes>
-</file>
-
-<file path=ppt/notesSlides/notesSlide29.xml><?xml version="1.0" encoding="utf-8"?>
-<p:notes xmlns:a="http://schemas.openxmlformats.org/drawingml/2006/main" xmlns:r="http://schemas.openxmlformats.org/officeDocument/2006/relationships" xmlns:p="http://schemas.openxmlformats.org/presentationml/2006/main">
-  <p:cSld>
-    <p:spTree>
-      <p:nvGrpSpPr>
-        <p:cNvPr id="1" name="">
-          <a:extLst>
-            <a:ext uri="{FF2B5EF4-FFF2-40B4-BE49-F238E27FC236}">
-              <a16:creationId xmlns:a16="http://schemas.microsoft.com/office/drawing/2014/main" id="{63D0BDE0-FEB3-F697-BE18-9C0C72A0A691}"/>
-            </a:ext>
-          </a:extLst>
-        </p:cNvPr>
-        <p:cNvGrpSpPr/>
-        <p:nvPr/>
-      </p:nvGrpSpPr>
-      <p:grpSpPr>
-        <a:xfrm>
-          <a:off x="0" y="0"/>
-          <a:ext cx="0" cy="0"/>
-          <a:chOff x="0" y="0"/>
-          <a:chExt cx="0" cy="0"/>
-        </a:xfrm>
-      </p:grpSpPr>
-      <p:sp>
-        <p:nvSpPr>
-          <p:cNvPr id="2" name="Slide Image Placeholder 1">
-            <a:extLst>
-              <a:ext uri="{FF2B5EF4-FFF2-40B4-BE49-F238E27FC236}">
-                <a16:creationId xmlns:a16="http://schemas.microsoft.com/office/drawing/2014/main" id="{FC9BD1F2-11C7-A903-6D71-5383BC43CE76}"/>
-              </a:ext>
-            </a:extLst>
-          </p:cNvPr>
-          <p:cNvSpPr>
-            <a:spLocks noGrp="1" noRot="1" noChangeAspect="1"/>
-          </p:cNvSpPr>
-          <p:nvPr>
-            <p:ph type="sldImg"/>
-          </p:nvPr>
-        </p:nvSpPr>
-        <p:spPr/>
-      </p:sp>
-      <p:sp>
-        <p:nvSpPr>
-          <p:cNvPr id="3" name="Notes Placeholder 2">
-            <a:extLst>
-              <a:ext uri="{FF2B5EF4-FFF2-40B4-BE49-F238E27FC236}">
-                <a16:creationId xmlns:a16="http://schemas.microsoft.com/office/drawing/2014/main" id="{0117F5DE-8252-DA09-32D2-CD7F47C36143}"/>
-              </a:ext>
-            </a:extLst>
-          </p:cNvPr>
-          <p:cNvSpPr>
-            <a:spLocks noGrp="1"/>
-          </p:cNvSpPr>
-          <p:nvPr>
-            <p:ph type="body" idx="1"/>
-          </p:nvPr>
-        </p:nvSpPr>
-        <p:spPr/>
-        <p:txBody>
-          <a:bodyPr/>
-          <a:lstStyle/>
-          <a:p>
-            <a:r>
-              <a:rPr lang="hr-HR" dirty="0"/>
-              <a:t>https://docs.google.com/document/d/1v11ex24b5KZ5C7AVHrSNdipiSX8wOAPqtwGSeYseo_g/edit?tab=t.0</a:t>
-            </a:r>
-          </a:p>
-        </p:txBody>
-      </p:sp>
-      <p:sp>
-        <p:nvSpPr>
-          <p:cNvPr id="4" name="Slide Number Placeholder 3">
-            <a:extLst>
-              <a:ext uri="{FF2B5EF4-FFF2-40B4-BE49-F238E27FC236}">
-                <a16:creationId xmlns:a16="http://schemas.microsoft.com/office/drawing/2014/main" id="{78E6D474-39EF-1D44-0DFE-53953A8EF68E}"/>
-              </a:ext>
-            </a:extLst>
-          </p:cNvPr>
-          <p:cNvSpPr>
-            <a:spLocks noGrp="1"/>
-          </p:cNvSpPr>
-          <p:nvPr>
-            <p:ph type="sldNum" sz="quarter" idx="5"/>
-          </p:nvPr>
-        </p:nvSpPr>
-        <p:spPr/>
-        <p:txBody>
-          <a:bodyPr/>
-          <a:lstStyle/>
-          <a:p>
-            <a:fld id="{343B951A-A665-1949-AEDB-B62DC9BE7F13}" type="slidenum">
-              <a:rPr lang="en-US" smtClean="0"/>
-              <a:t>30</a:t>
-            </a:fld>
-            <a:endParaRPr lang="en-US"/>
-          </a:p>
-        </p:txBody>
-      </p:sp>
-    </p:spTree>
-    <p:extLst>
-      <p:ext uri="{BB962C8B-B14F-4D97-AF65-F5344CB8AC3E}">
-        <p14:creationId xmlns:p14="http://schemas.microsoft.com/office/powerpoint/2010/main" val="896772717"/>
       </p:ext>
     </p:extLst>
   </p:cSld>
@@ -4410,6 +4409,117 @@
         <p:cNvPr id="1" name="">
           <a:extLst>
             <a:ext uri="{FF2B5EF4-FFF2-40B4-BE49-F238E27FC236}">
+              <a16:creationId xmlns:a16="http://schemas.microsoft.com/office/drawing/2014/main" id="{63D0BDE0-FEB3-F697-BE18-9C0C72A0A691}"/>
+            </a:ext>
+          </a:extLst>
+        </p:cNvPr>
+        <p:cNvGrpSpPr/>
+        <p:nvPr/>
+      </p:nvGrpSpPr>
+      <p:grpSpPr>
+        <a:xfrm>
+          <a:off x="0" y="0"/>
+          <a:ext cx="0" cy="0"/>
+          <a:chOff x="0" y="0"/>
+          <a:chExt cx="0" cy="0"/>
+        </a:xfrm>
+      </p:grpSpPr>
+      <p:sp>
+        <p:nvSpPr>
+          <p:cNvPr id="2" name="Slide Image Placeholder 1">
+            <a:extLst>
+              <a:ext uri="{FF2B5EF4-FFF2-40B4-BE49-F238E27FC236}">
+                <a16:creationId xmlns:a16="http://schemas.microsoft.com/office/drawing/2014/main" id="{FC9BD1F2-11C7-A903-6D71-5383BC43CE76}"/>
+              </a:ext>
+            </a:extLst>
+          </p:cNvPr>
+          <p:cNvSpPr>
+            <a:spLocks noGrp="1" noRot="1" noChangeAspect="1"/>
+          </p:cNvSpPr>
+          <p:nvPr>
+            <p:ph type="sldImg"/>
+          </p:nvPr>
+        </p:nvSpPr>
+        <p:spPr/>
+      </p:sp>
+      <p:sp>
+        <p:nvSpPr>
+          <p:cNvPr id="3" name="Notes Placeholder 2">
+            <a:extLst>
+              <a:ext uri="{FF2B5EF4-FFF2-40B4-BE49-F238E27FC236}">
+                <a16:creationId xmlns:a16="http://schemas.microsoft.com/office/drawing/2014/main" id="{0117F5DE-8252-DA09-32D2-CD7F47C36143}"/>
+              </a:ext>
+            </a:extLst>
+          </p:cNvPr>
+          <p:cNvSpPr>
+            <a:spLocks noGrp="1"/>
+          </p:cNvSpPr>
+          <p:nvPr>
+            <p:ph type="body" idx="1"/>
+          </p:nvPr>
+        </p:nvSpPr>
+        <p:spPr/>
+        <p:txBody>
+          <a:bodyPr/>
+          <a:lstStyle/>
+          <a:p>
+            <a:r>
+              <a:rPr lang="hr-HR" dirty="0"/>
+              <a:t>https://docs.google.com/document/d/1v11ex24b5KZ5C7AVHrSNdipiSX8wOAPqtwGSeYseo_g/edit?tab=t.0</a:t>
+            </a:r>
+          </a:p>
+        </p:txBody>
+      </p:sp>
+      <p:sp>
+        <p:nvSpPr>
+          <p:cNvPr id="4" name="Slide Number Placeholder 3">
+            <a:extLst>
+              <a:ext uri="{FF2B5EF4-FFF2-40B4-BE49-F238E27FC236}">
+                <a16:creationId xmlns:a16="http://schemas.microsoft.com/office/drawing/2014/main" id="{78E6D474-39EF-1D44-0DFE-53953A8EF68E}"/>
+              </a:ext>
+            </a:extLst>
+          </p:cNvPr>
+          <p:cNvSpPr>
+            <a:spLocks noGrp="1"/>
+          </p:cNvSpPr>
+          <p:nvPr>
+            <p:ph type="sldNum" sz="quarter" idx="5"/>
+          </p:nvPr>
+        </p:nvSpPr>
+        <p:spPr/>
+        <p:txBody>
+          <a:bodyPr/>
+          <a:lstStyle/>
+          <a:p>
+            <a:fld id="{343B951A-A665-1949-AEDB-B62DC9BE7F13}" type="slidenum">
+              <a:rPr lang="en-US" smtClean="0"/>
+              <a:t>31</a:t>
+            </a:fld>
+            <a:endParaRPr lang="en-US"/>
+          </a:p>
+        </p:txBody>
+      </p:sp>
+    </p:spTree>
+    <p:extLst>
+      <p:ext uri="{BB962C8B-B14F-4D97-AF65-F5344CB8AC3E}">
+        <p14:creationId xmlns:p14="http://schemas.microsoft.com/office/powerpoint/2010/main" val="896772717"/>
+      </p:ext>
+    </p:extLst>
+  </p:cSld>
+  <p:clrMapOvr>
+    <a:masterClrMapping/>
+  </p:clrMapOvr>
+</p:notes>
+</file>
+
+<file path=ppt/notesSlides/notesSlide31.xml><?xml version="1.0" encoding="utf-8"?>
+<p:notes xmlns:a="http://schemas.openxmlformats.org/drawingml/2006/main" xmlns:r="http://schemas.openxmlformats.org/officeDocument/2006/relationships" xmlns:p="http://schemas.openxmlformats.org/presentationml/2006/main">
+  <p:cSld>
+    <p:spTree>
+      <p:nvGrpSpPr>
+        <p:cNvPr id="1" name="">
+          <a:extLst>
+            <a:ext uri="{FF2B5EF4-FFF2-40B4-BE49-F238E27FC236}">
               <a16:creationId xmlns:a16="http://schemas.microsoft.com/office/drawing/2014/main" id="{F260D398-9B40-E5EE-B0F5-2E88FA393349}"/>
             </a:ext>
           </a:extLst>
@@ -4494,7 +4604,7 @@
           <a:p>
             <a:fld id="{343B951A-A665-1949-AEDB-B62DC9BE7F13}" type="slidenum">
               <a:rPr lang="en-US" smtClean="0"/>
-              <a:t>31</a:t>
+              <a:t>32</a:t>
             </a:fld>
             <a:endParaRPr lang="en-US"/>
           </a:p>
@@ -4575,6 +4685,10 @@
           <a:bodyPr/>
           <a:lstStyle/>
           <a:p>
+            <a:r>
+              <a:rPr lang="hr-HR"/>
+              <a:t>https://www.enterprisedb.com/blog/postgres-developers-favorite-database-2024#:~:text=2024%20Stack%20Overflow%20survey%20names,year%20in%20a%20row%20%7C%20EDB</a:t>
+            </a:r>
             <a:endParaRPr lang="hr-HR" dirty="0"/>
           </a:p>
         </p:txBody>
@@ -4684,6 +4798,38 @@
           <a:lstStyle/>
           <a:p>
             <a:pPr algn="l"/>
+            <a:endParaRPr lang="en-US" b="0" i="0" dirty="0">
+              <a:solidFill>
+                <a:srgbClr val="6D28D2"/>
+              </a:solidFill>
+              <a:effectLst/>
+              <a:latin typeface="Udemy Sans"/>
+            </a:endParaRPr>
+          </a:p>
+          <a:p>
+            <a:pPr algn="l"/>
+            <a:r>
+              <a:rPr lang="en-US" b="0" i="0" dirty="0">
+                <a:solidFill>
+                  <a:srgbClr val="303141"/>
+                </a:solidFill>
+                <a:effectLst/>
+                <a:latin typeface="Udemy Sans"/>
+              </a:rPr>
+              <a:t>https://www.postgresql.org/docs/current/datatype.html</a:t>
+            </a:r>
+          </a:p>
+          <a:p>
+            <a:pPr algn="l"/>
+            <a:br>
+              <a:rPr lang="en-US" dirty="0"/>
+            </a:br>
+            <a:br>
+              <a:rPr lang="en-US" dirty="0"/>
+            </a:br>
+            <a:br>
+              <a:rPr lang="en-US" dirty="0"/>
+            </a:br>
             <a:r>
               <a:rPr lang="en-US" dirty="0" err="1"/>
               <a:t>Instaliranje</a:t>
@@ -4812,29 +4958,6 @@
               <a:effectLst/>
               <a:latin typeface="Udemy Sans"/>
             </a:endParaRPr>
-          </a:p>
-          <a:p>
-            <a:pPr algn="l"/>
-            <a:endParaRPr lang="en-US" b="0" i="0" dirty="0">
-              <a:solidFill>
-                <a:srgbClr val="6D28D2"/>
-              </a:solidFill>
-              <a:effectLst/>
-              <a:latin typeface="Udemy Sans"/>
-            </a:endParaRPr>
-          </a:p>
-          <a:p>
-            <a:pPr algn="l"/>
-            <a:r>
-              <a:rPr lang="en-US" b="0" i="0" dirty="0">
-                <a:solidFill>
-                  <a:srgbClr val="303141"/>
-                </a:solidFill>
-                <a:effectLst/>
-                <a:latin typeface="Udemy Sans"/>
-              </a:rPr>
-              <a:t>https://www.postgresql.org/docs/current/datatype.html</a:t>
-            </a:r>
           </a:p>
           <a:p>
             <a:endParaRPr lang="hr-HR" dirty="0"/>
@@ -4947,12 +5070,46 @@
           <a:p>
             <a:r>
               <a:rPr lang="hr-HR" dirty="0"/>
-              <a:t>w3schools.com/</a:t>
-            </a:r>
-            <a:r>
-              <a:rPr lang="hr-HR" dirty="0" err="1"/>
+              <a:t>w3schools.com/sql</a:t>
+            </a:r>
+            <a:r>
+              <a:rPr lang="en-US" dirty="0"/>
+              <a:t> – </a:t>
+            </a:r>
+            <a:r>
+              <a:rPr lang="en-US" dirty="0" err="1"/>
+              <a:t>pokazi</a:t>
+            </a:r>
+            <a:r>
+              <a:rPr lang="en-US" dirty="0"/>
+              <a:t> </a:t>
+            </a:r>
+            <a:r>
+              <a:rPr lang="en-US" dirty="0" err="1"/>
+              <a:t>ovo</a:t>
+            </a:r>
+            <a:r>
+              <a:rPr lang="en-US" dirty="0"/>
+              <a:t> I koji </a:t>
+            </a:r>
+            <a:r>
+              <a:rPr lang="en-US" dirty="0" err="1"/>
+              <a:t>su</a:t>
+            </a:r>
+            <a:r>
+              <a:rPr lang="en-US" dirty="0"/>
+              <a:t> data types </a:t>
+            </a:r>
+            <a:r>
+              <a:rPr lang="en-US" dirty="0" err="1"/>
               <a:t>sql</a:t>
             </a:r>
+            <a:r>
+              <a:rPr lang="en-US" dirty="0"/>
+              <a:t> data types</a:t>
+            </a:r>
+          </a:p>
+          <a:p>
             <a:endParaRPr lang="en-US" dirty="0"/>
           </a:p>
           <a:p>
@@ -6035,7 +6192,7 @@
                 <a:ea typeface="Open Sans" panose="020B0606030504020204" pitchFamily="34" charset="0"/>
                 <a:cs typeface="Open Sans" panose="020B0606030504020204" pitchFamily="34" charset="0"/>
               </a:rPr>
-              <a:t>03/06/2025</a:t>
+              <a:t>04/06/2025</a:t>
             </a:fld>
             <a:endParaRPr lang="en-GB" sz="1800" b="0" i="0" kern="1200" dirty="0">
               <a:solidFill>
@@ -6780,7 +6937,7 @@
                 <a:ea typeface="Open Sans" panose="020B0606030504020204" pitchFamily="34" charset="0"/>
                 <a:cs typeface="Open Sans" panose="020B0606030504020204" pitchFamily="34" charset="0"/>
               </a:rPr>
-              <a:t>03/06/2025</a:t>
+              <a:t>04/06/2025</a:t>
             </a:fld>
             <a:endParaRPr lang="en-GB" sz="1800" b="0" i="0" kern="1200" dirty="0">
               <a:solidFill>
@@ -7303,7 +7460,7 @@
                 <a:ea typeface="Open Sans" panose="020B0606030504020204" pitchFamily="34" charset="0"/>
                 <a:cs typeface="Open Sans" panose="020B0606030504020204" pitchFamily="34" charset="0"/>
               </a:rPr>
-              <a:t>03/06/2025</a:t>
+              <a:t>04/06/2025</a:t>
             </a:fld>
             <a:endParaRPr lang="en-GB" sz="1800" b="0" i="0" kern="1200" dirty="0">
               <a:solidFill>
@@ -8269,7 +8426,7 @@
                 <a:ea typeface="Open Sans" panose="020B0606030504020204" pitchFamily="34" charset="0"/>
                 <a:cs typeface="Open Sans" panose="020B0606030504020204" pitchFamily="34" charset="0"/>
               </a:rPr>
-              <a:t>03/06/2025</a:t>
+              <a:t>04/06/2025</a:t>
             </a:fld>
             <a:endParaRPr lang="en-GB" sz="1800" b="0" i="0" kern="1200" dirty="0">
               <a:solidFill>
@@ -8708,7 +8865,7 @@
                 <a:ea typeface="Open Sans" panose="020B0606030504020204" pitchFamily="34" charset="0"/>
                 <a:cs typeface="Open Sans" panose="020B0606030504020204" pitchFamily="34" charset="0"/>
               </a:rPr>
-              <a:t>03/06/2025</a:t>
+              <a:t>04/06/2025</a:t>
             </a:fld>
             <a:endParaRPr lang="en-GB" sz="1800" b="0" i="0" kern="1200" dirty="0">
               <a:solidFill>
@@ -10478,7 +10635,7 @@
                 <a:ea typeface="Open Sans" pitchFamily="2" charset="0"/>
                 <a:cs typeface="Open Sans" pitchFamily="2" charset="0"/>
               </a:rPr>
-              <a:t>03/06/2025</a:t>
+              <a:t>04/06/2025</a:t>
             </a:fld>
             <a:endParaRPr lang="en-GB" sz="1800" b="0" i="0" kern="1200" dirty="0">
               <a:solidFill>
@@ -12228,7 +12385,7 @@
                 <a:ea typeface="Open Sans" pitchFamily="2" charset="0"/>
                 <a:cs typeface="Open Sans" pitchFamily="2" charset="0"/>
               </a:rPr>
-              <a:t>03/06/2025</a:t>
+              <a:t>04/06/2025</a:t>
             </a:fld>
             <a:endParaRPr lang="en-GB" sz="1800" b="0" i="0" kern="1200" dirty="0">
               <a:solidFill>
@@ -12745,7 +12902,7 @@
                 <a:ea typeface="Open Sans" panose="020B0606030504020204" pitchFamily="34" charset="0"/>
                 <a:cs typeface="Open Sans" panose="020B0606030504020204" pitchFamily="34" charset="0"/>
               </a:rPr>
-              <a:t>03/06/2025</a:t>
+              <a:t>04/06/2025</a:t>
             </a:fld>
             <a:endParaRPr lang="en-GB" sz="1800" b="0" i="0" kern="1200" dirty="0">
               <a:solidFill>
@@ -13342,7 +13499,7 @@
                 <a:ea typeface="Open Sans" pitchFamily="2" charset="0"/>
                 <a:cs typeface="Open Sans" pitchFamily="2" charset="0"/>
               </a:rPr>
-              <a:t>03/06/2025</a:t>
+              <a:t>04/06/2025</a:t>
             </a:fld>
             <a:endParaRPr lang="en-GB" sz="1800" b="0" i="0" kern="1200" dirty="0">
               <a:solidFill>
@@ -13882,7 +14039,7 @@
                 <a:ea typeface="Open Sans" panose="020B0606030504020204" pitchFamily="34" charset="0"/>
                 <a:cs typeface="Open Sans" panose="020B0606030504020204" pitchFamily="34" charset="0"/>
               </a:rPr>
-              <a:t>03/06/2025</a:t>
+              <a:t>04/06/2025</a:t>
             </a:fld>
             <a:endParaRPr lang="en-GB" sz="1800" b="0" i="0" kern="1200" dirty="0">
               <a:solidFill>
@@ -14583,7 +14740,7 @@
                 <a:ea typeface="Open Sans" panose="020B0606030504020204" pitchFamily="34" charset="0"/>
                 <a:cs typeface="Open Sans" panose="020B0606030504020204" pitchFamily="34" charset="0"/>
               </a:rPr>
-              <a:t>03/06/2025</a:t>
+              <a:t>04/06/2025</a:t>
             </a:fld>
             <a:endParaRPr lang="en-GB" sz="1800" b="0" i="0" kern="1200" dirty="0">
               <a:solidFill>
@@ -14946,7 +15103,7 @@
                 <a:ea typeface="Open Sans" pitchFamily="2" charset="0"/>
                 <a:cs typeface="Open Sans" pitchFamily="2" charset="0"/>
               </a:rPr>
-              <a:t>03/06/2025</a:t>
+              <a:t>04/06/2025</a:t>
             </a:fld>
             <a:endParaRPr lang="en-GB" sz="1800" b="0" i="0" kern="1200" dirty="0">
               <a:solidFill>
@@ -15341,7 +15498,7 @@
                 <a:ea typeface="Open Sans" pitchFamily="2" charset="0"/>
                 <a:cs typeface="Open Sans" pitchFamily="2" charset="0"/>
               </a:rPr>
-              <a:t>03/06/2025</a:t>
+              <a:t>04/06/2025</a:t>
             </a:fld>
             <a:endParaRPr lang="en-GB" sz="1800" b="0" i="0" kern="1200" dirty="0">
               <a:solidFill>
@@ -17369,6 +17526,330 @@
         <p:cNvPr id="1" name="">
           <a:extLst>
             <a:ext uri="{FF2B5EF4-FFF2-40B4-BE49-F238E27FC236}">
+              <a16:creationId xmlns:a16="http://schemas.microsoft.com/office/drawing/2014/main" id="{074DA1DE-C49D-2ED2-FDD0-705EEDB5A207}"/>
+            </a:ext>
+          </a:extLst>
+        </p:cNvPr>
+        <p:cNvGrpSpPr/>
+        <p:nvPr/>
+      </p:nvGrpSpPr>
+      <p:grpSpPr>
+        <a:xfrm>
+          <a:off x="0" y="0"/>
+          <a:ext cx="0" cy="0"/>
+          <a:chOff x="0" y="0"/>
+          <a:chExt cx="0" cy="0"/>
+        </a:xfrm>
+      </p:grpSpPr>
+      <p:sp>
+        <p:nvSpPr>
+          <p:cNvPr id="4" name="Title 1">
+            <a:extLst>
+              <a:ext uri="{FF2B5EF4-FFF2-40B4-BE49-F238E27FC236}">
+                <a16:creationId xmlns:a16="http://schemas.microsoft.com/office/drawing/2014/main" id="{51637EAA-649E-F865-613A-C9B9921BBA88}"/>
+              </a:ext>
+            </a:extLst>
+          </p:cNvPr>
+          <p:cNvSpPr txBox="1">
+            <a:spLocks/>
+          </p:cNvSpPr>
+          <p:nvPr/>
+        </p:nvSpPr>
+        <p:spPr>
+          <a:xfrm>
+            <a:off x="990600" y="383056"/>
+            <a:ext cx="10515600" cy="853976"/>
+          </a:xfrm>
+          <a:prstGeom prst="rect">
+            <a:avLst/>
+          </a:prstGeom>
+        </p:spPr>
+        <p:txBody>
+          <a:bodyPr vert="horz" lIns="91440" tIns="45720" rIns="91440" bIns="45720" rtlCol="0" anchor="ctr">
+            <a:normAutofit/>
+          </a:bodyPr>
+          <a:lstStyle>
+            <a:lvl1pPr algn="l" defTabSz="914400" rtl="0" eaLnBrk="1" latinLnBrk="0" hangingPunct="1">
+              <a:lnSpc>
+                <a:spcPct val="90000"/>
+              </a:lnSpc>
+              <a:spcBef>
+                <a:spcPct val="0"/>
+              </a:spcBef>
+              <a:buNone/>
+              <a:defRPr sz="3600" b="1" i="0" kern="1200" cap="all" baseline="0">
+                <a:solidFill>
+                  <a:schemeClr val="tx2"/>
+                </a:solidFill>
+                <a:latin typeface="+mj-lt"/>
+                <a:ea typeface="Open Sans Semibold" panose="020B0606030504020204" pitchFamily="34" charset="0"/>
+                <a:cs typeface="Open Sans Semibold" panose="020B0606030504020204" pitchFamily="34" charset="0"/>
+              </a:defRPr>
+            </a:lvl1pPr>
+          </a:lstStyle>
+          <a:p>
+            <a:r>
+              <a:rPr lang="en-US" dirty="0"/>
+              <a:t>Baze </a:t>
+            </a:r>
+            <a:r>
+              <a:rPr lang="en-US" dirty="0" err="1"/>
+              <a:t>podataka</a:t>
+            </a:r>
+            <a:r>
+              <a:rPr lang="en-US" dirty="0"/>
+              <a:t> – </a:t>
+            </a:r>
+            <a:r>
+              <a:rPr lang="hr-HR" dirty="0"/>
+              <a:t>SQL Relacije i JOIN </a:t>
+            </a:r>
+          </a:p>
+        </p:txBody>
+      </p:sp>
+      <p:pic>
+        <p:nvPicPr>
+          <p:cNvPr id="5" name="Picture 4">
+            <a:extLst>
+              <a:ext uri="{FF2B5EF4-FFF2-40B4-BE49-F238E27FC236}">
+                <a16:creationId xmlns:a16="http://schemas.microsoft.com/office/drawing/2014/main" id="{7CAE497D-A895-23A1-DEED-98F27FB6F1BA}"/>
+              </a:ext>
+            </a:extLst>
+          </p:cNvPr>
+          <p:cNvPicPr>
+            <a:picLocks noChangeAspect="1"/>
+          </p:cNvPicPr>
+          <p:nvPr/>
+        </p:nvPicPr>
+        <p:blipFill>
+          <a:blip r:embed="rId3"/>
+          <a:stretch>
+            <a:fillRect/>
+          </a:stretch>
+        </p:blipFill>
+        <p:spPr>
+          <a:xfrm>
+            <a:off x="2577934" y="1237032"/>
+            <a:ext cx="6162675" cy="2847975"/>
+          </a:xfrm>
+          <a:prstGeom prst="rect">
+            <a:avLst/>
+          </a:prstGeom>
+        </p:spPr>
+      </p:pic>
+      <p:sp>
+        <p:nvSpPr>
+          <p:cNvPr id="7" name="Rectangle 1">
+            <a:extLst>
+              <a:ext uri="{FF2B5EF4-FFF2-40B4-BE49-F238E27FC236}">
+                <a16:creationId xmlns:a16="http://schemas.microsoft.com/office/drawing/2014/main" id="{AC0AA558-6739-115E-98DF-3A98FBBF4160}"/>
+              </a:ext>
+            </a:extLst>
+          </p:cNvPr>
+          <p:cNvSpPr>
+            <a:spLocks noChangeArrowheads="1"/>
+          </p:cNvSpPr>
+          <p:nvPr/>
+        </p:nvSpPr>
+        <p:spPr bwMode="auto">
+          <a:xfrm>
+            <a:off x="1801505" y="4478825"/>
+            <a:ext cx="8722388" cy="923330"/>
+          </a:xfrm>
+          <a:prstGeom prst="rect">
+            <a:avLst/>
+          </a:prstGeom>
+          <a:noFill/>
+          <a:ln>
+            <a:noFill/>
+          </a:ln>
+          <a:effectLst/>
+          <a:extLst>
+            <a:ext uri="{909E8E84-426E-40DD-AFC4-6F175D3DCCD1}">
+              <a14:hiddenFill xmlns:a14="http://schemas.microsoft.com/office/drawing/2010/main">
+                <a:solidFill>
+                  <a:schemeClr val="accent1"/>
+                </a:solidFill>
+              </a14:hiddenFill>
+            </a:ext>
+            <a:ext uri="{91240B29-F687-4F45-9708-019B960494DF}">
+              <a14:hiddenLine xmlns:a14="http://schemas.microsoft.com/office/drawing/2010/main" w="9525">
+                <a:solidFill>
+                  <a:schemeClr val="tx1"/>
+                </a:solidFill>
+                <a:miter lim="800000"/>
+                <a:headEnd/>
+                <a:tailEnd/>
+              </a14:hiddenLine>
+            </a:ext>
+            <a:ext uri="{AF507438-7753-43E0-B8FC-AC1667EBCBE1}">
+              <a14:hiddenEffects xmlns:a14="http://schemas.microsoft.com/office/drawing/2010/main">
+                <a:effectLst>
+                  <a:outerShdw dist="35921" dir="2700000" algn="ctr" rotWithShape="0">
+                    <a:schemeClr val="bg2"/>
+                  </a:outerShdw>
+                </a:effectLst>
+              </a14:hiddenEffects>
+            </a:ext>
+          </a:extLst>
+        </p:spPr>
+        <p:txBody>
+          <a:bodyPr vert="horz" wrap="none" lIns="91440" tIns="45720" rIns="91440" bIns="45720" numCol="1" anchor="ctr" anchorCtr="0" compatLnSpc="1">
+            <a:prstTxWarp prst="textNoShape">
+              <a:avLst/>
+            </a:prstTxWarp>
+            <a:spAutoFit/>
+          </a:bodyPr>
+          <a:lstStyle/>
+          <a:p>
+            <a:pPr marL="0" marR="0" lvl="0" indent="0" algn="l" defTabSz="914400" rtl="0" eaLnBrk="0" fontAlgn="base" latinLnBrk="0" hangingPunct="0">
+              <a:lnSpc>
+                <a:spcPct val="100000"/>
+              </a:lnSpc>
+              <a:spcBef>
+                <a:spcPct val="0"/>
+              </a:spcBef>
+              <a:spcAft>
+                <a:spcPct val="0"/>
+              </a:spcAft>
+              <a:buClrTx/>
+              <a:buSzTx/>
+              <a:buFontTx/>
+              <a:buChar char="•"/>
+              <a:tabLst/>
+            </a:pPr>
+            <a:r>
+              <a:rPr kumimoji="0" lang="sr-Latn-RS" altLang="sr-Latn-RS" sz="1800" b="1" i="0" u="none" strike="noStrike" cap="none" normalizeH="0" baseline="0" dirty="0">
+                <a:ln>
+                  <a:noFill/>
+                </a:ln>
+                <a:solidFill>
+                  <a:schemeClr val="tx1"/>
+                </a:solidFill>
+                <a:effectLst/>
+                <a:latin typeface="Arial" panose="020B0604020202020204" pitchFamily="34" charset="0"/>
+              </a:rPr>
+              <a:t>INNER JOIN</a:t>
+            </a:r>
+            <a:r>
+              <a:rPr kumimoji="0" lang="sr-Latn-RS" altLang="sr-Latn-RS" sz="1800" b="0" i="0" u="none" strike="noStrike" cap="none" normalizeH="0" baseline="0" dirty="0">
+                <a:ln>
+                  <a:noFill/>
+                </a:ln>
+                <a:solidFill>
+                  <a:schemeClr val="tx1"/>
+                </a:solidFill>
+                <a:effectLst/>
+                <a:latin typeface="Arial" panose="020B0604020202020204" pitchFamily="34" charset="0"/>
+              </a:rPr>
+              <a:t> → vraća samo „preklapajuće“ id-jeve (1, 2, 4).</a:t>
+            </a:r>
+            <a:endParaRPr kumimoji="0" lang="en-US" altLang="sr-Latn-RS" sz="1800" b="0" i="0" u="none" strike="noStrike" cap="none" normalizeH="0" baseline="0" dirty="0">
+              <a:ln>
+                <a:noFill/>
+              </a:ln>
+              <a:solidFill>
+                <a:schemeClr val="tx1"/>
+              </a:solidFill>
+              <a:effectLst/>
+              <a:latin typeface="Arial" panose="020B0604020202020204" pitchFamily="34" charset="0"/>
+            </a:endParaRPr>
+          </a:p>
+          <a:p>
+            <a:pPr marL="0" marR="0" lvl="0" indent="0" algn="l" defTabSz="914400" rtl="0" eaLnBrk="0" fontAlgn="base" latinLnBrk="0" hangingPunct="0">
+              <a:lnSpc>
+                <a:spcPct val="100000"/>
+              </a:lnSpc>
+              <a:spcBef>
+                <a:spcPct val="0"/>
+              </a:spcBef>
+              <a:spcAft>
+                <a:spcPct val="0"/>
+              </a:spcAft>
+              <a:buClrTx/>
+              <a:buSzTx/>
+              <a:buFontTx/>
+              <a:buChar char="•"/>
+              <a:tabLst/>
+            </a:pPr>
+            <a:endParaRPr kumimoji="0" lang="sr-Latn-RS" altLang="sr-Latn-RS" sz="1800" b="0" i="0" u="none" strike="noStrike" cap="none" normalizeH="0" baseline="0" dirty="0">
+              <a:ln>
+                <a:noFill/>
+              </a:ln>
+              <a:solidFill>
+                <a:schemeClr val="tx1"/>
+              </a:solidFill>
+              <a:effectLst/>
+              <a:latin typeface="Arial" panose="020B0604020202020204" pitchFamily="34" charset="0"/>
+            </a:endParaRPr>
+          </a:p>
+          <a:p>
+            <a:pPr marL="0" marR="0" lvl="0" indent="0" algn="l" defTabSz="914400" rtl="0" eaLnBrk="0" fontAlgn="base" latinLnBrk="0" hangingPunct="0">
+              <a:lnSpc>
+                <a:spcPct val="100000"/>
+              </a:lnSpc>
+              <a:spcBef>
+                <a:spcPct val="0"/>
+              </a:spcBef>
+              <a:spcAft>
+                <a:spcPct val="0"/>
+              </a:spcAft>
+              <a:buClrTx/>
+              <a:buSzTx/>
+              <a:buFontTx/>
+              <a:buChar char="•"/>
+              <a:tabLst/>
+            </a:pPr>
+            <a:r>
+              <a:rPr kumimoji="0" lang="sr-Latn-RS" altLang="sr-Latn-RS" sz="1800" b="1" i="0" u="none" strike="noStrike" cap="none" normalizeH="0" baseline="0" dirty="0">
+                <a:ln>
+                  <a:noFill/>
+                </a:ln>
+                <a:solidFill>
+                  <a:schemeClr val="tx1"/>
+                </a:solidFill>
+                <a:effectLst/>
+                <a:latin typeface="Arial" panose="020B0604020202020204" pitchFamily="34" charset="0"/>
+              </a:rPr>
+              <a:t>LEFT JOIN</a:t>
+            </a:r>
+            <a:r>
+              <a:rPr kumimoji="0" lang="sr-Latn-RS" altLang="sr-Latn-RS" sz="1800" b="0" i="0" u="none" strike="noStrike" cap="none" normalizeH="0" baseline="0" dirty="0">
+                <a:ln>
+                  <a:noFill/>
+                </a:ln>
+                <a:solidFill>
+                  <a:schemeClr val="tx1"/>
+                </a:solidFill>
+                <a:effectLst/>
+                <a:latin typeface="Arial" panose="020B0604020202020204" pitchFamily="34" charset="0"/>
+              </a:rPr>
+              <a:t> → vraća sve id-jeve iz A (1, 2, 3, 4), a za id=3 će podaci iz B biti NULL.</a:t>
+            </a:r>
+          </a:p>
+        </p:txBody>
+      </p:sp>
+    </p:spTree>
+    <p:extLst>
+      <p:ext uri="{BB962C8B-B14F-4D97-AF65-F5344CB8AC3E}">
+        <p14:creationId xmlns:p14="http://schemas.microsoft.com/office/powerpoint/2010/main" val="2616917186"/>
+      </p:ext>
+    </p:extLst>
+  </p:cSld>
+  <p:clrMapOvr>
+    <a:masterClrMapping/>
+  </p:clrMapOvr>
+</p:sld>
+</file>
+
+<file path=ppt/slides/slide15.xml><?xml version="1.0" encoding="utf-8"?>
+<p:sld xmlns:a="http://schemas.openxmlformats.org/drawingml/2006/main" xmlns:r="http://schemas.openxmlformats.org/officeDocument/2006/relationships" xmlns:p="http://schemas.openxmlformats.org/presentationml/2006/main">
+  <p:cSld>
+    <p:spTree>
+      <p:nvGrpSpPr>
+        <p:cNvPr id="1" name="">
+          <a:extLst>
+            <a:ext uri="{FF2B5EF4-FFF2-40B4-BE49-F238E27FC236}">
               <a16:creationId xmlns:a16="http://schemas.microsoft.com/office/drawing/2014/main" id="{4FB2760B-E071-F247-11DC-4074D00F802E}"/>
             </a:ext>
           </a:extLst>
@@ -17510,7 +17991,7 @@
         </p:nvSpPr>
         <p:spPr>
           <a:xfrm>
-            <a:off x="1031358" y="1975456"/>
+            <a:off x="1031358" y="1760252"/>
             <a:ext cx="5328139" cy="853976"/>
           </a:xfrm>
           <a:prstGeom prst="rect">
@@ -17587,8 +18068,8 @@
         </p:nvSpPr>
         <p:spPr>
           <a:xfrm>
-            <a:off x="1031358" y="2644170"/>
-            <a:ext cx="8860465" cy="523220"/>
+            <a:off x="1031358" y="2340719"/>
+            <a:ext cx="8860465" cy="738664"/>
           </a:xfrm>
           <a:prstGeom prst="rect">
             <a:avLst/>
@@ -17622,19 +18103,59 @@
             </a:r>
             <a:r>
               <a:rPr lang="hr-HR" sz="1400" b="1" dirty="0"/>
-              <a:t>za </a:t>
-            </a:r>
-            <a:r>
-              <a:rPr lang="hr-HR" sz="1400" b="1" dirty="0" err="1"/>
-              <a:t>modularizaciju</a:t>
-            </a:r>
-            <a:r>
-              <a:rPr lang="hr-HR" sz="1400" b="1" dirty="0"/>
-              <a:t> baze</a:t>
+              <a:t>za modularizaciju baze</a:t>
             </a:r>
             <a:r>
               <a:rPr lang="hr-HR" sz="1400" dirty="0"/>
               <a:t> i izbjegavanje prevelikih tablica s previše stupaca.</a:t>
+            </a:r>
+            <a:r>
+              <a:rPr lang="en-US" sz="1400" dirty="0"/>
+              <a:t> </a:t>
+            </a:r>
+            <a:r>
+              <a:rPr lang="en-US" sz="1400" dirty="0" err="1"/>
+              <a:t>Nije</a:t>
+            </a:r>
+            <a:r>
+              <a:rPr lang="en-US" sz="1400" dirty="0"/>
+              <a:t> dobro za </a:t>
+            </a:r>
+            <a:r>
+              <a:rPr lang="en-US" sz="1400" dirty="0" err="1"/>
+              <a:t>preformanse</a:t>
+            </a:r>
+            <a:r>
+              <a:rPr lang="en-US" sz="1400" dirty="0"/>
+              <a:t> </a:t>
+            </a:r>
+            <a:r>
+              <a:rPr lang="en-US" sz="1400" dirty="0" err="1"/>
+              <a:t>kada</a:t>
+            </a:r>
+            <a:r>
+              <a:rPr lang="en-US" sz="1400" dirty="0"/>
+              <a:t> </a:t>
+            </a:r>
+            <a:r>
+              <a:rPr lang="en-US" sz="1400" dirty="0" err="1"/>
+              <a:t>tablica</a:t>
+            </a:r>
+            <a:r>
+              <a:rPr lang="en-US" sz="1400" dirty="0"/>
+              <a:t> </a:t>
+            </a:r>
+            <a:r>
+              <a:rPr lang="en-US" sz="1400" dirty="0" err="1"/>
+              <a:t>ima</a:t>
+            </a:r>
+            <a:r>
+              <a:rPr lang="en-US" sz="1400" dirty="0"/>
+              <a:t> previse </a:t>
+            </a:r>
+            <a:r>
+              <a:rPr lang="en-US" sz="1400" dirty="0" err="1"/>
+              <a:t>stupaca</a:t>
             </a:r>
             <a:endParaRPr lang="en-US" sz="1400" dirty="0"/>
           </a:p>
@@ -17713,7 +18234,7 @@
 </p:sld>
 </file>
 
-<file path=ppt/slides/slide15.xml><?xml version="1.0" encoding="utf-8"?>
+<file path=ppt/slides/slide16.xml><?xml version="1.0" encoding="utf-8"?>
 <p:sld xmlns:a="http://schemas.openxmlformats.org/drawingml/2006/main" xmlns:r="http://schemas.openxmlformats.org/officeDocument/2006/relationships" xmlns:p="http://schemas.openxmlformats.org/presentationml/2006/main">
   <p:cSld>
     <p:spTree>
@@ -18037,7 +18558,7 @@
 </p:sld>
 </file>
 
-<file path=ppt/slides/slide16.xml><?xml version="1.0" encoding="utf-8"?>
+<file path=ppt/slides/slide17.xml><?xml version="1.0" encoding="utf-8"?>
 <p:sld xmlns:a="http://schemas.openxmlformats.org/drawingml/2006/main" xmlns:r="http://schemas.openxmlformats.org/officeDocument/2006/relationships" xmlns:p="http://schemas.openxmlformats.org/presentationml/2006/main">
   <p:cSld>
     <p:spTree>
@@ -18178,7 +18699,7 @@
 </p:sld>
 </file>
 
-<file path=ppt/slides/slide17.xml><?xml version="1.0" encoding="utf-8"?>
+<file path=ppt/slides/slide18.xml><?xml version="1.0" encoding="utf-8"?>
 <p:sld xmlns:a="http://schemas.openxmlformats.org/drawingml/2006/main" xmlns:r="http://schemas.openxmlformats.org/officeDocument/2006/relationships" xmlns:p="http://schemas.openxmlformats.org/presentationml/2006/main">
   <p:cSld>
     <p:spTree>
@@ -18392,7 +18913,7 @@
 </p:sld>
 </file>
 
-<file path=ppt/slides/slide18.xml><?xml version="1.0" encoding="utf-8"?>
+<file path=ppt/slides/slide19.xml><?xml version="1.0" encoding="utf-8"?>
 <p:sld xmlns:a="http://schemas.openxmlformats.org/drawingml/2006/main" xmlns:r="http://schemas.openxmlformats.org/officeDocument/2006/relationships" xmlns:p="http://schemas.openxmlformats.org/presentationml/2006/main">
   <p:cSld>
     <p:spTree>
@@ -18649,7 +19170,797 @@
 </p:sld>
 </file>
 
-<file path=ppt/slides/slide19.xml><?xml version="1.0" encoding="utf-8"?>
+<file path=ppt/slides/slide2.xml><?xml version="1.0" encoding="utf-8"?>
+<p:sld xmlns:a="http://schemas.openxmlformats.org/drawingml/2006/main" xmlns:r="http://schemas.openxmlformats.org/officeDocument/2006/relationships" xmlns:p="http://schemas.openxmlformats.org/presentationml/2006/main">
+  <p:cSld>
+    <p:spTree>
+      <p:nvGrpSpPr>
+        <p:cNvPr id="1" name="">
+          <a:extLst>
+            <a:ext uri="{FF2B5EF4-FFF2-40B4-BE49-F238E27FC236}">
+              <a16:creationId xmlns:a16="http://schemas.microsoft.com/office/drawing/2014/main" id="{918D26FF-D4FF-E27A-CD45-DD91280060C0}"/>
+            </a:ext>
+          </a:extLst>
+        </p:cNvPr>
+        <p:cNvGrpSpPr/>
+        <p:nvPr/>
+      </p:nvGrpSpPr>
+      <p:grpSpPr>
+        <a:xfrm>
+          <a:off x="0" y="0"/>
+          <a:ext cx="0" cy="0"/>
+          <a:chOff x="0" y="0"/>
+          <a:chExt cx="0" cy="0"/>
+        </a:xfrm>
+      </p:grpSpPr>
+      <p:sp>
+        <p:nvSpPr>
+          <p:cNvPr id="4" name="Title 1">
+            <a:extLst>
+              <a:ext uri="{FF2B5EF4-FFF2-40B4-BE49-F238E27FC236}">
+                <a16:creationId xmlns:a16="http://schemas.microsoft.com/office/drawing/2014/main" id="{119F6997-C2AB-77D2-A4ED-C8E2A7416C1D}"/>
+              </a:ext>
+            </a:extLst>
+          </p:cNvPr>
+          <p:cNvSpPr txBox="1">
+            <a:spLocks/>
+          </p:cNvSpPr>
+          <p:nvPr/>
+        </p:nvSpPr>
+        <p:spPr>
+          <a:xfrm>
+            <a:off x="990600" y="383056"/>
+            <a:ext cx="10515600" cy="853976"/>
+          </a:xfrm>
+          <a:prstGeom prst="rect">
+            <a:avLst/>
+          </a:prstGeom>
+        </p:spPr>
+        <p:txBody>
+          <a:bodyPr vert="horz" lIns="91440" tIns="45720" rIns="91440" bIns="45720" rtlCol="0" anchor="ctr">
+            <a:normAutofit/>
+          </a:bodyPr>
+          <a:lstStyle>
+            <a:lvl1pPr algn="l" defTabSz="914400" rtl="0" eaLnBrk="1" latinLnBrk="0" hangingPunct="1">
+              <a:lnSpc>
+                <a:spcPct val="90000"/>
+              </a:lnSpc>
+              <a:spcBef>
+                <a:spcPct val="0"/>
+              </a:spcBef>
+              <a:buNone/>
+              <a:defRPr sz="3600" b="1" i="0" kern="1200" cap="all" baseline="0">
+                <a:solidFill>
+                  <a:schemeClr val="tx2"/>
+                </a:solidFill>
+                <a:latin typeface="+mj-lt"/>
+                <a:ea typeface="Open Sans Semibold" panose="020B0606030504020204" pitchFamily="34" charset="0"/>
+                <a:cs typeface="Open Sans Semibold" panose="020B0606030504020204" pitchFamily="34" charset="0"/>
+              </a:defRPr>
+            </a:lvl1pPr>
+          </a:lstStyle>
+          <a:p>
+            <a:r>
+              <a:rPr lang="en-US" dirty="0" err="1"/>
+              <a:t>baze</a:t>
+            </a:r>
+            <a:r>
+              <a:rPr lang="en-US" dirty="0"/>
+              <a:t> </a:t>
+            </a:r>
+            <a:r>
+              <a:rPr lang="en-US" dirty="0" err="1"/>
+              <a:t>podataka</a:t>
+            </a:r>
+            <a:r>
+              <a:rPr lang="en-US" dirty="0"/>
+              <a:t> - </a:t>
+            </a:r>
+            <a:r>
+              <a:rPr lang="en-US" dirty="0" err="1"/>
+              <a:t>osnove</a:t>
+            </a:r>
+            <a:endParaRPr lang="hr-HR" dirty="0"/>
+          </a:p>
+        </p:txBody>
+      </p:sp>
+      <p:sp>
+        <p:nvSpPr>
+          <p:cNvPr id="6" name="Content Placeholder 2">
+            <a:extLst>
+              <a:ext uri="{FF2B5EF4-FFF2-40B4-BE49-F238E27FC236}">
+                <a16:creationId xmlns:a16="http://schemas.microsoft.com/office/drawing/2014/main" id="{11D32EC0-A401-2168-D46E-8C3F239BF562}"/>
+              </a:ext>
+            </a:extLst>
+          </p:cNvPr>
+          <p:cNvSpPr txBox="1">
+            <a:spLocks/>
+          </p:cNvSpPr>
+          <p:nvPr/>
+        </p:nvSpPr>
+        <p:spPr>
+          <a:xfrm>
+            <a:off x="924848" y="1751992"/>
+            <a:ext cx="3932237" cy="3161656"/>
+          </a:xfrm>
+          <a:prstGeom prst="rect">
+            <a:avLst/>
+          </a:prstGeom>
+        </p:spPr>
+        <p:txBody>
+          <a:bodyPr vert="horz" lIns="91440" tIns="45720" rIns="91440" bIns="45720" rtlCol="0">
+            <a:normAutofit fontScale="92500" lnSpcReduction="20000"/>
+          </a:bodyPr>
+          <a:lstStyle>
+            <a:lvl1pPr marL="368300" indent="-352425" algn="l" defTabSz="914400" rtl="0" eaLnBrk="1" latinLnBrk="0" hangingPunct="1">
+              <a:lnSpc>
+                <a:spcPct val="90000"/>
+              </a:lnSpc>
+              <a:spcBef>
+                <a:spcPts val="600"/>
+              </a:spcBef>
+              <a:spcAft>
+                <a:spcPts val="600"/>
+              </a:spcAft>
+              <a:buClr>
+                <a:schemeClr val="accent2"/>
+              </a:buClr>
+              <a:buFont typeface="Wingdings" pitchFamily="2" charset="2"/>
+              <a:buChar char="§"/>
+              <a:tabLst/>
+              <a:defRPr sz="2400" kern="1200">
+                <a:solidFill>
+                  <a:schemeClr val="tx1"/>
+                </a:solidFill>
+                <a:latin typeface="+mn-lt"/>
+                <a:ea typeface="Open Sans" panose="020B0606030504020204" pitchFamily="34" charset="0"/>
+                <a:cs typeface="Open Sans" panose="020B0606030504020204" pitchFamily="34" charset="0"/>
+              </a:defRPr>
+            </a:lvl1pPr>
+            <a:lvl2pPr marL="771525" indent="-274638" algn="l" defTabSz="914400" rtl="0" eaLnBrk="1" latinLnBrk="0" hangingPunct="1">
+              <a:lnSpc>
+                <a:spcPct val="90000"/>
+              </a:lnSpc>
+              <a:spcBef>
+                <a:spcPts val="600"/>
+              </a:spcBef>
+              <a:spcAft>
+                <a:spcPts val="600"/>
+              </a:spcAft>
+              <a:buClr>
+                <a:schemeClr val="accent2"/>
+              </a:buClr>
+              <a:buFont typeface="Wingdings" pitchFamily="2" charset="2"/>
+              <a:buChar char="§"/>
+              <a:tabLst/>
+              <a:defRPr sz="2200" kern="1200">
+                <a:solidFill>
+                  <a:schemeClr val="tx1"/>
+                </a:solidFill>
+                <a:latin typeface="+mn-lt"/>
+                <a:ea typeface="Open Sans" panose="020B0606030504020204" pitchFamily="34" charset="0"/>
+                <a:cs typeface="Open Sans" panose="020B0606030504020204" pitchFamily="34" charset="0"/>
+              </a:defRPr>
+            </a:lvl2pPr>
+            <a:lvl3pPr marL="1143000" indent="-228600" algn="l" defTabSz="914400" rtl="0" eaLnBrk="1" latinLnBrk="0" hangingPunct="1">
+              <a:lnSpc>
+                <a:spcPct val="90000"/>
+              </a:lnSpc>
+              <a:spcBef>
+                <a:spcPts val="600"/>
+              </a:spcBef>
+              <a:spcAft>
+                <a:spcPts val="600"/>
+              </a:spcAft>
+              <a:buClr>
+                <a:schemeClr val="accent2"/>
+              </a:buClr>
+              <a:buFont typeface="Wingdings" pitchFamily="2" charset="2"/>
+              <a:buChar char="§"/>
+              <a:defRPr sz="2000" kern="1200">
+                <a:solidFill>
+                  <a:schemeClr val="tx1"/>
+                </a:solidFill>
+                <a:latin typeface="+mn-lt"/>
+                <a:ea typeface="Open Sans" panose="020B0606030504020204" pitchFamily="34" charset="0"/>
+                <a:cs typeface="Open Sans" panose="020B0606030504020204" pitchFamily="34" charset="0"/>
+              </a:defRPr>
+            </a:lvl3pPr>
+            <a:lvl4pPr marL="1600200" indent="-228600" algn="l" defTabSz="914400" rtl="0" eaLnBrk="1" latinLnBrk="0" hangingPunct="1">
+              <a:lnSpc>
+                <a:spcPct val="90000"/>
+              </a:lnSpc>
+              <a:spcBef>
+                <a:spcPts val="600"/>
+              </a:spcBef>
+              <a:spcAft>
+                <a:spcPts val="600"/>
+              </a:spcAft>
+              <a:buClr>
+                <a:schemeClr val="accent2"/>
+              </a:buClr>
+              <a:buFont typeface="Wingdings" pitchFamily="2" charset="2"/>
+              <a:buChar char="§"/>
+              <a:defRPr sz="1800" kern="1200">
+                <a:solidFill>
+                  <a:schemeClr val="tx1"/>
+                </a:solidFill>
+                <a:latin typeface="+mn-lt"/>
+                <a:ea typeface="Open Sans" panose="020B0606030504020204" pitchFamily="34" charset="0"/>
+                <a:cs typeface="Open Sans" panose="020B0606030504020204" pitchFamily="34" charset="0"/>
+              </a:defRPr>
+            </a:lvl4pPr>
+            <a:lvl5pPr marL="1960563" indent="-225425" algn="l" defTabSz="914400" rtl="0" eaLnBrk="1" latinLnBrk="0" hangingPunct="1">
+              <a:lnSpc>
+                <a:spcPct val="90000"/>
+              </a:lnSpc>
+              <a:spcBef>
+                <a:spcPts val="600"/>
+              </a:spcBef>
+              <a:spcAft>
+                <a:spcPts val="600"/>
+              </a:spcAft>
+              <a:buClr>
+                <a:schemeClr val="accent2"/>
+              </a:buClr>
+              <a:buFont typeface="Wingdings" pitchFamily="2" charset="2"/>
+              <a:buChar char="§"/>
+              <a:tabLst/>
+              <a:defRPr sz="1600" kern="1200">
+                <a:solidFill>
+                  <a:schemeClr val="tx1"/>
+                </a:solidFill>
+                <a:latin typeface="+mn-lt"/>
+                <a:ea typeface="Open Sans" panose="020B0606030504020204" pitchFamily="34" charset="0"/>
+                <a:cs typeface="Open Sans" panose="020B0606030504020204" pitchFamily="34" charset="0"/>
+              </a:defRPr>
+            </a:lvl5pPr>
+            <a:lvl6pPr marL="2514600" indent="-228600" algn="l" defTabSz="914400" rtl="0" eaLnBrk="1" latinLnBrk="0" hangingPunct="1">
+              <a:lnSpc>
+                <a:spcPct val="90000"/>
+              </a:lnSpc>
+              <a:spcBef>
+                <a:spcPts val="500"/>
+              </a:spcBef>
+              <a:buFont typeface="Arial" panose="020B0604020202020204" pitchFamily="34" charset="0"/>
+              <a:buChar char="•"/>
+              <a:defRPr sz="1800" kern="1200">
+                <a:solidFill>
+                  <a:schemeClr val="tx1"/>
+                </a:solidFill>
+                <a:latin typeface="+mn-lt"/>
+                <a:ea typeface="+mn-ea"/>
+                <a:cs typeface="+mn-cs"/>
+              </a:defRPr>
+            </a:lvl6pPr>
+            <a:lvl7pPr marL="2971800" indent="-228600" algn="l" defTabSz="914400" rtl="0" eaLnBrk="1" latinLnBrk="0" hangingPunct="1">
+              <a:lnSpc>
+                <a:spcPct val="90000"/>
+              </a:lnSpc>
+              <a:spcBef>
+                <a:spcPts val="500"/>
+              </a:spcBef>
+              <a:buFont typeface="Arial" panose="020B0604020202020204" pitchFamily="34" charset="0"/>
+              <a:buChar char="•"/>
+              <a:defRPr sz="1800" kern="1200">
+                <a:solidFill>
+                  <a:schemeClr val="tx1"/>
+                </a:solidFill>
+                <a:latin typeface="+mn-lt"/>
+                <a:ea typeface="+mn-ea"/>
+                <a:cs typeface="+mn-cs"/>
+              </a:defRPr>
+            </a:lvl7pPr>
+            <a:lvl8pPr marL="3429000" indent="-228600" algn="l" defTabSz="914400" rtl="0" eaLnBrk="1" latinLnBrk="0" hangingPunct="1">
+              <a:lnSpc>
+                <a:spcPct val="90000"/>
+              </a:lnSpc>
+              <a:spcBef>
+                <a:spcPts val="500"/>
+              </a:spcBef>
+              <a:buFont typeface="Arial" panose="020B0604020202020204" pitchFamily="34" charset="0"/>
+              <a:buChar char="•"/>
+              <a:defRPr sz="1800" kern="1200">
+                <a:solidFill>
+                  <a:schemeClr val="tx1"/>
+                </a:solidFill>
+                <a:latin typeface="+mn-lt"/>
+                <a:ea typeface="+mn-ea"/>
+                <a:cs typeface="+mn-cs"/>
+              </a:defRPr>
+            </a:lvl8pPr>
+            <a:lvl9pPr marL="3886200" indent="-228600" algn="l" defTabSz="914400" rtl="0" eaLnBrk="1" latinLnBrk="0" hangingPunct="1">
+              <a:lnSpc>
+                <a:spcPct val="90000"/>
+              </a:lnSpc>
+              <a:spcBef>
+                <a:spcPts val="500"/>
+              </a:spcBef>
+              <a:buFont typeface="Arial" panose="020B0604020202020204" pitchFamily="34" charset="0"/>
+              <a:buChar char="•"/>
+              <a:defRPr sz="1800" kern="1200">
+                <a:solidFill>
+                  <a:schemeClr val="tx1"/>
+                </a:solidFill>
+                <a:latin typeface="+mn-lt"/>
+                <a:ea typeface="+mn-ea"/>
+                <a:cs typeface="+mn-cs"/>
+              </a:defRPr>
+            </a:lvl9pPr>
+          </a:lstStyle>
+          <a:p>
+            <a:pPr marL="15875" indent="0">
+              <a:buNone/>
+            </a:pPr>
+            <a:r>
+              <a:rPr lang="hr-HR" dirty="0"/>
+              <a:t>🔹 </a:t>
+            </a:r>
+            <a:r>
+              <a:rPr lang="en-US" dirty="0"/>
+              <a:t>Baze </a:t>
+            </a:r>
+            <a:r>
+              <a:rPr lang="en-US" dirty="0" err="1"/>
+              <a:t>podataka</a:t>
+            </a:r>
+            <a:r>
+              <a:rPr lang="en-US" dirty="0"/>
+              <a:t> </a:t>
+            </a:r>
+            <a:r>
+              <a:rPr lang="en-US" dirty="0" err="1"/>
+              <a:t>nam</a:t>
+            </a:r>
+            <a:r>
+              <a:rPr lang="en-US" dirty="0"/>
+              <a:t> </a:t>
+            </a:r>
+            <a:r>
+              <a:rPr lang="en-US" dirty="0" err="1"/>
+              <a:t>omo</a:t>
+            </a:r>
+            <a:r>
+              <a:rPr lang="hr-HR" dirty="0" err="1"/>
+              <a:t>gućavaju</a:t>
+            </a:r>
+            <a:r>
+              <a:rPr lang="hr-HR" dirty="0"/>
+              <a:t> da </a:t>
+            </a:r>
+            <a:r>
+              <a:rPr lang="en-US" b="1" dirty="0" err="1"/>
+              <a:t>podatke</a:t>
+            </a:r>
+            <a:r>
+              <a:rPr lang="en-US" b="1" dirty="0"/>
+              <a:t> </a:t>
+            </a:r>
+            <a:r>
+              <a:rPr lang="en-US" b="1" dirty="0" err="1"/>
+              <a:t>spremimo</a:t>
+            </a:r>
+            <a:r>
+              <a:rPr lang="en-US" b="1" dirty="0"/>
+              <a:t> </a:t>
+            </a:r>
+            <a:r>
+              <a:rPr lang="hr-HR" b="1" dirty="0"/>
+              <a:t>trajno</a:t>
+            </a:r>
+            <a:r>
+              <a:rPr lang="hr-HR" dirty="0"/>
+              <a:t> i </a:t>
+            </a:r>
+            <a:r>
+              <a:rPr lang="en-US" dirty="0"/>
+              <a:t>da se </a:t>
+            </a:r>
+            <a:r>
+              <a:rPr lang="hr-HR" dirty="0"/>
+              <a:t>mogu dohvaćati po potrebi.</a:t>
+            </a:r>
+            <a:endParaRPr lang="en-US" dirty="0"/>
+          </a:p>
+          <a:p>
+            <a:pPr marL="15875" indent="0">
+              <a:buNone/>
+            </a:pPr>
+            <a:r>
+              <a:rPr lang="hr-HR" dirty="0"/>
+              <a:t>👉 </a:t>
+            </a:r>
+            <a:r>
+              <a:rPr lang="en-US" dirty="0"/>
+              <a:t>Bez </a:t>
+            </a:r>
+            <a:r>
+              <a:rPr lang="en-US" dirty="0" err="1"/>
+              <a:t>baze</a:t>
+            </a:r>
+            <a:r>
+              <a:rPr lang="en-US" dirty="0"/>
+              <a:t>, </a:t>
+            </a:r>
+            <a:r>
+              <a:rPr lang="hr-HR" dirty="0"/>
+              <a:t>Nakon </a:t>
+            </a:r>
+            <a:r>
+              <a:rPr lang="hr-HR" dirty="0" err="1"/>
+              <a:t>restarta</a:t>
+            </a:r>
+            <a:r>
+              <a:rPr lang="hr-HR" dirty="0"/>
+              <a:t>, svi podaci su </a:t>
+            </a:r>
+            <a:r>
+              <a:rPr lang="hr-HR" b="1" dirty="0"/>
+              <a:t>izbrisani</a:t>
+            </a:r>
+            <a:r>
+              <a:rPr lang="hr-HR" dirty="0"/>
+              <a:t> i vraćeni na početno stanje</a:t>
+            </a:r>
+            <a:endParaRPr lang="en-US" dirty="0"/>
+          </a:p>
+          <a:p>
+            <a:pPr marL="15875" indent="0">
+              <a:buNone/>
+            </a:pPr>
+            <a:r>
+              <a:rPr lang="hr-HR" dirty="0"/>
+              <a:t>👉Zato što su podaci pohranjeni u </a:t>
+            </a:r>
+            <a:r>
+              <a:rPr lang="hr-HR" b="1" dirty="0"/>
+              <a:t>privremenoj memoriji</a:t>
+            </a:r>
+            <a:r>
+              <a:rPr lang="hr-HR" dirty="0"/>
+              <a:t> (RAM-u).</a:t>
+            </a:r>
+            <a:endParaRPr lang="en-US" dirty="0"/>
+          </a:p>
+          <a:p>
+            <a:pPr marL="15875" indent="0">
+              <a:buNone/>
+            </a:pPr>
+            <a:endParaRPr lang="hr-HR" dirty="0"/>
+          </a:p>
+        </p:txBody>
+      </p:sp>
+      <p:sp>
+        <p:nvSpPr>
+          <p:cNvPr id="8" name="Content Placeholder 2">
+            <a:extLst>
+              <a:ext uri="{FF2B5EF4-FFF2-40B4-BE49-F238E27FC236}">
+                <a16:creationId xmlns:a16="http://schemas.microsoft.com/office/drawing/2014/main" id="{1BC0CF8C-886E-AD0F-D124-AF5FDEBF9AE2}"/>
+              </a:ext>
+            </a:extLst>
+          </p:cNvPr>
+          <p:cNvSpPr txBox="1">
+            <a:spLocks/>
+          </p:cNvSpPr>
+          <p:nvPr/>
+        </p:nvSpPr>
+        <p:spPr>
+          <a:xfrm>
+            <a:off x="5368798" y="1751992"/>
+            <a:ext cx="3932237" cy="3161656"/>
+          </a:xfrm>
+          <a:prstGeom prst="rect">
+            <a:avLst/>
+          </a:prstGeom>
+        </p:spPr>
+        <p:txBody>
+          <a:bodyPr vert="horz" lIns="91440" tIns="45720" rIns="91440" bIns="45720" rtlCol="0">
+            <a:normAutofit lnSpcReduction="10000"/>
+          </a:bodyPr>
+          <a:lstStyle>
+            <a:lvl1pPr marL="368300" indent="-352425" algn="l" defTabSz="914400" rtl="0" eaLnBrk="1" latinLnBrk="0" hangingPunct="1">
+              <a:lnSpc>
+                <a:spcPct val="90000"/>
+              </a:lnSpc>
+              <a:spcBef>
+                <a:spcPts val="600"/>
+              </a:spcBef>
+              <a:spcAft>
+                <a:spcPts val="600"/>
+              </a:spcAft>
+              <a:buClr>
+                <a:schemeClr val="accent2"/>
+              </a:buClr>
+              <a:buFont typeface="Wingdings" pitchFamily="2" charset="2"/>
+              <a:buChar char="§"/>
+              <a:tabLst/>
+              <a:defRPr sz="2400" kern="1200">
+                <a:solidFill>
+                  <a:schemeClr val="tx1"/>
+                </a:solidFill>
+                <a:latin typeface="+mn-lt"/>
+                <a:ea typeface="Open Sans" panose="020B0606030504020204" pitchFamily="34" charset="0"/>
+                <a:cs typeface="Open Sans" panose="020B0606030504020204" pitchFamily="34" charset="0"/>
+              </a:defRPr>
+            </a:lvl1pPr>
+            <a:lvl2pPr marL="771525" indent="-274638" algn="l" defTabSz="914400" rtl="0" eaLnBrk="1" latinLnBrk="0" hangingPunct="1">
+              <a:lnSpc>
+                <a:spcPct val="90000"/>
+              </a:lnSpc>
+              <a:spcBef>
+                <a:spcPts val="600"/>
+              </a:spcBef>
+              <a:spcAft>
+                <a:spcPts val="600"/>
+              </a:spcAft>
+              <a:buClr>
+                <a:schemeClr val="accent2"/>
+              </a:buClr>
+              <a:buFont typeface="Wingdings" pitchFamily="2" charset="2"/>
+              <a:buChar char="§"/>
+              <a:tabLst/>
+              <a:defRPr sz="2200" kern="1200">
+                <a:solidFill>
+                  <a:schemeClr val="tx1"/>
+                </a:solidFill>
+                <a:latin typeface="+mn-lt"/>
+                <a:ea typeface="Open Sans" panose="020B0606030504020204" pitchFamily="34" charset="0"/>
+                <a:cs typeface="Open Sans" panose="020B0606030504020204" pitchFamily="34" charset="0"/>
+              </a:defRPr>
+            </a:lvl2pPr>
+            <a:lvl3pPr marL="1143000" indent="-228600" algn="l" defTabSz="914400" rtl="0" eaLnBrk="1" latinLnBrk="0" hangingPunct="1">
+              <a:lnSpc>
+                <a:spcPct val="90000"/>
+              </a:lnSpc>
+              <a:spcBef>
+                <a:spcPts val="600"/>
+              </a:spcBef>
+              <a:spcAft>
+                <a:spcPts val="600"/>
+              </a:spcAft>
+              <a:buClr>
+                <a:schemeClr val="accent2"/>
+              </a:buClr>
+              <a:buFont typeface="Wingdings" pitchFamily="2" charset="2"/>
+              <a:buChar char="§"/>
+              <a:defRPr sz="2000" kern="1200">
+                <a:solidFill>
+                  <a:schemeClr val="tx1"/>
+                </a:solidFill>
+                <a:latin typeface="+mn-lt"/>
+                <a:ea typeface="Open Sans" panose="020B0606030504020204" pitchFamily="34" charset="0"/>
+                <a:cs typeface="Open Sans" panose="020B0606030504020204" pitchFamily="34" charset="0"/>
+              </a:defRPr>
+            </a:lvl3pPr>
+            <a:lvl4pPr marL="1600200" indent="-228600" algn="l" defTabSz="914400" rtl="0" eaLnBrk="1" latinLnBrk="0" hangingPunct="1">
+              <a:lnSpc>
+                <a:spcPct val="90000"/>
+              </a:lnSpc>
+              <a:spcBef>
+                <a:spcPts val="600"/>
+              </a:spcBef>
+              <a:spcAft>
+                <a:spcPts val="600"/>
+              </a:spcAft>
+              <a:buClr>
+                <a:schemeClr val="accent2"/>
+              </a:buClr>
+              <a:buFont typeface="Wingdings" pitchFamily="2" charset="2"/>
+              <a:buChar char="§"/>
+              <a:defRPr sz="1800" kern="1200">
+                <a:solidFill>
+                  <a:schemeClr val="tx1"/>
+                </a:solidFill>
+                <a:latin typeface="+mn-lt"/>
+                <a:ea typeface="Open Sans" panose="020B0606030504020204" pitchFamily="34" charset="0"/>
+                <a:cs typeface="Open Sans" panose="020B0606030504020204" pitchFamily="34" charset="0"/>
+              </a:defRPr>
+            </a:lvl4pPr>
+            <a:lvl5pPr marL="1960563" indent="-225425" algn="l" defTabSz="914400" rtl="0" eaLnBrk="1" latinLnBrk="0" hangingPunct="1">
+              <a:lnSpc>
+                <a:spcPct val="90000"/>
+              </a:lnSpc>
+              <a:spcBef>
+                <a:spcPts val="600"/>
+              </a:spcBef>
+              <a:spcAft>
+                <a:spcPts val="600"/>
+              </a:spcAft>
+              <a:buClr>
+                <a:schemeClr val="accent2"/>
+              </a:buClr>
+              <a:buFont typeface="Wingdings" pitchFamily="2" charset="2"/>
+              <a:buChar char="§"/>
+              <a:tabLst/>
+              <a:defRPr sz="1600" kern="1200">
+                <a:solidFill>
+                  <a:schemeClr val="tx1"/>
+                </a:solidFill>
+                <a:latin typeface="+mn-lt"/>
+                <a:ea typeface="Open Sans" panose="020B0606030504020204" pitchFamily="34" charset="0"/>
+                <a:cs typeface="Open Sans" panose="020B0606030504020204" pitchFamily="34" charset="0"/>
+              </a:defRPr>
+            </a:lvl5pPr>
+            <a:lvl6pPr marL="2514600" indent="-228600" algn="l" defTabSz="914400" rtl="0" eaLnBrk="1" latinLnBrk="0" hangingPunct="1">
+              <a:lnSpc>
+                <a:spcPct val="90000"/>
+              </a:lnSpc>
+              <a:spcBef>
+                <a:spcPts val="500"/>
+              </a:spcBef>
+              <a:buFont typeface="Arial" panose="020B0604020202020204" pitchFamily="34" charset="0"/>
+              <a:buChar char="•"/>
+              <a:defRPr sz="1800" kern="1200">
+                <a:solidFill>
+                  <a:schemeClr val="tx1"/>
+                </a:solidFill>
+                <a:latin typeface="+mn-lt"/>
+                <a:ea typeface="+mn-ea"/>
+                <a:cs typeface="+mn-cs"/>
+              </a:defRPr>
+            </a:lvl6pPr>
+            <a:lvl7pPr marL="2971800" indent="-228600" algn="l" defTabSz="914400" rtl="0" eaLnBrk="1" latinLnBrk="0" hangingPunct="1">
+              <a:lnSpc>
+                <a:spcPct val="90000"/>
+              </a:lnSpc>
+              <a:spcBef>
+                <a:spcPts val="500"/>
+              </a:spcBef>
+              <a:buFont typeface="Arial" panose="020B0604020202020204" pitchFamily="34" charset="0"/>
+              <a:buChar char="•"/>
+              <a:defRPr sz="1800" kern="1200">
+                <a:solidFill>
+                  <a:schemeClr val="tx1"/>
+                </a:solidFill>
+                <a:latin typeface="+mn-lt"/>
+                <a:ea typeface="+mn-ea"/>
+                <a:cs typeface="+mn-cs"/>
+              </a:defRPr>
+            </a:lvl7pPr>
+            <a:lvl8pPr marL="3429000" indent="-228600" algn="l" defTabSz="914400" rtl="0" eaLnBrk="1" latinLnBrk="0" hangingPunct="1">
+              <a:lnSpc>
+                <a:spcPct val="90000"/>
+              </a:lnSpc>
+              <a:spcBef>
+                <a:spcPts val="500"/>
+              </a:spcBef>
+              <a:buFont typeface="Arial" panose="020B0604020202020204" pitchFamily="34" charset="0"/>
+              <a:buChar char="•"/>
+              <a:defRPr sz="1800" kern="1200">
+                <a:solidFill>
+                  <a:schemeClr val="tx1"/>
+                </a:solidFill>
+                <a:latin typeface="+mn-lt"/>
+                <a:ea typeface="+mn-ea"/>
+                <a:cs typeface="+mn-cs"/>
+              </a:defRPr>
+            </a:lvl8pPr>
+            <a:lvl9pPr marL="3886200" indent="-228600" algn="l" defTabSz="914400" rtl="0" eaLnBrk="1" latinLnBrk="0" hangingPunct="1">
+              <a:lnSpc>
+                <a:spcPct val="90000"/>
+              </a:lnSpc>
+              <a:spcBef>
+                <a:spcPts val="500"/>
+              </a:spcBef>
+              <a:buFont typeface="Arial" panose="020B0604020202020204" pitchFamily="34" charset="0"/>
+              <a:buChar char="•"/>
+              <a:defRPr sz="1800" kern="1200">
+                <a:solidFill>
+                  <a:schemeClr val="tx1"/>
+                </a:solidFill>
+                <a:latin typeface="+mn-lt"/>
+                <a:ea typeface="+mn-ea"/>
+                <a:cs typeface="+mn-cs"/>
+              </a:defRPr>
+            </a:lvl9pPr>
+          </a:lstStyle>
+          <a:p>
+            <a:pPr marL="15875" indent="0">
+              <a:buNone/>
+            </a:pPr>
+            <a:r>
+              <a:rPr lang="hr-HR" dirty="0"/>
+              <a:t>Postoje </a:t>
+            </a:r>
+            <a:r>
+              <a:rPr lang="hr-HR" b="1" dirty="0"/>
+              <a:t>dvije glavne vrste baza podataka</a:t>
+            </a:r>
+            <a:r>
+              <a:rPr lang="hr-HR" dirty="0"/>
+              <a:t>:</a:t>
+            </a:r>
+            <a:endParaRPr lang="en-US" dirty="0"/>
+          </a:p>
+          <a:p>
+            <a:pPr marL="15875" indent="0">
+              <a:buNone/>
+            </a:pPr>
+            <a:br>
+              <a:rPr lang="hr-HR" dirty="0"/>
+            </a:br>
+            <a:r>
+              <a:rPr lang="hr-HR" dirty="0"/>
+              <a:t>✔ </a:t>
+            </a:r>
+            <a:r>
+              <a:rPr lang="hr-HR" b="1" dirty="0"/>
+              <a:t>SQL baze podataka</a:t>
+            </a:r>
+            <a:r>
+              <a:rPr lang="hr-HR" dirty="0"/>
+              <a:t> </a:t>
+            </a:r>
+            <a:r>
+              <a:rPr lang="en-US" dirty="0"/>
+              <a:t>–</a:t>
+            </a:r>
+            <a:r>
+              <a:rPr lang="en-US" dirty="0" err="1"/>
+              <a:t>relacijske</a:t>
+            </a:r>
+            <a:r>
+              <a:rPr lang="en-US" dirty="0"/>
+              <a:t> </a:t>
+            </a:r>
+            <a:r>
+              <a:rPr lang="hr-HR" dirty="0"/>
+              <a:t>(strukturirane)</a:t>
+            </a:r>
+            <a:endParaRPr lang="en-US" dirty="0"/>
+          </a:p>
+          <a:p>
+            <a:pPr marL="15875" indent="0">
+              <a:buNone/>
+            </a:pPr>
+            <a:br>
+              <a:rPr lang="hr-HR" dirty="0"/>
+            </a:br>
+            <a:r>
+              <a:rPr lang="hr-HR" dirty="0"/>
+              <a:t>✔ </a:t>
+            </a:r>
+            <a:r>
+              <a:rPr lang="hr-HR" b="1" dirty="0" err="1"/>
+              <a:t>NoSQL</a:t>
+            </a:r>
+            <a:r>
+              <a:rPr lang="hr-HR" b="1" dirty="0"/>
+              <a:t> baze podataka</a:t>
+            </a:r>
+            <a:r>
+              <a:rPr lang="hr-HR" dirty="0"/>
+              <a:t> </a:t>
+            </a:r>
+            <a:r>
+              <a:rPr lang="en-US" dirty="0" err="1"/>
+              <a:t>nerelacijske</a:t>
+            </a:r>
+            <a:r>
+              <a:rPr lang="en-US" dirty="0"/>
+              <a:t> </a:t>
+            </a:r>
+            <a:r>
+              <a:rPr lang="hr-HR" dirty="0"/>
+              <a:t>(nema stroge strukture)</a:t>
+            </a:r>
+          </a:p>
+        </p:txBody>
+      </p:sp>
+    </p:spTree>
+    <p:extLst>
+      <p:ext uri="{BB962C8B-B14F-4D97-AF65-F5344CB8AC3E}">
+        <p14:creationId xmlns:p14="http://schemas.microsoft.com/office/powerpoint/2010/main" val="4089507502"/>
+      </p:ext>
+    </p:extLst>
+  </p:cSld>
+  <p:clrMapOvr>
+    <a:masterClrMapping/>
+  </p:clrMapOvr>
+</p:sld>
+</file>
+
+<file path=ppt/slides/slide20.xml><?xml version="1.0" encoding="utf-8"?>
 <p:sld xmlns:a="http://schemas.openxmlformats.org/drawingml/2006/main" xmlns:r="http://schemas.openxmlformats.org/officeDocument/2006/relationships" xmlns:p="http://schemas.openxmlformats.org/presentationml/2006/main">
   <p:cSld>
     <p:spTree>
@@ -19028,797 +20339,7 @@
 </p:sld>
 </file>
 
-<file path=ppt/slides/slide2.xml><?xml version="1.0" encoding="utf-8"?>
-<p:sld xmlns:a="http://schemas.openxmlformats.org/drawingml/2006/main" xmlns:r="http://schemas.openxmlformats.org/officeDocument/2006/relationships" xmlns:p="http://schemas.openxmlformats.org/presentationml/2006/main">
-  <p:cSld>
-    <p:spTree>
-      <p:nvGrpSpPr>
-        <p:cNvPr id="1" name="">
-          <a:extLst>
-            <a:ext uri="{FF2B5EF4-FFF2-40B4-BE49-F238E27FC236}">
-              <a16:creationId xmlns:a16="http://schemas.microsoft.com/office/drawing/2014/main" id="{918D26FF-D4FF-E27A-CD45-DD91280060C0}"/>
-            </a:ext>
-          </a:extLst>
-        </p:cNvPr>
-        <p:cNvGrpSpPr/>
-        <p:nvPr/>
-      </p:nvGrpSpPr>
-      <p:grpSpPr>
-        <a:xfrm>
-          <a:off x="0" y="0"/>
-          <a:ext cx="0" cy="0"/>
-          <a:chOff x="0" y="0"/>
-          <a:chExt cx="0" cy="0"/>
-        </a:xfrm>
-      </p:grpSpPr>
-      <p:sp>
-        <p:nvSpPr>
-          <p:cNvPr id="4" name="Title 1">
-            <a:extLst>
-              <a:ext uri="{FF2B5EF4-FFF2-40B4-BE49-F238E27FC236}">
-                <a16:creationId xmlns:a16="http://schemas.microsoft.com/office/drawing/2014/main" id="{119F6997-C2AB-77D2-A4ED-C8E2A7416C1D}"/>
-              </a:ext>
-            </a:extLst>
-          </p:cNvPr>
-          <p:cNvSpPr txBox="1">
-            <a:spLocks/>
-          </p:cNvSpPr>
-          <p:nvPr/>
-        </p:nvSpPr>
-        <p:spPr>
-          <a:xfrm>
-            <a:off x="990600" y="383056"/>
-            <a:ext cx="10515600" cy="853976"/>
-          </a:xfrm>
-          <a:prstGeom prst="rect">
-            <a:avLst/>
-          </a:prstGeom>
-        </p:spPr>
-        <p:txBody>
-          <a:bodyPr vert="horz" lIns="91440" tIns="45720" rIns="91440" bIns="45720" rtlCol="0" anchor="ctr">
-            <a:normAutofit/>
-          </a:bodyPr>
-          <a:lstStyle>
-            <a:lvl1pPr algn="l" defTabSz="914400" rtl="0" eaLnBrk="1" latinLnBrk="0" hangingPunct="1">
-              <a:lnSpc>
-                <a:spcPct val="90000"/>
-              </a:lnSpc>
-              <a:spcBef>
-                <a:spcPct val="0"/>
-              </a:spcBef>
-              <a:buNone/>
-              <a:defRPr sz="3600" b="1" i="0" kern="1200" cap="all" baseline="0">
-                <a:solidFill>
-                  <a:schemeClr val="tx2"/>
-                </a:solidFill>
-                <a:latin typeface="+mj-lt"/>
-                <a:ea typeface="Open Sans Semibold" panose="020B0606030504020204" pitchFamily="34" charset="0"/>
-                <a:cs typeface="Open Sans Semibold" panose="020B0606030504020204" pitchFamily="34" charset="0"/>
-              </a:defRPr>
-            </a:lvl1pPr>
-          </a:lstStyle>
-          <a:p>
-            <a:r>
-              <a:rPr lang="en-US" dirty="0" err="1"/>
-              <a:t>baze</a:t>
-            </a:r>
-            <a:r>
-              <a:rPr lang="en-US" dirty="0"/>
-              <a:t> </a:t>
-            </a:r>
-            <a:r>
-              <a:rPr lang="en-US" dirty="0" err="1"/>
-              <a:t>podataka</a:t>
-            </a:r>
-            <a:r>
-              <a:rPr lang="en-US" dirty="0"/>
-              <a:t> - </a:t>
-            </a:r>
-            <a:r>
-              <a:rPr lang="en-US" dirty="0" err="1"/>
-              <a:t>osnove</a:t>
-            </a:r>
-            <a:endParaRPr lang="hr-HR" dirty="0"/>
-          </a:p>
-        </p:txBody>
-      </p:sp>
-      <p:sp>
-        <p:nvSpPr>
-          <p:cNvPr id="6" name="Content Placeholder 2">
-            <a:extLst>
-              <a:ext uri="{FF2B5EF4-FFF2-40B4-BE49-F238E27FC236}">
-                <a16:creationId xmlns:a16="http://schemas.microsoft.com/office/drawing/2014/main" id="{11D32EC0-A401-2168-D46E-8C3F239BF562}"/>
-              </a:ext>
-            </a:extLst>
-          </p:cNvPr>
-          <p:cNvSpPr txBox="1">
-            <a:spLocks/>
-          </p:cNvSpPr>
-          <p:nvPr/>
-        </p:nvSpPr>
-        <p:spPr>
-          <a:xfrm>
-            <a:off x="924848" y="1751992"/>
-            <a:ext cx="3932237" cy="3161656"/>
-          </a:xfrm>
-          <a:prstGeom prst="rect">
-            <a:avLst/>
-          </a:prstGeom>
-        </p:spPr>
-        <p:txBody>
-          <a:bodyPr vert="horz" lIns="91440" tIns="45720" rIns="91440" bIns="45720" rtlCol="0">
-            <a:normAutofit fontScale="92500" lnSpcReduction="20000"/>
-          </a:bodyPr>
-          <a:lstStyle>
-            <a:lvl1pPr marL="368300" indent="-352425" algn="l" defTabSz="914400" rtl="0" eaLnBrk="1" latinLnBrk="0" hangingPunct="1">
-              <a:lnSpc>
-                <a:spcPct val="90000"/>
-              </a:lnSpc>
-              <a:spcBef>
-                <a:spcPts val="600"/>
-              </a:spcBef>
-              <a:spcAft>
-                <a:spcPts val="600"/>
-              </a:spcAft>
-              <a:buClr>
-                <a:schemeClr val="accent2"/>
-              </a:buClr>
-              <a:buFont typeface="Wingdings" pitchFamily="2" charset="2"/>
-              <a:buChar char="§"/>
-              <a:tabLst/>
-              <a:defRPr sz="2400" kern="1200">
-                <a:solidFill>
-                  <a:schemeClr val="tx1"/>
-                </a:solidFill>
-                <a:latin typeface="+mn-lt"/>
-                <a:ea typeface="Open Sans" panose="020B0606030504020204" pitchFamily="34" charset="0"/>
-                <a:cs typeface="Open Sans" panose="020B0606030504020204" pitchFamily="34" charset="0"/>
-              </a:defRPr>
-            </a:lvl1pPr>
-            <a:lvl2pPr marL="771525" indent="-274638" algn="l" defTabSz="914400" rtl="0" eaLnBrk="1" latinLnBrk="0" hangingPunct="1">
-              <a:lnSpc>
-                <a:spcPct val="90000"/>
-              </a:lnSpc>
-              <a:spcBef>
-                <a:spcPts val="600"/>
-              </a:spcBef>
-              <a:spcAft>
-                <a:spcPts val="600"/>
-              </a:spcAft>
-              <a:buClr>
-                <a:schemeClr val="accent2"/>
-              </a:buClr>
-              <a:buFont typeface="Wingdings" pitchFamily="2" charset="2"/>
-              <a:buChar char="§"/>
-              <a:tabLst/>
-              <a:defRPr sz="2200" kern="1200">
-                <a:solidFill>
-                  <a:schemeClr val="tx1"/>
-                </a:solidFill>
-                <a:latin typeface="+mn-lt"/>
-                <a:ea typeface="Open Sans" panose="020B0606030504020204" pitchFamily="34" charset="0"/>
-                <a:cs typeface="Open Sans" panose="020B0606030504020204" pitchFamily="34" charset="0"/>
-              </a:defRPr>
-            </a:lvl2pPr>
-            <a:lvl3pPr marL="1143000" indent="-228600" algn="l" defTabSz="914400" rtl="0" eaLnBrk="1" latinLnBrk="0" hangingPunct="1">
-              <a:lnSpc>
-                <a:spcPct val="90000"/>
-              </a:lnSpc>
-              <a:spcBef>
-                <a:spcPts val="600"/>
-              </a:spcBef>
-              <a:spcAft>
-                <a:spcPts val="600"/>
-              </a:spcAft>
-              <a:buClr>
-                <a:schemeClr val="accent2"/>
-              </a:buClr>
-              <a:buFont typeface="Wingdings" pitchFamily="2" charset="2"/>
-              <a:buChar char="§"/>
-              <a:defRPr sz="2000" kern="1200">
-                <a:solidFill>
-                  <a:schemeClr val="tx1"/>
-                </a:solidFill>
-                <a:latin typeface="+mn-lt"/>
-                <a:ea typeface="Open Sans" panose="020B0606030504020204" pitchFamily="34" charset="0"/>
-                <a:cs typeface="Open Sans" panose="020B0606030504020204" pitchFamily="34" charset="0"/>
-              </a:defRPr>
-            </a:lvl3pPr>
-            <a:lvl4pPr marL="1600200" indent="-228600" algn="l" defTabSz="914400" rtl="0" eaLnBrk="1" latinLnBrk="0" hangingPunct="1">
-              <a:lnSpc>
-                <a:spcPct val="90000"/>
-              </a:lnSpc>
-              <a:spcBef>
-                <a:spcPts val="600"/>
-              </a:spcBef>
-              <a:spcAft>
-                <a:spcPts val="600"/>
-              </a:spcAft>
-              <a:buClr>
-                <a:schemeClr val="accent2"/>
-              </a:buClr>
-              <a:buFont typeface="Wingdings" pitchFamily="2" charset="2"/>
-              <a:buChar char="§"/>
-              <a:defRPr sz="1800" kern="1200">
-                <a:solidFill>
-                  <a:schemeClr val="tx1"/>
-                </a:solidFill>
-                <a:latin typeface="+mn-lt"/>
-                <a:ea typeface="Open Sans" panose="020B0606030504020204" pitchFamily="34" charset="0"/>
-                <a:cs typeface="Open Sans" panose="020B0606030504020204" pitchFamily="34" charset="0"/>
-              </a:defRPr>
-            </a:lvl4pPr>
-            <a:lvl5pPr marL="1960563" indent="-225425" algn="l" defTabSz="914400" rtl="0" eaLnBrk="1" latinLnBrk="0" hangingPunct="1">
-              <a:lnSpc>
-                <a:spcPct val="90000"/>
-              </a:lnSpc>
-              <a:spcBef>
-                <a:spcPts val="600"/>
-              </a:spcBef>
-              <a:spcAft>
-                <a:spcPts val="600"/>
-              </a:spcAft>
-              <a:buClr>
-                <a:schemeClr val="accent2"/>
-              </a:buClr>
-              <a:buFont typeface="Wingdings" pitchFamily="2" charset="2"/>
-              <a:buChar char="§"/>
-              <a:tabLst/>
-              <a:defRPr sz="1600" kern="1200">
-                <a:solidFill>
-                  <a:schemeClr val="tx1"/>
-                </a:solidFill>
-                <a:latin typeface="+mn-lt"/>
-                <a:ea typeface="Open Sans" panose="020B0606030504020204" pitchFamily="34" charset="0"/>
-                <a:cs typeface="Open Sans" panose="020B0606030504020204" pitchFamily="34" charset="0"/>
-              </a:defRPr>
-            </a:lvl5pPr>
-            <a:lvl6pPr marL="2514600" indent="-228600" algn="l" defTabSz="914400" rtl="0" eaLnBrk="1" latinLnBrk="0" hangingPunct="1">
-              <a:lnSpc>
-                <a:spcPct val="90000"/>
-              </a:lnSpc>
-              <a:spcBef>
-                <a:spcPts val="500"/>
-              </a:spcBef>
-              <a:buFont typeface="Arial" panose="020B0604020202020204" pitchFamily="34" charset="0"/>
-              <a:buChar char="•"/>
-              <a:defRPr sz="1800" kern="1200">
-                <a:solidFill>
-                  <a:schemeClr val="tx1"/>
-                </a:solidFill>
-                <a:latin typeface="+mn-lt"/>
-                <a:ea typeface="+mn-ea"/>
-                <a:cs typeface="+mn-cs"/>
-              </a:defRPr>
-            </a:lvl6pPr>
-            <a:lvl7pPr marL="2971800" indent="-228600" algn="l" defTabSz="914400" rtl="0" eaLnBrk="1" latinLnBrk="0" hangingPunct="1">
-              <a:lnSpc>
-                <a:spcPct val="90000"/>
-              </a:lnSpc>
-              <a:spcBef>
-                <a:spcPts val="500"/>
-              </a:spcBef>
-              <a:buFont typeface="Arial" panose="020B0604020202020204" pitchFamily="34" charset="0"/>
-              <a:buChar char="•"/>
-              <a:defRPr sz="1800" kern="1200">
-                <a:solidFill>
-                  <a:schemeClr val="tx1"/>
-                </a:solidFill>
-                <a:latin typeface="+mn-lt"/>
-                <a:ea typeface="+mn-ea"/>
-                <a:cs typeface="+mn-cs"/>
-              </a:defRPr>
-            </a:lvl7pPr>
-            <a:lvl8pPr marL="3429000" indent="-228600" algn="l" defTabSz="914400" rtl="0" eaLnBrk="1" latinLnBrk="0" hangingPunct="1">
-              <a:lnSpc>
-                <a:spcPct val="90000"/>
-              </a:lnSpc>
-              <a:spcBef>
-                <a:spcPts val="500"/>
-              </a:spcBef>
-              <a:buFont typeface="Arial" panose="020B0604020202020204" pitchFamily="34" charset="0"/>
-              <a:buChar char="•"/>
-              <a:defRPr sz="1800" kern="1200">
-                <a:solidFill>
-                  <a:schemeClr val="tx1"/>
-                </a:solidFill>
-                <a:latin typeface="+mn-lt"/>
-                <a:ea typeface="+mn-ea"/>
-                <a:cs typeface="+mn-cs"/>
-              </a:defRPr>
-            </a:lvl8pPr>
-            <a:lvl9pPr marL="3886200" indent="-228600" algn="l" defTabSz="914400" rtl="0" eaLnBrk="1" latinLnBrk="0" hangingPunct="1">
-              <a:lnSpc>
-                <a:spcPct val="90000"/>
-              </a:lnSpc>
-              <a:spcBef>
-                <a:spcPts val="500"/>
-              </a:spcBef>
-              <a:buFont typeface="Arial" panose="020B0604020202020204" pitchFamily="34" charset="0"/>
-              <a:buChar char="•"/>
-              <a:defRPr sz="1800" kern="1200">
-                <a:solidFill>
-                  <a:schemeClr val="tx1"/>
-                </a:solidFill>
-                <a:latin typeface="+mn-lt"/>
-                <a:ea typeface="+mn-ea"/>
-                <a:cs typeface="+mn-cs"/>
-              </a:defRPr>
-            </a:lvl9pPr>
-          </a:lstStyle>
-          <a:p>
-            <a:pPr marL="15875" indent="0">
-              <a:buNone/>
-            </a:pPr>
-            <a:r>
-              <a:rPr lang="hr-HR" dirty="0"/>
-              <a:t>🔹 </a:t>
-            </a:r>
-            <a:r>
-              <a:rPr lang="en-US" dirty="0"/>
-              <a:t>Baze </a:t>
-            </a:r>
-            <a:r>
-              <a:rPr lang="en-US" dirty="0" err="1"/>
-              <a:t>podataka</a:t>
-            </a:r>
-            <a:r>
-              <a:rPr lang="en-US" dirty="0"/>
-              <a:t> </a:t>
-            </a:r>
-            <a:r>
-              <a:rPr lang="en-US" dirty="0" err="1"/>
-              <a:t>nam</a:t>
-            </a:r>
-            <a:r>
-              <a:rPr lang="en-US" dirty="0"/>
-              <a:t> </a:t>
-            </a:r>
-            <a:r>
-              <a:rPr lang="en-US" dirty="0" err="1"/>
-              <a:t>omo</a:t>
-            </a:r>
-            <a:r>
-              <a:rPr lang="hr-HR" dirty="0" err="1"/>
-              <a:t>gućavaju</a:t>
-            </a:r>
-            <a:r>
-              <a:rPr lang="hr-HR" dirty="0"/>
-              <a:t> da </a:t>
-            </a:r>
-            <a:r>
-              <a:rPr lang="en-US" b="1" dirty="0" err="1"/>
-              <a:t>podatke</a:t>
-            </a:r>
-            <a:r>
-              <a:rPr lang="en-US" b="1" dirty="0"/>
-              <a:t> </a:t>
-            </a:r>
-            <a:r>
-              <a:rPr lang="en-US" b="1" dirty="0" err="1"/>
-              <a:t>spremimo</a:t>
-            </a:r>
-            <a:r>
-              <a:rPr lang="en-US" b="1" dirty="0"/>
-              <a:t> </a:t>
-            </a:r>
-            <a:r>
-              <a:rPr lang="hr-HR" b="1" dirty="0"/>
-              <a:t>trajno</a:t>
-            </a:r>
-            <a:r>
-              <a:rPr lang="hr-HR" dirty="0"/>
-              <a:t> i </a:t>
-            </a:r>
-            <a:r>
-              <a:rPr lang="en-US" dirty="0"/>
-              <a:t>da se </a:t>
-            </a:r>
-            <a:r>
-              <a:rPr lang="hr-HR" dirty="0"/>
-              <a:t>mogu dohvaćati po potrebi.</a:t>
-            </a:r>
-            <a:endParaRPr lang="en-US" dirty="0"/>
-          </a:p>
-          <a:p>
-            <a:pPr marL="15875" indent="0">
-              <a:buNone/>
-            </a:pPr>
-            <a:r>
-              <a:rPr lang="hr-HR" dirty="0"/>
-              <a:t>👉 </a:t>
-            </a:r>
-            <a:r>
-              <a:rPr lang="en-US" dirty="0"/>
-              <a:t>Bez </a:t>
-            </a:r>
-            <a:r>
-              <a:rPr lang="en-US" dirty="0" err="1"/>
-              <a:t>baze</a:t>
-            </a:r>
-            <a:r>
-              <a:rPr lang="en-US" dirty="0"/>
-              <a:t>, </a:t>
-            </a:r>
-            <a:r>
-              <a:rPr lang="hr-HR" dirty="0"/>
-              <a:t>Nakon </a:t>
-            </a:r>
-            <a:r>
-              <a:rPr lang="hr-HR" dirty="0" err="1"/>
-              <a:t>restarta</a:t>
-            </a:r>
-            <a:r>
-              <a:rPr lang="hr-HR" dirty="0"/>
-              <a:t>, svi podaci su </a:t>
-            </a:r>
-            <a:r>
-              <a:rPr lang="hr-HR" b="1" dirty="0"/>
-              <a:t>izbrisani</a:t>
-            </a:r>
-            <a:r>
-              <a:rPr lang="hr-HR" dirty="0"/>
-              <a:t> i vraćeni na početno stanje</a:t>
-            </a:r>
-            <a:endParaRPr lang="en-US" dirty="0"/>
-          </a:p>
-          <a:p>
-            <a:pPr marL="15875" indent="0">
-              <a:buNone/>
-            </a:pPr>
-            <a:r>
-              <a:rPr lang="hr-HR" dirty="0"/>
-              <a:t>👉Zato što su podaci pohranjeni u </a:t>
-            </a:r>
-            <a:r>
-              <a:rPr lang="hr-HR" b="1" dirty="0"/>
-              <a:t>privremenoj memoriji</a:t>
-            </a:r>
-            <a:r>
-              <a:rPr lang="hr-HR" dirty="0"/>
-              <a:t> (RAM-u).</a:t>
-            </a:r>
-            <a:endParaRPr lang="en-US" dirty="0"/>
-          </a:p>
-          <a:p>
-            <a:pPr marL="15875" indent="0">
-              <a:buNone/>
-            </a:pPr>
-            <a:endParaRPr lang="hr-HR" dirty="0"/>
-          </a:p>
-        </p:txBody>
-      </p:sp>
-      <p:sp>
-        <p:nvSpPr>
-          <p:cNvPr id="8" name="Content Placeholder 2">
-            <a:extLst>
-              <a:ext uri="{FF2B5EF4-FFF2-40B4-BE49-F238E27FC236}">
-                <a16:creationId xmlns:a16="http://schemas.microsoft.com/office/drawing/2014/main" id="{1BC0CF8C-886E-AD0F-D124-AF5FDEBF9AE2}"/>
-              </a:ext>
-            </a:extLst>
-          </p:cNvPr>
-          <p:cNvSpPr txBox="1">
-            <a:spLocks/>
-          </p:cNvSpPr>
-          <p:nvPr/>
-        </p:nvSpPr>
-        <p:spPr>
-          <a:xfrm>
-            <a:off x="5368798" y="1751992"/>
-            <a:ext cx="3932237" cy="3161656"/>
-          </a:xfrm>
-          <a:prstGeom prst="rect">
-            <a:avLst/>
-          </a:prstGeom>
-        </p:spPr>
-        <p:txBody>
-          <a:bodyPr vert="horz" lIns="91440" tIns="45720" rIns="91440" bIns="45720" rtlCol="0">
-            <a:normAutofit lnSpcReduction="10000"/>
-          </a:bodyPr>
-          <a:lstStyle>
-            <a:lvl1pPr marL="368300" indent="-352425" algn="l" defTabSz="914400" rtl="0" eaLnBrk="1" latinLnBrk="0" hangingPunct="1">
-              <a:lnSpc>
-                <a:spcPct val="90000"/>
-              </a:lnSpc>
-              <a:spcBef>
-                <a:spcPts val="600"/>
-              </a:spcBef>
-              <a:spcAft>
-                <a:spcPts val="600"/>
-              </a:spcAft>
-              <a:buClr>
-                <a:schemeClr val="accent2"/>
-              </a:buClr>
-              <a:buFont typeface="Wingdings" pitchFamily="2" charset="2"/>
-              <a:buChar char="§"/>
-              <a:tabLst/>
-              <a:defRPr sz="2400" kern="1200">
-                <a:solidFill>
-                  <a:schemeClr val="tx1"/>
-                </a:solidFill>
-                <a:latin typeface="+mn-lt"/>
-                <a:ea typeface="Open Sans" panose="020B0606030504020204" pitchFamily="34" charset="0"/>
-                <a:cs typeface="Open Sans" panose="020B0606030504020204" pitchFamily="34" charset="0"/>
-              </a:defRPr>
-            </a:lvl1pPr>
-            <a:lvl2pPr marL="771525" indent="-274638" algn="l" defTabSz="914400" rtl="0" eaLnBrk="1" latinLnBrk="0" hangingPunct="1">
-              <a:lnSpc>
-                <a:spcPct val="90000"/>
-              </a:lnSpc>
-              <a:spcBef>
-                <a:spcPts val="600"/>
-              </a:spcBef>
-              <a:spcAft>
-                <a:spcPts val="600"/>
-              </a:spcAft>
-              <a:buClr>
-                <a:schemeClr val="accent2"/>
-              </a:buClr>
-              <a:buFont typeface="Wingdings" pitchFamily="2" charset="2"/>
-              <a:buChar char="§"/>
-              <a:tabLst/>
-              <a:defRPr sz="2200" kern="1200">
-                <a:solidFill>
-                  <a:schemeClr val="tx1"/>
-                </a:solidFill>
-                <a:latin typeface="+mn-lt"/>
-                <a:ea typeface="Open Sans" panose="020B0606030504020204" pitchFamily="34" charset="0"/>
-                <a:cs typeface="Open Sans" panose="020B0606030504020204" pitchFamily="34" charset="0"/>
-              </a:defRPr>
-            </a:lvl2pPr>
-            <a:lvl3pPr marL="1143000" indent="-228600" algn="l" defTabSz="914400" rtl="0" eaLnBrk="1" latinLnBrk="0" hangingPunct="1">
-              <a:lnSpc>
-                <a:spcPct val="90000"/>
-              </a:lnSpc>
-              <a:spcBef>
-                <a:spcPts val="600"/>
-              </a:spcBef>
-              <a:spcAft>
-                <a:spcPts val="600"/>
-              </a:spcAft>
-              <a:buClr>
-                <a:schemeClr val="accent2"/>
-              </a:buClr>
-              <a:buFont typeface="Wingdings" pitchFamily="2" charset="2"/>
-              <a:buChar char="§"/>
-              <a:defRPr sz="2000" kern="1200">
-                <a:solidFill>
-                  <a:schemeClr val="tx1"/>
-                </a:solidFill>
-                <a:latin typeface="+mn-lt"/>
-                <a:ea typeface="Open Sans" panose="020B0606030504020204" pitchFamily="34" charset="0"/>
-                <a:cs typeface="Open Sans" panose="020B0606030504020204" pitchFamily="34" charset="0"/>
-              </a:defRPr>
-            </a:lvl3pPr>
-            <a:lvl4pPr marL="1600200" indent="-228600" algn="l" defTabSz="914400" rtl="0" eaLnBrk="1" latinLnBrk="0" hangingPunct="1">
-              <a:lnSpc>
-                <a:spcPct val="90000"/>
-              </a:lnSpc>
-              <a:spcBef>
-                <a:spcPts val="600"/>
-              </a:spcBef>
-              <a:spcAft>
-                <a:spcPts val="600"/>
-              </a:spcAft>
-              <a:buClr>
-                <a:schemeClr val="accent2"/>
-              </a:buClr>
-              <a:buFont typeface="Wingdings" pitchFamily="2" charset="2"/>
-              <a:buChar char="§"/>
-              <a:defRPr sz="1800" kern="1200">
-                <a:solidFill>
-                  <a:schemeClr val="tx1"/>
-                </a:solidFill>
-                <a:latin typeface="+mn-lt"/>
-                <a:ea typeface="Open Sans" panose="020B0606030504020204" pitchFamily="34" charset="0"/>
-                <a:cs typeface="Open Sans" panose="020B0606030504020204" pitchFamily="34" charset="0"/>
-              </a:defRPr>
-            </a:lvl4pPr>
-            <a:lvl5pPr marL="1960563" indent="-225425" algn="l" defTabSz="914400" rtl="0" eaLnBrk="1" latinLnBrk="0" hangingPunct="1">
-              <a:lnSpc>
-                <a:spcPct val="90000"/>
-              </a:lnSpc>
-              <a:spcBef>
-                <a:spcPts val="600"/>
-              </a:spcBef>
-              <a:spcAft>
-                <a:spcPts val="600"/>
-              </a:spcAft>
-              <a:buClr>
-                <a:schemeClr val="accent2"/>
-              </a:buClr>
-              <a:buFont typeface="Wingdings" pitchFamily="2" charset="2"/>
-              <a:buChar char="§"/>
-              <a:tabLst/>
-              <a:defRPr sz="1600" kern="1200">
-                <a:solidFill>
-                  <a:schemeClr val="tx1"/>
-                </a:solidFill>
-                <a:latin typeface="+mn-lt"/>
-                <a:ea typeface="Open Sans" panose="020B0606030504020204" pitchFamily="34" charset="0"/>
-                <a:cs typeface="Open Sans" panose="020B0606030504020204" pitchFamily="34" charset="0"/>
-              </a:defRPr>
-            </a:lvl5pPr>
-            <a:lvl6pPr marL="2514600" indent="-228600" algn="l" defTabSz="914400" rtl="0" eaLnBrk="1" latinLnBrk="0" hangingPunct="1">
-              <a:lnSpc>
-                <a:spcPct val="90000"/>
-              </a:lnSpc>
-              <a:spcBef>
-                <a:spcPts val="500"/>
-              </a:spcBef>
-              <a:buFont typeface="Arial" panose="020B0604020202020204" pitchFamily="34" charset="0"/>
-              <a:buChar char="•"/>
-              <a:defRPr sz="1800" kern="1200">
-                <a:solidFill>
-                  <a:schemeClr val="tx1"/>
-                </a:solidFill>
-                <a:latin typeface="+mn-lt"/>
-                <a:ea typeface="+mn-ea"/>
-                <a:cs typeface="+mn-cs"/>
-              </a:defRPr>
-            </a:lvl6pPr>
-            <a:lvl7pPr marL="2971800" indent="-228600" algn="l" defTabSz="914400" rtl="0" eaLnBrk="1" latinLnBrk="0" hangingPunct="1">
-              <a:lnSpc>
-                <a:spcPct val="90000"/>
-              </a:lnSpc>
-              <a:spcBef>
-                <a:spcPts val="500"/>
-              </a:spcBef>
-              <a:buFont typeface="Arial" panose="020B0604020202020204" pitchFamily="34" charset="0"/>
-              <a:buChar char="•"/>
-              <a:defRPr sz="1800" kern="1200">
-                <a:solidFill>
-                  <a:schemeClr val="tx1"/>
-                </a:solidFill>
-                <a:latin typeface="+mn-lt"/>
-                <a:ea typeface="+mn-ea"/>
-                <a:cs typeface="+mn-cs"/>
-              </a:defRPr>
-            </a:lvl7pPr>
-            <a:lvl8pPr marL="3429000" indent="-228600" algn="l" defTabSz="914400" rtl="0" eaLnBrk="1" latinLnBrk="0" hangingPunct="1">
-              <a:lnSpc>
-                <a:spcPct val="90000"/>
-              </a:lnSpc>
-              <a:spcBef>
-                <a:spcPts val="500"/>
-              </a:spcBef>
-              <a:buFont typeface="Arial" panose="020B0604020202020204" pitchFamily="34" charset="0"/>
-              <a:buChar char="•"/>
-              <a:defRPr sz="1800" kern="1200">
-                <a:solidFill>
-                  <a:schemeClr val="tx1"/>
-                </a:solidFill>
-                <a:latin typeface="+mn-lt"/>
-                <a:ea typeface="+mn-ea"/>
-                <a:cs typeface="+mn-cs"/>
-              </a:defRPr>
-            </a:lvl8pPr>
-            <a:lvl9pPr marL="3886200" indent="-228600" algn="l" defTabSz="914400" rtl="0" eaLnBrk="1" latinLnBrk="0" hangingPunct="1">
-              <a:lnSpc>
-                <a:spcPct val="90000"/>
-              </a:lnSpc>
-              <a:spcBef>
-                <a:spcPts val="500"/>
-              </a:spcBef>
-              <a:buFont typeface="Arial" panose="020B0604020202020204" pitchFamily="34" charset="0"/>
-              <a:buChar char="•"/>
-              <a:defRPr sz="1800" kern="1200">
-                <a:solidFill>
-                  <a:schemeClr val="tx1"/>
-                </a:solidFill>
-                <a:latin typeface="+mn-lt"/>
-                <a:ea typeface="+mn-ea"/>
-                <a:cs typeface="+mn-cs"/>
-              </a:defRPr>
-            </a:lvl9pPr>
-          </a:lstStyle>
-          <a:p>
-            <a:pPr marL="15875" indent="0">
-              <a:buNone/>
-            </a:pPr>
-            <a:r>
-              <a:rPr lang="hr-HR" dirty="0"/>
-              <a:t>Postoje </a:t>
-            </a:r>
-            <a:r>
-              <a:rPr lang="hr-HR" b="1" dirty="0"/>
-              <a:t>dvije glavne vrste baza podataka</a:t>
-            </a:r>
-            <a:r>
-              <a:rPr lang="hr-HR" dirty="0"/>
-              <a:t>:</a:t>
-            </a:r>
-            <a:endParaRPr lang="en-US" dirty="0"/>
-          </a:p>
-          <a:p>
-            <a:pPr marL="15875" indent="0">
-              <a:buNone/>
-            </a:pPr>
-            <a:br>
-              <a:rPr lang="hr-HR" dirty="0"/>
-            </a:br>
-            <a:r>
-              <a:rPr lang="hr-HR" dirty="0"/>
-              <a:t>✔ </a:t>
-            </a:r>
-            <a:r>
-              <a:rPr lang="hr-HR" b="1" dirty="0"/>
-              <a:t>SQL baze podataka</a:t>
-            </a:r>
-            <a:r>
-              <a:rPr lang="hr-HR" dirty="0"/>
-              <a:t> </a:t>
-            </a:r>
-            <a:r>
-              <a:rPr lang="en-US" dirty="0"/>
-              <a:t>–</a:t>
-            </a:r>
-            <a:r>
-              <a:rPr lang="en-US" dirty="0" err="1"/>
-              <a:t>relacijske</a:t>
-            </a:r>
-            <a:r>
-              <a:rPr lang="en-US" dirty="0"/>
-              <a:t> </a:t>
-            </a:r>
-            <a:r>
-              <a:rPr lang="hr-HR" dirty="0"/>
-              <a:t>(strukturirane)</a:t>
-            </a:r>
-            <a:endParaRPr lang="en-US" dirty="0"/>
-          </a:p>
-          <a:p>
-            <a:pPr marL="15875" indent="0">
-              <a:buNone/>
-            </a:pPr>
-            <a:br>
-              <a:rPr lang="hr-HR" dirty="0"/>
-            </a:br>
-            <a:r>
-              <a:rPr lang="hr-HR" dirty="0"/>
-              <a:t>✔ </a:t>
-            </a:r>
-            <a:r>
-              <a:rPr lang="hr-HR" b="1" dirty="0" err="1"/>
-              <a:t>NoSQL</a:t>
-            </a:r>
-            <a:r>
-              <a:rPr lang="hr-HR" b="1" dirty="0"/>
-              <a:t> baze podataka</a:t>
-            </a:r>
-            <a:r>
-              <a:rPr lang="hr-HR" dirty="0"/>
-              <a:t> </a:t>
-            </a:r>
-            <a:r>
-              <a:rPr lang="en-US" dirty="0" err="1"/>
-              <a:t>nerelacijske</a:t>
-            </a:r>
-            <a:r>
-              <a:rPr lang="en-US" dirty="0"/>
-              <a:t> </a:t>
-            </a:r>
-            <a:r>
-              <a:rPr lang="hr-HR" dirty="0"/>
-              <a:t>(nema stroge strukture)</a:t>
-            </a:r>
-          </a:p>
-        </p:txBody>
-      </p:sp>
-    </p:spTree>
-    <p:extLst>
-      <p:ext uri="{BB962C8B-B14F-4D97-AF65-F5344CB8AC3E}">
-        <p14:creationId xmlns:p14="http://schemas.microsoft.com/office/powerpoint/2010/main" val="4089507502"/>
-      </p:ext>
-    </p:extLst>
-  </p:cSld>
-  <p:clrMapOvr>
-    <a:masterClrMapping/>
-  </p:clrMapOvr>
-</p:sld>
-</file>
-
-<file path=ppt/slides/slide20.xml><?xml version="1.0" encoding="utf-8"?>
+<file path=ppt/slides/slide21.xml><?xml version="1.0" encoding="utf-8"?>
 <p:sld xmlns:a="http://schemas.openxmlformats.org/drawingml/2006/main" xmlns:r="http://schemas.openxmlformats.org/officeDocument/2006/relationships" xmlns:p="http://schemas.openxmlformats.org/presentationml/2006/main">
   <p:cSld>
     <p:spTree>
@@ -20015,7 +20536,7 @@
 </p:sld>
 </file>
 
-<file path=ppt/slides/slide21.xml><?xml version="1.0" encoding="utf-8"?>
+<file path=ppt/slides/slide22.xml><?xml version="1.0" encoding="utf-8"?>
 <p:sld xmlns:a="http://schemas.openxmlformats.org/drawingml/2006/main" xmlns:r="http://schemas.openxmlformats.org/officeDocument/2006/relationships" xmlns:p="http://schemas.openxmlformats.org/presentationml/2006/main">
   <p:cSld>
     <p:spTree>
@@ -20152,7 +20673,7 @@
 </p:sld>
 </file>
 
-<file path=ppt/slides/slide22.xml><?xml version="1.0" encoding="utf-8"?>
+<file path=ppt/slides/slide23.xml><?xml version="1.0" encoding="utf-8"?>
 <p:sld xmlns:a="http://schemas.openxmlformats.org/drawingml/2006/main" xmlns:r="http://schemas.openxmlformats.org/officeDocument/2006/relationships" xmlns:p="http://schemas.openxmlformats.org/presentationml/2006/main">
   <p:cSld>
     <p:spTree>
@@ -20417,7 +20938,7 @@
 </p:sld>
 </file>
 
-<file path=ppt/slides/slide23.xml><?xml version="1.0" encoding="utf-8"?>
+<file path=ppt/slides/slide24.xml><?xml version="1.0" encoding="utf-8"?>
 <p:sld xmlns:a="http://schemas.openxmlformats.org/drawingml/2006/main" xmlns:r="http://schemas.openxmlformats.org/officeDocument/2006/relationships" xmlns:p="http://schemas.openxmlformats.org/presentationml/2006/main">
   <p:cSld>
     <p:spTree>
@@ -20694,7 +21215,7 @@
 </p:sld>
 </file>
 
-<file path=ppt/slides/slide24.xml><?xml version="1.0" encoding="utf-8"?>
+<file path=ppt/slides/slide25.xml><?xml version="1.0" encoding="utf-8"?>
 <p:sld xmlns:a="http://schemas.openxmlformats.org/drawingml/2006/main" xmlns:r="http://schemas.openxmlformats.org/officeDocument/2006/relationships" xmlns:p="http://schemas.openxmlformats.org/presentationml/2006/main">
   <p:cSld>
     <p:spTree>
@@ -20834,7 +21355,7 @@
 </p:sld>
 </file>
 
-<file path=ppt/slides/slide25.xml><?xml version="1.0" encoding="utf-8"?>
+<file path=ppt/slides/slide26.xml><?xml version="1.0" encoding="utf-8"?>
 <p:sld xmlns:a="http://schemas.openxmlformats.org/drawingml/2006/main" xmlns:r="http://schemas.openxmlformats.org/officeDocument/2006/relationships" xmlns:p="http://schemas.openxmlformats.org/presentationml/2006/main">
   <p:cSld>
     <p:spTree>
@@ -20941,8 +21462,8 @@
         </p:nvGrpSpPr>
         <p:grpSpPr>
           <a:xfrm>
-            <a:off x="3627141" y="1873825"/>
-            <a:ext cx="4333875" cy="2480497"/>
+            <a:off x="3367833" y="1567539"/>
+            <a:ext cx="6704214" cy="3837163"/>
             <a:chOff x="1226841" y="1635410"/>
             <a:chExt cx="4333875" cy="2480497"/>
           </a:xfrm>
@@ -21102,7 +21623,7 @@
 </p:sld>
 </file>
 
-<file path=ppt/slides/slide26.xml><?xml version="1.0" encoding="utf-8"?>
+<file path=ppt/slides/slide27.xml><?xml version="1.0" encoding="utf-8"?>
 <p:sld xmlns:a="http://schemas.openxmlformats.org/drawingml/2006/main" xmlns:r="http://schemas.openxmlformats.org/officeDocument/2006/relationships" xmlns:p="http://schemas.openxmlformats.org/presentationml/2006/main">
   <p:cSld>
     <p:spTree>
@@ -21490,7 +22011,7 @@
 </p:sld>
 </file>
 
-<file path=ppt/slides/slide27.xml><?xml version="1.0" encoding="utf-8"?>
+<file path=ppt/slides/slide28.xml><?xml version="1.0" encoding="utf-8"?>
 <p:sld xmlns:a="http://schemas.openxmlformats.org/drawingml/2006/main" xmlns:r="http://schemas.openxmlformats.org/officeDocument/2006/relationships" xmlns:p="http://schemas.openxmlformats.org/presentationml/2006/main">
   <p:cSld>
     <p:spTree>
@@ -21590,8 +22111,8 @@
         </p:nvSpPr>
         <p:spPr>
           <a:xfrm>
-            <a:off x="1024270" y="1647468"/>
-            <a:ext cx="2649279" cy="369332"/>
+            <a:off x="990600" y="1824889"/>
+            <a:ext cx="2649279" cy="646331"/>
           </a:xfrm>
           <a:prstGeom prst="rect">
             <a:avLst/>
@@ -21632,6 +22153,9 @@
               <a:rPr lang="en-US" dirty="0" err="1"/>
               <a:t>bazom</a:t>
             </a:r>
+            <a:endParaRPr lang="en-US" dirty="0"/>
+          </a:p>
+          <a:p>
             <a:endParaRPr lang="en-US" dirty="0"/>
           </a:p>
         </p:txBody>
@@ -21658,50 +22182,20 @@
         </p:blipFill>
         <p:spPr>
           <a:xfrm>
-            <a:off x="871134" y="2340343"/>
-            <a:ext cx="2734466" cy="2789596"/>
+            <a:off x="6248400" y="1581262"/>
+            <a:ext cx="3839752" cy="3917166"/>
           </a:xfrm>
           <a:prstGeom prst="rect">
             <a:avLst/>
           </a:prstGeom>
         </p:spPr>
       </p:pic>
-      <p:pic>
-        <p:nvPicPr>
-          <p:cNvPr id="20" name="Picture 19">
-            <a:extLst>
-              <a:ext uri="{FF2B5EF4-FFF2-40B4-BE49-F238E27FC236}">
-                <a16:creationId xmlns:a16="http://schemas.microsoft.com/office/drawing/2014/main" id="{CE8D563F-17B6-B61A-C588-993DAFC4E44C}"/>
-              </a:ext>
-            </a:extLst>
-          </p:cNvPr>
-          <p:cNvPicPr>
-            <a:picLocks noChangeAspect="1"/>
-          </p:cNvPicPr>
-          <p:nvPr/>
-        </p:nvPicPr>
-        <p:blipFill>
-          <a:blip r:embed="rId4"/>
-          <a:stretch>
-            <a:fillRect/>
-          </a:stretch>
-        </p:blipFill>
-        <p:spPr>
-          <a:xfrm>
-            <a:off x="4020713" y="2340343"/>
-            <a:ext cx="3913646" cy="1560228"/>
-          </a:xfrm>
-          <a:prstGeom prst="rect">
-            <a:avLst/>
-          </a:prstGeom>
-        </p:spPr>
-      </p:pic>
       <p:sp>
         <p:nvSpPr>
-          <p:cNvPr id="21" name="TextBox 20">
-            <a:extLst>
-              <a:ext uri="{FF2B5EF4-FFF2-40B4-BE49-F238E27FC236}">
-                <a16:creationId xmlns:a16="http://schemas.microsoft.com/office/drawing/2014/main" id="{DCBC15BB-E323-AA3A-621B-802F45C176F5}"/>
+          <p:cNvPr id="5" name="TextBox 4">
+            <a:extLst>
+              <a:ext uri="{FF2B5EF4-FFF2-40B4-BE49-F238E27FC236}">
+                <a16:creationId xmlns:a16="http://schemas.microsoft.com/office/drawing/2014/main" id="{FEF2DF1E-5BA5-98DA-C739-154E173FE59B}"/>
               </a:ext>
             </a:extLst>
           </p:cNvPr>
@@ -21710,8 +22204,8 @@
         </p:nvSpPr>
         <p:spPr>
           <a:xfrm>
-            <a:off x="4020713" y="1643376"/>
-            <a:ext cx="3464607" cy="369332"/>
+            <a:off x="990600" y="2704235"/>
+            <a:ext cx="4741460" cy="646331"/>
           </a:xfrm>
           <a:prstGeom prst="rect">
             <a:avLst/>
@@ -21726,86 +22220,50 @@
           <a:p>
             <a:r>
               <a:rPr lang="en-US" dirty="0"/>
-              <a:t>- </a:t>
+              <a:t>-</a:t>
             </a:r>
             <a:r>
               <a:rPr lang="hr-HR" dirty="0"/>
-              <a:t>Dohvaćanje podataka iz baze</a:t>
-            </a:r>
+              <a:t> </a:t>
+            </a:r>
+            <a:r>
+              <a:rPr lang="en-US" dirty="0" err="1"/>
+              <a:t>Koristimo</a:t>
+            </a:r>
+            <a:r>
+              <a:rPr lang="en-US" dirty="0"/>
+              <a:t> </a:t>
+            </a:r>
+            <a:r>
+              <a:rPr lang="en-US" dirty="0" err="1"/>
+              <a:t>pg</a:t>
+            </a:r>
+            <a:r>
+              <a:rPr lang="en-US" dirty="0"/>
+              <a:t> (</a:t>
+            </a:r>
+            <a:r>
+              <a:rPr lang="en-US" dirty="0" err="1"/>
+              <a:t>postgres</a:t>
+            </a:r>
+            <a:r>
+              <a:rPr lang="en-US" dirty="0"/>
+              <a:t> </a:t>
+            </a:r>
+            <a:r>
+              <a:rPr lang="en-US" dirty="0" err="1"/>
+              <a:t>npm</a:t>
+            </a:r>
+            <a:r>
+              <a:rPr lang="en-US" dirty="0"/>
+              <a:t> package)</a:t>
+            </a:r>
+          </a:p>
+          <a:p>
             <a:endParaRPr lang="en-US" dirty="0"/>
           </a:p>
         </p:txBody>
       </p:sp>
-      <p:sp>
-        <p:nvSpPr>
-          <p:cNvPr id="22" name="TextBox 21">
-            <a:extLst>
-              <a:ext uri="{FF2B5EF4-FFF2-40B4-BE49-F238E27FC236}">
-                <a16:creationId xmlns:a16="http://schemas.microsoft.com/office/drawing/2014/main" id="{AECB6984-7E68-73A7-CED7-09997CD802A9}"/>
-              </a:ext>
-            </a:extLst>
-          </p:cNvPr>
-          <p:cNvSpPr txBox="1"/>
-          <p:nvPr/>
-        </p:nvSpPr>
-        <p:spPr>
-          <a:xfrm>
-            <a:off x="8240067" y="1647468"/>
-            <a:ext cx="3464607" cy="369332"/>
-          </a:xfrm>
-          <a:prstGeom prst="rect">
-            <a:avLst/>
-          </a:prstGeom>
-          <a:noFill/>
-        </p:spPr>
-        <p:txBody>
-          <a:bodyPr wrap="square">
-            <a:spAutoFit/>
-          </a:bodyPr>
-          <a:lstStyle/>
-          <a:p>
-            <a:r>
-              <a:rPr lang="en-US" dirty="0"/>
-              <a:t>- </a:t>
-            </a:r>
-            <a:r>
-              <a:rPr lang="hr-HR" dirty="0"/>
-              <a:t>Pokretanje Express servera</a:t>
-            </a:r>
-            <a:endParaRPr lang="en-US" dirty="0"/>
-          </a:p>
-        </p:txBody>
-      </p:sp>
-      <p:pic>
-        <p:nvPicPr>
-          <p:cNvPr id="24" name="Picture 23">
-            <a:extLst>
-              <a:ext uri="{FF2B5EF4-FFF2-40B4-BE49-F238E27FC236}">
-                <a16:creationId xmlns:a16="http://schemas.microsoft.com/office/drawing/2014/main" id="{9E011CA3-7864-E528-CDE4-9B01408D0AD6}"/>
-              </a:ext>
-            </a:extLst>
-          </p:cNvPr>
-          <p:cNvPicPr>
-            <a:picLocks noChangeAspect="1"/>
-          </p:cNvPicPr>
-          <p:nvPr/>
-        </p:nvPicPr>
-        <p:blipFill>
-          <a:blip r:embed="rId5"/>
-          <a:stretch>
-            <a:fillRect/>
-          </a:stretch>
-        </p:blipFill>
-        <p:spPr>
-          <a:xfrm>
-            <a:off x="8349472" y="2340343"/>
-            <a:ext cx="3660535" cy="1560228"/>
-          </a:xfrm>
-          <a:prstGeom prst="rect">
-            <a:avLst/>
-          </a:prstGeom>
-        </p:spPr>
-      </p:pic>
     </p:spTree>
     <p:extLst>
       <p:ext uri="{BB962C8B-B14F-4D97-AF65-F5344CB8AC3E}">
@@ -21819,7 +22277,7 @@
 </p:sld>
 </file>
 
-<file path=ppt/slides/slide28.xml><?xml version="1.0" encoding="utf-8"?>
+<file path=ppt/slides/slide29.xml><?xml version="1.0" encoding="utf-8"?>
 <p:sld xmlns:a="http://schemas.openxmlformats.org/drawingml/2006/main" xmlns:r="http://schemas.openxmlformats.org/officeDocument/2006/relationships" xmlns:p="http://schemas.openxmlformats.org/presentationml/2006/main">
   <p:cSld>
     <p:spTree>
@@ -21827,7 +22285,7 @@
         <p:cNvPr id="1" name="">
           <a:extLst>
             <a:ext uri="{FF2B5EF4-FFF2-40B4-BE49-F238E27FC236}">
-              <a16:creationId xmlns:a16="http://schemas.microsoft.com/office/drawing/2014/main" id="{F95AA1B2-8D60-CF7D-B08C-92C66EEF3872}"/>
+              <a16:creationId xmlns:a16="http://schemas.microsoft.com/office/drawing/2014/main" id="{A29E93B2-76DC-44B9-E499-86CEC697B1DA}"/>
             </a:ext>
           </a:extLst>
         </p:cNvPr>
@@ -21847,7 +22305,7 @@
           <p:cNvPr id="4" name="Title 1">
             <a:extLst>
               <a:ext uri="{FF2B5EF4-FFF2-40B4-BE49-F238E27FC236}">
-                <a16:creationId xmlns:a16="http://schemas.microsoft.com/office/drawing/2014/main" id="{87133C36-5F26-94E0-8705-09A1514B757F}"/>
+                <a16:creationId xmlns:a16="http://schemas.microsoft.com/office/drawing/2014/main" id="{BC9E861E-2F0B-A621-5A54-702C8DAECC9B}"/>
               </a:ext>
             </a:extLst>
           </p:cNvPr>
@@ -21899,89 +22357,9 @@
             </a:r>
             <a:r>
               <a:rPr lang="en-US" dirty="0"/>
-              <a:t> – POVEZIVANJE SA BAZOM</a:t>
+              <a:t> – EXPRESS.JS</a:t>
             </a:r>
             <a:endParaRPr lang="hr-HR" dirty="0"/>
-          </a:p>
-        </p:txBody>
-      </p:sp>
-      <p:sp>
-        <p:nvSpPr>
-          <p:cNvPr id="11" name="TextBox 10">
-            <a:extLst>
-              <a:ext uri="{FF2B5EF4-FFF2-40B4-BE49-F238E27FC236}">
-                <a16:creationId xmlns:a16="http://schemas.microsoft.com/office/drawing/2014/main" id="{AF0E90B3-0411-7412-C4D2-0D9D8AFD31B2}"/>
-              </a:ext>
-            </a:extLst>
-          </p:cNvPr>
-          <p:cNvSpPr txBox="1"/>
-          <p:nvPr/>
-        </p:nvSpPr>
-        <p:spPr>
-          <a:xfrm>
-            <a:off x="1024270" y="1647468"/>
-            <a:ext cx="3638107" cy="369332"/>
-          </a:xfrm>
-          <a:prstGeom prst="rect">
-            <a:avLst/>
-          </a:prstGeom>
-          <a:noFill/>
-        </p:spPr>
-        <p:txBody>
-          <a:bodyPr wrap="square">
-            <a:spAutoFit/>
-          </a:bodyPr>
-          <a:lstStyle/>
-          <a:p>
-            <a:r>
-              <a:rPr lang="en-US" dirty="0"/>
-              <a:t>- </a:t>
-            </a:r>
-            <a:r>
-              <a:rPr lang="hr-HR" dirty="0"/>
-              <a:t>Generiranje slučajnog pitanja</a:t>
-            </a:r>
-            <a:endParaRPr lang="en-US" dirty="0"/>
-          </a:p>
-        </p:txBody>
-      </p:sp>
-      <p:sp>
-        <p:nvSpPr>
-          <p:cNvPr id="22" name="TextBox 21">
-            <a:extLst>
-              <a:ext uri="{FF2B5EF4-FFF2-40B4-BE49-F238E27FC236}">
-                <a16:creationId xmlns:a16="http://schemas.microsoft.com/office/drawing/2014/main" id="{2BF31045-83D3-FC49-CFCF-A1CC8299D3F8}"/>
-              </a:ext>
-            </a:extLst>
-          </p:cNvPr>
-          <p:cNvSpPr txBox="1"/>
-          <p:nvPr/>
-        </p:nvSpPr>
-        <p:spPr>
-          <a:xfrm>
-            <a:off x="6507763" y="1647468"/>
-            <a:ext cx="3464607" cy="369332"/>
-          </a:xfrm>
-          <a:prstGeom prst="rect">
-            <a:avLst/>
-          </a:prstGeom>
-          <a:noFill/>
-        </p:spPr>
-        <p:txBody>
-          <a:bodyPr wrap="square">
-            <a:spAutoFit/>
-          </a:bodyPr>
-          <a:lstStyle/>
-          <a:p>
-            <a:r>
-              <a:rPr lang="en-US" dirty="0"/>
-              <a:t>- </a:t>
-            </a:r>
-            <a:r>
-              <a:rPr lang="hr-HR" dirty="0"/>
-              <a:t>Obrada odgovora korisnika</a:t>
-            </a:r>
-            <a:endParaRPr lang="en-US" dirty="0"/>
           </a:p>
         </p:txBody>
       </p:sp>
@@ -21990,7 +22368,7 @@
           <p:cNvPr id="3" name="Picture 2">
             <a:extLst>
               <a:ext uri="{FF2B5EF4-FFF2-40B4-BE49-F238E27FC236}">
-                <a16:creationId xmlns:a16="http://schemas.microsoft.com/office/drawing/2014/main" id="{DA99D440-24EC-0BF7-3CE8-F6651E1C1B11}"/>
+                <a16:creationId xmlns:a16="http://schemas.microsoft.com/office/drawing/2014/main" id="{D914F24E-C115-4AB6-FB9C-E992F215698F}"/>
               </a:ext>
             </a:extLst>
           </p:cNvPr>
@@ -22007,50 +22385,20 @@
         </p:blipFill>
         <p:spPr>
           <a:xfrm>
-            <a:off x="1166812" y="2289542"/>
-            <a:ext cx="3346709" cy="1968652"/>
+            <a:off x="5074905" y="1879615"/>
+            <a:ext cx="3946265" cy="2818024"/>
           </a:xfrm>
           <a:prstGeom prst="rect">
             <a:avLst/>
           </a:prstGeom>
         </p:spPr>
       </p:pic>
-      <p:pic>
-        <p:nvPicPr>
-          <p:cNvPr id="6" name="Picture 5">
-            <a:extLst>
-              <a:ext uri="{FF2B5EF4-FFF2-40B4-BE49-F238E27FC236}">
-                <a16:creationId xmlns:a16="http://schemas.microsoft.com/office/drawing/2014/main" id="{EBC8540E-99F3-6332-122E-82517EAA0063}"/>
-              </a:ext>
-            </a:extLst>
-          </p:cNvPr>
-          <p:cNvPicPr>
-            <a:picLocks noChangeAspect="1"/>
-          </p:cNvPicPr>
-          <p:nvPr/>
-        </p:nvPicPr>
-        <p:blipFill>
-          <a:blip r:embed="rId4"/>
-          <a:stretch>
-            <a:fillRect/>
-          </a:stretch>
-        </p:blipFill>
-        <p:spPr>
-          <a:xfrm>
-            <a:off x="6574133" y="2289542"/>
-            <a:ext cx="3464607" cy="2203462"/>
-          </a:xfrm>
-          <a:prstGeom prst="rect">
-            <a:avLst/>
-          </a:prstGeom>
-        </p:spPr>
-      </p:pic>
       <p:sp>
         <p:nvSpPr>
-          <p:cNvPr id="7" name="TextBox 6">
-            <a:extLst>
-              <a:ext uri="{FF2B5EF4-FFF2-40B4-BE49-F238E27FC236}">
-                <a16:creationId xmlns:a16="http://schemas.microsoft.com/office/drawing/2014/main" id="{B6A06FFB-09AF-2AE5-ECFA-0CB1FFCB9CE7}"/>
+          <p:cNvPr id="5" name="TextBox 4">
+            <a:extLst>
+              <a:ext uri="{FF2B5EF4-FFF2-40B4-BE49-F238E27FC236}">
+                <a16:creationId xmlns:a16="http://schemas.microsoft.com/office/drawing/2014/main" id="{3205CA7C-77C7-0FDE-D6EA-6005AA7242E6}"/>
               </a:ext>
             </a:extLst>
           </p:cNvPr>
@@ -22059,8 +22407,8 @@
         </p:nvSpPr>
         <p:spPr>
           <a:xfrm>
-            <a:off x="921488" y="4984319"/>
-            <a:ext cx="3638107" cy="369332"/>
+            <a:off x="1039502" y="1237032"/>
+            <a:ext cx="11201400" cy="923330"/>
           </a:xfrm>
           <a:prstGeom prst="rect">
             <a:avLst/>
@@ -22074,8 +22422,28 @@
           <a:lstStyle/>
           <a:p>
             <a:r>
-              <a:rPr lang="hr-HR" dirty="0"/>
-              <a:t>👉</a:t>
+              <a:rPr lang="en-US" dirty="0"/>
+              <a:t>Express.js je </a:t>
+            </a:r>
+            <a:r>
+              <a:rPr lang="en-US" dirty="0" err="1"/>
+              <a:t>popularan</a:t>
+            </a:r>
+            <a:r>
+              <a:rPr lang="en-US" dirty="0"/>
+              <a:t>, </a:t>
+            </a:r>
+            <a:r>
+              <a:rPr lang="en-US" dirty="0" err="1"/>
+              <a:t>minimalistički</a:t>
+            </a:r>
+            <a:r>
+              <a:rPr lang="en-US" dirty="0"/>
+              <a:t> web-</a:t>
+            </a:r>
+            <a:r>
+              <a:rPr lang="en-US" dirty="0" err="1"/>
+              <a:t>aplikacijski</a:t>
             </a:r>
             <a:r>
               <a:rPr lang="en-US" dirty="0"/>
@@ -22083,7 +22451,23 @@
             </a:r>
             <a:r>
               <a:rPr lang="en-US" dirty="0" err="1"/>
-              <a:t>Pokretanje</a:t>
+              <a:t>okvir</a:t>
+            </a:r>
+            <a:r>
+              <a:rPr lang="en-US" dirty="0"/>
+              <a:t> za Node.js. </a:t>
+            </a:r>
+            <a:r>
+              <a:rPr lang="en-US" dirty="0" err="1"/>
+              <a:t>Dostupan</a:t>
+            </a:r>
+            <a:r>
+              <a:rPr lang="en-US" dirty="0"/>
+              <a:t> je </a:t>
+            </a:r>
+            <a:r>
+              <a:rPr lang="en-US" dirty="0" err="1"/>
+              <a:t>kao</a:t>
             </a:r>
             <a:r>
               <a:rPr lang="en-US" dirty="0"/>
@@ -22091,157 +22475,187 @@
             </a:r>
             <a:r>
               <a:rPr lang="en-US" dirty="0" err="1"/>
-              <a:t>aplikacije</a:t>
-            </a:r>
-            <a:endParaRPr lang="en-US" dirty="0"/>
-          </a:p>
-        </p:txBody>
-      </p:sp>
-      <p:pic>
-        <p:nvPicPr>
-          <p:cNvPr id="9" name="Picture 8">
-            <a:extLst>
-              <a:ext uri="{FF2B5EF4-FFF2-40B4-BE49-F238E27FC236}">
-                <a16:creationId xmlns:a16="http://schemas.microsoft.com/office/drawing/2014/main" id="{8925F186-3234-9204-0D29-A6A96B8B31C3}"/>
-              </a:ext>
-            </a:extLst>
-          </p:cNvPr>
-          <p:cNvPicPr>
-            <a:picLocks noChangeAspect="1"/>
-          </p:cNvPicPr>
-          <p:nvPr/>
-        </p:nvPicPr>
-        <p:blipFill>
-          <a:blip r:embed="rId5"/>
-          <a:stretch>
-            <a:fillRect/>
-          </a:stretch>
-        </p:blipFill>
-        <p:spPr>
-          <a:xfrm>
-            <a:off x="4513521" y="4916572"/>
-            <a:ext cx="1400175" cy="504825"/>
-          </a:xfrm>
-          <a:prstGeom prst="rect">
-            <a:avLst/>
-          </a:prstGeom>
-        </p:spPr>
-      </p:pic>
-    </p:spTree>
-    <p:extLst>
-      <p:ext uri="{BB962C8B-B14F-4D97-AF65-F5344CB8AC3E}">
-        <p14:creationId xmlns:p14="http://schemas.microsoft.com/office/powerpoint/2010/main" val="1520390030"/>
-      </p:ext>
-    </p:extLst>
-  </p:cSld>
-  <p:clrMapOvr>
-    <a:masterClrMapping/>
-  </p:clrMapOvr>
-</p:sld>
-</file>
-
-<file path=ppt/slides/slide29.xml><?xml version="1.0" encoding="utf-8"?>
-<p:sld xmlns:a="http://schemas.openxmlformats.org/drawingml/2006/main" xmlns:r="http://schemas.openxmlformats.org/officeDocument/2006/relationships" xmlns:p="http://schemas.openxmlformats.org/presentationml/2006/main">
-  <p:cSld>
-    <p:spTree>
-      <p:nvGrpSpPr>
-        <p:cNvPr id="1" name="">
-          <a:extLst>
-            <a:ext uri="{FF2B5EF4-FFF2-40B4-BE49-F238E27FC236}">
-              <a16:creationId xmlns:a16="http://schemas.microsoft.com/office/drawing/2014/main" id="{9D6EF2B3-C1C8-AEBF-2741-42FCAC0913C8}"/>
-            </a:ext>
-          </a:extLst>
-        </p:cNvPr>
-        <p:cNvGrpSpPr/>
-        <p:nvPr/>
-      </p:nvGrpSpPr>
-      <p:grpSpPr>
-        <a:xfrm>
-          <a:off x="0" y="0"/>
-          <a:ext cx="0" cy="0"/>
-          <a:chOff x="0" y="0"/>
-          <a:chExt cx="0" cy="0"/>
-        </a:xfrm>
-      </p:grpSpPr>
-      <p:sp>
-        <p:nvSpPr>
-          <p:cNvPr id="2" name="Title 1">
-            <a:extLst>
-              <a:ext uri="{FF2B5EF4-FFF2-40B4-BE49-F238E27FC236}">
-                <a16:creationId xmlns:a16="http://schemas.microsoft.com/office/drawing/2014/main" id="{9E3F17B2-EF5A-3CF5-6AF8-371CD53C963B}"/>
-              </a:ext>
-            </a:extLst>
-          </p:cNvPr>
-          <p:cNvSpPr>
-            <a:spLocks noGrp="1"/>
-          </p:cNvSpPr>
-          <p:nvPr>
-            <p:ph type="title"/>
-          </p:nvPr>
-        </p:nvSpPr>
-        <p:spPr/>
-        <p:txBody>
-          <a:bodyPr/>
-          <a:lstStyle/>
-          <a:p>
+              <a:t>npm</a:t>
+            </a:r>
             <a:r>
               <a:rPr lang="en-US" dirty="0"/>
-              <a:t>VJE</a:t>
-            </a:r>
-            <a:r>
-              <a:rPr lang="hr-HR" dirty="0"/>
-              <a:t>ž</a:t>
+              <a:t> </a:t>
             </a:r>
             <a:r>
               <a:rPr lang="en-US" dirty="0" err="1"/>
-              <a:t>ba</a:t>
-            </a:r>
-            <a:endParaRPr lang="hr-HR" dirty="0"/>
+              <a:t>paket</a:t>
+            </a:r>
+            <a:r>
+              <a:rPr lang="en-US" dirty="0"/>
+              <a:t> (express) </a:t>
+            </a:r>
+            <a:r>
+              <a:rPr lang="en-US" dirty="0" err="1"/>
+              <a:t>i</a:t>
+            </a:r>
+            <a:r>
+              <a:rPr lang="en-US" dirty="0"/>
+              <a:t> </a:t>
+            </a:r>
+            <a:r>
+              <a:rPr lang="en-US" dirty="0" err="1"/>
+              <a:t>djeluje</a:t>
+            </a:r>
+            <a:r>
+              <a:rPr lang="en-US" dirty="0"/>
+              <a:t> </a:t>
+            </a:r>
+            <a:r>
+              <a:rPr lang="en-US" dirty="0" err="1"/>
+              <a:t>kao</a:t>
+            </a:r>
+            <a:r>
+              <a:rPr lang="en-US" dirty="0"/>
+              <a:t> tanka </a:t>
+            </a:r>
+            <a:r>
+              <a:rPr lang="en-US" dirty="0" err="1"/>
+              <a:t>nadogradnja</a:t>
+            </a:r>
+            <a:r>
+              <a:rPr lang="en-US" dirty="0"/>
+              <a:t> </a:t>
+            </a:r>
+            <a:r>
+              <a:rPr lang="en-US" dirty="0" err="1"/>
+              <a:t>na</a:t>
+            </a:r>
+            <a:r>
+              <a:rPr lang="en-US" dirty="0"/>
+              <a:t> </a:t>
+            </a:r>
+            <a:r>
+              <a:rPr lang="en-US" dirty="0" err="1"/>
+              <a:t>ugrađeni</a:t>
+            </a:r>
+            <a:r>
+              <a:rPr lang="en-US" dirty="0"/>
+              <a:t> Node-</a:t>
+            </a:r>
+            <a:r>
+              <a:rPr lang="en-US" dirty="0" err="1"/>
+              <a:t>ov</a:t>
+            </a:r>
+            <a:r>
+              <a:rPr lang="en-US" dirty="0"/>
+              <a:t> HTTP </a:t>
+            </a:r>
+            <a:r>
+              <a:rPr lang="en-US" dirty="0" err="1"/>
+              <a:t>modul</a:t>
+            </a:r>
+            <a:r>
+              <a:rPr lang="en-US" dirty="0"/>
+              <a:t>, </a:t>
+            </a:r>
+            <a:r>
+              <a:rPr lang="en-US" dirty="0" err="1"/>
+              <a:t>dodajući</a:t>
+            </a:r>
+            <a:r>
+              <a:rPr lang="en-US" dirty="0"/>
+              <a:t> </a:t>
+            </a:r>
+            <a:r>
+              <a:rPr lang="en-US" dirty="0" err="1"/>
+              <a:t>apstrakcije</a:t>
+            </a:r>
+            <a:r>
+              <a:rPr lang="en-US" dirty="0"/>
+              <a:t> </a:t>
+            </a:r>
+            <a:r>
+              <a:rPr lang="en-US" dirty="0" err="1"/>
+              <a:t>višeg</a:t>
+            </a:r>
+            <a:r>
+              <a:rPr lang="en-US" dirty="0"/>
+              <a:t> </a:t>
+            </a:r>
+            <a:r>
+              <a:rPr lang="en-US" dirty="0" err="1"/>
+              <a:t>nivoa</a:t>
+            </a:r>
+            <a:r>
+              <a:rPr lang="en-US" dirty="0"/>
+              <a:t> za </a:t>
+            </a:r>
+            <a:r>
+              <a:rPr lang="en-US" dirty="0" err="1"/>
+              <a:t>izradu</a:t>
+            </a:r>
+            <a:r>
+              <a:rPr lang="en-US" dirty="0"/>
+              <a:t> web-</a:t>
+            </a:r>
+            <a:r>
+              <a:rPr lang="en-US" dirty="0" err="1"/>
+              <a:t>servera</a:t>
+            </a:r>
+            <a:r>
+              <a:rPr lang="en-US" dirty="0"/>
+              <a:t> </a:t>
+            </a:r>
+            <a:r>
+              <a:rPr lang="en-US" dirty="0" err="1"/>
+              <a:t>i</a:t>
+            </a:r>
+            <a:r>
+              <a:rPr lang="en-US" dirty="0"/>
+              <a:t> API-ja.</a:t>
+            </a:r>
           </a:p>
         </p:txBody>
       </p:sp>
       <p:sp>
         <p:nvSpPr>
-          <p:cNvPr id="6" name="Text Placeholder 5">
-            <a:extLst>
-              <a:ext uri="{FF2B5EF4-FFF2-40B4-BE49-F238E27FC236}">
-                <a16:creationId xmlns:a16="http://schemas.microsoft.com/office/drawing/2014/main" id="{97E54977-B2B8-0D17-13C2-C5C4C104DF41}"/>
-              </a:ext>
-            </a:extLst>
-          </p:cNvPr>
-          <p:cNvSpPr>
-            <a:spLocks noGrp="1"/>
-          </p:cNvSpPr>
-          <p:nvPr>
-            <p:ph type="body" sz="half" idx="2"/>
-          </p:nvPr>
+          <p:cNvPr id="6" name="TextBox 5">
+            <a:extLst>
+              <a:ext uri="{FF2B5EF4-FFF2-40B4-BE49-F238E27FC236}">
+                <a16:creationId xmlns:a16="http://schemas.microsoft.com/office/drawing/2014/main" id="{63F9C440-821C-E693-C8B5-28F742C0778C}"/>
+              </a:ext>
+            </a:extLst>
+          </p:cNvPr>
+          <p:cNvSpPr txBox="1"/>
+          <p:nvPr/>
         </p:nvSpPr>
-        <p:spPr/>
+        <p:spPr>
+          <a:xfrm>
+            <a:off x="1115701" y="4759389"/>
+            <a:ext cx="9299813" cy="923330"/>
+          </a:xfrm>
+          <a:prstGeom prst="rect">
+            <a:avLst/>
+          </a:prstGeom>
+          <a:noFill/>
+        </p:spPr>
         <p:txBody>
-          <a:bodyPr/>
+          <a:bodyPr wrap="square">
+            <a:spAutoFit/>
+          </a:bodyPr>
           <a:lstStyle/>
           <a:p>
             <a:r>
-              <a:rPr lang="en-US" dirty="0"/>
-              <a:t>UPDATE, DELETE, ORDER BY I ALTER</a:t>
-            </a:r>
-            <a:br>
-              <a:rPr lang="en-US" dirty="0"/>
-            </a:br>
-            <a:br>
-              <a:rPr lang="en-US" dirty="0"/>
-            </a:br>
+              <a:rPr lang="hr-HR" b="1" dirty="0"/>
+              <a:t>Jednostavnost nad “sve-u-jednom”</a:t>
+            </a:r>
             <a:r>
               <a:rPr lang="hr-HR" dirty="0"/>
-              <a:t>https://docs.google.com/document/d/1yj9ZgRMeeVH-M-Khr318v2uXekogUSFAQFC9KAqBhvo/edit?usp=sharing</a:t>
-            </a:r>
+              <a:t>: Express vam daje tek dovoljno strukture (ruter, middleware, rukovanje zahtjevom/odgovorom) bez nametanja određenog rasporeda projekta ili dodatnih značajki (kao što su ORM-ovi ili motor za predloške).</a:t>
+            </a:r>
+            <a:endParaRPr lang="en-US" dirty="0"/>
           </a:p>
         </p:txBody>
       </p:sp>
     </p:spTree>
     <p:extLst>
       <p:ext uri="{BB962C8B-B14F-4D97-AF65-F5344CB8AC3E}">
-        <p14:creationId xmlns:p14="http://schemas.microsoft.com/office/powerpoint/2010/main" val="3511950210"/>
+        <p14:creationId xmlns:p14="http://schemas.microsoft.com/office/powerpoint/2010/main" val="1351308387"/>
       </p:ext>
     </p:extLst>
   </p:cSld>
@@ -23167,6 +23581,117 @@
         <p:cNvPr id="1" name="">
           <a:extLst>
             <a:ext uri="{FF2B5EF4-FFF2-40B4-BE49-F238E27FC236}">
+              <a16:creationId xmlns:a16="http://schemas.microsoft.com/office/drawing/2014/main" id="{9D6EF2B3-C1C8-AEBF-2741-42FCAC0913C8}"/>
+            </a:ext>
+          </a:extLst>
+        </p:cNvPr>
+        <p:cNvGrpSpPr/>
+        <p:nvPr/>
+      </p:nvGrpSpPr>
+      <p:grpSpPr>
+        <a:xfrm>
+          <a:off x="0" y="0"/>
+          <a:ext cx="0" cy="0"/>
+          <a:chOff x="0" y="0"/>
+          <a:chExt cx="0" cy="0"/>
+        </a:xfrm>
+      </p:grpSpPr>
+      <p:sp>
+        <p:nvSpPr>
+          <p:cNvPr id="2" name="Title 1">
+            <a:extLst>
+              <a:ext uri="{FF2B5EF4-FFF2-40B4-BE49-F238E27FC236}">
+                <a16:creationId xmlns:a16="http://schemas.microsoft.com/office/drawing/2014/main" id="{9E3F17B2-EF5A-3CF5-6AF8-371CD53C963B}"/>
+              </a:ext>
+            </a:extLst>
+          </p:cNvPr>
+          <p:cNvSpPr>
+            <a:spLocks noGrp="1"/>
+          </p:cNvSpPr>
+          <p:nvPr>
+            <p:ph type="title"/>
+          </p:nvPr>
+        </p:nvSpPr>
+        <p:spPr/>
+        <p:txBody>
+          <a:bodyPr/>
+          <a:lstStyle/>
+          <a:p>
+            <a:r>
+              <a:rPr lang="en-US" dirty="0"/>
+              <a:t>VJE</a:t>
+            </a:r>
+            <a:r>
+              <a:rPr lang="hr-HR" dirty="0"/>
+              <a:t>ž</a:t>
+            </a:r>
+            <a:r>
+              <a:rPr lang="en-US" dirty="0" err="1"/>
+              <a:t>ba</a:t>
+            </a:r>
+            <a:endParaRPr lang="hr-HR" dirty="0"/>
+          </a:p>
+        </p:txBody>
+      </p:sp>
+      <p:sp>
+        <p:nvSpPr>
+          <p:cNvPr id="6" name="Text Placeholder 5">
+            <a:extLst>
+              <a:ext uri="{FF2B5EF4-FFF2-40B4-BE49-F238E27FC236}">
+                <a16:creationId xmlns:a16="http://schemas.microsoft.com/office/drawing/2014/main" id="{97E54977-B2B8-0D17-13C2-C5C4C104DF41}"/>
+              </a:ext>
+            </a:extLst>
+          </p:cNvPr>
+          <p:cNvSpPr>
+            <a:spLocks noGrp="1"/>
+          </p:cNvSpPr>
+          <p:nvPr>
+            <p:ph type="body" sz="half" idx="2"/>
+          </p:nvPr>
+        </p:nvSpPr>
+        <p:spPr/>
+        <p:txBody>
+          <a:bodyPr/>
+          <a:lstStyle/>
+          <a:p>
+            <a:r>
+              <a:rPr lang="en-US" dirty="0"/>
+              <a:t>UPDATE, DELETE, ORDER BY I ALTER</a:t>
+            </a:r>
+            <a:br>
+              <a:rPr lang="en-US" dirty="0"/>
+            </a:br>
+            <a:br>
+              <a:rPr lang="en-US" dirty="0"/>
+            </a:br>
+            <a:r>
+              <a:rPr lang="hr-HR" dirty="0"/>
+              <a:t>https://docs.google.com/document/d/1yj9ZgRMeeVH-M-Khr318v2uXekogUSFAQFC9KAqBhvo/edit?usp=sharing</a:t>
+            </a:r>
+          </a:p>
+        </p:txBody>
+      </p:sp>
+    </p:spTree>
+    <p:extLst>
+      <p:ext uri="{BB962C8B-B14F-4D97-AF65-F5344CB8AC3E}">
+        <p14:creationId xmlns:p14="http://schemas.microsoft.com/office/powerpoint/2010/main" val="3511950210"/>
+      </p:ext>
+    </p:extLst>
+  </p:cSld>
+  <p:clrMapOvr>
+    <a:masterClrMapping/>
+  </p:clrMapOvr>
+</p:sld>
+</file>
+
+<file path=ppt/slides/slide31.xml><?xml version="1.0" encoding="utf-8"?>
+<p:sld xmlns:a="http://schemas.openxmlformats.org/drawingml/2006/main" xmlns:r="http://schemas.openxmlformats.org/officeDocument/2006/relationships" xmlns:p="http://schemas.openxmlformats.org/presentationml/2006/main">
+  <p:cSld>
+    <p:spTree>
+      <p:nvGrpSpPr>
+        <p:cNvPr id="1" name="">
+          <a:extLst>
+            <a:ext uri="{FF2B5EF4-FFF2-40B4-BE49-F238E27FC236}">
               <a16:creationId xmlns:a16="http://schemas.microsoft.com/office/drawing/2014/main" id="{762AAD0E-B24A-B0E8-3EBA-B07269FE5286}"/>
             </a:ext>
           </a:extLst>
@@ -23312,7 +23837,7 @@
 </p:sld>
 </file>
 
-<file path=ppt/slides/slide31.xml><?xml version="1.0" encoding="utf-8"?>
+<file path=ppt/slides/slide32.xml><?xml version="1.0" encoding="utf-8"?>
 <p:sld xmlns:a="http://schemas.openxmlformats.org/drawingml/2006/main" xmlns:r="http://schemas.openxmlformats.org/officeDocument/2006/relationships" xmlns:p="http://schemas.openxmlformats.org/presentationml/2006/main">
   <p:cSld>
     <p:spTree>
@@ -25127,7 +25652,7 @@
         <p:spPr>
           <a:xfrm>
             <a:off x="751368" y="1336119"/>
-            <a:ext cx="5258686" cy="4185761"/>
+            <a:ext cx="5258686" cy="4401205"/>
           </a:xfrm>
           <a:prstGeom prst="rect">
             <a:avLst/>
@@ -25167,8 +25692,104 @@
             </a:pPr>
             <a:r>
               <a:rPr lang="hr-HR" sz="1400" dirty="0"/>
-              <a:t>VARCHAR(n) – Varijabilna duljina teksta (maksimalno n znakova)</a:t>
-            </a:r>
+              <a:t>VARCHAR(n) – Varijabilna duljina teksta (maksimalno n</a:t>
+            </a:r>
+            <a:r>
+              <a:rPr lang="en-US" sz="1400" dirty="0"/>
+              <a:t> - </a:t>
+            </a:r>
+            <a:r>
+              <a:rPr lang="en-US" sz="1400" dirty="0" err="1"/>
+              <a:t>ali</a:t>
+            </a:r>
+            <a:r>
+              <a:rPr lang="en-US" sz="1400" dirty="0"/>
+              <a:t> </a:t>
+            </a:r>
+            <a:r>
+              <a:rPr lang="en-US" sz="1400" dirty="0" err="1"/>
+              <a:t>iskoristeno</a:t>
+            </a:r>
+            <a:r>
+              <a:rPr lang="en-US" sz="1400" dirty="0"/>
+              <a:t> je </a:t>
+            </a:r>
+            <a:r>
+              <a:rPr lang="en-US" sz="1400" dirty="0" err="1"/>
+              <a:t>memorije</a:t>
+            </a:r>
+            <a:r>
+              <a:rPr lang="en-US" sz="1400" dirty="0"/>
+              <a:t> Koliko </a:t>
+            </a:r>
+            <a:r>
+              <a:rPr lang="en-US" sz="1400" dirty="0" err="1"/>
+              <a:t>ima</a:t>
+            </a:r>
+            <a:r>
+              <a:rPr lang="en-US" sz="1400" dirty="0"/>
+              <a:t> </a:t>
+            </a:r>
+            <a:r>
+              <a:rPr lang="en-US" sz="1400" dirty="0" err="1"/>
+              <a:t>znakova</a:t>
+            </a:r>
+            <a:r>
+              <a:rPr lang="hr-HR" sz="1400" dirty="0"/>
+              <a:t> znakova)</a:t>
+            </a:r>
+            <a:br>
+              <a:rPr lang="en-US" sz="1400" dirty="0"/>
+            </a:br>
+            <a:r>
+              <a:rPr lang="en-US" sz="1400" dirty="0"/>
+              <a:t>- CHAR(50) -</a:t>
+            </a:r>
+            <a:r>
+              <a:rPr lang="en-US" sz="1400" dirty="0" err="1"/>
+              <a:t>fiksira</a:t>
+            </a:r>
+            <a:r>
+              <a:rPr lang="en-US" sz="1400" dirty="0"/>
+              <a:t> </a:t>
+            </a:r>
+            <a:r>
+              <a:rPr lang="en-US" sz="1400" dirty="0" err="1"/>
+              <a:t>memoriju</a:t>
+            </a:r>
+            <a:r>
+              <a:rPr lang="en-US" sz="1400" dirty="0"/>
+              <a:t> </a:t>
+            </a:r>
+            <a:r>
+              <a:rPr lang="en-US" sz="1400" dirty="0" err="1"/>
+              <a:t>na</a:t>
+            </a:r>
+            <a:r>
+              <a:rPr lang="en-US" sz="1400" dirty="0"/>
+              <a:t> </a:t>
+            </a:r>
+            <a:r>
+              <a:rPr lang="en-US" sz="1400" dirty="0" err="1"/>
+              <a:t>vrijednost</a:t>
+            </a:r>
+            <a:r>
+              <a:rPr lang="en-US" sz="1400" dirty="0"/>
+              <a:t> </a:t>
+            </a:r>
+            <a:r>
+              <a:rPr lang="en-US" sz="1400" dirty="0" err="1"/>
+              <a:t>koja</a:t>
+            </a:r>
+            <a:r>
+              <a:rPr lang="en-US" sz="1400" dirty="0"/>
+              <a:t> je </a:t>
+            </a:r>
+            <a:r>
+              <a:rPr lang="en-US" sz="1400" dirty="0" err="1"/>
+              <a:t>unesena</a:t>
+            </a:r>
+            <a:endParaRPr lang="hr-HR" sz="1400" dirty="0"/>
           </a:p>
           <a:p>
             <a:pPr>
@@ -25327,12 +25948,17 @@
               <a:rPr lang="hr-HR" sz="1400" dirty="0"/>
               <a:t>VARCHAR(50) = ograničenje na 50 znakova</a:t>
             </a:r>
-          </a:p>
-          <a:p>
-            <a:pPr>
-              <a:buFont typeface="Arial" panose="020B0604020202020204" pitchFamily="34" charset="0"/>
-              <a:buChar char="•"/>
-            </a:pPr>
+            <a:r>
+              <a:rPr lang="en-US" sz="1400" dirty="0"/>
+              <a:t>, </a:t>
+            </a:r>
+            <a:br>
+              <a:rPr lang="en-US" sz="1400" dirty="0"/>
+            </a:br>
+            <a:r>
+              <a:rPr lang="en-US" sz="1400" dirty="0"/>
+              <a:t>- </a:t>
+            </a:r>
             <a:r>
               <a:rPr lang="hr-HR" sz="1400" dirty="0"/>
               <a:t>TEXT = nema ograničenja</a:t>
@@ -27604,17 +28230,6 @@
 </file>
 
 <file path=customXml/item2.xml><?xml version="1.0" encoding="utf-8"?>
-<p:properties xmlns:p="http://schemas.microsoft.com/office/2006/metadata/properties" xmlns:xsi="http://www.w3.org/2001/XMLSchema-instance" xmlns:pc="http://schemas.microsoft.com/office/infopath/2007/PartnerControls">
-  <documentManagement>
-    <lcf76f155ced4ddcb4097134ff3c332f xmlns="40806f44-bc4a-4ea4-b660-c6da93f8f179">
-      <Terms xmlns="http://schemas.microsoft.com/office/infopath/2007/PartnerControls"/>
-    </lcf76f155ced4ddcb4097134ff3c332f>
-    <TaxCatchAll xmlns="758d0d8f-b783-4c78-ab73-9740c97b97cf" xsi:nil="true"/>
-  </documentManagement>
-</p:properties>
-</file>
-
-<file path=customXml/item3.xml><?xml version="1.0" encoding="utf-8"?>
 <ct:contentTypeSchema xmlns:ct="http://schemas.microsoft.com/office/2006/metadata/contentType" xmlns:ma="http://schemas.microsoft.com/office/2006/metadata/properties/metaAttributes" ct:_="" ma:_="" ma:contentTypeName="Document" ma:contentTypeID="0x010100E4F55D9EF0BF0A44B819E681FCAC00B7" ma:contentTypeVersion="12" ma:contentTypeDescription="Create a new document." ma:contentTypeScope="" ma:versionID="068ce121a7a7a0aebcb89dd601c4f0a2">
   <xsd:schema xmlns:xsd="http://www.w3.org/2001/XMLSchema" xmlns:xs="http://www.w3.org/2001/XMLSchema" xmlns:p="http://schemas.microsoft.com/office/2006/metadata/properties" xmlns:ns2="40806f44-bc4a-4ea4-b660-c6da93f8f179" xmlns:ns3="758d0d8f-b783-4c78-ab73-9740c97b97cf" targetNamespace="http://schemas.microsoft.com/office/2006/metadata/properties" ma:root="true" ma:fieldsID="67c58e6c5c8ea9af0822acd84d25e1a2" ns2:_="" ns3:_="">
     <xsd:import namespace="40806f44-bc4a-4ea4-b660-c6da93f8f179"/>
@@ -27831,6 +28446,17 @@
 </ct:contentTypeSchema>
 </file>
 
+<file path=customXml/item3.xml><?xml version="1.0" encoding="utf-8"?>
+<p:properties xmlns:p="http://schemas.microsoft.com/office/2006/metadata/properties" xmlns:xsi="http://www.w3.org/2001/XMLSchema-instance" xmlns:pc="http://schemas.microsoft.com/office/infopath/2007/PartnerControls">
+  <documentManagement>
+    <lcf76f155ced4ddcb4097134ff3c332f xmlns="40806f44-bc4a-4ea4-b660-c6da93f8f179">
+      <Terms xmlns="http://schemas.microsoft.com/office/infopath/2007/PartnerControls"/>
+    </lcf76f155ced4ddcb4097134ff3c332f>
+    <TaxCatchAll xmlns="758d0d8f-b783-4c78-ab73-9740c97b97cf" xsi:nil="true"/>
+  </documentManagement>
+</p:properties>
+</file>
+
 <file path=customXml/itemProps1.xml><?xml version="1.0" encoding="utf-8"?>
 <ds:datastoreItem xmlns:ds="http://schemas.openxmlformats.org/officeDocument/2006/customXml" ds:itemID="{46915D30-CAA6-465E-907F-1770D4E3B01D}">
   <ds:schemaRefs>
@@ -27840,23 +28466,6 @@
 </file>
 
 <file path=customXml/itemProps2.xml><?xml version="1.0" encoding="utf-8"?>
-<ds:datastoreItem xmlns:ds="http://schemas.openxmlformats.org/officeDocument/2006/customXml" ds:itemID="{61E72F81-8533-461E-8E71-A6D77294CFEF}">
-  <ds:schemaRefs>
-    <ds:schemaRef ds:uri="http://purl.org/dc/elements/1.1/"/>
-    <ds:schemaRef ds:uri="http://www.w3.org/XML/1998/namespace"/>
-    <ds:schemaRef ds:uri="http://purl.org/dc/terms/"/>
-    <ds:schemaRef ds:uri="http://schemas.microsoft.com/office/2006/documentManagement/types"/>
-    <ds:schemaRef ds:uri="40806f44-bc4a-4ea4-b660-c6da93f8f179"/>
-    <ds:schemaRef ds:uri="http://schemas.openxmlformats.org/package/2006/metadata/core-properties"/>
-    <ds:schemaRef ds:uri="http://purl.org/dc/dcmitype/"/>
-    <ds:schemaRef ds:uri="http://schemas.microsoft.com/office/infopath/2007/PartnerControls"/>
-    <ds:schemaRef ds:uri="758d0d8f-b783-4c78-ab73-9740c97b97cf"/>
-    <ds:schemaRef ds:uri="http://schemas.microsoft.com/office/2006/metadata/properties"/>
-  </ds:schemaRefs>
-</ds:datastoreItem>
-</file>
-
-<file path=customXml/itemProps3.xml><?xml version="1.0" encoding="utf-8"?>
 <ds:datastoreItem xmlns:ds="http://schemas.openxmlformats.org/officeDocument/2006/customXml" ds:itemID="{4E6AED0F-96FF-4C7F-8AC9-672C91BFCDFE}">
   <ds:schemaRefs>
     <ds:schemaRef ds:uri="http://schemas.microsoft.com/office/2006/metadata/contentType"/>
@@ -27873,4 +28482,21 @@
     <ds:schemaRef ds:uri="http://schemas.microsoft.com/internal/obd"/>
   </ds:schemaRefs>
 </ds:datastoreItem>
+</file>
+
+<file path=customXml/itemProps3.xml><?xml version="1.0" encoding="utf-8"?>
+<ds:datastoreItem xmlns:ds="http://schemas.openxmlformats.org/officeDocument/2006/customXml" ds:itemID="{61E72F81-8533-461E-8E71-A6D77294CFEF}">
+  <ds:schemaRefs>
+    <ds:schemaRef ds:uri="http://purl.org/dc/elements/1.1/"/>
+    <ds:schemaRef ds:uri="http://www.w3.org/XML/1998/namespace"/>
+    <ds:schemaRef ds:uri="http://purl.org/dc/terms/"/>
+    <ds:schemaRef ds:uri="http://schemas.microsoft.com/office/2006/documentManagement/types"/>
+    <ds:schemaRef ds:uri="40806f44-bc4a-4ea4-b660-c6da93f8f179"/>
+    <ds:schemaRef ds:uri="http://schemas.openxmlformats.org/package/2006/metadata/core-properties"/>
+    <ds:schemaRef ds:uri="http://purl.org/dc/dcmitype/"/>
+    <ds:schemaRef ds:uri="http://schemas.microsoft.com/office/infopath/2007/PartnerControls"/>
+    <ds:schemaRef ds:uri="758d0d8f-b783-4c78-ab73-9740c97b97cf"/>
+    <ds:schemaRef ds:uri="http://schemas.microsoft.com/office/2006/metadata/properties"/>
+  </ds:schemaRefs>
+</ds:datastoreItem>
 </file>
</xml_diff>